<commit_message>
Updated powerpoint with all slides for Part 1.  Still need to practice
</commit_message>
<xml_diff>
--- a/Git and LV.pptx
+++ b/Git and LV.pptx
@@ -4,10 +4,23 @@
   <p:sldMasterIdLst>
     <p:sldMasterId id="2147483660" r:id="rId1"/>
   </p:sldMasterIdLst>
+  <p:notesMasterIdLst>
+    <p:notesMasterId r:id="rId15"/>
+  </p:notesMasterIdLst>
   <p:sldIdLst>
     <p:sldId id="256" r:id="rId2"/>
     <p:sldId id="257" r:id="rId3"/>
     <p:sldId id="258" r:id="rId4"/>
+    <p:sldId id="259" r:id="rId5"/>
+    <p:sldId id="260" r:id="rId6"/>
+    <p:sldId id="261" r:id="rId7"/>
+    <p:sldId id="262" r:id="rId8"/>
+    <p:sldId id="263" r:id="rId9"/>
+    <p:sldId id="264" r:id="rId10"/>
+    <p:sldId id="265" r:id="rId11"/>
+    <p:sldId id="266" r:id="rId12"/>
+    <p:sldId id="267" r:id="rId13"/>
+    <p:sldId id="268" r:id="rId14"/>
   </p:sldIdLst>
   <p:sldSz cx="12192000" cy="6858000"/>
   <p:notesSz cx="6858000" cy="9144000"/>
@@ -106,7 +119,479 @@
       </a:defRPr>
     </a:lvl9pPr>
   </p:defaultTextStyle>
+  <p:extLst>
+    <p:ext uri="{EFAFB233-063F-42B5-8137-9DF3F51BA10A}">
+      <p15:sldGuideLst xmlns:p15="http://schemas.microsoft.com/office/powerpoint/2012/main"/>
+    </p:ext>
+  </p:extLst>
 </p:presentation>
+</file>
+
+<file path=ppt/notesMasters/notesMaster1.xml><?xml version="1.0" encoding="utf-8"?>
+<p:notesMaster xmlns:a="http://schemas.openxmlformats.org/drawingml/2006/main" xmlns:r="http://schemas.openxmlformats.org/officeDocument/2006/relationships" xmlns:p="http://schemas.openxmlformats.org/presentationml/2006/main">
+  <p:cSld>
+    <p:bg>
+      <p:bgRef idx="1001">
+        <a:schemeClr val="bg1"/>
+      </p:bgRef>
+    </p:bg>
+    <p:spTree>
+      <p:nvGrpSpPr>
+        <p:cNvPr id="1" name=""/>
+        <p:cNvGrpSpPr/>
+        <p:nvPr/>
+      </p:nvGrpSpPr>
+      <p:grpSpPr>
+        <a:xfrm>
+          <a:off x="0" y="0"/>
+          <a:ext cx="0" cy="0"/>
+          <a:chOff x="0" y="0"/>
+          <a:chExt cx="0" cy="0"/>
+        </a:xfrm>
+      </p:grpSpPr>
+      <p:sp>
+        <p:nvSpPr>
+          <p:cNvPr id="2" name="Header Placeholder 1">
+            <a:extLst>
+              <a:ext uri="{FF2B5EF4-FFF2-40B4-BE49-F238E27FC236}">
+                <a16:creationId xmlns:a16="http://schemas.microsoft.com/office/drawing/2014/main" id="{9CA8C556-2CBB-4F64-9D66-09564EDC5300}"/>
+              </a:ext>
+            </a:extLst>
+          </p:cNvPr>
+          <p:cNvSpPr>
+            <a:spLocks noGrp="1"/>
+          </p:cNvSpPr>
+          <p:nvPr>
+            <p:ph type="hdr" sz="quarter"/>
+          </p:nvPr>
+        </p:nvSpPr>
+        <p:spPr>
+          <a:xfrm>
+            <a:off x="0" y="0"/>
+            <a:ext cx="2971800" cy="458788"/>
+          </a:xfrm>
+          <a:prstGeom prst="rect">
+            <a:avLst/>
+          </a:prstGeom>
+        </p:spPr>
+        <p:txBody>
+          <a:bodyPr vert="horz" lIns="91440" tIns="45720" rIns="91440" bIns="45720" rtlCol="0"/>
+          <a:lstStyle>
+            <a:lvl1pPr algn="l">
+              <a:defRPr sz="1200"/>
+            </a:lvl1pPr>
+          </a:lstStyle>
+          <a:p>
+            <a:endParaRPr lang="en-US"/>
+          </a:p>
+        </p:txBody>
+      </p:sp>
+      <p:sp>
+        <p:nvSpPr>
+          <p:cNvPr id="3" name="Date Placeholder 2">
+            <a:extLst>
+              <a:ext uri="{FF2B5EF4-FFF2-40B4-BE49-F238E27FC236}">
+                <a16:creationId xmlns:a16="http://schemas.microsoft.com/office/drawing/2014/main" id="{4F52CC0C-C158-4AC2-A5C9-43A498E72F39}"/>
+              </a:ext>
+            </a:extLst>
+          </p:cNvPr>
+          <p:cNvSpPr>
+            <a:spLocks noGrp="1"/>
+          </p:cNvSpPr>
+          <p:nvPr>
+            <p:ph type="dt" idx="1"/>
+          </p:nvPr>
+        </p:nvSpPr>
+        <p:spPr>
+          <a:xfrm>
+            <a:off x="3884613" y="0"/>
+            <a:ext cx="2971800" cy="458788"/>
+          </a:xfrm>
+          <a:prstGeom prst="rect">
+            <a:avLst/>
+          </a:prstGeom>
+        </p:spPr>
+        <p:txBody>
+          <a:bodyPr vert="horz" lIns="91440" tIns="45720" rIns="91440" bIns="45720" rtlCol="0"/>
+          <a:lstStyle>
+            <a:lvl1pPr algn="r">
+              <a:defRPr sz="1200"/>
+            </a:lvl1pPr>
+          </a:lstStyle>
+          <a:p>
+            <a:fld id="{340551C4-E36D-4DF7-AAE7-E45DF88FF737}" type="datetimeFigureOut">
+              <a:rPr lang="en-US" smtClean="0"/>
+              <a:t>10/22/2019</a:t>
+            </a:fld>
+            <a:endParaRPr lang="en-US"/>
+          </a:p>
+        </p:txBody>
+      </p:sp>
+      <p:sp>
+        <p:nvSpPr>
+          <p:cNvPr id="4" name="Slide Image Placeholder 3">
+            <a:extLst>
+              <a:ext uri="{FF2B5EF4-FFF2-40B4-BE49-F238E27FC236}">
+                <a16:creationId xmlns:a16="http://schemas.microsoft.com/office/drawing/2014/main" id="{DB52F938-9281-40B9-A2BF-4016FFB9B74C}"/>
+              </a:ext>
+            </a:extLst>
+          </p:cNvPr>
+          <p:cNvSpPr>
+            <a:spLocks noGrp="1" noRot="1" noChangeAspect="1"/>
+          </p:cNvSpPr>
+          <p:nvPr>
+            <p:ph type="sldImg" idx="2"/>
+          </p:nvPr>
+        </p:nvSpPr>
+        <p:spPr>
+          <a:xfrm>
+            <a:off x="685800" y="1143000"/>
+            <a:ext cx="5486400" cy="3086100"/>
+          </a:xfrm>
+          <a:prstGeom prst="rect">
+            <a:avLst/>
+          </a:prstGeom>
+          <a:noFill/>
+          <a:ln w="12700">
+            <a:solidFill>
+              <a:prstClr val="black"/>
+            </a:solidFill>
+          </a:ln>
+        </p:spPr>
+        <p:txBody>
+          <a:bodyPr vert="horz" lIns="91440" tIns="45720" rIns="91440" bIns="45720" rtlCol="0" anchor="ctr"/>
+          <a:lstStyle/>
+          <a:p>
+            <a:endParaRPr lang="en-US"/>
+          </a:p>
+        </p:txBody>
+      </p:sp>
+      <p:sp>
+        <p:nvSpPr>
+          <p:cNvPr id="5" name="Notes Placeholder 4">
+            <a:extLst>
+              <a:ext uri="{FF2B5EF4-FFF2-40B4-BE49-F238E27FC236}">
+                <a16:creationId xmlns:a16="http://schemas.microsoft.com/office/drawing/2014/main" id="{C0E09A08-6315-40F6-96FB-7B96939E3FFB}"/>
+              </a:ext>
+            </a:extLst>
+          </p:cNvPr>
+          <p:cNvSpPr>
+            <a:spLocks noGrp="1"/>
+          </p:cNvSpPr>
+          <p:nvPr>
+            <p:ph type="body" sz="quarter" idx="3"/>
+          </p:nvPr>
+        </p:nvSpPr>
+        <p:spPr>
+          <a:xfrm>
+            <a:off x="685800" y="4400550"/>
+            <a:ext cx="5486400" cy="3600450"/>
+          </a:xfrm>
+          <a:prstGeom prst="rect">
+            <a:avLst/>
+          </a:prstGeom>
+        </p:spPr>
+        <p:txBody>
+          <a:bodyPr vert="horz" lIns="91440" tIns="45720" rIns="91440" bIns="45720" rtlCol="0"/>
+          <a:lstStyle/>
+          <a:p>
+            <a:pPr lvl="0"/>
+            <a:r>
+              <a:rPr lang="en-US"/>
+              <a:t>Click to edit Master text styles</a:t>
+            </a:r>
+          </a:p>
+          <a:p>
+            <a:pPr lvl="1"/>
+            <a:r>
+              <a:rPr lang="en-US"/>
+              <a:t>Second level</a:t>
+            </a:r>
+          </a:p>
+          <a:p>
+            <a:pPr lvl="2"/>
+            <a:r>
+              <a:rPr lang="en-US"/>
+              <a:t>Third level</a:t>
+            </a:r>
+          </a:p>
+          <a:p>
+            <a:pPr lvl="3"/>
+            <a:r>
+              <a:rPr lang="en-US"/>
+              <a:t>Fourth level</a:t>
+            </a:r>
+          </a:p>
+          <a:p>
+            <a:pPr lvl="4"/>
+            <a:r>
+              <a:rPr lang="en-US"/>
+              <a:t>Fifth level</a:t>
+            </a:r>
+          </a:p>
+        </p:txBody>
+      </p:sp>
+      <p:sp>
+        <p:nvSpPr>
+          <p:cNvPr id="6" name="Footer Placeholder 5">
+            <a:extLst>
+              <a:ext uri="{FF2B5EF4-FFF2-40B4-BE49-F238E27FC236}">
+                <a16:creationId xmlns:a16="http://schemas.microsoft.com/office/drawing/2014/main" id="{DDCB402B-602E-4CB3-B3B4-09500C999550}"/>
+              </a:ext>
+            </a:extLst>
+          </p:cNvPr>
+          <p:cNvSpPr>
+            <a:spLocks noGrp="1"/>
+          </p:cNvSpPr>
+          <p:nvPr>
+            <p:ph type="ftr" sz="quarter" idx="4"/>
+          </p:nvPr>
+        </p:nvSpPr>
+        <p:spPr>
+          <a:xfrm>
+            <a:off x="0" y="8685213"/>
+            <a:ext cx="2971800" cy="458787"/>
+          </a:xfrm>
+          <a:prstGeom prst="rect">
+            <a:avLst/>
+          </a:prstGeom>
+        </p:spPr>
+        <p:txBody>
+          <a:bodyPr vert="horz" lIns="91440" tIns="45720" rIns="91440" bIns="45720" rtlCol="0" anchor="b"/>
+          <a:lstStyle>
+            <a:lvl1pPr algn="l">
+              <a:defRPr sz="1200"/>
+            </a:lvl1pPr>
+          </a:lstStyle>
+          <a:p>
+            <a:endParaRPr lang="en-US"/>
+          </a:p>
+        </p:txBody>
+      </p:sp>
+      <p:sp>
+        <p:nvSpPr>
+          <p:cNvPr id="7" name="Slide Number Placeholder 6">
+            <a:extLst>
+              <a:ext uri="{FF2B5EF4-FFF2-40B4-BE49-F238E27FC236}">
+                <a16:creationId xmlns:a16="http://schemas.microsoft.com/office/drawing/2014/main" id="{D738927B-6596-4D7C-8F8B-2ABE6FA60199}"/>
+              </a:ext>
+            </a:extLst>
+          </p:cNvPr>
+          <p:cNvSpPr>
+            <a:spLocks noGrp="1"/>
+          </p:cNvSpPr>
+          <p:nvPr>
+            <p:ph type="sldNum" sz="quarter" idx="5"/>
+          </p:nvPr>
+        </p:nvSpPr>
+        <p:spPr>
+          <a:xfrm>
+            <a:off x="3884613" y="8685213"/>
+            <a:ext cx="2971800" cy="458787"/>
+          </a:xfrm>
+          <a:prstGeom prst="rect">
+            <a:avLst/>
+          </a:prstGeom>
+        </p:spPr>
+        <p:txBody>
+          <a:bodyPr vert="horz" lIns="91440" tIns="45720" rIns="91440" bIns="45720" rtlCol="0" anchor="b"/>
+          <a:lstStyle>
+            <a:lvl1pPr algn="r">
+              <a:defRPr sz="1200"/>
+            </a:lvl1pPr>
+          </a:lstStyle>
+          <a:p>
+            <a:fld id="{E9E1DFC9-EE16-4136-8822-8361C2EB7D32}" type="slidenum">
+              <a:rPr lang="en-US" smtClean="0"/>
+              <a:t>‹#›</a:t>
+            </a:fld>
+            <a:endParaRPr lang="en-US"/>
+          </a:p>
+        </p:txBody>
+      </p:sp>
+    </p:spTree>
+  </p:cSld>
+  <p:clrMap bg1="lt1" tx1="dk1" bg2="lt2" tx2="dk2" accent1="accent1" accent2="accent2" accent3="accent3" accent4="accent4" accent5="accent5" accent6="accent6" hlink="hlink" folHlink="folHlink"/>
+  <p:notesStyle>
+    <a:lvl1pPr marL="0" algn="l" defTabSz="914400" rtl="0" eaLnBrk="1" latinLnBrk="0" hangingPunct="1">
+      <a:defRPr sz="1200" kern="1200">
+        <a:solidFill>
+          <a:schemeClr val="tx1"/>
+        </a:solidFill>
+        <a:latin typeface="+mn-lt"/>
+        <a:ea typeface="+mn-ea"/>
+        <a:cs typeface="+mn-cs"/>
+      </a:defRPr>
+    </a:lvl1pPr>
+    <a:lvl2pPr marL="457200" algn="l" defTabSz="914400" rtl="0" eaLnBrk="1" latinLnBrk="0" hangingPunct="1">
+      <a:defRPr sz="1200" kern="1200">
+        <a:solidFill>
+          <a:schemeClr val="tx1"/>
+        </a:solidFill>
+        <a:latin typeface="+mn-lt"/>
+        <a:ea typeface="+mn-ea"/>
+        <a:cs typeface="+mn-cs"/>
+      </a:defRPr>
+    </a:lvl2pPr>
+    <a:lvl3pPr marL="914400" algn="l" defTabSz="914400" rtl="0" eaLnBrk="1" latinLnBrk="0" hangingPunct="1">
+      <a:defRPr sz="1200" kern="1200">
+        <a:solidFill>
+          <a:schemeClr val="tx1"/>
+        </a:solidFill>
+        <a:latin typeface="+mn-lt"/>
+        <a:ea typeface="+mn-ea"/>
+        <a:cs typeface="+mn-cs"/>
+      </a:defRPr>
+    </a:lvl3pPr>
+    <a:lvl4pPr marL="1371600" algn="l" defTabSz="914400" rtl="0" eaLnBrk="1" latinLnBrk="0" hangingPunct="1">
+      <a:defRPr sz="1200" kern="1200">
+        <a:solidFill>
+          <a:schemeClr val="tx1"/>
+        </a:solidFill>
+        <a:latin typeface="+mn-lt"/>
+        <a:ea typeface="+mn-ea"/>
+        <a:cs typeface="+mn-cs"/>
+      </a:defRPr>
+    </a:lvl4pPr>
+    <a:lvl5pPr marL="1828800" algn="l" defTabSz="914400" rtl="0" eaLnBrk="1" latinLnBrk="0" hangingPunct="1">
+      <a:defRPr sz="1200" kern="1200">
+        <a:solidFill>
+          <a:schemeClr val="tx1"/>
+        </a:solidFill>
+        <a:latin typeface="+mn-lt"/>
+        <a:ea typeface="+mn-ea"/>
+        <a:cs typeface="+mn-cs"/>
+      </a:defRPr>
+    </a:lvl5pPr>
+    <a:lvl6pPr marL="2286000" algn="l" defTabSz="914400" rtl="0" eaLnBrk="1" latinLnBrk="0" hangingPunct="1">
+      <a:defRPr sz="1200" kern="1200">
+        <a:solidFill>
+          <a:schemeClr val="tx1"/>
+        </a:solidFill>
+        <a:latin typeface="+mn-lt"/>
+        <a:ea typeface="+mn-ea"/>
+        <a:cs typeface="+mn-cs"/>
+      </a:defRPr>
+    </a:lvl6pPr>
+    <a:lvl7pPr marL="2743200" algn="l" defTabSz="914400" rtl="0" eaLnBrk="1" latinLnBrk="0" hangingPunct="1">
+      <a:defRPr sz="1200" kern="1200">
+        <a:solidFill>
+          <a:schemeClr val="tx1"/>
+        </a:solidFill>
+        <a:latin typeface="+mn-lt"/>
+        <a:ea typeface="+mn-ea"/>
+        <a:cs typeface="+mn-cs"/>
+      </a:defRPr>
+    </a:lvl7pPr>
+    <a:lvl8pPr marL="3200400" algn="l" defTabSz="914400" rtl="0" eaLnBrk="1" latinLnBrk="0" hangingPunct="1">
+      <a:defRPr sz="1200" kern="1200">
+        <a:solidFill>
+          <a:schemeClr val="tx1"/>
+        </a:solidFill>
+        <a:latin typeface="+mn-lt"/>
+        <a:ea typeface="+mn-ea"/>
+        <a:cs typeface="+mn-cs"/>
+      </a:defRPr>
+    </a:lvl8pPr>
+    <a:lvl9pPr marL="3657600" algn="l" defTabSz="914400" rtl="0" eaLnBrk="1" latinLnBrk="0" hangingPunct="1">
+      <a:defRPr sz="1200" kern="1200">
+        <a:solidFill>
+          <a:schemeClr val="tx1"/>
+        </a:solidFill>
+        <a:latin typeface="+mn-lt"/>
+        <a:ea typeface="+mn-ea"/>
+        <a:cs typeface="+mn-cs"/>
+      </a:defRPr>
+    </a:lvl9pPr>
+  </p:notesStyle>
+</p:notesMaster>
+</file>
+
+<file path=ppt/notesSlides/notesSlide1.xml><?xml version="1.0" encoding="utf-8"?>
+<p:notes xmlns:a="http://schemas.openxmlformats.org/drawingml/2006/main" xmlns:r="http://schemas.openxmlformats.org/officeDocument/2006/relationships" xmlns:p="http://schemas.openxmlformats.org/presentationml/2006/main">
+  <p:cSld>
+    <p:spTree>
+      <p:nvGrpSpPr>
+        <p:cNvPr id="1" name=""/>
+        <p:cNvGrpSpPr/>
+        <p:nvPr/>
+      </p:nvGrpSpPr>
+      <p:grpSpPr>
+        <a:xfrm>
+          <a:off x="0" y="0"/>
+          <a:ext cx="0" cy="0"/>
+          <a:chOff x="0" y="0"/>
+          <a:chExt cx="0" cy="0"/>
+        </a:xfrm>
+      </p:grpSpPr>
+      <p:sp>
+        <p:nvSpPr>
+          <p:cNvPr id="2" name="Slide Image Placeholder 1"/>
+          <p:cNvSpPr>
+            <a:spLocks noGrp="1" noRot="1" noChangeAspect="1"/>
+          </p:cNvSpPr>
+          <p:nvPr>
+            <p:ph type="sldImg"/>
+          </p:nvPr>
+        </p:nvSpPr>
+        <p:spPr/>
+      </p:sp>
+      <p:sp>
+        <p:nvSpPr>
+          <p:cNvPr id="3" name="Notes Placeholder 2"/>
+          <p:cNvSpPr>
+            <a:spLocks noGrp="1"/>
+          </p:cNvSpPr>
+          <p:nvPr>
+            <p:ph type="body" idx="1"/>
+          </p:nvPr>
+        </p:nvSpPr>
+        <p:spPr/>
+        <p:txBody>
+          <a:bodyPr/>
+          <a:lstStyle/>
+          <a:p>
+            <a:r>
+              <a:rPr lang="en-US" dirty="0"/>
+              <a:t>A Client requires a connection to the server to get anything done. </a:t>
+            </a:r>
+          </a:p>
+        </p:txBody>
+      </p:sp>
+      <p:sp>
+        <p:nvSpPr>
+          <p:cNvPr id="4" name="Slide Number Placeholder 3"/>
+          <p:cNvSpPr>
+            <a:spLocks noGrp="1"/>
+          </p:cNvSpPr>
+          <p:nvPr>
+            <p:ph type="sldNum" sz="quarter" idx="5"/>
+          </p:nvPr>
+        </p:nvSpPr>
+        <p:spPr/>
+        <p:txBody>
+          <a:bodyPr/>
+          <a:lstStyle/>
+          <a:p>
+            <a:fld id="{D831DA15-0810-404C-B38C-91CCA02F8F85}" type="slidenum">
+              <a:rPr lang="en-US" smtClean="0"/>
+              <a:t>6</a:t>
+            </a:fld>
+            <a:endParaRPr lang="en-US"/>
+          </a:p>
+        </p:txBody>
+      </p:sp>
+    </p:spTree>
+    <p:extLst>
+      <p:ext uri="{BB962C8B-B14F-4D97-AF65-F5344CB8AC3E}">
+        <p14:creationId xmlns:p14="http://schemas.microsoft.com/office/powerpoint/2010/main" val="2611573630"/>
+      </p:ext>
+    </p:extLst>
+  </p:cSld>
+  <p:clrMapOvr>
+    <a:masterClrMapping/>
+  </p:clrMapOvr>
+</p:notes>
 </file>
 
 <file path=ppt/slideLayouts/slideLayout1.xml><?xml version="1.0" encoding="utf-8"?>
@@ -831,7 +1316,7 @@
           <a:p>
             <a:fld id="{38E594E3-4743-4683-81F7-698D2FA773A6}" type="datetimeFigureOut">
               <a:rPr lang="en-US" smtClean="0"/>
-              <a:t>10/8/2019</a:t>
+              <a:t>10/22/2019</a:t>
             </a:fld>
             <a:endParaRPr lang="en-US"/>
           </a:p>
@@ -1082,7 +1567,7 @@
           <a:p>
             <a:fld id="{38E594E3-4743-4683-81F7-698D2FA773A6}" type="datetimeFigureOut">
               <a:rPr lang="en-US" smtClean="0"/>
-              <a:t>10/8/2019</a:t>
+              <a:t>10/22/2019</a:t>
             </a:fld>
             <a:endParaRPr lang="en-US"/>
           </a:p>
@@ -1396,7 +1881,7 @@
           <a:p>
             <a:fld id="{38E594E3-4743-4683-81F7-698D2FA773A6}" type="datetimeFigureOut">
               <a:rPr lang="en-US" smtClean="0"/>
-              <a:t>10/8/2019</a:t>
+              <a:t>10/22/2019</a:t>
             </a:fld>
             <a:endParaRPr lang="en-US"/>
           </a:p>
@@ -1737,7 +2222,7 @@
           <a:p>
             <a:fld id="{38E594E3-4743-4683-81F7-698D2FA773A6}" type="datetimeFigureOut">
               <a:rPr lang="en-US" smtClean="0"/>
-              <a:t>10/8/2019</a:t>
+              <a:t>10/22/2019</a:t>
             </a:fld>
             <a:endParaRPr lang="en-US"/>
           </a:p>
@@ -2051,7 +2536,7 @@
           <a:p>
             <a:fld id="{38E594E3-4743-4683-81F7-698D2FA773A6}" type="datetimeFigureOut">
               <a:rPr lang="en-US" smtClean="0"/>
-              <a:t>10/8/2019</a:t>
+              <a:t>10/22/2019</a:t>
             </a:fld>
             <a:endParaRPr lang="en-US"/>
           </a:p>
@@ -2444,7 +2929,7 @@
           <a:p>
             <a:fld id="{38E594E3-4743-4683-81F7-698D2FA773A6}" type="datetimeFigureOut">
               <a:rPr lang="en-US" smtClean="0"/>
-              <a:t>10/8/2019</a:t>
+              <a:t>10/22/2019</a:t>
             </a:fld>
             <a:endParaRPr lang="en-US"/>
           </a:p>
@@ -2614,7 +3099,7 @@
           <a:p>
             <a:fld id="{38E594E3-4743-4683-81F7-698D2FA773A6}" type="datetimeFigureOut">
               <a:rPr lang="en-US" smtClean="0"/>
-              <a:t>10/8/2019</a:t>
+              <a:t>10/22/2019</a:t>
             </a:fld>
             <a:endParaRPr lang="en-US"/>
           </a:p>
@@ -2794,7 +3279,7 @@
           <a:p>
             <a:fld id="{38E594E3-4743-4683-81F7-698D2FA773A6}" type="datetimeFigureOut">
               <a:rPr lang="en-US" smtClean="0"/>
-              <a:t>10/8/2019</a:t>
+              <a:t>10/22/2019</a:t>
             </a:fld>
             <a:endParaRPr lang="en-US"/>
           </a:p>
@@ -2970,7 +3455,7 @@
           <a:p>
             <a:fld id="{38E594E3-4743-4683-81F7-698D2FA773A6}" type="datetimeFigureOut">
               <a:rPr lang="en-US" smtClean="0"/>
-              <a:t>10/8/2019</a:t>
+              <a:t>10/22/2019</a:t>
             </a:fld>
             <a:endParaRPr lang="en-US"/>
           </a:p>
@@ -3217,7 +3702,7 @@
           <a:p>
             <a:fld id="{38E594E3-4743-4683-81F7-698D2FA773A6}" type="datetimeFigureOut">
               <a:rPr lang="en-US" smtClean="0"/>
-              <a:t>10/8/2019</a:t>
+              <a:t>10/22/2019</a:t>
             </a:fld>
             <a:endParaRPr lang="en-US"/>
           </a:p>
@@ -3449,7 +3934,7 @@
           <a:p>
             <a:fld id="{38E594E3-4743-4683-81F7-698D2FA773A6}" type="datetimeFigureOut">
               <a:rPr lang="en-US" smtClean="0"/>
-              <a:t>10/8/2019</a:t>
+              <a:t>10/22/2019</a:t>
             </a:fld>
             <a:endParaRPr lang="en-US"/>
           </a:p>
@@ -3823,7 +4308,7 @@
           <a:p>
             <a:fld id="{38E594E3-4743-4683-81F7-698D2FA773A6}" type="datetimeFigureOut">
               <a:rPr lang="en-US" smtClean="0"/>
-              <a:t>10/8/2019</a:t>
+              <a:t>10/22/2019</a:t>
             </a:fld>
             <a:endParaRPr lang="en-US"/>
           </a:p>
@@ -3946,7 +4431,7 @@
           <a:p>
             <a:fld id="{38E594E3-4743-4683-81F7-698D2FA773A6}" type="datetimeFigureOut">
               <a:rPr lang="en-US" smtClean="0"/>
-              <a:t>10/8/2019</a:t>
+              <a:t>10/22/2019</a:t>
             </a:fld>
             <a:endParaRPr lang="en-US"/>
           </a:p>
@@ -4041,7 +4526,7 @@
           <a:p>
             <a:fld id="{38E594E3-4743-4683-81F7-698D2FA773A6}" type="datetimeFigureOut">
               <a:rPr lang="en-US" smtClean="0"/>
-              <a:t>10/8/2019</a:t>
+              <a:t>10/22/2019</a:t>
             </a:fld>
             <a:endParaRPr lang="en-US"/>
           </a:p>
@@ -4296,7 +4781,7 @@
           <a:p>
             <a:fld id="{38E594E3-4743-4683-81F7-698D2FA773A6}" type="datetimeFigureOut">
               <a:rPr lang="en-US" smtClean="0"/>
-              <a:t>10/8/2019</a:t>
+              <a:t>10/22/2019</a:t>
             </a:fld>
             <a:endParaRPr lang="en-US"/>
           </a:p>
@@ -4559,7 +5044,7 @@
           <a:p>
             <a:fld id="{38E594E3-4743-4683-81F7-698D2FA773A6}" type="datetimeFigureOut">
               <a:rPr lang="en-US" smtClean="0"/>
-              <a:t>10/8/2019</a:t>
+              <a:t>10/22/2019</a:t>
             </a:fld>
             <a:endParaRPr lang="en-US"/>
           </a:p>
@@ -5302,7 +5787,7 @@
           <a:p>
             <a:fld id="{38E594E3-4743-4683-81F7-698D2FA773A6}" type="datetimeFigureOut">
               <a:rPr lang="en-US" smtClean="0"/>
-              <a:t>10/8/2019</a:t>
+              <a:t>10/22/2019</a:t>
             </a:fld>
             <a:endParaRPr lang="en-US"/>
           </a:p>
@@ -5849,7 +6334,7 @@
           <a:p>
             <a:r>
               <a:rPr lang="en-US" dirty="0"/>
-              <a:t>Git LabVIEW! Git!</a:t>
+              <a:t>Git! LabVIEW, Git!</a:t>
             </a:r>
           </a:p>
         </p:txBody>
@@ -5886,6 +6371,391 @@
     <p:extLst>
       <p:ext uri="{BB962C8B-B14F-4D97-AF65-F5344CB8AC3E}">
         <p14:creationId xmlns:p14="http://schemas.microsoft.com/office/powerpoint/2010/main" val="219579215"/>
+      </p:ext>
+    </p:extLst>
+  </p:cSld>
+  <p:clrMapOvr>
+    <a:masterClrMapping/>
+  </p:clrMapOvr>
+</p:sld>
+</file>
+
+<file path=ppt/slides/slide10.xml><?xml version="1.0" encoding="utf-8"?>
+<p:sld xmlns:a="http://schemas.openxmlformats.org/drawingml/2006/main" xmlns:r="http://schemas.openxmlformats.org/officeDocument/2006/relationships" xmlns:p="http://schemas.openxmlformats.org/presentationml/2006/main">
+  <p:cSld>
+    <p:spTree>
+      <p:nvGrpSpPr>
+        <p:cNvPr id="1" name=""/>
+        <p:cNvGrpSpPr/>
+        <p:nvPr/>
+      </p:nvGrpSpPr>
+      <p:grpSpPr>
+        <a:xfrm>
+          <a:off x="0" y="0"/>
+          <a:ext cx="0" cy="0"/>
+          <a:chOff x="0" y="0"/>
+          <a:chExt cx="0" cy="0"/>
+        </a:xfrm>
+      </p:grpSpPr>
+      <p:sp>
+        <p:nvSpPr>
+          <p:cNvPr id="2" name="Title 1">
+            <a:extLst>
+              <a:ext uri="{FF2B5EF4-FFF2-40B4-BE49-F238E27FC236}">
+                <a16:creationId xmlns:a16="http://schemas.microsoft.com/office/drawing/2014/main" id="{7EE1DCE8-D311-4D99-A81C-BE65135FC7B1}"/>
+              </a:ext>
+            </a:extLst>
+          </p:cNvPr>
+          <p:cNvSpPr>
+            <a:spLocks noGrp="1"/>
+          </p:cNvSpPr>
+          <p:nvPr>
+            <p:ph type="title"/>
+          </p:nvPr>
+        </p:nvSpPr>
+        <p:spPr>
+          <a:xfrm>
+            <a:off x="677334" y="609600"/>
+            <a:ext cx="8596668" cy="732639"/>
+          </a:xfrm>
+        </p:spPr>
+        <p:txBody>
+          <a:bodyPr/>
+          <a:lstStyle/>
+          <a:p>
+            <a:r>
+              <a:rPr lang="en-US" dirty="0"/>
+              <a:t>Branching and Merging</a:t>
+            </a:r>
+          </a:p>
+        </p:txBody>
+      </p:sp>
+      <p:sp>
+        <p:nvSpPr>
+          <p:cNvPr id="3" name="Content Placeholder 2">
+            <a:extLst>
+              <a:ext uri="{FF2B5EF4-FFF2-40B4-BE49-F238E27FC236}">
+                <a16:creationId xmlns:a16="http://schemas.microsoft.com/office/drawing/2014/main" id="{9374DAC6-B719-4917-BD3A-9F035608224A}"/>
+              </a:ext>
+            </a:extLst>
+          </p:cNvPr>
+          <p:cNvSpPr>
+            <a:spLocks noGrp="1"/>
+          </p:cNvSpPr>
+          <p:nvPr>
+            <p:ph idx="1"/>
+          </p:nvPr>
+        </p:nvSpPr>
+        <p:spPr>
+          <a:xfrm>
+            <a:off x="677334" y="1342239"/>
+            <a:ext cx="8596668" cy="4699123"/>
+          </a:xfrm>
+        </p:spPr>
+        <p:txBody>
+          <a:bodyPr/>
+          <a:lstStyle/>
+          <a:p>
+            <a:r>
+              <a:rPr lang="en-US" dirty="0"/>
+              <a:t>A branch is a copy of the working set that can be modified independently of other branches.</a:t>
+            </a:r>
+          </a:p>
+          <a:p>
+            <a:r>
+              <a:rPr lang="en-US" dirty="0"/>
+              <a:t>Merging is the act of applying the changes from one branch to another branch.</a:t>
+            </a:r>
+          </a:p>
+          <a:p>
+            <a:pPr lvl="1"/>
+            <a:endParaRPr lang="en-US" dirty="0"/>
+          </a:p>
+        </p:txBody>
+      </p:sp>
+    </p:spTree>
+    <p:extLst>
+      <p:ext uri="{BB962C8B-B14F-4D97-AF65-F5344CB8AC3E}">
+        <p14:creationId xmlns:p14="http://schemas.microsoft.com/office/powerpoint/2010/main" val="1546890086"/>
+      </p:ext>
+    </p:extLst>
+  </p:cSld>
+  <p:clrMapOvr>
+    <a:masterClrMapping/>
+  </p:clrMapOvr>
+</p:sld>
+</file>
+
+<file path=ppt/slides/slide11.xml><?xml version="1.0" encoding="utf-8"?>
+<p:sld xmlns:a="http://schemas.openxmlformats.org/drawingml/2006/main" xmlns:r="http://schemas.openxmlformats.org/officeDocument/2006/relationships" xmlns:p="http://schemas.openxmlformats.org/presentationml/2006/main">
+  <p:cSld>
+    <p:spTree>
+      <p:nvGrpSpPr>
+        <p:cNvPr id="1" name=""/>
+        <p:cNvGrpSpPr/>
+        <p:nvPr/>
+      </p:nvGrpSpPr>
+      <p:grpSpPr>
+        <a:xfrm>
+          <a:off x="0" y="0"/>
+          <a:ext cx="0" cy="0"/>
+          <a:chOff x="0" y="0"/>
+          <a:chExt cx="0" cy="0"/>
+        </a:xfrm>
+      </p:grpSpPr>
+      <p:sp>
+        <p:nvSpPr>
+          <p:cNvPr id="2" name="Title 1">
+            <a:extLst>
+              <a:ext uri="{FF2B5EF4-FFF2-40B4-BE49-F238E27FC236}">
+                <a16:creationId xmlns:a16="http://schemas.microsoft.com/office/drawing/2014/main" id="{7EE1DCE8-D311-4D99-A81C-BE65135FC7B1}"/>
+              </a:ext>
+            </a:extLst>
+          </p:cNvPr>
+          <p:cNvSpPr>
+            <a:spLocks noGrp="1"/>
+          </p:cNvSpPr>
+          <p:nvPr>
+            <p:ph type="title"/>
+          </p:nvPr>
+        </p:nvSpPr>
+        <p:spPr>
+          <a:xfrm>
+            <a:off x="677334" y="609600"/>
+            <a:ext cx="8596668" cy="732639"/>
+          </a:xfrm>
+        </p:spPr>
+        <p:txBody>
+          <a:bodyPr/>
+          <a:lstStyle/>
+          <a:p>
+            <a:r>
+              <a:rPr lang="en-US" dirty="0"/>
+              <a:t>Push (and Pull)</a:t>
+            </a:r>
+          </a:p>
+        </p:txBody>
+      </p:sp>
+      <p:sp>
+        <p:nvSpPr>
+          <p:cNvPr id="3" name="Content Placeholder 2">
+            <a:extLst>
+              <a:ext uri="{FF2B5EF4-FFF2-40B4-BE49-F238E27FC236}">
+                <a16:creationId xmlns:a16="http://schemas.microsoft.com/office/drawing/2014/main" id="{9374DAC6-B719-4917-BD3A-9F035608224A}"/>
+              </a:ext>
+            </a:extLst>
+          </p:cNvPr>
+          <p:cNvSpPr>
+            <a:spLocks noGrp="1"/>
+          </p:cNvSpPr>
+          <p:nvPr>
+            <p:ph idx="1"/>
+          </p:nvPr>
+        </p:nvSpPr>
+        <p:spPr>
+          <a:xfrm>
+            <a:off x="677334" y="1342239"/>
+            <a:ext cx="8596668" cy="4699123"/>
+          </a:xfrm>
+        </p:spPr>
+        <p:txBody>
+          <a:bodyPr/>
+          <a:lstStyle/>
+          <a:p>
+            <a:r>
+              <a:rPr lang="en-US" dirty="0"/>
+              <a:t>Pushing is the act of moving the changeset from your repo to another repo.</a:t>
+            </a:r>
+          </a:p>
+          <a:p>
+            <a:pPr lvl="1"/>
+            <a:r>
+              <a:rPr lang="en-US" dirty="0"/>
+              <a:t>This is the way changesets are shared. </a:t>
+            </a:r>
+          </a:p>
+          <a:p>
+            <a:r>
+              <a:rPr lang="en-US" dirty="0"/>
+              <a:t>Pull Requests (Short for: Requesting Someone Else To Pull Your Changes)</a:t>
+            </a:r>
+          </a:p>
+          <a:p>
+            <a:pPr lvl="1"/>
+            <a:endParaRPr lang="en-US" dirty="0"/>
+          </a:p>
+        </p:txBody>
+      </p:sp>
+    </p:spTree>
+    <p:extLst>
+      <p:ext uri="{BB962C8B-B14F-4D97-AF65-F5344CB8AC3E}">
+        <p14:creationId xmlns:p14="http://schemas.microsoft.com/office/powerpoint/2010/main" val="52621604"/>
+      </p:ext>
+    </p:extLst>
+  </p:cSld>
+  <p:clrMapOvr>
+    <a:masterClrMapping/>
+  </p:clrMapOvr>
+</p:sld>
+</file>
+
+<file path=ppt/slides/slide12.xml><?xml version="1.0" encoding="utf-8"?>
+<p:sld xmlns:a="http://schemas.openxmlformats.org/drawingml/2006/main" xmlns:r="http://schemas.openxmlformats.org/officeDocument/2006/relationships" xmlns:p="http://schemas.openxmlformats.org/presentationml/2006/main">
+  <p:cSld>
+    <p:spTree>
+      <p:nvGrpSpPr>
+        <p:cNvPr id="1" name=""/>
+        <p:cNvGrpSpPr/>
+        <p:nvPr/>
+      </p:nvGrpSpPr>
+      <p:grpSpPr>
+        <a:xfrm>
+          <a:off x="0" y="0"/>
+          <a:ext cx="0" cy="0"/>
+          <a:chOff x="0" y="0"/>
+          <a:chExt cx="0" cy="0"/>
+        </a:xfrm>
+      </p:grpSpPr>
+      <p:sp>
+        <p:nvSpPr>
+          <p:cNvPr id="2" name="Title 1">
+            <a:extLst>
+              <a:ext uri="{FF2B5EF4-FFF2-40B4-BE49-F238E27FC236}">
+                <a16:creationId xmlns:a16="http://schemas.microsoft.com/office/drawing/2014/main" id="{ECBF22E6-9EF8-4EB2-88B3-3875ED450CAF}"/>
+              </a:ext>
+            </a:extLst>
+          </p:cNvPr>
+          <p:cNvSpPr>
+            <a:spLocks noGrp="1"/>
+          </p:cNvSpPr>
+          <p:nvPr>
+            <p:ph type="ctrTitle"/>
+          </p:nvPr>
+        </p:nvSpPr>
+        <p:spPr/>
+        <p:txBody>
+          <a:bodyPr/>
+          <a:lstStyle/>
+          <a:p>
+            <a:r>
+              <a:rPr lang="en-US" dirty="0"/>
+              <a:t>Questions?</a:t>
+            </a:r>
+          </a:p>
+        </p:txBody>
+      </p:sp>
+      <p:sp>
+        <p:nvSpPr>
+          <p:cNvPr id="3" name="Subtitle 2">
+            <a:extLst>
+              <a:ext uri="{FF2B5EF4-FFF2-40B4-BE49-F238E27FC236}">
+                <a16:creationId xmlns:a16="http://schemas.microsoft.com/office/drawing/2014/main" id="{929B19A5-6D33-451A-8FC4-594FDCA00286}"/>
+              </a:ext>
+            </a:extLst>
+          </p:cNvPr>
+          <p:cNvSpPr>
+            <a:spLocks noGrp="1"/>
+          </p:cNvSpPr>
+          <p:nvPr>
+            <p:ph type="subTitle" idx="1"/>
+          </p:nvPr>
+        </p:nvSpPr>
+        <p:spPr/>
+        <p:txBody>
+          <a:bodyPr/>
+          <a:lstStyle/>
+          <a:p>
+            <a:endParaRPr lang="en-US" dirty="0"/>
+          </a:p>
+        </p:txBody>
+      </p:sp>
+    </p:spTree>
+    <p:extLst>
+      <p:ext uri="{BB962C8B-B14F-4D97-AF65-F5344CB8AC3E}">
+        <p14:creationId xmlns:p14="http://schemas.microsoft.com/office/powerpoint/2010/main" val="2403661108"/>
+      </p:ext>
+    </p:extLst>
+  </p:cSld>
+  <p:clrMapOvr>
+    <a:masterClrMapping/>
+  </p:clrMapOvr>
+</p:sld>
+</file>
+
+<file path=ppt/slides/slide13.xml><?xml version="1.0" encoding="utf-8"?>
+<p:sld xmlns:a="http://schemas.openxmlformats.org/drawingml/2006/main" xmlns:r="http://schemas.openxmlformats.org/officeDocument/2006/relationships" xmlns:p="http://schemas.openxmlformats.org/presentationml/2006/main">
+  <p:cSld>
+    <p:spTree>
+      <p:nvGrpSpPr>
+        <p:cNvPr id="1" name=""/>
+        <p:cNvGrpSpPr/>
+        <p:nvPr/>
+      </p:nvGrpSpPr>
+      <p:grpSpPr>
+        <a:xfrm>
+          <a:off x="0" y="0"/>
+          <a:ext cx="0" cy="0"/>
+          <a:chOff x="0" y="0"/>
+          <a:chExt cx="0" cy="0"/>
+        </a:xfrm>
+      </p:grpSpPr>
+      <p:sp>
+        <p:nvSpPr>
+          <p:cNvPr id="2" name="Title 1">
+            <a:extLst>
+              <a:ext uri="{FF2B5EF4-FFF2-40B4-BE49-F238E27FC236}">
+                <a16:creationId xmlns:a16="http://schemas.microsoft.com/office/drawing/2014/main" id="{683E4871-360F-44C3-A8FD-445890CEC74C}"/>
+              </a:ext>
+            </a:extLst>
+          </p:cNvPr>
+          <p:cNvSpPr>
+            <a:spLocks noGrp="1"/>
+          </p:cNvSpPr>
+          <p:nvPr>
+            <p:ph type="ctrTitle"/>
+          </p:nvPr>
+        </p:nvSpPr>
+        <p:spPr/>
+        <p:txBody>
+          <a:bodyPr/>
+          <a:lstStyle/>
+          <a:p>
+            <a:r>
+              <a:rPr lang="en-US" dirty="0"/>
+              <a:t>Thank you</a:t>
+            </a:r>
+          </a:p>
+        </p:txBody>
+      </p:sp>
+      <p:sp>
+        <p:nvSpPr>
+          <p:cNvPr id="3" name="Subtitle 2">
+            <a:extLst>
+              <a:ext uri="{FF2B5EF4-FFF2-40B4-BE49-F238E27FC236}">
+                <a16:creationId xmlns:a16="http://schemas.microsoft.com/office/drawing/2014/main" id="{20A51FFC-0255-460B-A489-5E875685389D}"/>
+              </a:ext>
+            </a:extLst>
+          </p:cNvPr>
+          <p:cNvSpPr>
+            <a:spLocks noGrp="1"/>
+          </p:cNvSpPr>
+          <p:nvPr>
+            <p:ph type="subTitle" idx="1"/>
+          </p:nvPr>
+        </p:nvSpPr>
+        <p:spPr/>
+        <p:txBody>
+          <a:bodyPr/>
+          <a:lstStyle/>
+          <a:p>
+            <a:endParaRPr lang="en-US" dirty="0"/>
+          </a:p>
+        </p:txBody>
+      </p:sp>
+    </p:spTree>
+    <p:extLst>
+      <p:ext uri="{BB962C8B-B14F-4D97-AF65-F5344CB8AC3E}">
+        <p14:creationId xmlns:p14="http://schemas.microsoft.com/office/powerpoint/2010/main" val="3301109532"/>
       </p:ext>
     </p:extLst>
   </p:cSld>
@@ -5935,7 +6805,7 @@
           <a:p>
             <a:r>
               <a:rPr lang="en-US" dirty="0"/>
-              <a:t>Target Audience and Expectations</a:t>
+              <a:t>Goal and Target Audience</a:t>
             </a:r>
           </a:p>
         </p:txBody>
@@ -5963,6 +6833,19 @@
           <a:p>
             <a:r>
               <a:rPr lang="en-US" dirty="0"/>
+              <a:t>Goal</a:t>
+            </a:r>
+          </a:p>
+          <a:p>
+            <a:pPr lvl="1"/>
+            <a:r>
+              <a:rPr lang="en-US" dirty="0"/>
+              <a:t>Find and describe the intersection of LabVIEW, which we all know, and Git, a modern and very popular revision control tool. </a:t>
+            </a:r>
+          </a:p>
+          <a:p>
+            <a:r>
+              <a:rPr lang="en-US" dirty="0"/>
               <a:t>Ideal Target Audience</a:t>
             </a:r>
           </a:p>
@@ -5970,38 +6853,41 @@
             <a:pPr lvl="1"/>
             <a:r>
               <a:rPr lang="en-US" dirty="0"/>
-              <a:t>Has LabVIEW experience, but has little revision Git (or revision control) experience</a:t>
+              <a:t>Has LabVIEW experience, but has little Git (or revision control) experience</a:t>
             </a:r>
           </a:p>
           <a:p>
             <a:r>
               <a:rPr lang="en-US" dirty="0"/>
-              <a:t>Expectations from this</a:t>
+              <a:t>Worst Case Audience</a:t>
             </a:r>
           </a:p>
           <a:p>
             <a:pPr lvl="1"/>
             <a:r>
               <a:rPr lang="en-US" dirty="0"/>
-              <a:t>Will learn about Git and Revision Control (Part 1)</a:t>
+              <a:t>Git experts!</a:t>
             </a:r>
           </a:p>
           <a:p>
             <a:pPr lvl="1"/>
             <a:r>
               <a:rPr lang="en-US" dirty="0"/>
-              <a:t>Will learn about how to work with Git (Part 2)</a:t>
+              <a:t>I apologize in advance for any gross simplifications and errors. </a:t>
             </a:r>
           </a:p>
           <a:p>
             <a:pPr lvl="1"/>
             <a:r>
               <a:rPr lang="en-US" dirty="0"/>
-              <a:t>Will learn about LabVIEW and Git combined (Part 3)</a:t>
+              <a:t>Please try to avoid “but what about…”s.  I will be focusing on the core feature set and not any extra modules. </a:t>
             </a:r>
           </a:p>
           <a:p>
             <a:pPr lvl="1"/>
+            <a:endParaRPr lang="en-US" dirty="0"/>
+          </a:p>
+          <a:p>
             <a:endParaRPr lang="en-US" dirty="0"/>
           </a:p>
         </p:txBody>
@@ -6057,7 +6943,10 @@
           <a:bodyPr/>
           <a:lstStyle/>
           <a:p>
-            <a:endParaRPr lang="en-US"/>
+            <a:r>
+              <a:rPr lang="en-US" dirty="0"/>
+              <a:t>Expectations</a:t>
+            </a:r>
           </a:p>
         </p:txBody>
       </p:sp>
@@ -6082,7 +6971,55 @@
           <a:bodyPr/>
           <a:lstStyle/>
           <a:p>
-            <a:endParaRPr lang="en-US"/>
+            <a:r>
+              <a:rPr lang="en-US" dirty="0"/>
+              <a:t>Expectations from this</a:t>
+            </a:r>
+          </a:p>
+          <a:p>
+            <a:pPr lvl="1"/>
+            <a:r>
+              <a:rPr lang="en-US" dirty="0"/>
+              <a:t>Will learn about Git and Revision Control (Part 1)</a:t>
+            </a:r>
+          </a:p>
+          <a:p>
+            <a:pPr lvl="1"/>
+            <a:r>
+              <a:rPr lang="en-US" dirty="0"/>
+              <a:t>Will learn about how to work with Git (Part 2)</a:t>
+            </a:r>
+          </a:p>
+          <a:p>
+            <a:pPr lvl="1"/>
+            <a:r>
+              <a:rPr lang="en-US" dirty="0"/>
+              <a:t>Will learn about LabVIEW and Git combined (Part 3)</a:t>
+            </a:r>
+          </a:p>
+          <a:p>
+            <a:pPr lvl="1"/>
+            <a:endParaRPr lang="en-US" dirty="0"/>
+          </a:p>
+          <a:p>
+            <a:r>
+              <a:rPr lang="en-US" dirty="0"/>
+              <a:t>What not to expect</a:t>
+            </a:r>
+          </a:p>
+          <a:p>
+            <a:pPr lvl="1"/>
+            <a:r>
+              <a:rPr lang="en-US" dirty="0"/>
+              <a:t>An in depth look at Git</a:t>
+            </a:r>
+          </a:p>
+          <a:p>
+            <a:pPr lvl="1"/>
+            <a:endParaRPr lang="en-US" dirty="0"/>
+          </a:p>
+          <a:p>
+            <a:endParaRPr lang="en-US" dirty="0"/>
           </a:p>
         </p:txBody>
       </p:sp>
@@ -6090,6 +7027,800 @@
     <p:extLst>
       <p:ext uri="{BB962C8B-B14F-4D97-AF65-F5344CB8AC3E}">
         <p14:creationId xmlns:p14="http://schemas.microsoft.com/office/powerpoint/2010/main" val="1987190056"/>
+      </p:ext>
+    </p:extLst>
+  </p:cSld>
+  <p:clrMapOvr>
+    <a:masterClrMapping/>
+  </p:clrMapOvr>
+</p:sld>
+</file>
+
+<file path=ppt/slides/slide4.xml><?xml version="1.0" encoding="utf-8"?>
+<p:sld xmlns:a="http://schemas.openxmlformats.org/drawingml/2006/main" xmlns:r="http://schemas.openxmlformats.org/officeDocument/2006/relationships" xmlns:p="http://schemas.openxmlformats.org/presentationml/2006/main">
+  <p:cSld>
+    <p:spTree>
+      <p:nvGrpSpPr>
+        <p:cNvPr id="1" name=""/>
+        <p:cNvGrpSpPr/>
+        <p:nvPr/>
+      </p:nvGrpSpPr>
+      <p:grpSpPr>
+        <a:xfrm>
+          <a:off x="0" y="0"/>
+          <a:ext cx="0" cy="0"/>
+          <a:chOff x="0" y="0"/>
+          <a:chExt cx="0" cy="0"/>
+        </a:xfrm>
+      </p:grpSpPr>
+      <p:sp>
+        <p:nvSpPr>
+          <p:cNvPr id="2" name="Title 1">
+            <a:extLst>
+              <a:ext uri="{FF2B5EF4-FFF2-40B4-BE49-F238E27FC236}">
+                <a16:creationId xmlns:a16="http://schemas.microsoft.com/office/drawing/2014/main" id="{C8CB4D04-F501-42DB-9F38-52B10BA52142}"/>
+              </a:ext>
+            </a:extLst>
+          </p:cNvPr>
+          <p:cNvSpPr>
+            <a:spLocks noGrp="1"/>
+          </p:cNvSpPr>
+          <p:nvPr>
+            <p:ph type="title"/>
+          </p:nvPr>
+        </p:nvSpPr>
+        <p:spPr>
+          <a:xfrm>
+            <a:off x="677334" y="609600"/>
+            <a:ext cx="8596668" cy="808139"/>
+          </a:xfrm>
+        </p:spPr>
+        <p:txBody>
+          <a:bodyPr/>
+          <a:lstStyle/>
+          <a:p>
+            <a:r>
+              <a:rPr lang="en-US" dirty="0"/>
+              <a:t>What is Revision Control?</a:t>
+            </a:r>
+          </a:p>
+        </p:txBody>
+      </p:sp>
+      <p:sp>
+        <p:nvSpPr>
+          <p:cNvPr id="3" name="Content Placeholder 2">
+            <a:extLst>
+              <a:ext uri="{FF2B5EF4-FFF2-40B4-BE49-F238E27FC236}">
+                <a16:creationId xmlns:a16="http://schemas.microsoft.com/office/drawing/2014/main" id="{6AD7360C-5DE1-4104-9363-5AD4F4C33A94}"/>
+              </a:ext>
+            </a:extLst>
+          </p:cNvPr>
+          <p:cNvSpPr>
+            <a:spLocks noGrp="1"/>
+          </p:cNvSpPr>
+          <p:nvPr>
+            <p:ph idx="1"/>
+          </p:nvPr>
+        </p:nvSpPr>
+        <p:spPr>
+          <a:xfrm>
+            <a:off x="677334" y="1417739"/>
+            <a:ext cx="8596668" cy="4657179"/>
+          </a:xfrm>
+        </p:spPr>
+        <p:txBody>
+          <a:bodyPr/>
+          <a:lstStyle/>
+          <a:p>
+            <a:r>
+              <a:rPr lang="en-US" dirty="0"/>
+              <a:t>Revision control is a method of capturing snapshots of files (code, etc.) at specific points in time.</a:t>
+            </a:r>
+          </a:p>
+          <a:p>
+            <a:endParaRPr lang="en-US" dirty="0"/>
+          </a:p>
+          <a:p>
+            <a:r>
+              <a:rPr lang="en-US" dirty="0"/>
+              <a:t>What happens if I don’t have revision control?</a:t>
+            </a:r>
+          </a:p>
+          <a:p>
+            <a:pPr lvl="1"/>
+            <a:r>
+              <a:rPr lang="en-US" dirty="0"/>
+              <a:t>“I have this awesome software I developed that does everything I need, but it has this one tenacious bug.  I just spent the last 3 weeks finding this bug, and it turned out that it was a simple setting/register/</a:t>
+            </a:r>
+            <a:r>
+              <a:rPr lang="en-US" dirty="0" err="1"/>
+              <a:t>subVI</a:t>
+            </a:r>
+            <a:r>
+              <a:rPr lang="en-US" dirty="0"/>
+              <a:t>.  But now, I don’t remember all the things I changed in trying to find that one thing I needed to change.”</a:t>
+            </a:r>
+          </a:p>
+          <a:p>
+            <a:pPr lvl="1"/>
+            <a:r>
+              <a:rPr lang="en-US" dirty="0"/>
+              <a:t>Revision control can fix that!</a:t>
+            </a:r>
+          </a:p>
+        </p:txBody>
+      </p:sp>
+    </p:spTree>
+    <p:extLst>
+      <p:ext uri="{BB962C8B-B14F-4D97-AF65-F5344CB8AC3E}">
+        <p14:creationId xmlns:p14="http://schemas.microsoft.com/office/powerpoint/2010/main" val="105933662"/>
+      </p:ext>
+    </p:extLst>
+  </p:cSld>
+  <p:clrMapOvr>
+    <a:masterClrMapping/>
+  </p:clrMapOvr>
+</p:sld>
+</file>
+
+<file path=ppt/slides/slide5.xml><?xml version="1.0" encoding="utf-8"?>
+<p:sld xmlns:a="http://schemas.openxmlformats.org/drawingml/2006/main" xmlns:r="http://schemas.openxmlformats.org/officeDocument/2006/relationships" xmlns:p="http://schemas.openxmlformats.org/presentationml/2006/main">
+  <p:cSld>
+    <p:spTree>
+      <p:nvGrpSpPr>
+        <p:cNvPr id="1" name=""/>
+        <p:cNvGrpSpPr/>
+        <p:nvPr/>
+      </p:nvGrpSpPr>
+      <p:grpSpPr>
+        <a:xfrm>
+          <a:off x="0" y="0"/>
+          <a:ext cx="0" cy="0"/>
+          <a:chOff x="0" y="0"/>
+          <a:chExt cx="0" cy="0"/>
+        </a:xfrm>
+      </p:grpSpPr>
+      <p:sp>
+        <p:nvSpPr>
+          <p:cNvPr id="2" name="Title 1">
+            <a:extLst>
+              <a:ext uri="{FF2B5EF4-FFF2-40B4-BE49-F238E27FC236}">
+                <a16:creationId xmlns:a16="http://schemas.microsoft.com/office/drawing/2014/main" id="{7EE1DCE8-D311-4D99-A81C-BE65135FC7B1}"/>
+              </a:ext>
+            </a:extLst>
+          </p:cNvPr>
+          <p:cNvSpPr>
+            <a:spLocks noGrp="1"/>
+          </p:cNvSpPr>
+          <p:nvPr>
+            <p:ph type="title"/>
+          </p:nvPr>
+        </p:nvSpPr>
+        <p:spPr>
+          <a:xfrm>
+            <a:off x="677334" y="609600"/>
+            <a:ext cx="8596668" cy="732639"/>
+          </a:xfrm>
+        </p:spPr>
+        <p:txBody>
+          <a:bodyPr/>
+          <a:lstStyle/>
+          <a:p>
+            <a:r>
+              <a:rPr lang="en-US" dirty="0"/>
+              <a:t>Benefits</a:t>
+            </a:r>
+          </a:p>
+        </p:txBody>
+      </p:sp>
+      <p:sp>
+        <p:nvSpPr>
+          <p:cNvPr id="3" name="Content Placeholder 2">
+            <a:extLst>
+              <a:ext uri="{FF2B5EF4-FFF2-40B4-BE49-F238E27FC236}">
+                <a16:creationId xmlns:a16="http://schemas.microsoft.com/office/drawing/2014/main" id="{9374DAC6-B719-4917-BD3A-9F035608224A}"/>
+              </a:ext>
+            </a:extLst>
+          </p:cNvPr>
+          <p:cNvSpPr>
+            <a:spLocks noGrp="1"/>
+          </p:cNvSpPr>
+          <p:nvPr>
+            <p:ph idx="1"/>
+          </p:nvPr>
+        </p:nvSpPr>
+        <p:spPr>
+          <a:xfrm>
+            <a:off x="677334" y="1342239"/>
+            <a:ext cx="8596668" cy="4699123"/>
+          </a:xfrm>
+        </p:spPr>
+        <p:txBody>
+          <a:bodyPr/>
+          <a:lstStyle/>
+          <a:p>
+            <a:r>
+              <a:rPr lang="en-US" dirty="0"/>
+              <a:t>For a solo developer:</a:t>
+            </a:r>
+          </a:p>
+          <a:p>
+            <a:pPr lvl="1"/>
+            <a:r>
+              <a:rPr lang="en-US" dirty="0"/>
+              <a:t>Snapshots of code (or docs) at known states.  </a:t>
+            </a:r>
+          </a:p>
+          <a:p>
+            <a:pPr lvl="1"/>
+            <a:r>
+              <a:rPr lang="en-US" dirty="0"/>
+              <a:t>Better independence of development, when working on independent features</a:t>
+            </a:r>
+          </a:p>
+          <a:p>
+            <a:pPr lvl="1"/>
+            <a:endParaRPr lang="en-US" dirty="0"/>
+          </a:p>
+          <a:p>
+            <a:r>
+              <a:rPr lang="en-US" dirty="0"/>
+              <a:t>For a team:</a:t>
+            </a:r>
+          </a:p>
+          <a:p>
+            <a:pPr lvl="1"/>
+            <a:r>
+              <a:rPr lang="en-US" dirty="0"/>
+              <a:t>Individual developers can work on the same code at the same time without being locked out.</a:t>
+            </a:r>
+          </a:p>
+          <a:p>
+            <a:pPr lvl="1"/>
+            <a:r>
+              <a:rPr lang="en-US" dirty="0"/>
+              <a:t>Known states of codebases to develop against. </a:t>
+            </a:r>
+          </a:p>
+        </p:txBody>
+      </p:sp>
+    </p:spTree>
+    <p:extLst>
+      <p:ext uri="{BB962C8B-B14F-4D97-AF65-F5344CB8AC3E}">
+        <p14:creationId xmlns:p14="http://schemas.microsoft.com/office/powerpoint/2010/main" val="2816320598"/>
+      </p:ext>
+    </p:extLst>
+  </p:cSld>
+  <p:clrMapOvr>
+    <a:masterClrMapping/>
+  </p:clrMapOvr>
+</p:sld>
+</file>
+
+<file path=ppt/slides/slide6.xml><?xml version="1.0" encoding="utf-8"?>
+<p:sld xmlns:a="http://schemas.openxmlformats.org/drawingml/2006/main" xmlns:r="http://schemas.openxmlformats.org/officeDocument/2006/relationships" xmlns:p="http://schemas.openxmlformats.org/presentationml/2006/main">
+  <p:cSld>
+    <p:spTree>
+      <p:nvGrpSpPr>
+        <p:cNvPr id="1" name=""/>
+        <p:cNvGrpSpPr/>
+        <p:nvPr/>
+      </p:nvGrpSpPr>
+      <p:grpSpPr>
+        <a:xfrm>
+          <a:off x="0" y="0"/>
+          <a:ext cx="0" cy="0"/>
+          <a:chOff x="0" y="0"/>
+          <a:chExt cx="0" cy="0"/>
+        </a:xfrm>
+      </p:grpSpPr>
+      <p:sp>
+        <p:nvSpPr>
+          <p:cNvPr id="2" name="Title 1">
+            <a:extLst>
+              <a:ext uri="{FF2B5EF4-FFF2-40B4-BE49-F238E27FC236}">
+                <a16:creationId xmlns:a16="http://schemas.microsoft.com/office/drawing/2014/main" id="{7EE1DCE8-D311-4D99-A81C-BE65135FC7B1}"/>
+              </a:ext>
+            </a:extLst>
+          </p:cNvPr>
+          <p:cNvSpPr>
+            <a:spLocks noGrp="1"/>
+          </p:cNvSpPr>
+          <p:nvPr>
+            <p:ph type="title"/>
+          </p:nvPr>
+        </p:nvSpPr>
+        <p:spPr>
+          <a:xfrm>
+            <a:off x="677334" y="609600"/>
+            <a:ext cx="8596668" cy="732639"/>
+          </a:xfrm>
+        </p:spPr>
+        <p:txBody>
+          <a:bodyPr/>
+          <a:lstStyle/>
+          <a:p>
+            <a:r>
+              <a:rPr lang="en-US" dirty="0"/>
+              <a:t>Client/Server Model	</a:t>
+            </a:r>
+          </a:p>
+        </p:txBody>
+      </p:sp>
+      <p:sp>
+        <p:nvSpPr>
+          <p:cNvPr id="3" name="Content Placeholder 2">
+            <a:extLst>
+              <a:ext uri="{FF2B5EF4-FFF2-40B4-BE49-F238E27FC236}">
+                <a16:creationId xmlns:a16="http://schemas.microsoft.com/office/drawing/2014/main" id="{9374DAC6-B719-4917-BD3A-9F035608224A}"/>
+              </a:ext>
+            </a:extLst>
+          </p:cNvPr>
+          <p:cNvSpPr>
+            <a:spLocks noGrp="1"/>
+          </p:cNvSpPr>
+          <p:nvPr>
+            <p:ph idx="1"/>
+          </p:nvPr>
+        </p:nvSpPr>
+        <p:spPr>
+          <a:xfrm>
+            <a:off x="677334" y="1342239"/>
+            <a:ext cx="8596668" cy="4699123"/>
+          </a:xfrm>
+        </p:spPr>
+        <p:txBody>
+          <a:bodyPr>
+            <a:normAutofit/>
+          </a:bodyPr>
+          <a:lstStyle/>
+          <a:p>
+            <a:r>
+              <a:rPr lang="en-US" dirty="0"/>
+              <a:t>Ex: Subversion (SVN), Perforce, Surround SCM, Team Foundation Server</a:t>
+            </a:r>
+          </a:p>
+          <a:p>
+            <a:endParaRPr lang="en-US" dirty="0"/>
+          </a:p>
+          <a:p>
+            <a:r>
+              <a:rPr lang="en-US" dirty="0"/>
+              <a:t>The server acts as the master.</a:t>
+            </a:r>
+          </a:p>
+          <a:p>
+            <a:pPr lvl="1"/>
+            <a:r>
+              <a:rPr lang="en-US" dirty="0"/>
+              <a:t>It stores a copy of EVERY file that is revision controlled.</a:t>
+            </a:r>
+          </a:p>
+          <a:p>
+            <a:pPr lvl="1"/>
+            <a:r>
+              <a:rPr lang="en-US" dirty="0"/>
+              <a:t>It stores the revision history.</a:t>
+            </a:r>
+          </a:p>
+          <a:p>
+            <a:pPr lvl="1"/>
+            <a:r>
+              <a:rPr lang="en-US" dirty="0"/>
+              <a:t>It determines who has access to the files, and who can make changes</a:t>
+            </a:r>
+          </a:p>
+          <a:p>
+            <a:r>
+              <a:rPr lang="en-US" dirty="0"/>
+              <a:t>A client is beholden to the server.</a:t>
+            </a:r>
+          </a:p>
+          <a:p>
+            <a:pPr lvl="1"/>
+            <a:r>
+              <a:rPr lang="en-US" dirty="0"/>
+              <a:t>Clients only have copies of the files they pulled or checked out.</a:t>
+            </a:r>
+          </a:p>
+          <a:p>
+            <a:endParaRPr lang="en-US" dirty="0"/>
+          </a:p>
+          <a:p>
+            <a:r>
+              <a:rPr lang="en-US" dirty="0"/>
+              <a:t>Files cannot be worked on simultaneously.</a:t>
+            </a:r>
+          </a:p>
+          <a:p>
+            <a:r>
+              <a:rPr lang="en-US" dirty="0"/>
+              <a:t>Simplest in terms of explaining the hierarchy and modus operandi. </a:t>
+            </a:r>
+          </a:p>
+          <a:p>
+            <a:endParaRPr lang="en-US" dirty="0"/>
+          </a:p>
+        </p:txBody>
+      </p:sp>
+    </p:spTree>
+    <p:extLst>
+      <p:ext uri="{BB962C8B-B14F-4D97-AF65-F5344CB8AC3E}">
+        <p14:creationId xmlns:p14="http://schemas.microsoft.com/office/powerpoint/2010/main" val="3738401976"/>
+      </p:ext>
+    </p:extLst>
+  </p:cSld>
+  <p:clrMapOvr>
+    <a:masterClrMapping/>
+  </p:clrMapOvr>
+</p:sld>
+</file>
+
+<file path=ppt/slides/slide7.xml><?xml version="1.0" encoding="utf-8"?>
+<p:sld xmlns:a="http://schemas.openxmlformats.org/drawingml/2006/main" xmlns:r="http://schemas.openxmlformats.org/officeDocument/2006/relationships" xmlns:p="http://schemas.openxmlformats.org/presentationml/2006/main">
+  <p:cSld>
+    <p:spTree>
+      <p:nvGrpSpPr>
+        <p:cNvPr id="1" name=""/>
+        <p:cNvGrpSpPr/>
+        <p:nvPr/>
+      </p:nvGrpSpPr>
+      <p:grpSpPr>
+        <a:xfrm>
+          <a:off x="0" y="0"/>
+          <a:ext cx="0" cy="0"/>
+          <a:chOff x="0" y="0"/>
+          <a:chExt cx="0" cy="0"/>
+        </a:xfrm>
+      </p:grpSpPr>
+      <p:sp>
+        <p:nvSpPr>
+          <p:cNvPr id="2" name="Title 1">
+            <a:extLst>
+              <a:ext uri="{FF2B5EF4-FFF2-40B4-BE49-F238E27FC236}">
+                <a16:creationId xmlns:a16="http://schemas.microsoft.com/office/drawing/2014/main" id="{7EE1DCE8-D311-4D99-A81C-BE65135FC7B1}"/>
+              </a:ext>
+            </a:extLst>
+          </p:cNvPr>
+          <p:cNvSpPr>
+            <a:spLocks noGrp="1"/>
+          </p:cNvSpPr>
+          <p:nvPr>
+            <p:ph type="title"/>
+          </p:nvPr>
+        </p:nvSpPr>
+        <p:spPr>
+          <a:xfrm>
+            <a:off x="677334" y="609600"/>
+            <a:ext cx="8596668" cy="732639"/>
+          </a:xfrm>
+        </p:spPr>
+        <p:txBody>
+          <a:bodyPr/>
+          <a:lstStyle/>
+          <a:p>
+            <a:r>
+              <a:rPr lang="en-US" dirty="0"/>
+              <a:t>Distributed Model</a:t>
+            </a:r>
+          </a:p>
+        </p:txBody>
+      </p:sp>
+      <p:sp>
+        <p:nvSpPr>
+          <p:cNvPr id="3" name="Content Placeholder 2">
+            <a:extLst>
+              <a:ext uri="{FF2B5EF4-FFF2-40B4-BE49-F238E27FC236}">
+                <a16:creationId xmlns:a16="http://schemas.microsoft.com/office/drawing/2014/main" id="{9374DAC6-B719-4917-BD3A-9F035608224A}"/>
+              </a:ext>
+            </a:extLst>
+          </p:cNvPr>
+          <p:cNvSpPr>
+            <a:spLocks noGrp="1"/>
+          </p:cNvSpPr>
+          <p:nvPr>
+            <p:ph idx="1"/>
+          </p:nvPr>
+        </p:nvSpPr>
+        <p:spPr>
+          <a:xfrm>
+            <a:off x="677334" y="1342239"/>
+            <a:ext cx="8596668" cy="4699123"/>
+          </a:xfrm>
+        </p:spPr>
+        <p:txBody>
+          <a:bodyPr/>
+          <a:lstStyle/>
+          <a:p>
+            <a:r>
+              <a:rPr lang="en-US" dirty="0"/>
+              <a:t>Ex: Git, Mercurial</a:t>
+            </a:r>
+          </a:p>
+          <a:p>
+            <a:endParaRPr lang="en-US" dirty="0"/>
+          </a:p>
+          <a:p>
+            <a:r>
+              <a:rPr lang="en-US" dirty="0"/>
+              <a:t>Everyone has a copy!</a:t>
+            </a:r>
+          </a:p>
+          <a:p>
+            <a:pPr lvl="1"/>
+            <a:r>
+              <a:rPr lang="en-US" dirty="0"/>
+              <a:t>Every person who is participating in revision control has a complete copy of the code.  (Not a complete copy of ALL code…. More on this later)</a:t>
+            </a:r>
+          </a:p>
+          <a:p>
+            <a:r>
+              <a:rPr lang="en-US" dirty="0"/>
+              <a:t>Everyone is a master….in their own little realm.</a:t>
+            </a:r>
+          </a:p>
+          <a:p>
+            <a:pPr lvl="1"/>
+            <a:r>
+              <a:rPr lang="en-US" dirty="0"/>
+              <a:t>Each developer can do whatever they want to their own repository.  It’s only when sharing that repo that any enforcement of rules happens. </a:t>
+            </a:r>
+          </a:p>
+          <a:p>
+            <a:endParaRPr lang="en-US" dirty="0"/>
+          </a:p>
+          <a:p>
+            <a:r>
+              <a:rPr lang="en-US" dirty="0"/>
+              <a:t>Simultaneous work can be done now, but you bring on the burden of reconciliation. </a:t>
+            </a:r>
+          </a:p>
+        </p:txBody>
+      </p:sp>
+    </p:spTree>
+    <p:extLst>
+      <p:ext uri="{BB962C8B-B14F-4D97-AF65-F5344CB8AC3E}">
+        <p14:creationId xmlns:p14="http://schemas.microsoft.com/office/powerpoint/2010/main" val="3461655565"/>
+      </p:ext>
+    </p:extLst>
+  </p:cSld>
+  <p:clrMapOvr>
+    <a:masterClrMapping/>
+  </p:clrMapOvr>
+</p:sld>
+</file>
+
+<file path=ppt/slides/slide8.xml><?xml version="1.0" encoding="utf-8"?>
+<p:sld xmlns:a="http://schemas.openxmlformats.org/drawingml/2006/main" xmlns:r="http://schemas.openxmlformats.org/officeDocument/2006/relationships" xmlns:p="http://schemas.openxmlformats.org/presentationml/2006/main">
+  <p:cSld>
+    <p:spTree>
+      <p:nvGrpSpPr>
+        <p:cNvPr id="1" name=""/>
+        <p:cNvGrpSpPr/>
+        <p:nvPr/>
+      </p:nvGrpSpPr>
+      <p:grpSpPr>
+        <a:xfrm>
+          <a:off x="0" y="0"/>
+          <a:ext cx="0" cy="0"/>
+          <a:chOff x="0" y="0"/>
+          <a:chExt cx="0" cy="0"/>
+        </a:xfrm>
+      </p:grpSpPr>
+      <p:sp>
+        <p:nvSpPr>
+          <p:cNvPr id="2" name="Title 1">
+            <a:extLst>
+              <a:ext uri="{FF2B5EF4-FFF2-40B4-BE49-F238E27FC236}">
+                <a16:creationId xmlns:a16="http://schemas.microsoft.com/office/drawing/2014/main" id="{7EE1DCE8-D311-4D99-A81C-BE65135FC7B1}"/>
+              </a:ext>
+            </a:extLst>
+          </p:cNvPr>
+          <p:cNvSpPr>
+            <a:spLocks noGrp="1"/>
+          </p:cNvSpPr>
+          <p:nvPr>
+            <p:ph type="title"/>
+          </p:nvPr>
+        </p:nvSpPr>
+        <p:spPr>
+          <a:xfrm>
+            <a:off x="677334" y="609600"/>
+            <a:ext cx="8596668" cy="732639"/>
+          </a:xfrm>
+        </p:spPr>
+        <p:txBody>
+          <a:bodyPr/>
+          <a:lstStyle/>
+          <a:p>
+            <a:r>
+              <a:rPr lang="en-US" dirty="0"/>
+              <a:t>How Does Git Work?</a:t>
+            </a:r>
+          </a:p>
+        </p:txBody>
+      </p:sp>
+      <p:sp>
+        <p:nvSpPr>
+          <p:cNvPr id="3" name="Content Placeholder 2">
+            <a:extLst>
+              <a:ext uri="{FF2B5EF4-FFF2-40B4-BE49-F238E27FC236}">
+                <a16:creationId xmlns:a16="http://schemas.microsoft.com/office/drawing/2014/main" id="{9374DAC6-B719-4917-BD3A-9F035608224A}"/>
+              </a:ext>
+            </a:extLst>
+          </p:cNvPr>
+          <p:cNvSpPr>
+            <a:spLocks noGrp="1"/>
+          </p:cNvSpPr>
+          <p:nvPr>
+            <p:ph idx="1"/>
+          </p:nvPr>
+        </p:nvSpPr>
+        <p:spPr>
+          <a:xfrm>
+            <a:off x="677334" y="1342239"/>
+            <a:ext cx="8596668" cy="4699123"/>
+          </a:xfrm>
+        </p:spPr>
+        <p:txBody>
+          <a:bodyPr/>
+          <a:lstStyle/>
+          <a:p>
+            <a:r>
+              <a:rPr lang="en-US" dirty="0"/>
+              <a:t>Three primary activities</a:t>
+            </a:r>
+          </a:p>
+          <a:p>
+            <a:endParaRPr lang="en-US" dirty="0"/>
+          </a:p>
+          <a:p>
+            <a:r>
+              <a:rPr lang="en-US" dirty="0"/>
+              <a:t>Committing</a:t>
+            </a:r>
+          </a:p>
+          <a:p>
+            <a:r>
+              <a:rPr lang="en-US" dirty="0"/>
+              <a:t>Branching/Merging (aka unbranching)</a:t>
+            </a:r>
+          </a:p>
+          <a:p>
+            <a:r>
+              <a:rPr lang="en-US" dirty="0"/>
+              <a:t>Distributing (Push and Pull)</a:t>
+            </a:r>
+          </a:p>
+          <a:p>
+            <a:endParaRPr lang="en-US" dirty="0"/>
+          </a:p>
+          <a:p>
+            <a:r>
+              <a:rPr lang="en-US" dirty="0"/>
+              <a:t>Everything else serves these three functions.</a:t>
+            </a:r>
+          </a:p>
+        </p:txBody>
+      </p:sp>
+    </p:spTree>
+    <p:extLst>
+      <p:ext uri="{BB962C8B-B14F-4D97-AF65-F5344CB8AC3E}">
+        <p14:creationId xmlns:p14="http://schemas.microsoft.com/office/powerpoint/2010/main" val="2490705565"/>
+      </p:ext>
+    </p:extLst>
+  </p:cSld>
+  <p:clrMapOvr>
+    <a:masterClrMapping/>
+  </p:clrMapOvr>
+</p:sld>
+</file>
+
+<file path=ppt/slides/slide9.xml><?xml version="1.0" encoding="utf-8"?>
+<p:sld xmlns:a="http://schemas.openxmlformats.org/drawingml/2006/main" xmlns:r="http://schemas.openxmlformats.org/officeDocument/2006/relationships" xmlns:p="http://schemas.openxmlformats.org/presentationml/2006/main">
+  <p:cSld>
+    <p:spTree>
+      <p:nvGrpSpPr>
+        <p:cNvPr id="1" name=""/>
+        <p:cNvGrpSpPr/>
+        <p:nvPr/>
+      </p:nvGrpSpPr>
+      <p:grpSpPr>
+        <a:xfrm>
+          <a:off x="0" y="0"/>
+          <a:ext cx="0" cy="0"/>
+          <a:chOff x="0" y="0"/>
+          <a:chExt cx="0" cy="0"/>
+        </a:xfrm>
+      </p:grpSpPr>
+      <p:sp>
+        <p:nvSpPr>
+          <p:cNvPr id="2" name="Title 1">
+            <a:extLst>
+              <a:ext uri="{FF2B5EF4-FFF2-40B4-BE49-F238E27FC236}">
+                <a16:creationId xmlns:a16="http://schemas.microsoft.com/office/drawing/2014/main" id="{7EE1DCE8-D311-4D99-A81C-BE65135FC7B1}"/>
+              </a:ext>
+            </a:extLst>
+          </p:cNvPr>
+          <p:cNvSpPr>
+            <a:spLocks noGrp="1"/>
+          </p:cNvSpPr>
+          <p:nvPr>
+            <p:ph type="title"/>
+          </p:nvPr>
+        </p:nvSpPr>
+        <p:spPr>
+          <a:xfrm>
+            <a:off x="677334" y="609600"/>
+            <a:ext cx="8596668" cy="732639"/>
+          </a:xfrm>
+        </p:spPr>
+        <p:txBody>
+          <a:bodyPr/>
+          <a:lstStyle/>
+          <a:p>
+            <a:r>
+              <a:rPr lang="en-US" dirty="0"/>
+              <a:t>Commit</a:t>
+            </a:r>
+          </a:p>
+        </p:txBody>
+      </p:sp>
+      <p:sp>
+        <p:nvSpPr>
+          <p:cNvPr id="3" name="Content Placeholder 2">
+            <a:extLst>
+              <a:ext uri="{FF2B5EF4-FFF2-40B4-BE49-F238E27FC236}">
+                <a16:creationId xmlns:a16="http://schemas.microsoft.com/office/drawing/2014/main" id="{9374DAC6-B719-4917-BD3A-9F035608224A}"/>
+              </a:ext>
+            </a:extLst>
+          </p:cNvPr>
+          <p:cNvSpPr>
+            <a:spLocks noGrp="1"/>
+          </p:cNvSpPr>
+          <p:nvPr>
+            <p:ph idx="1"/>
+          </p:nvPr>
+        </p:nvSpPr>
+        <p:spPr>
+          <a:xfrm>
+            <a:off x="677334" y="1342239"/>
+            <a:ext cx="8596668" cy="4699123"/>
+          </a:xfrm>
+        </p:spPr>
+        <p:txBody>
+          <a:bodyPr/>
+          <a:lstStyle/>
+          <a:p>
+            <a:r>
+              <a:rPr lang="en-US" dirty="0"/>
+              <a:t>A commit is a single snapshot in time.  </a:t>
+            </a:r>
+          </a:p>
+          <a:p>
+            <a:pPr lvl="1"/>
+            <a:r>
+              <a:rPr lang="en-US" dirty="0"/>
+              <a:t>Places a snapshot of the files into the change history.</a:t>
+            </a:r>
+          </a:p>
+          <a:p>
+            <a:pPr lvl="1"/>
+            <a:r>
+              <a:rPr lang="en-US" dirty="0"/>
+              <a:t>The developer decides what is or isn’t included.</a:t>
+            </a:r>
+          </a:p>
+          <a:p>
+            <a:pPr lvl="1"/>
+            <a:endParaRPr lang="en-US" dirty="0"/>
+          </a:p>
+        </p:txBody>
+      </p:sp>
+    </p:spTree>
+    <p:extLst>
+      <p:ext uri="{BB962C8B-B14F-4D97-AF65-F5344CB8AC3E}">
+        <p14:creationId xmlns:p14="http://schemas.microsoft.com/office/powerpoint/2010/main" val="2405585525"/>
       </p:ext>
     </p:extLst>
   </p:cSld>
@@ -6354,4 +8085,299 @@
     </a:ext>
   </a:extLst>
 </a:theme>
+</file>
+
+<file path=ppt/theme/theme2.xml><?xml version="1.0" encoding="utf-8"?>
+<a:theme xmlns:a="http://schemas.openxmlformats.org/drawingml/2006/main" name="Office Theme">
+  <a:themeElements>
+    <a:clrScheme name="Office">
+      <a:dk1>
+        <a:sysClr val="windowText" lastClr="000000"/>
+      </a:dk1>
+      <a:lt1>
+        <a:sysClr val="window" lastClr="FFFFFF"/>
+      </a:lt1>
+      <a:dk2>
+        <a:srgbClr val="44546A"/>
+      </a:dk2>
+      <a:lt2>
+        <a:srgbClr val="E7E6E6"/>
+      </a:lt2>
+      <a:accent1>
+        <a:srgbClr val="4472C4"/>
+      </a:accent1>
+      <a:accent2>
+        <a:srgbClr val="ED7D31"/>
+      </a:accent2>
+      <a:accent3>
+        <a:srgbClr val="A5A5A5"/>
+      </a:accent3>
+      <a:accent4>
+        <a:srgbClr val="FFC000"/>
+      </a:accent4>
+      <a:accent5>
+        <a:srgbClr val="5B9BD5"/>
+      </a:accent5>
+      <a:accent6>
+        <a:srgbClr val="70AD47"/>
+      </a:accent6>
+      <a:hlink>
+        <a:srgbClr val="0563C1"/>
+      </a:hlink>
+      <a:folHlink>
+        <a:srgbClr val="954F72"/>
+      </a:folHlink>
+    </a:clrScheme>
+    <a:fontScheme name="Office">
+      <a:majorFont>
+        <a:latin typeface="Calibri Light" panose="020F0302020204030204"/>
+        <a:ea typeface=""/>
+        <a:cs typeface=""/>
+        <a:font script="Jpan" typeface="游ゴシック Light"/>
+        <a:font script="Hang" typeface="맑은 고딕"/>
+        <a:font script="Hans" typeface="等线 Light"/>
+        <a:font script="Hant" typeface="新細明體"/>
+        <a:font script="Arab" typeface="Times New Roman"/>
+        <a:font script="Hebr" typeface="Times New Roman"/>
+        <a:font script="Thai" typeface="Angsana New"/>
+        <a:font script="Ethi" typeface="Nyala"/>
+        <a:font script="Beng" typeface="Vrinda"/>
+        <a:font script="Gujr" typeface="Shruti"/>
+        <a:font script="Khmr" typeface="MoolBoran"/>
+        <a:font script="Knda" typeface="Tunga"/>
+        <a:font script="Guru" typeface="Raavi"/>
+        <a:font script="Cans" typeface="Euphemia"/>
+        <a:font script="Cher" typeface="Plantagenet Cherokee"/>
+        <a:font script="Yiii" typeface="Microsoft Yi Baiti"/>
+        <a:font script="Tibt" typeface="Microsoft Himalaya"/>
+        <a:font script="Thaa" typeface="MV Boli"/>
+        <a:font script="Deva" typeface="Mangal"/>
+        <a:font script="Telu" typeface="Gautami"/>
+        <a:font script="Taml" typeface="Latha"/>
+        <a:font script="Syrc" typeface="Estrangelo Edessa"/>
+        <a:font script="Orya" typeface="Kalinga"/>
+        <a:font script="Mlym" typeface="Kartika"/>
+        <a:font script="Laoo" typeface="DokChampa"/>
+        <a:font script="Sinh" typeface="Iskoola Pota"/>
+        <a:font script="Mong" typeface="Mongolian Baiti"/>
+        <a:font script="Viet" typeface="Times New Roman"/>
+        <a:font script="Uigh" typeface="Microsoft Uighur"/>
+        <a:font script="Geor" typeface="Sylfaen"/>
+        <a:font script="Armn" typeface="Arial"/>
+        <a:font script="Bugi" typeface="Leelawadee UI"/>
+        <a:font script="Bopo" typeface="Microsoft JhengHei"/>
+        <a:font script="Java" typeface="Javanese Text"/>
+        <a:font script="Lisu" typeface="Segoe UI"/>
+        <a:font script="Mymr" typeface="Myanmar Text"/>
+        <a:font script="Nkoo" typeface="Ebrima"/>
+        <a:font script="Olck" typeface="Nirmala UI"/>
+        <a:font script="Osma" typeface="Ebrima"/>
+        <a:font script="Phag" typeface="Phagspa"/>
+        <a:font script="Syrn" typeface="Estrangelo Edessa"/>
+        <a:font script="Syrj" typeface="Estrangelo Edessa"/>
+        <a:font script="Syre" typeface="Estrangelo Edessa"/>
+        <a:font script="Sora" typeface="Nirmala UI"/>
+        <a:font script="Tale" typeface="Microsoft Tai Le"/>
+        <a:font script="Talu" typeface="Microsoft New Tai Lue"/>
+        <a:font script="Tfng" typeface="Ebrima"/>
+      </a:majorFont>
+      <a:minorFont>
+        <a:latin typeface="Calibri" panose="020F0502020204030204"/>
+        <a:ea typeface=""/>
+        <a:cs typeface=""/>
+        <a:font script="Jpan" typeface="游ゴシック"/>
+        <a:font script="Hang" typeface="맑은 고딕"/>
+        <a:font script="Hans" typeface="等线"/>
+        <a:font script="Hant" typeface="新細明體"/>
+        <a:font script="Arab" typeface="Arial"/>
+        <a:font script="Hebr" typeface="Arial"/>
+        <a:font script="Thai" typeface="Cordia New"/>
+        <a:font script="Ethi" typeface="Nyala"/>
+        <a:font script="Beng" typeface="Vrinda"/>
+        <a:font script="Gujr" typeface="Shruti"/>
+        <a:font script="Khmr" typeface="DaunPenh"/>
+        <a:font script="Knda" typeface="Tunga"/>
+        <a:font script="Guru" typeface="Raavi"/>
+        <a:font script="Cans" typeface="Euphemia"/>
+        <a:font script="Cher" typeface="Plantagenet Cherokee"/>
+        <a:font script="Yiii" typeface="Microsoft Yi Baiti"/>
+        <a:font script="Tibt" typeface="Microsoft Himalaya"/>
+        <a:font script="Thaa" typeface="MV Boli"/>
+        <a:font script="Deva" typeface="Mangal"/>
+        <a:font script="Telu" typeface="Gautami"/>
+        <a:font script="Taml" typeface="Latha"/>
+        <a:font script="Syrc" typeface="Estrangelo Edessa"/>
+        <a:font script="Orya" typeface="Kalinga"/>
+        <a:font script="Mlym" typeface="Kartika"/>
+        <a:font script="Laoo" typeface="DokChampa"/>
+        <a:font script="Sinh" typeface="Iskoola Pota"/>
+        <a:font script="Mong" typeface="Mongolian Baiti"/>
+        <a:font script="Viet" typeface="Arial"/>
+        <a:font script="Uigh" typeface="Microsoft Uighur"/>
+        <a:font script="Geor" typeface="Sylfaen"/>
+        <a:font script="Armn" typeface="Arial"/>
+        <a:font script="Bugi" typeface="Leelawadee UI"/>
+        <a:font script="Bopo" typeface="Microsoft JhengHei"/>
+        <a:font script="Java" typeface="Javanese Text"/>
+        <a:font script="Lisu" typeface="Segoe UI"/>
+        <a:font script="Mymr" typeface="Myanmar Text"/>
+        <a:font script="Nkoo" typeface="Ebrima"/>
+        <a:font script="Olck" typeface="Nirmala UI"/>
+        <a:font script="Osma" typeface="Ebrima"/>
+        <a:font script="Phag" typeface="Phagspa"/>
+        <a:font script="Syrn" typeface="Estrangelo Edessa"/>
+        <a:font script="Syrj" typeface="Estrangelo Edessa"/>
+        <a:font script="Syre" typeface="Estrangelo Edessa"/>
+        <a:font script="Sora" typeface="Nirmala UI"/>
+        <a:font script="Tale" typeface="Microsoft Tai Le"/>
+        <a:font script="Talu" typeface="Microsoft New Tai Lue"/>
+        <a:font script="Tfng" typeface="Ebrima"/>
+      </a:minorFont>
+    </a:fontScheme>
+    <a:fmtScheme name="Office">
+      <a:fillStyleLst>
+        <a:solidFill>
+          <a:schemeClr val="phClr"/>
+        </a:solidFill>
+        <a:gradFill rotWithShape="1">
+          <a:gsLst>
+            <a:gs pos="0">
+              <a:schemeClr val="phClr">
+                <a:lumMod val="110000"/>
+                <a:satMod val="105000"/>
+                <a:tint val="67000"/>
+              </a:schemeClr>
+            </a:gs>
+            <a:gs pos="50000">
+              <a:schemeClr val="phClr">
+                <a:lumMod val="105000"/>
+                <a:satMod val="103000"/>
+                <a:tint val="73000"/>
+              </a:schemeClr>
+            </a:gs>
+            <a:gs pos="100000">
+              <a:schemeClr val="phClr">
+                <a:lumMod val="105000"/>
+                <a:satMod val="109000"/>
+                <a:tint val="81000"/>
+              </a:schemeClr>
+            </a:gs>
+          </a:gsLst>
+          <a:lin ang="5400000" scaled="0"/>
+        </a:gradFill>
+        <a:gradFill rotWithShape="1">
+          <a:gsLst>
+            <a:gs pos="0">
+              <a:schemeClr val="phClr">
+                <a:satMod val="103000"/>
+                <a:lumMod val="102000"/>
+                <a:tint val="94000"/>
+              </a:schemeClr>
+            </a:gs>
+            <a:gs pos="50000">
+              <a:schemeClr val="phClr">
+                <a:satMod val="110000"/>
+                <a:lumMod val="100000"/>
+                <a:shade val="100000"/>
+              </a:schemeClr>
+            </a:gs>
+            <a:gs pos="100000">
+              <a:schemeClr val="phClr">
+                <a:lumMod val="99000"/>
+                <a:satMod val="120000"/>
+                <a:shade val="78000"/>
+              </a:schemeClr>
+            </a:gs>
+          </a:gsLst>
+          <a:lin ang="5400000" scaled="0"/>
+        </a:gradFill>
+      </a:fillStyleLst>
+      <a:lnStyleLst>
+        <a:ln w="6350" cap="flat" cmpd="sng" algn="ctr">
+          <a:solidFill>
+            <a:schemeClr val="phClr"/>
+          </a:solidFill>
+          <a:prstDash val="solid"/>
+          <a:miter lim="800000"/>
+        </a:ln>
+        <a:ln w="12700" cap="flat" cmpd="sng" algn="ctr">
+          <a:solidFill>
+            <a:schemeClr val="phClr"/>
+          </a:solidFill>
+          <a:prstDash val="solid"/>
+          <a:miter lim="800000"/>
+        </a:ln>
+        <a:ln w="19050" cap="flat" cmpd="sng" algn="ctr">
+          <a:solidFill>
+            <a:schemeClr val="phClr"/>
+          </a:solidFill>
+          <a:prstDash val="solid"/>
+          <a:miter lim="800000"/>
+        </a:ln>
+      </a:lnStyleLst>
+      <a:effectStyleLst>
+        <a:effectStyle>
+          <a:effectLst/>
+        </a:effectStyle>
+        <a:effectStyle>
+          <a:effectLst/>
+        </a:effectStyle>
+        <a:effectStyle>
+          <a:effectLst>
+            <a:outerShdw blurRad="57150" dist="19050" dir="5400000" algn="ctr" rotWithShape="0">
+              <a:srgbClr val="000000">
+                <a:alpha val="63000"/>
+              </a:srgbClr>
+            </a:outerShdw>
+          </a:effectLst>
+        </a:effectStyle>
+      </a:effectStyleLst>
+      <a:bgFillStyleLst>
+        <a:solidFill>
+          <a:schemeClr val="phClr"/>
+        </a:solidFill>
+        <a:solidFill>
+          <a:schemeClr val="phClr">
+            <a:tint val="95000"/>
+            <a:satMod val="170000"/>
+          </a:schemeClr>
+        </a:solidFill>
+        <a:gradFill rotWithShape="1">
+          <a:gsLst>
+            <a:gs pos="0">
+              <a:schemeClr val="phClr">
+                <a:tint val="93000"/>
+                <a:satMod val="150000"/>
+                <a:shade val="98000"/>
+                <a:lumMod val="102000"/>
+              </a:schemeClr>
+            </a:gs>
+            <a:gs pos="50000">
+              <a:schemeClr val="phClr">
+                <a:tint val="98000"/>
+                <a:satMod val="130000"/>
+                <a:shade val="90000"/>
+                <a:lumMod val="103000"/>
+              </a:schemeClr>
+            </a:gs>
+            <a:gs pos="100000">
+              <a:schemeClr val="phClr">
+                <a:shade val="63000"/>
+                <a:satMod val="120000"/>
+              </a:schemeClr>
+            </a:gs>
+          </a:gsLst>
+          <a:lin ang="5400000" scaled="0"/>
+        </a:gradFill>
+      </a:bgFillStyleLst>
+    </a:fmtScheme>
+  </a:themeElements>
+  <a:objectDefaults/>
+  <a:extraClrSchemeLst/>
+  <a:extLst>
+    <a:ext uri="{05A4C25C-085E-4340-85A3-A5531E510DB2}">
+      <thm15:themeFamily xmlns:thm15="http://schemas.microsoft.com/office/thememl/2012/main" name="Office Theme" id="{62F939B6-93AF-4DB8-9C6B-D6C7DFDC589F}" vid="{4A3C46E8-61CC-4603-A589-7422A47A8E4A}"/>
+    </a:ext>
+  </a:extLst>
+</a:theme>
 </file>
</xml_diff>

<commit_message>
Added feedback from Covisus team.
</commit_message>
<xml_diff>
--- a/Git and LV.pptx
+++ b/Git and LV.pptx
@@ -5,7 +5,7 @@
     <p:sldMasterId id="2147483660" r:id="rId1"/>
   </p:sldMasterIdLst>
   <p:notesMasterIdLst>
-    <p:notesMasterId r:id="rId15"/>
+    <p:notesMasterId r:id="rId19"/>
   </p:notesMasterIdLst>
   <p:sldIdLst>
     <p:sldId id="256" r:id="rId2"/>
@@ -15,12 +15,16 @@
     <p:sldId id="260" r:id="rId6"/>
     <p:sldId id="261" r:id="rId7"/>
     <p:sldId id="262" r:id="rId8"/>
-    <p:sldId id="263" r:id="rId9"/>
-    <p:sldId id="264" r:id="rId10"/>
-    <p:sldId id="265" r:id="rId11"/>
-    <p:sldId id="266" r:id="rId12"/>
-    <p:sldId id="267" r:id="rId13"/>
-    <p:sldId id="268" r:id="rId14"/>
+    <p:sldId id="272" r:id="rId9"/>
+    <p:sldId id="263" r:id="rId10"/>
+    <p:sldId id="269" r:id="rId11"/>
+    <p:sldId id="264" r:id="rId12"/>
+    <p:sldId id="265" r:id="rId13"/>
+    <p:sldId id="266" r:id="rId14"/>
+    <p:sldId id="270" r:id="rId15"/>
+    <p:sldId id="267" r:id="rId16"/>
+    <p:sldId id="268" r:id="rId17"/>
+    <p:sldId id="271" r:id="rId18"/>
   </p:sldIdLst>
   <p:sldSz cx="12192000" cy="6858000"/>
   <p:notesSz cx="6858000" cy="9144000"/>
@@ -221,7 +225,7 @@
           <a:p>
             <a:fld id="{340551C4-E36D-4DF7-AAE7-E45DF88FF737}" type="datetimeFigureOut">
               <a:rPr lang="en-US" smtClean="0"/>
-              <a:t>10/22/2019</a:t>
+              <a:t>10/26/2019</a:t>
             </a:fld>
             <a:endParaRPr lang="en-US"/>
           </a:p>
@@ -553,6 +557,264 @@
           <a:p>
             <a:r>
               <a:rPr lang="en-US" dirty="0"/>
+              <a:t>Explain “Core feature set’ Wording better</a:t>
+            </a:r>
+          </a:p>
+        </p:txBody>
+      </p:sp>
+      <p:sp>
+        <p:nvSpPr>
+          <p:cNvPr id="4" name="Slide Number Placeholder 3"/>
+          <p:cNvSpPr>
+            <a:spLocks noGrp="1"/>
+          </p:cNvSpPr>
+          <p:nvPr>
+            <p:ph type="sldNum" sz="quarter" idx="5"/>
+          </p:nvPr>
+        </p:nvSpPr>
+        <p:spPr/>
+        <p:txBody>
+          <a:bodyPr/>
+          <a:lstStyle/>
+          <a:p>
+            <a:fld id="{E9E1DFC9-EE16-4136-8822-8361C2EB7D32}" type="slidenum">
+              <a:rPr lang="en-US" smtClean="0"/>
+              <a:t>2</a:t>
+            </a:fld>
+            <a:endParaRPr lang="en-US"/>
+          </a:p>
+        </p:txBody>
+      </p:sp>
+    </p:spTree>
+    <p:extLst>
+      <p:ext uri="{BB962C8B-B14F-4D97-AF65-F5344CB8AC3E}">
+        <p14:creationId xmlns:p14="http://schemas.microsoft.com/office/powerpoint/2010/main" val="3941402197"/>
+      </p:ext>
+    </p:extLst>
+  </p:cSld>
+  <p:clrMapOvr>
+    <a:masterClrMapping/>
+  </p:clrMapOvr>
+</p:notes>
+</file>
+
+<file path=ppt/notesSlides/notesSlide2.xml><?xml version="1.0" encoding="utf-8"?>
+<p:notes xmlns:a="http://schemas.openxmlformats.org/drawingml/2006/main" xmlns:r="http://schemas.openxmlformats.org/officeDocument/2006/relationships" xmlns:p="http://schemas.openxmlformats.org/presentationml/2006/main">
+  <p:cSld>
+    <p:spTree>
+      <p:nvGrpSpPr>
+        <p:cNvPr id="1" name=""/>
+        <p:cNvGrpSpPr/>
+        <p:nvPr/>
+      </p:nvGrpSpPr>
+      <p:grpSpPr>
+        <a:xfrm>
+          <a:off x="0" y="0"/>
+          <a:ext cx="0" cy="0"/>
+          <a:chOff x="0" y="0"/>
+          <a:chExt cx="0" cy="0"/>
+        </a:xfrm>
+      </p:grpSpPr>
+      <p:sp>
+        <p:nvSpPr>
+          <p:cNvPr id="2" name="Slide Image Placeholder 1"/>
+          <p:cNvSpPr>
+            <a:spLocks noGrp="1" noRot="1" noChangeAspect="1"/>
+          </p:cNvSpPr>
+          <p:nvPr>
+            <p:ph type="sldImg"/>
+          </p:nvPr>
+        </p:nvSpPr>
+        <p:spPr/>
+      </p:sp>
+      <p:sp>
+        <p:nvSpPr>
+          <p:cNvPr id="3" name="Notes Placeholder 2"/>
+          <p:cNvSpPr>
+            <a:spLocks noGrp="1"/>
+          </p:cNvSpPr>
+          <p:nvPr>
+            <p:ph type="body" idx="1"/>
+          </p:nvPr>
+        </p:nvSpPr>
+        <p:spPr/>
+        <p:txBody>
+          <a:bodyPr/>
+          <a:lstStyle/>
+          <a:p>
+            <a:endParaRPr lang="en-US" dirty="0"/>
+          </a:p>
+        </p:txBody>
+      </p:sp>
+      <p:sp>
+        <p:nvSpPr>
+          <p:cNvPr id="4" name="Slide Number Placeholder 3"/>
+          <p:cNvSpPr>
+            <a:spLocks noGrp="1"/>
+          </p:cNvSpPr>
+          <p:nvPr>
+            <p:ph type="sldNum" sz="quarter" idx="5"/>
+          </p:nvPr>
+        </p:nvSpPr>
+        <p:spPr/>
+        <p:txBody>
+          <a:bodyPr/>
+          <a:lstStyle/>
+          <a:p>
+            <a:fld id="{E9E1DFC9-EE16-4136-8822-8361C2EB7D32}" type="slidenum">
+              <a:rPr lang="en-US" smtClean="0"/>
+              <a:t>3</a:t>
+            </a:fld>
+            <a:endParaRPr lang="en-US"/>
+          </a:p>
+        </p:txBody>
+      </p:sp>
+    </p:spTree>
+    <p:extLst>
+      <p:ext uri="{BB962C8B-B14F-4D97-AF65-F5344CB8AC3E}">
+        <p14:creationId xmlns:p14="http://schemas.microsoft.com/office/powerpoint/2010/main" val="2717331410"/>
+      </p:ext>
+    </p:extLst>
+  </p:cSld>
+  <p:clrMapOvr>
+    <a:masterClrMapping/>
+  </p:clrMapOvr>
+</p:notes>
+</file>
+
+<file path=ppt/notesSlides/notesSlide3.xml><?xml version="1.0" encoding="utf-8"?>
+<p:notes xmlns:a="http://schemas.openxmlformats.org/drawingml/2006/main" xmlns:r="http://schemas.openxmlformats.org/officeDocument/2006/relationships" xmlns:p="http://schemas.openxmlformats.org/presentationml/2006/main">
+  <p:cSld>
+    <p:spTree>
+      <p:nvGrpSpPr>
+        <p:cNvPr id="1" name=""/>
+        <p:cNvGrpSpPr/>
+        <p:nvPr/>
+      </p:nvGrpSpPr>
+      <p:grpSpPr>
+        <a:xfrm>
+          <a:off x="0" y="0"/>
+          <a:ext cx="0" cy="0"/>
+          <a:chOff x="0" y="0"/>
+          <a:chExt cx="0" cy="0"/>
+        </a:xfrm>
+      </p:grpSpPr>
+      <p:sp>
+        <p:nvSpPr>
+          <p:cNvPr id="2" name="Slide Image Placeholder 1"/>
+          <p:cNvSpPr>
+            <a:spLocks noGrp="1" noRot="1" noChangeAspect="1"/>
+          </p:cNvSpPr>
+          <p:nvPr>
+            <p:ph type="sldImg"/>
+          </p:nvPr>
+        </p:nvSpPr>
+        <p:spPr/>
+      </p:sp>
+      <p:sp>
+        <p:nvSpPr>
+          <p:cNvPr id="3" name="Notes Placeholder 2"/>
+          <p:cNvSpPr>
+            <a:spLocks noGrp="1"/>
+          </p:cNvSpPr>
+          <p:nvPr>
+            <p:ph type="body" idx="1"/>
+          </p:nvPr>
+        </p:nvSpPr>
+        <p:spPr/>
+        <p:txBody>
+          <a:bodyPr/>
+          <a:lstStyle/>
+          <a:p>
+            <a:r>
+              <a:rPr lang="en-US" dirty="0"/>
+              <a:t>Better Define Locked out.</a:t>
+            </a:r>
+          </a:p>
+        </p:txBody>
+      </p:sp>
+      <p:sp>
+        <p:nvSpPr>
+          <p:cNvPr id="4" name="Slide Number Placeholder 3"/>
+          <p:cNvSpPr>
+            <a:spLocks noGrp="1"/>
+          </p:cNvSpPr>
+          <p:nvPr>
+            <p:ph type="sldNum" sz="quarter" idx="5"/>
+          </p:nvPr>
+        </p:nvSpPr>
+        <p:spPr/>
+        <p:txBody>
+          <a:bodyPr/>
+          <a:lstStyle/>
+          <a:p>
+            <a:fld id="{E9E1DFC9-EE16-4136-8822-8361C2EB7D32}" type="slidenum">
+              <a:rPr lang="en-US" smtClean="0"/>
+              <a:t>5</a:t>
+            </a:fld>
+            <a:endParaRPr lang="en-US"/>
+          </a:p>
+        </p:txBody>
+      </p:sp>
+    </p:spTree>
+    <p:extLst>
+      <p:ext uri="{BB962C8B-B14F-4D97-AF65-F5344CB8AC3E}">
+        <p14:creationId xmlns:p14="http://schemas.microsoft.com/office/powerpoint/2010/main" val="420198931"/>
+      </p:ext>
+    </p:extLst>
+  </p:cSld>
+  <p:clrMapOvr>
+    <a:masterClrMapping/>
+  </p:clrMapOvr>
+</p:notes>
+</file>
+
+<file path=ppt/notesSlides/notesSlide4.xml><?xml version="1.0" encoding="utf-8"?>
+<p:notes xmlns:a="http://schemas.openxmlformats.org/drawingml/2006/main" xmlns:r="http://schemas.openxmlformats.org/officeDocument/2006/relationships" xmlns:p="http://schemas.openxmlformats.org/presentationml/2006/main">
+  <p:cSld>
+    <p:spTree>
+      <p:nvGrpSpPr>
+        <p:cNvPr id="1" name=""/>
+        <p:cNvGrpSpPr/>
+        <p:nvPr/>
+      </p:nvGrpSpPr>
+      <p:grpSpPr>
+        <a:xfrm>
+          <a:off x="0" y="0"/>
+          <a:ext cx="0" cy="0"/>
+          <a:chOff x="0" y="0"/>
+          <a:chExt cx="0" cy="0"/>
+        </a:xfrm>
+      </p:grpSpPr>
+      <p:sp>
+        <p:nvSpPr>
+          <p:cNvPr id="2" name="Slide Image Placeholder 1"/>
+          <p:cNvSpPr>
+            <a:spLocks noGrp="1" noRot="1" noChangeAspect="1"/>
+          </p:cNvSpPr>
+          <p:nvPr>
+            <p:ph type="sldImg"/>
+          </p:nvPr>
+        </p:nvSpPr>
+        <p:spPr/>
+      </p:sp>
+      <p:sp>
+        <p:nvSpPr>
+          <p:cNvPr id="3" name="Notes Placeholder 2"/>
+          <p:cNvSpPr>
+            <a:spLocks noGrp="1"/>
+          </p:cNvSpPr>
+          <p:nvPr>
+            <p:ph type="body" idx="1"/>
+          </p:nvPr>
+        </p:nvSpPr>
+        <p:spPr/>
+        <p:txBody>
+          <a:bodyPr/>
+          <a:lstStyle/>
+          <a:p>
+            <a:r>
+              <a:rPr lang="en-US" dirty="0"/>
               <a:t>A Client requires a connection to the server to get anything done. </a:t>
             </a:r>
           </a:p>
@@ -585,6 +847,351 @@
     <p:extLst>
       <p:ext uri="{BB962C8B-B14F-4D97-AF65-F5344CB8AC3E}">
         <p14:creationId xmlns:p14="http://schemas.microsoft.com/office/powerpoint/2010/main" val="2611573630"/>
+      </p:ext>
+    </p:extLst>
+  </p:cSld>
+  <p:clrMapOvr>
+    <a:masterClrMapping/>
+  </p:clrMapOvr>
+</p:notes>
+</file>
+
+<file path=ppt/notesSlides/notesSlide5.xml><?xml version="1.0" encoding="utf-8"?>
+<p:notes xmlns:a="http://schemas.openxmlformats.org/drawingml/2006/main" xmlns:r="http://schemas.openxmlformats.org/officeDocument/2006/relationships" xmlns:p="http://schemas.openxmlformats.org/presentationml/2006/main">
+  <p:cSld>
+    <p:spTree>
+      <p:nvGrpSpPr>
+        <p:cNvPr id="1" name=""/>
+        <p:cNvGrpSpPr/>
+        <p:nvPr/>
+      </p:nvGrpSpPr>
+      <p:grpSpPr>
+        <a:xfrm>
+          <a:off x="0" y="0"/>
+          <a:ext cx="0" cy="0"/>
+          <a:chOff x="0" y="0"/>
+          <a:chExt cx="0" cy="0"/>
+        </a:xfrm>
+      </p:grpSpPr>
+      <p:sp>
+        <p:nvSpPr>
+          <p:cNvPr id="2" name="Slide Image Placeholder 1"/>
+          <p:cNvSpPr>
+            <a:spLocks noGrp="1" noRot="1" noChangeAspect="1"/>
+          </p:cNvSpPr>
+          <p:nvPr>
+            <p:ph type="sldImg"/>
+          </p:nvPr>
+        </p:nvSpPr>
+        <p:spPr/>
+      </p:sp>
+      <p:sp>
+        <p:nvSpPr>
+          <p:cNvPr id="3" name="Notes Placeholder 2"/>
+          <p:cNvSpPr>
+            <a:spLocks noGrp="1"/>
+          </p:cNvSpPr>
+          <p:nvPr>
+            <p:ph type="body" idx="1"/>
+          </p:nvPr>
+        </p:nvSpPr>
+        <p:spPr/>
+        <p:txBody>
+          <a:bodyPr/>
+          <a:lstStyle/>
+          <a:p>
+            <a:r>
+              <a:rPr lang="en-US" dirty="0"/>
+              <a:t>Better define work</a:t>
+            </a:r>
+          </a:p>
+        </p:txBody>
+      </p:sp>
+      <p:sp>
+        <p:nvSpPr>
+          <p:cNvPr id="4" name="Slide Number Placeholder 3"/>
+          <p:cNvSpPr>
+            <a:spLocks noGrp="1"/>
+          </p:cNvSpPr>
+          <p:nvPr>
+            <p:ph type="sldNum" sz="quarter" idx="5"/>
+          </p:nvPr>
+        </p:nvSpPr>
+        <p:spPr/>
+        <p:txBody>
+          <a:bodyPr/>
+          <a:lstStyle/>
+          <a:p>
+            <a:fld id="{E9E1DFC9-EE16-4136-8822-8361C2EB7D32}" type="slidenum">
+              <a:rPr lang="en-US" smtClean="0"/>
+              <a:t>7</a:t>
+            </a:fld>
+            <a:endParaRPr lang="en-US"/>
+          </a:p>
+        </p:txBody>
+      </p:sp>
+    </p:spTree>
+    <p:extLst>
+      <p:ext uri="{BB962C8B-B14F-4D97-AF65-F5344CB8AC3E}">
+        <p14:creationId xmlns:p14="http://schemas.microsoft.com/office/powerpoint/2010/main" val="1214830215"/>
+      </p:ext>
+    </p:extLst>
+  </p:cSld>
+  <p:clrMapOvr>
+    <a:masterClrMapping/>
+  </p:clrMapOvr>
+</p:notes>
+</file>
+
+<file path=ppt/notesSlides/notesSlide6.xml><?xml version="1.0" encoding="utf-8"?>
+<p:notes xmlns:a="http://schemas.openxmlformats.org/drawingml/2006/main" xmlns:r="http://schemas.openxmlformats.org/officeDocument/2006/relationships" xmlns:p="http://schemas.openxmlformats.org/presentationml/2006/main">
+  <p:cSld>
+    <p:spTree>
+      <p:nvGrpSpPr>
+        <p:cNvPr id="1" name=""/>
+        <p:cNvGrpSpPr/>
+        <p:nvPr/>
+      </p:nvGrpSpPr>
+      <p:grpSpPr>
+        <a:xfrm>
+          <a:off x="0" y="0"/>
+          <a:ext cx="0" cy="0"/>
+          <a:chOff x="0" y="0"/>
+          <a:chExt cx="0" cy="0"/>
+        </a:xfrm>
+      </p:grpSpPr>
+      <p:sp>
+        <p:nvSpPr>
+          <p:cNvPr id="2" name="Slide Image Placeholder 1"/>
+          <p:cNvSpPr>
+            <a:spLocks noGrp="1" noRot="1" noChangeAspect="1"/>
+          </p:cNvSpPr>
+          <p:nvPr>
+            <p:ph type="sldImg"/>
+          </p:nvPr>
+        </p:nvSpPr>
+        <p:spPr/>
+      </p:sp>
+      <p:sp>
+        <p:nvSpPr>
+          <p:cNvPr id="3" name="Notes Placeholder 2"/>
+          <p:cNvSpPr>
+            <a:spLocks noGrp="1"/>
+          </p:cNvSpPr>
+          <p:nvPr>
+            <p:ph type="body" idx="1"/>
+          </p:nvPr>
+        </p:nvSpPr>
+        <p:spPr/>
+        <p:txBody>
+          <a:bodyPr/>
+          <a:lstStyle/>
+          <a:p>
+            <a:r>
+              <a:rPr lang="en-US" dirty="0"/>
+              <a:t>Better define work</a:t>
+            </a:r>
+          </a:p>
+        </p:txBody>
+      </p:sp>
+      <p:sp>
+        <p:nvSpPr>
+          <p:cNvPr id="4" name="Slide Number Placeholder 3"/>
+          <p:cNvSpPr>
+            <a:spLocks noGrp="1"/>
+          </p:cNvSpPr>
+          <p:nvPr>
+            <p:ph type="sldNum" sz="quarter" idx="5"/>
+          </p:nvPr>
+        </p:nvSpPr>
+        <p:spPr/>
+        <p:txBody>
+          <a:bodyPr/>
+          <a:lstStyle/>
+          <a:p>
+            <a:fld id="{E9E1DFC9-EE16-4136-8822-8361C2EB7D32}" type="slidenum">
+              <a:rPr lang="en-US" smtClean="0"/>
+              <a:t>8</a:t>
+            </a:fld>
+            <a:endParaRPr lang="en-US"/>
+          </a:p>
+        </p:txBody>
+      </p:sp>
+    </p:spTree>
+    <p:extLst>
+      <p:ext uri="{BB962C8B-B14F-4D97-AF65-F5344CB8AC3E}">
+        <p14:creationId xmlns:p14="http://schemas.microsoft.com/office/powerpoint/2010/main" val="2705225124"/>
+      </p:ext>
+    </p:extLst>
+  </p:cSld>
+  <p:clrMapOvr>
+    <a:masterClrMapping/>
+  </p:clrMapOvr>
+</p:notes>
+</file>
+
+<file path=ppt/notesSlides/notesSlide7.xml><?xml version="1.0" encoding="utf-8"?>
+<p:notes xmlns:a="http://schemas.openxmlformats.org/drawingml/2006/main" xmlns:r="http://schemas.openxmlformats.org/officeDocument/2006/relationships" xmlns:p="http://schemas.openxmlformats.org/presentationml/2006/main">
+  <p:cSld>
+    <p:spTree>
+      <p:nvGrpSpPr>
+        <p:cNvPr id="1" name=""/>
+        <p:cNvGrpSpPr/>
+        <p:nvPr/>
+      </p:nvGrpSpPr>
+      <p:grpSpPr>
+        <a:xfrm>
+          <a:off x="0" y="0"/>
+          <a:ext cx="0" cy="0"/>
+          <a:chOff x="0" y="0"/>
+          <a:chExt cx="0" cy="0"/>
+        </a:xfrm>
+      </p:grpSpPr>
+      <p:sp>
+        <p:nvSpPr>
+          <p:cNvPr id="2" name="Slide Image Placeholder 1"/>
+          <p:cNvSpPr>
+            <a:spLocks noGrp="1" noRot="1" noChangeAspect="1"/>
+          </p:cNvSpPr>
+          <p:nvPr>
+            <p:ph type="sldImg"/>
+          </p:nvPr>
+        </p:nvSpPr>
+        <p:spPr/>
+      </p:sp>
+      <p:sp>
+        <p:nvSpPr>
+          <p:cNvPr id="3" name="Notes Placeholder 2"/>
+          <p:cNvSpPr>
+            <a:spLocks noGrp="1"/>
+          </p:cNvSpPr>
+          <p:nvPr>
+            <p:ph type="body" idx="1"/>
+          </p:nvPr>
+        </p:nvSpPr>
+        <p:spPr/>
+        <p:txBody>
+          <a:bodyPr/>
+          <a:lstStyle/>
+          <a:p>
+            <a:r>
+              <a:rPr lang="en-US" dirty="0"/>
+              <a:t>Add Visual References (Atlassian Diagrams)</a:t>
+            </a:r>
+          </a:p>
+        </p:txBody>
+      </p:sp>
+      <p:sp>
+        <p:nvSpPr>
+          <p:cNvPr id="4" name="Slide Number Placeholder 3"/>
+          <p:cNvSpPr>
+            <a:spLocks noGrp="1"/>
+          </p:cNvSpPr>
+          <p:nvPr>
+            <p:ph type="sldNum" sz="quarter" idx="5"/>
+          </p:nvPr>
+        </p:nvSpPr>
+        <p:spPr/>
+        <p:txBody>
+          <a:bodyPr/>
+          <a:lstStyle/>
+          <a:p>
+            <a:fld id="{E9E1DFC9-EE16-4136-8822-8361C2EB7D32}" type="slidenum">
+              <a:rPr lang="en-US" smtClean="0"/>
+              <a:t>12</a:t>
+            </a:fld>
+            <a:endParaRPr lang="en-US"/>
+          </a:p>
+        </p:txBody>
+      </p:sp>
+    </p:spTree>
+    <p:extLst>
+      <p:ext uri="{BB962C8B-B14F-4D97-AF65-F5344CB8AC3E}">
+        <p14:creationId xmlns:p14="http://schemas.microsoft.com/office/powerpoint/2010/main" val="2749384323"/>
+      </p:ext>
+    </p:extLst>
+  </p:cSld>
+  <p:clrMapOvr>
+    <a:masterClrMapping/>
+  </p:clrMapOvr>
+</p:notes>
+</file>
+
+<file path=ppt/notesSlides/notesSlide8.xml><?xml version="1.0" encoding="utf-8"?>
+<p:notes xmlns:a="http://schemas.openxmlformats.org/drawingml/2006/main" xmlns:r="http://schemas.openxmlformats.org/officeDocument/2006/relationships" xmlns:p="http://schemas.openxmlformats.org/presentationml/2006/main">
+  <p:cSld>
+    <p:spTree>
+      <p:nvGrpSpPr>
+        <p:cNvPr id="1" name=""/>
+        <p:cNvGrpSpPr/>
+        <p:nvPr/>
+      </p:nvGrpSpPr>
+      <p:grpSpPr>
+        <a:xfrm>
+          <a:off x="0" y="0"/>
+          <a:ext cx="0" cy="0"/>
+          <a:chOff x="0" y="0"/>
+          <a:chExt cx="0" cy="0"/>
+        </a:xfrm>
+      </p:grpSpPr>
+      <p:sp>
+        <p:nvSpPr>
+          <p:cNvPr id="2" name="Slide Image Placeholder 1"/>
+          <p:cNvSpPr>
+            <a:spLocks noGrp="1" noRot="1" noChangeAspect="1"/>
+          </p:cNvSpPr>
+          <p:nvPr>
+            <p:ph type="sldImg"/>
+          </p:nvPr>
+        </p:nvSpPr>
+        <p:spPr/>
+      </p:sp>
+      <p:sp>
+        <p:nvSpPr>
+          <p:cNvPr id="3" name="Notes Placeholder 2"/>
+          <p:cNvSpPr>
+            <a:spLocks noGrp="1"/>
+          </p:cNvSpPr>
+          <p:nvPr>
+            <p:ph type="body" idx="1"/>
+          </p:nvPr>
+        </p:nvSpPr>
+        <p:spPr/>
+        <p:txBody>
+          <a:bodyPr/>
+          <a:lstStyle/>
+          <a:p>
+            <a:endParaRPr lang="en-US" dirty="0"/>
+          </a:p>
+        </p:txBody>
+      </p:sp>
+      <p:sp>
+        <p:nvSpPr>
+          <p:cNvPr id="4" name="Slide Number Placeholder 3"/>
+          <p:cNvSpPr>
+            <a:spLocks noGrp="1"/>
+          </p:cNvSpPr>
+          <p:nvPr>
+            <p:ph type="sldNum" sz="quarter" idx="5"/>
+          </p:nvPr>
+        </p:nvSpPr>
+        <p:spPr/>
+        <p:txBody>
+          <a:bodyPr/>
+          <a:lstStyle/>
+          <a:p>
+            <a:fld id="{E9E1DFC9-EE16-4136-8822-8361C2EB7D32}" type="slidenum">
+              <a:rPr lang="en-US" smtClean="0"/>
+              <a:t>13</a:t>
+            </a:fld>
+            <a:endParaRPr lang="en-US"/>
+          </a:p>
+        </p:txBody>
+      </p:sp>
+    </p:spTree>
+    <p:extLst>
+      <p:ext uri="{BB962C8B-B14F-4D97-AF65-F5344CB8AC3E}">
+        <p14:creationId xmlns:p14="http://schemas.microsoft.com/office/powerpoint/2010/main" val="238496880"/>
       </p:ext>
     </p:extLst>
   </p:cSld>
@@ -1316,7 +1923,7 @@
           <a:p>
             <a:fld id="{38E594E3-4743-4683-81F7-698D2FA773A6}" type="datetimeFigureOut">
               <a:rPr lang="en-US" smtClean="0"/>
-              <a:t>10/22/2019</a:t>
+              <a:t>10/26/2019</a:t>
             </a:fld>
             <a:endParaRPr lang="en-US"/>
           </a:p>
@@ -1567,7 +2174,7 @@
           <a:p>
             <a:fld id="{38E594E3-4743-4683-81F7-698D2FA773A6}" type="datetimeFigureOut">
               <a:rPr lang="en-US" smtClean="0"/>
-              <a:t>10/22/2019</a:t>
+              <a:t>10/26/2019</a:t>
             </a:fld>
             <a:endParaRPr lang="en-US"/>
           </a:p>
@@ -1881,7 +2488,7 @@
           <a:p>
             <a:fld id="{38E594E3-4743-4683-81F7-698D2FA773A6}" type="datetimeFigureOut">
               <a:rPr lang="en-US" smtClean="0"/>
-              <a:t>10/22/2019</a:t>
+              <a:t>10/26/2019</a:t>
             </a:fld>
             <a:endParaRPr lang="en-US"/>
           </a:p>
@@ -2222,7 +2829,7 @@
           <a:p>
             <a:fld id="{38E594E3-4743-4683-81F7-698D2FA773A6}" type="datetimeFigureOut">
               <a:rPr lang="en-US" smtClean="0"/>
-              <a:t>10/22/2019</a:t>
+              <a:t>10/26/2019</a:t>
             </a:fld>
             <a:endParaRPr lang="en-US"/>
           </a:p>
@@ -2536,7 +3143,7 @@
           <a:p>
             <a:fld id="{38E594E3-4743-4683-81F7-698D2FA773A6}" type="datetimeFigureOut">
               <a:rPr lang="en-US" smtClean="0"/>
-              <a:t>10/22/2019</a:t>
+              <a:t>10/26/2019</a:t>
             </a:fld>
             <a:endParaRPr lang="en-US"/>
           </a:p>
@@ -2929,7 +3536,7 @@
           <a:p>
             <a:fld id="{38E594E3-4743-4683-81F7-698D2FA773A6}" type="datetimeFigureOut">
               <a:rPr lang="en-US" smtClean="0"/>
-              <a:t>10/22/2019</a:t>
+              <a:t>10/26/2019</a:t>
             </a:fld>
             <a:endParaRPr lang="en-US"/>
           </a:p>
@@ -3099,7 +3706,7 @@
           <a:p>
             <a:fld id="{38E594E3-4743-4683-81F7-698D2FA773A6}" type="datetimeFigureOut">
               <a:rPr lang="en-US" smtClean="0"/>
-              <a:t>10/22/2019</a:t>
+              <a:t>10/26/2019</a:t>
             </a:fld>
             <a:endParaRPr lang="en-US"/>
           </a:p>
@@ -3279,7 +3886,7 @@
           <a:p>
             <a:fld id="{38E594E3-4743-4683-81F7-698D2FA773A6}" type="datetimeFigureOut">
               <a:rPr lang="en-US" smtClean="0"/>
-              <a:t>10/22/2019</a:t>
+              <a:t>10/26/2019</a:t>
             </a:fld>
             <a:endParaRPr lang="en-US"/>
           </a:p>
@@ -3455,7 +4062,7 @@
           <a:p>
             <a:fld id="{38E594E3-4743-4683-81F7-698D2FA773A6}" type="datetimeFigureOut">
               <a:rPr lang="en-US" smtClean="0"/>
-              <a:t>10/22/2019</a:t>
+              <a:t>10/26/2019</a:t>
             </a:fld>
             <a:endParaRPr lang="en-US"/>
           </a:p>
@@ -3702,7 +4309,7 @@
           <a:p>
             <a:fld id="{38E594E3-4743-4683-81F7-698D2FA773A6}" type="datetimeFigureOut">
               <a:rPr lang="en-US" smtClean="0"/>
-              <a:t>10/22/2019</a:t>
+              <a:t>10/26/2019</a:t>
             </a:fld>
             <a:endParaRPr lang="en-US"/>
           </a:p>
@@ -3934,7 +4541,7 @@
           <a:p>
             <a:fld id="{38E594E3-4743-4683-81F7-698D2FA773A6}" type="datetimeFigureOut">
               <a:rPr lang="en-US" smtClean="0"/>
-              <a:t>10/22/2019</a:t>
+              <a:t>10/26/2019</a:t>
             </a:fld>
             <a:endParaRPr lang="en-US"/>
           </a:p>
@@ -4308,7 +4915,7 @@
           <a:p>
             <a:fld id="{38E594E3-4743-4683-81F7-698D2FA773A6}" type="datetimeFigureOut">
               <a:rPr lang="en-US" smtClean="0"/>
-              <a:t>10/22/2019</a:t>
+              <a:t>10/26/2019</a:t>
             </a:fld>
             <a:endParaRPr lang="en-US"/>
           </a:p>
@@ -4431,7 +5038,7 @@
           <a:p>
             <a:fld id="{38E594E3-4743-4683-81F7-698D2FA773A6}" type="datetimeFigureOut">
               <a:rPr lang="en-US" smtClean="0"/>
-              <a:t>10/22/2019</a:t>
+              <a:t>10/26/2019</a:t>
             </a:fld>
             <a:endParaRPr lang="en-US"/>
           </a:p>
@@ -4526,7 +5133,7 @@
           <a:p>
             <a:fld id="{38E594E3-4743-4683-81F7-698D2FA773A6}" type="datetimeFigureOut">
               <a:rPr lang="en-US" smtClean="0"/>
-              <a:t>10/22/2019</a:t>
+              <a:t>10/26/2019</a:t>
             </a:fld>
             <a:endParaRPr lang="en-US"/>
           </a:p>
@@ -4781,7 +5388,7 @@
           <a:p>
             <a:fld id="{38E594E3-4743-4683-81F7-698D2FA773A6}" type="datetimeFigureOut">
               <a:rPr lang="en-US" smtClean="0"/>
-              <a:t>10/22/2019</a:t>
+              <a:t>10/26/2019</a:t>
             </a:fld>
             <a:endParaRPr lang="en-US"/>
           </a:p>
@@ -5044,7 +5651,7 @@
           <a:p>
             <a:fld id="{38E594E3-4743-4683-81F7-698D2FA773A6}" type="datetimeFigureOut">
               <a:rPr lang="en-US" smtClean="0"/>
-              <a:t>10/22/2019</a:t>
+              <a:t>10/26/2019</a:t>
             </a:fld>
             <a:endParaRPr lang="en-US"/>
           </a:p>
@@ -5787,7 +6394,7 @@
           <a:p>
             <a:fld id="{38E594E3-4743-4683-81F7-698D2FA773A6}" type="datetimeFigureOut">
               <a:rPr lang="en-US" smtClean="0"/>
-              <a:t>10/22/2019</a:t>
+              <a:t>10/26/2019</a:t>
             </a:fld>
             <a:endParaRPr lang="en-US"/>
           </a:p>
@@ -6402,7 +7009,7 @@
           <p:cNvPr id="2" name="Title 1">
             <a:extLst>
               <a:ext uri="{FF2B5EF4-FFF2-40B4-BE49-F238E27FC236}">
-                <a16:creationId xmlns:a16="http://schemas.microsoft.com/office/drawing/2014/main" id="{7EE1DCE8-D311-4D99-A81C-BE65135FC7B1}"/>
+                <a16:creationId xmlns:a16="http://schemas.microsoft.com/office/drawing/2014/main" id="{BD61DC07-2119-4D76-8D85-02068B8AE439}"/>
               </a:ext>
             </a:extLst>
           </p:cNvPr>
@@ -6413,19 +7020,14 @@
             <p:ph type="title"/>
           </p:nvPr>
         </p:nvSpPr>
-        <p:spPr>
-          <a:xfrm>
-            <a:off x="677334" y="609600"/>
-            <a:ext cx="8596668" cy="732639"/>
-          </a:xfrm>
-        </p:spPr>
+        <p:spPr/>
         <p:txBody>
           <a:bodyPr/>
           <a:lstStyle/>
           <a:p>
             <a:r>
               <a:rPr lang="en-US" dirty="0"/>
-              <a:t>Branching and Merging</a:t>
+              <a:t>Repositories</a:t>
             </a:r>
           </a:p>
         </p:txBody>
@@ -6435,7 +7037,7 @@
           <p:cNvPr id="3" name="Content Placeholder 2">
             <a:extLst>
               <a:ext uri="{FF2B5EF4-FFF2-40B4-BE49-F238E27FC236}">
-                <a16:creationId xmlns:a16="http://schemas.microsoft.com/office/drawing/2014/main" id="{9374DAC6-B719-4917-BD3A-9F035608224A}"/>
+                <a16:creationId xmlns:a16="http://schemas.microsoft.com/office/drawing/2014/main" id="{296796AB-AD6F-4E4A-A8FD-D16B19175E75}"/>
               </a:ext>
             </a:extLst>
           </p:cNvPr>
@@ -6446,37 +7048,40 @@
             <p:ph idx="1"/>
           </p:nvPr>
         </p:nvSpPr>
-        <p:spPr>
-          <a:xfrm>
-            <a:off x="677334" y="1342239"/>
-            <a:ext cx="8596668" cy="4699123"/>
-          </a:xfrm>
-        </p:spPr>
+        <p:spPr/>
         <p:txBody>
           <a:bodyPr/>
           <a:lstStyle/>
           <a:p>
             <a:r>
               <a:rPr lang="en-US" dirty="0"/>
-              <a:t>A branch is a copy of the working set that can be modified independently of other branches.</a:t>
-            </a:r>
+              <a:t>Store the files you want to track</a:t>
+            </a:r>
+          </a:p>
+          <a:p>
+            <a:endParaRPr lang="en-US" dirty="0"/>
           </a:p>
           <a:p>
             <a:r>
               <a:rPr lang="en-US" dirty="0"/>
-              <a:t>Merging is the act of applying the changes from one branch to another branch.</a:t>
-            </a:r>
-          </a:p>
-          <a:p>
-            <a:pPr lvl="1"/>
+              <a:t>Are a single folder</a:t>
+            </a:r>
+          </a:p>
+          <a:p>
             <a:endParaRPr lang="en-US" dirty="0"/>
+          </a:p>
+          <a:p>
+            <a:r>
+              <a:rPr lang="en-US" dirty="0"/>
+              <a:t>Also contain all the git meta-data. </a:t>
+            </a:r>
           </a:p>
         </p:txBody>
       </p:sp>
     </p:spTree>
     <p:extLst>
       <p:ext uri="{BB962C8B-B14F-4D97-AF65-F5344CB8AC3E}">
-        <p14:creationId xmlns:p14="http://schemas.microsoft.com/office/powerpoint/2010/main" val="1546890086"/>
+        <p14:creationId xmlns:p14="http://schemas.microsoft.com/office/powerpoint/2010/main" val="2589151126"/>
       </p:ext>
     </p:extLst>
   </p:cSld>
@@ -6531,7 +7136,7 @@
           <a:p>
             <a:r>
               <a:rPr lang="en-US" dirty="0"/>
-              <a:t>Push (and Pull)</a:t>
+              <a:t>Commit</a:t>
             </a:r>
           </a:p>
         </p:txBody>
@@ -6564,20 +7169,21 @@
           <a:p>
             <a:r>
               <a:rPr lang="en-US" dirty="0"/>
-              <a:t>Pushing is the act of moving the changeset from your repo to another repo.</a:t>
+              <a:t>A commit is a single snapshot in time.  </a:t>
             </a:r>
           </a:p>
           <a:p>
             <a:pPr lvl="1"/>
             <a:r>
               <a:rPr lang="en-US" dirty="0"/>
-              <a:t>This is the way changesets are shared. </a:t>
-            </a:r>
-          </a:p>
-          <a:p>
+              <a:t>Places a snapshot of the files into the change history.</a:t>
+            </a:r>
+          </a:p>
+          <a:p>
+            <a:pPr lvl="1"/>
             <a:r>
               <a:rPr lang="en-US" dirty="0"/>
-              <a:t>Pull Requests (Short for: Requesting Someone Else To Pull Your Changes)</a:t>
+              <a:t>The developer decides what is or isn’t included.</a:t>
             </a:r>
           </a:p>
           <a:p>
@@ -6589,7 +7195,7 @@
     </p:spTree>
     <p:extLst>
       <p:ext uri="{BB962C8B-B14F-4D97-AF65-F5344CB8AC3E}">
-        <p14:creationId xmlns:p14="http://schemas.microsoft.com/office/powerpoint/2010/main" val="52621604"/>
+        <p14:creationId xmlns:p14="http://schemas.microsoft.com/office/powerpoint/2010/main" val="2405585525"/>
       </p:ext>
     </p:extLst>
   </p:cSld>
@@ -6602,6 +7208,14 @@
 <file path=ppt/slides/slide12.xml><?xml version="1.0" encoding="utf-8"?>
 <p:sld xmlns:a="http://schemas.openxmlformats.org/drawingml/2006/main" xmlns:r="http://schemas.openxmlformats.org/officeDocument/2006/relationships" xmlns:p="http://schemas.openxmlformats.org/presentationml/2006/main">
   <p:cSld>
+    <p:bg>
+      <p:bgPr>
+        <a:solidFill>
+          <a:schemeClr val="bg1"/>
+        </a:solidFill>
+        <a:effectLst/>
+      </p:bgPr>
+    </p:bg>
     <p:spTree>
       <p:nvGrpSpPr>
         <p:cNvPr id="1" name=""/>
@@ -6621,7 +7235,7 @@
           <p:cNvPr id="2" name="Title 1">
             <a:extLst>
               <a:ext uri="{FF2B5EF4-FFF2-40B4-BE49-F238E27FC236}">
-                <a16:creationId xmlns:a16="http://schemas.microsoft.com/office/drawing/2014/main" id="{ECBF22E6-9EF8-4EB2-88B3-3875ED450CAF}"/>
+                <a16:creationId xmlns:a16="http://schemas.microsoft.com/office/drawing/2014/main" id="{7EE1DCE8-D311-4D99-A81C-BE65135FC7B1}"/>
               </a:ext>
             </a:extLst>
           </p:cNvPr>
@@ -6629,27 +7243,34 @@
             <a:spLocks noGrp="1"/>
           </p:cNvSpPr>
           <p:nvPr>
-            <p:ph type="ctrTitle"/>
-          </p:nvPr>
-        </p:nvSpPr>
-        <p:spPr/>
-        <p:txBody>
-          <a:bodyPr/>
-          <a:lstStyle/>
-          <a:p>
-            <a:r>
-              <a:rPr lang="en-US" dirty="0"/>
-              <a:t>Questions?</a:t>
-            </a:r>
-          </a:p>
-        </p:txBody>
-      </p:sp>
-      <p:sp>
-        <p:nvSpPr>
-          <p:cNvPr id="3" name="Subtitle 2">
+            <p:ph type="title"/>
+          </p:nvPr>
+        </p:nvSpPr>
+        <p:spPr>
+          <a:xfrm>
+            <a:off x="676746" y="609600"/>
+            <a:ext cx="3729076" cy="1320800"/>
+          </a:xfrm>
+        </p:spPr>
+        <p:txBody>
+          <a:bodyPr anchor="ctr">
+            <a:normAutofit/>
+          </a:bodyPr>
+          <a:lstStyle/>
+          <a:p>
+            <a:r>
+              <a:rPr lang="en-US" sz="3600"/>
+              <a:t>Branching and Merging</a:t>
+            </a:r>
+          </a:p>
+        </p:txBody>
+      </p:sp>
+      <p:sp>
+        <p:nvSpPr>
+          <p:cNvPr id="3" name="Content Placeholder 2">
             <a:extLst>
               <a:ext uri="{FF2B5EF4-FFF2-40B4-BE49-F238E27FC236}">
-                <a16:creationId xmlns:a16="http://schemas.microsoft.com/office/drawing/2014/main" id="{929B19A5-6D33-451A-8FC4-594FDCA00286}"/>
+                <a16:creationId xmlns:a16="http://schemas.microsoft.com/office/drawing/2014/main" id="{9374DAC6-B719-4917-BD3A-9F035608224A}"/>
               </a:ext>
             </a:extLst>
           </p:cNvPr>
@@ -6657,22 +7278,72 @@
             <a:spLocks noGrp="1"/>
           </p:cNvSpPr>
           <p:nvPr>
-            <p:ph type="subTitle" idx="1"/>
-          </p:nvPr>
-        </p:nvSpPr>
-        <p:spPr/>
-        <p:txBody>
-          <a:bodyPr/>
-          <a:lstStyle/>
-          <a:p>
+            <p:ph idx="1"/>
+          </p:nvPr>
+        </p:nvSpPr>
+        <p:spPr>
+          <a:xfrm>
+            <a:off x="685167" y="2160589"/>
+            <a:ext cx="3720916" cy="3560733"/>
+          </a:xfrm>
+        </p:spPr>
+        <p:txBody>
+          <a:bodyPr>
+            <a:normAutofit/>
+          </a:bodyPr>
+          <a:lstStyle/>
+          <a:p>
+            <a:r>
+              <a:rPr lang="en-US" dirty="0"/>
+              <a:t>A branch is a copy of the working set that can be modified independently of other branches.</a:t>
+            </a:r>
+          </a:p>
+          <a:p>
+            <a:r>
+              <a:rPr lang="en-US" dirty="0"/>
+              <a:t>Merging is the act of applying the changes from one branch to another branch.</a:t>
+            </a:r>
+          </a:p>
+          <a:p>
+            <a:pPr lvl="1"/>
             <a:endParaRPr lang="en-US" dirty="0"/>
           </a:p>
         </p:txBody>
       </p:sp>
+      <p:pic>
+        <p:nvPicPr>
+          <p:cNvPr id="4" name="Picture 3">
+            <a:extLst>
+              <a:ext uri="{FF2B5EF4-FFF2-40B4-BE49-F238E27FC236}">
+                <a16:creationId xmlns:a16="http://schemas.microsoft.com/office/drawing/2014/main" id="{BD5BEA6F-173C-4D5E-BFBE-669D2CCB2796}"/>
+              </a:ext>
+            </a:extLst>
+          </p:cNvPr>
+          <p:cNvPicPr>
+            <a:picLocks noChangeAspect="1"/>
+          </p:cNvPicPr>
+          <p:nvPr/>
+        </p:nvPicPr>
+        <p:blipFill>
+          <a:blip r:embed="rId3"/>
+          <a:stretch>
+            <a:fillRect/>
+          </a:stretch>
+        </p:blipFill>
+        <p:spPr>
+          <a:xfrm>
+            <a:off x="4654035" y="1134265"/>
+            <a:ext cx="4602747" cy="4084937"/>
+          </a:xfrm>
+          <a:prstGeom prst="rect">
+            <a:avLst/>
+          </a:prstGeom>
+        </p:spPr>
+      </p:pic>
     </p:spTree>
     <p:extLst>
       <p:ext uri="{BB962C8B-B14F-4D97-AF65-F5344CB8AC3E}">
-        <p14:creationId xmlns:p14="http://schemas.microsoft.com/office/powerpoint/2010/main" val="2403661108"/>
+        <p14:creationId xmlns:p14="http://schemas.microsoft.com/office/powerpoint/2010/main" val="1546890086"/>
       </p:ext>
     </p:extLst>
   </p:cSld>
@@ -6704,6 +7375,285 @@
           <p:cNvPr id="2" name="Title 1">
             <a:extLst>
               <a:ext uri="{FF2B5EF4-FFF2-40B4-BE49-F238E27FC236}">
+                <a16:creationId xmlns:a16="http://schemas.microsoft.com/office/drawing/2014/main" id="{7EE1DCE8-D311-4D99-A81C-BE65135FC7B1}"/>
+              </a:ext>
+            </a:extLst>
+          </p:cNvPr>
+          <p:cNvSpPr>
+            <a:spLocks noGrp="1"/>
+          </p:cNvSpPr>
+          <p:nvPr>
+            <p:ph type="title"/>
+          </p:nvPr>
+        </p:nvSpPr>
+        <p:spPr>
+          <a:xfrm>
+            <a:off x="677334" y="609600"/>
+            <a:ext cx="8596668" cy="732639"/>
+          </a:xfrm>
+        </p:spPr>
+        <p:txBody>
+          <a:bodyPr/>
+          <a:lstStyle/>
+          <a:p>
+            <a:r>
+              <a:rPr lang="en-US" dirty="0"/>
+              <a:t>Push (and Pull)</a:t>
+            </a:r>
+          </a:p>
+        </p:txBody>
+      </p:sp>
+      <p:sp>
+        <p:nvSpPr>
+          <p:cNvPr id="3" name="Content Placeholder 2">
+            <a:extLst>
+              <a:ext uri="{FF2B5EF4-FFF2-40B4-BE49-F238E27FC236}">
+                <a16:creationId xmlns:a16="http://schemas.microsoft.com/office/drawing/2014/main" id="{9374DAC6-B719-4917-BD3A-9F035608224A}"/>
+              </a:ext>
+            </a:extLst>
+          </p:cNvPr>
+          <p:cNvSpPr>
+            <a:spLocks noGrp="1"/>
+          </p:cNvSpPr>
+          <p:nvPr>
+            <p:ph idx="1"/>
+          </p:nvPr>
+        </p:nvSpPr>
+        <p:spPr>
+          <a:xfrm>
+            <a:off x="677334" y="1342239"/>
+            <a:ext cx="8596668" cy="4699123"/>
+          </a:xfrm>
+        </p:spPr>
+        <p:txBody>
+          <a:bodyPr/>
+          <a:lstStyle/>
+          <a:p>
+            <a:r>
+              <a:rPr lang="en-US" dirty="0"/>
+              <a:t>Pushing is the act of moving the changeset from your repo to another repo.</a:t>
+            </a:r>
+          </a:p>
+          <a:p>
+            <a:pPr lvl="1"/>
+            <a:r>
+              <a:rPr lang="en-US" dirty="0"/>
+              <a:t>This is the way changesets are shared. </a:t>
+            </a:r>
+          </a:p>
+          <a:p>
+            <a:r>
+              <a:rPr lang="en-US" dirty="0"/>
+              <a:t>Pull Requests (Short for: Requesting Someone Else To Pull Your Changes)</a:t>
+            </a:r>
+          </a:p>
+          <a:p>
+            <a:pPr lvl="1"/>
+            <a:endParaRPr lang="en-US" dirty="0"/>
+          </a:p>
+        </p:txBody>
+      </p:sp>
+    </p:spTree>
+    <p:extLst>
+      <p:ext uri="{BB962C8B-B14F-4D97-AF65-F5344CB8AC3E}">
+        <p14:creationId xmlns:p14="http://schemas.microsoft.com/office/powerpoint/2010/main" val="52621604"/>
+      </p:ext>
+    </p:extLst>
+  </p:cSld>
+  <p:clrMapOvr>
+    <a:masterClrMapping/>
+  </p:clrMapOvr>
+</p:sld>
+</file>
+
+<file path=ppt/slides/slide14.xml><?xml version="1.0" encoding="utf-8"?>
+<p:sld xmlns:a="http://schemas.openxmlformats.org/drawingml/2006/main" xmlns:r="http://schemas.openxmlformats.org/officeDocument/2006/relationships" xmlns:p="http://schemas.openxmlformats.org/presentationml/2006/main">
+  <p:cSld>
+    <p:spTree>
+      <p:nvGrpSpPr>
+        <p:cNvPr id="1" name=""/>
+        <p:cNvGrpSpPr/>
+        <p:nvPr/>
+      </p:nvGrpSpPr>
+      <p:grpSpPr>
+        <a:xfrm>
+          <a:off x="0" y="0"/>
+          <a:ext cx="0" cy="0"/>
+          <a:chOff x="0" y="0"/>
+          <a:chExt cx="0" cy="0"/>
+        </a:xfrm>
+      </p:grpSpPr>
+      <p:sp>
+        <p:nvSpPr>
+          <p:cNvPr id="2" name="Title 1">
+            <a:extLst>
+              <a:ext uri="{FF2B5EF4-FFF2-40B4-BE49-F238E27FC236}">
+                <a16:creationId xmlns:a16="http://schemas.microsoft.com/office/drawing/2014/main" id="{C85963BB-D731-466E-9B53-F39BEDD14A67}"/>
+              </a:ext>
+            </a:extLst>
+          </p:cNvPr>
+          <p:cNvSpPr>
+            <a:spLocks noGrp="1"/>
+          </p:cNvSpPr>
+          <p:nvPr>
+            <p:ph type="title"/>
+          </p:nvPr>
+        </p:nvSpPr>
+        <p:spPr/>
+        <p:txBody>
+          <a:bodyPr/>
+          <a:lstStyle/>
+          <a:p>
+            <a:r>
+              <a:rPr lang="en-US" dirty="0"/>
+              <a:t>GitHub</a:t>
+            </a:r>
+          </a:p>
+        </p:txBody>
+      </p:sp>
+      <p:sp>
+        <p:nvSpPr>
+          <p:cNvPr id="3" name="Content Placeholder 2">
+            <a:extLst>
+              <a:ext uri="{FF2B5EF4-FFF2-40B4-BE49-F238E27FC236}">
+                <a16:creationId xmlns:a16="http://schemas.microsoft.com/office/drawing/2014/main" id="{28DCBE85-F0B3-46DD-9244-8E0C4FA104DD}"/>
+              </a:ext>
+            </a:extLst>
+          </p:cNvPr>
+          <p:cNvSpPr>
+            <a:spLocks noGrp="1"/>
+          </p:cNvSpPr>
+          <p:nvPr>
+            <p:ph idx="1"/>
+          </p:nvPr>
+        </p:nvSpPr>
+        <p:spPr/>
+        <p:txBody>
+          <a:bodyPr/>
+          <a:lstStyle/>
+          <a:p>
+            <a:endParaRPr lang="en-US" dirty="0"/>
+          </a:p>
+        </p:txBody>
+      </p:sp>
+    </p:spTree>
+    <p:extLst>
+      <p:ext uri="{BB962C8B-B14F-4D97-AF65-F5344CB8AC3E}">
+        <p14:creationId xmlns:p14="http://schemas.microsoft.com/office/powerpoint/2010/main" val="1367772460"/>
+      </p:ext>
+    </p:extLst>
+  </p:cSld>
+  <p:clrMapOvr>
+    <a:masterClrMapping/>
+  </p:clrMapOvr>
+</p:sld>
+</file>
+
+<file path=ppt/slides/slide15.xml><?xml version="1.0" encoding="utf-8"?>
+<p:sld xmlns:a="http://schemas.openxmlformats.org/drawingml/2006/main" xmlns:r="http://schemas.openxmlformats.org/officeDocument/2006/relationships" xmlns:p="http://schemas.openxmlformats.org/presentationml/2006/main">
+  <p:cSld>
+    <p:spTree>
+      <p:nvGrpSpPr>
+        <p:cNvPr id="1" name=""/>
+        <p:cNvGrpSpPr/>
+        <p:nvPr/>
+      </p:nvGrpSpPr>
+      <p:grpSpPr>
+        <a:xfrm>
+          <a:off x="0" y="0"/>
+          <a:ext cx="0" cy="0"/>
+          <a:chOff x="0" y="0"/>
+          <a:chExt cx="0" cy="0"/>
+        </a:xfrm>
+      </p:grpSpPr>
+      <p:sp>
+        <p:nvSpPr>
+          <p:cNvPr id="2" name="Title 1">
+            <a:extLst>
+              <a:ext uri="{FF2B5EF4-FFF2-40B4-BE49-F238E27FC236}">
+                <a16:creationId xmlns:a16="http://schemas.microsoft.com/office/drawing/2014/main" id="{ECBF22E6-9EF8-4EB2-88B3-3875ED450CAF}"/>
+              </a:ext>
+            </a:extLst>
+          </p:cNvPr>
+          <p:cNvSpPr>
+            <a:spLocks noGrp="1"/>
+          </p:cNvSpPr>
+          <p:nvPr>
+            <p:ph type="ctrTitle"/>
+          </p:nvPr>
+        </p:nvSpPr>
+        <p:spPr/>
+        <p:txBody>
+          <a:bodyPr/>
+          <a:lstStyle/>
+          <a:p>
+            <a:r>
+              <a:rPr lang="en-US" dirty="0"/>
+              <a:t>Questions?</a:t>
+            </a:r>
+          </a:p>
+        </p:txBody>
+      </p:sp>
+      <p:sp>
+        <p:nvSpPr>
+          <p:cNvPr id="3" name="Subtitle 2">
+            <a:extLst>
+              <a:ext uri="{FF2B5EF4-FFF2-40B4-BE49-F238E27FC236}">
+                <a16:creationId xmlns:a16="http://schemas.microsoft.com/office/drawing/2014/main" id="{929B19A5-6D33-451A-8FC4-594FDCA00286}"/>
+              </a:ext>
+            </a:extLst>
+          </p:cNvPr>
+          <p:cNvSpPr>
+            <a:spLocks noGrp="1"/>
+          </p:cNvSpPr>
+          <p:nvPr>
+            <p:ph type="subTitle" idx="1"/>
+          </p:nvPr>
+        </p:nvSpPr>
+        <p:spPr/>
+        <p:txBody>
+          <a:bodyPr/>
+          <a:lstStyle/>
+          <a:p>
+            <a:endParaRPr lang="en-US" dirty="0"/>
+          </a:p>
+        </p:txBody>
+      </p:sp>
+    </p:spTree>
+    <p:extLst>
+      <p:ext uri="{BB962C8B-B14F-4D97-AF65-F5344CB8AC3E}">
+        <p14:creationId xmlns:p14="http://schemas.microsoft.com/office/powerpoint/2010/main" val="2403661108"/>
+      </p:ext>
+    </p:extLst>
+  </p:cSld>
+  <p:clrMapOvr>
+    <a:masterClrMapping/>
+  </p:clrMapOvr>
+</p:sld>
+</file>
+
+<file path=ppt/slides/slide16.xml><?xml version="1.0" encoding="utf-8"?>
+<p:sld xmlns:a="http://schemas.openxmlformats.org/drawingml/2006/main" xmlns:r="http://schemas.openxmlformats.org/officeDocument/2006/relationships" xmlns:p="http://schemas.openxmlformats.org/presentationml/2006/main">
+  <p:cSld>
+    <p:spTree>
+      <p:nvGrpSpPr>
+        <p:cNvPr id="1" name=""/>
+        <p:cNvGrpSpPr/>
+        <p:nvPr/>
+      </p:nvGrpSpPr>
+      <p:grpSpPr>
+        <a:xfrm>
+          <a:off x="0" y="0"/>
+          <a:ext cx="0" cy="0"/>
+          <a:chOff x="0" y="0"/>
+          <a:chExt cx="0" cy="0"/>
+        </a:xfrm>
+      </p:grpSpPr>
+      <p:sp>
+        <p:nvSpPr>
+          <p:cNvPr id="2" name="Title 1">
+            <a:extLst>
+              <a:ext uri="{FF2B5EF4-FFF2-40B4-BE49-F238E27FC236}">
                 <a16:creationId xmlns:a16="http://schemas.microsoft.com/office/drawing/2014/main" id="{683E4871-360F-44C3-A8FD-445890CEC74C}"/>
               </a:ext>
             </a:extLst>
@@ -6756,6 +7706,140 @@
     <p:extLst>
       <p:ext uri="{BB962C8B-B14F-4D97-AF65-F5344CB8AC3E}">
         <p14:creationId xmlns:p14="http://schemas.microsoft.com/office/powerpoint/2010/main" val="3301109532"/>
+      </p:ext>
+    </p:extLst>
+  </p:cSld>
+  <p:clrMapOvr>
+    <a:masterClrMapping/>
+  </p:clrMapOvr>
+</p:sld>
+</file>
+
+<file path=ppt/slides/slide17.xml><?xml version="1.0" encoding="utf-8"?>
+<p:sld xmlns:a="http://schemas.openxmlformats.org/drawingml/2006/main" xmlns:r="http://schemas.openxmlformats.org/officeDocument/2006/relationships" xmlns:p="http://schemas.openxmlformats.org/presentationml/2006/main">
+  <p:cSld>
+    <p:spTree>
+      <p:nvGrpSpPr>
+        <p:cNvPr id="1" name=""/>
+        <p:cNvGrpSpPr/>
+        <p:nvPr/>
+      </p:nvGrpSpPr>
+      <p:grpSpPr>
+        <a:xfrm>
+          <a:off x="0" y="0"/>
+          <a:ext cx="0" cy="0"/>
+          <a:chOff x="0" y="0"/>
+          <a:chExt cx="0" cy="0"/>
+        </a:xfrm>
+      </p:grpSpPr>
+      <p:sp>
+        <p:nvSpPr>
+          <p:cNvPr id="2" name="Title 1">
+            <a:extLst>
+              <a:ext uri="{FF2B5EF4-FFF2-40B4-BE49-F238E27FC236}">
+                <a16:creationId xmlns:a16="http://schemas.microsoft.com/office/drawing/2014/main" id="{C85963BB-D731-466E-9B53-F39BEDD14A67}"/>
+              </a:ext>
+            </a:extLst>
+          </p:cNvPr>
+          <p:cNvSpPr>
+            <a:spLocks noGrp="1"/>
+          </p:cNvSpPr>
+          <p:nvPr>
+            <p:ph type="title"/>
+          </p:nvPr>
+        </p:nvSpPr>
+        <p:spPr>
+          <a:xfrm>
+            <a:off x="677334" y="609600"/>
+            <a:ext cx="8596668" cy="696686"/>
+          </a:xfrm>
+        </p:spPr>
+        <p:txBody>
+          <a:bodyPr/>
+          <a:lstStyle/>
+          <a:p>
+            <a:r>
+              <a:rPr lang="en-US" dirty="0"/>
+              <a:t>References	</a:t>
+            </a:r>
+          </a:p>
+        </p:txBody>
+      </p:sp>
+      <p:sp>
+        <p:nvSpPr>
+          <p:cNvPr id="3" name="Content Placeholder 2">
+            <a:extLst>
+              <a:ext uri="{FF2B5EF4-FFF2-40B4-BE49-F238E27FC236}">
+                <a16:creationId xmlns:a16="http://schemas.microsoft.com/office/drawing/2014/main" id="{28DCBE85-F0B3-46DD-9244-8E0C4FA104DD}"/>
+              </a:ext>
+            </a:extLst>
+          </p:cNvPr>
+          <p:cNvSpPr>
+            <a:spLocks noGrp="1"/>
+          </p:cNvSpPr>
+          <p:nvPr>
+            <p:ph idx="1"/>
+          </p:nvPr>
+        </p:nvSpPr>
+        <p:spPr>
+          <a:xfrm>
+            <a:off x="677334" y="1306287"/>
+            <a:ext cx="8596668" cy="4735076"/>
+          </a:xfrm>
+        </p:spPr>
+        <p:txBody>
+          <a:bodyPr/>
+          <a:lstStyle/>
+          <a:p>
+            <a:r>
+              <a:rPr lang="en-US" dirty="0"/>
+              <a:t>Atlassian Tutorial (</a:t>
+            </a:r>
+            <a:r>
+              <a:rPr lang="en-US" dirty="0">
+                <a:hlinkClick r:id="rId2"/>
+              </a:rPr>
+              <a:t>https://www.atlassian.com/git/tutorials</a:t>
+            </a:r>
+            <a:r>
+              <a:rPr lang="en-US" dirty="0"/>
+              <a:t>)</a:t>
+            </a:r>
+          </a:p>
+          <a:p>
+            <a:r>
+              <a:rPr lang="en-US" dirty="0"/>
+              <a:t>Git SCM docs (</a:t>
+            </a:r>
+            <a:r>
+              <a:rPr lang="en-US" dirty="0">
+                <a:hlinkClick r:id="rId3"/>
+              </a:rPr>
+              <a:t>https://git-scm.com/docs/</a:t>
+            </a:r>
+            <a:r>
+              <a:rPr lang="en-US" dirty="0"/>
+              <a:t>)</a:t>
+            </a:r>
+          </a:p>
+          <a:p>
+            <a:r>
+              <a:rPr lang="en-US" dirty="0"/>
+              <a:t>Git for Teams (</a:t>
+            </a:r>
+          </a:p>
+          <a:p>
+            <a:endParaRPr lang="en-US" dirty="0"/>
+          </a:p>
+          <a:p>
+            <a:endParaRPr lang="en-US" dirty="0"/>
+          </a:p>
+        </p:txBody>
+      </p:sp>
+    </p:spTree>
+    <p:extLst>
+      <p:ext uri="{BB962C8B-B14F-4D97-AF65-F5344CB8AC3E}">
+        <p14:creationId xmlns:p14="http://schemas.microsoft.com/office/powerpoint/2010/main" val="1585113183"/>
       </p:ext>
     </p:extLst>
   </p:cSld>
@@ -7231,8 +8315,8 @@
         </p:nvSpPr>
         <p:spPr>
           <a:xfrm>
-            <a:off x="677334" y="1342239"/>
-            <a:ext cx="8596668" cy="4699123"/>
+            <a:off x="677334" y="1937657"/>
+            <a:ext cx="8596668" cy="4103705"/>
           </a:xfrm>
         </p:spPr>
         <p:txBody>
@@ -7272,7 +8356,7 @@
             <a:pPr lvl="1"/>
             <a:r>
               <a:rPr lang="en-US" dirty="0"/>
-              <a:t>Individual developers can work on the same code at the same time without being locked out.</a:t>
+              <a:t>Individual developers can make commits on the same code at the same time without being locked out.</a:t>
             </a:r>
           </a:p>
           <a:p>
@@ -7572,7 +8656,7 @@
           <a:p>
             <a:r>
               <a:rPr lang="en-US" dirty="0"/>
-              <a:t>Simultaneous work can be done now, but you bring on the burden of reconciliation. </a:t>
+              <a:t>Simultaneous submitting of changes can be done now, but you bring on the burden of reconciliation. </a:t>
             </a:r>
           </a:p>
         </p:txBody>
@@ -7635,7 +8719,7 @@
           <a:p>
             <a:r>
               <a:rPr lang="en-US" dirty="0"/>
-              <a:t>How Does Git Work?</a:t>
+              <a:t>Distributed Model (Caveats)</a:t>
             </a:r>
           </a:p>
         </p:txBody>
@@ -7668,45 +8752,31 @@
           <a:p>
             <a:r>
               <a:rPr lang="en-US" dirty="0"/>
-              <a:t>Three primary activities</a:t>
+              <a:t>Who is the source of authority?</a:t>
+            </a:r>
+          </a:p>
+          <a:p>
+            <a:pPr lvl="1"/>
+            <a:r>
+              <a:rPr lang="en-US" dirty="0"/>
+              <a:t>Determine this ahead of time</a:t>
+            </a:r>
+          </a:p>
+          <a:p>
+            <a:r>
+              <a:rPr lang="en-US" dirty="0"/>
+              <a:t>If working in a team, you must have good teamwork</a:t>
             </a:r>
           </a:p>
           <a:p>
             <a:endParaRPr lang="en-US" dirty="0"/>
-          </a:p>
-          <a:p>
-            <a:r>
-              <a:rPr lang="en-US" dirty="0"/>
-              <a:t>Committing</a:t>
-            </a:r>
-          </a:p>
-          <a:p>
-            <a:r>
-              <a:rPr lang="en-US" dirty="0"/>
-              <a:t>Branching/Merging (aka unbranching)</a:t>
-            </a:r>
-          </a:p>
-          <a:p>
-            <a:r>
-              <a:rPr lang="en-US" dirty="0"/>
-              <a:t>Distributing (Push and Pull)</a:t>
-            </a:r>
-          </a:p>
-          <a:p>
-            <a:endParaRPr lang="en-US" dirty="0"/>
-          </a:p>
-          <a:p>
-            <a:r>
-              <a:rPr lang="en-US" dirty="0"/>
-              <a:t>Everything else serves these three functions.</a:t>
-            </a:r>
           </a:p>
         </p:txBody>
       </p:sp>
     </p:spTree>
     <p:extLst>
       <p:ext uri="{BB962C8B-B14F-4D97-AF65-F5344CB8AC3E}">
-        <p14:creationId xmlns:p14="http://schemas.microsoft.com/office/powerpoint/2010/main" val="2490705565"/>
+        <p14:creationId xmlns:p14="http://schemas.microsoft.com/office/powerpoint/2010/main" val="2189051626"/>
       </p:ext>
     </p:extLst>
   </p:cSld>
@@ -7761,7 +8831,7 @@
           <a:p>
             <a:r>
               <a:rPr lang="en-US" dirty="0"/>
-              <a:t>Commit</a:t>
+              <a:t>How Does Git Work?</a:t>
             </a:r>
           </a:p>
         </p:txBody>
@@ -7794,21 +8864,38 @@
           <a:p>
             <a:r>
               <a:rPr lang="en-US" dirty="0"/>
-              <a:t>A commit is a single snapshot in time.  </a:t>
+              <a:t>Three primary activities</a:t>
             </a:r>
           </a:p>
           <a:p>
             <a:pPr lvl="1"/>
             <a:r>
               <a:rPr lang="en-US" dirty="0"/>
-              <a:t>Places a snapshot of the files into the change history.</a:t>
+              <a:t>Committing</a:t>
             </a:r>
           </a:p>
           <a:p>
             <a:pPr lvl="1"/>
             <a:r>
               <a:rPr lang="en-US" dirty="0"/>
-              <a:t>The developer decides what is or isn’t included.</a:t>
+              <a:t>Branching/Merging (aka unbranching)</a:t>
+            </a:r>
+          </a:p>
+          <a:p>
+            <a:pPr lvl="1"/>
+            <a:r>
+              <a:rPr lang="en-US" dirty="0"/>
+              <a:t>Distributing (Push and Pull)</a:t>
+            </a:r>
+          </a:p>
+          <a:p>
+            <a:pPr lvl="1"/>
+            <a:endParaRPr lang="en-US" dirty="0"/>
+          </a:p>
+          <a:p>
+            <a:r>
+              <a:rPr lang="en-US" dirty="0"/>
+              <a:t>Everything else serves these three functions.</a:t>
             </a:r>
           </a:p>
           <a:p>
@@ -7820,7 +8907,7 @@
     </p:spTree>
     <p:extLst>
       <p:ext uri="{BB962C8B-B14F-4D97-AF65-F5344CB8AC3E}">
-        <p14:creationId xmlns:p14="http://schemas.microsoft.com/office/powerpoint/2010/main" val="2405585525"/>
+        <p14:creationId xmlns:p14="http://schemas.microsoft.com/office/powerpoint/2010/main" val="2490705565"/>
       </p:ext>
     </p:extLst>
   </p:cSld>

</xml_diff>

<commit_message>
Added some extra slides, some images, and some animations.
</commit_message>
<xml_diff>
--- a/Git and LV.pptx
+++ b/Git and LV.pptx
@@ -16,8 +16,8 @@
     <p:sldId id="261" r:id="rId7"/>
     <p:sldId id="262" r:id="rId8"/>
     <p:sldId id="272" r:id="rId9"/>
-    <p:sldId id="263" r:id="rId10"/>
-    <p:sldId id="269" r:id="rId11"/>
+    <p:sldId id="269" r:id="rId10"/>
+    <p:sldId id="263" r:id="rId11"/>
     <p:sldId id="264" r:id="rId12"/>
     <p:sldId id="265" r:id="rId13"/>
     <p:sldId id="266" r:id="rId14"/>
@@ -225,7 +225,7 @@
           <a:p>
             <a:fld id="{340551C4-E36D-4DF7-AAE7-E45DF88FF737}" type="datetimeFigureOut">
               <a:rPr lang="en-US" smtClean="0"/>
-              <a:t>10/26/2019</a:t>
+              <a:t>10/27/2019</a:t>
             </a:fld>
             <a:endParaRPr lang="en-US"/>
           </a:p>
@@ -598,6 +598,90 @@
 </p:notes>
 </file>
 
+<file path=ppt/notesSlides/notesSlide10.xml><?xml version="1.0" encoding="utf-8"?>
+<p:notes xmlns:a="http://schemas.openxmlformats.org/drawingml/2006/main" xmlns:r="http://schemas.openxmlformats.org/officeDocument/2006/relationships" xmlns:p="http://schemas.openxmlformats.org/presentationml/2006/main">
+  <p:cSld>
+    <p:spTree>
+      <p:nvGrpSpPr>
+        <p:cNvPr id="1" name=""/>
+        <p:cNvGrpSpPr/>
+        <p:nvPr/>
+      </p:nvGrpSpPr>
+      <p:grpSpPr>
+        <a:xfrm>
+          <a:off x="0" y="0"/>
+          <a:ext cx="0" cy="0"/>
+          <a:chOff x="0" y="0"/>
+          <a:chExt cx="0" cy="0"/>
+        </a:xfrm>
+      </p:grpSpPr>
+      <p:sp>
+        <p:nvSpPr>
+          <p:cNvPr id="2" name="Slide Image Placeholder 1"/>
+          <p:cNvSpPr>
+            <a:spLocks noGrp="1" noRot="1" noChangeAspect="1"/>
+          </p:cNvSpPr>
+          <p:nvPr>
+            <p:ph type="sldImg"/>
+          </p:nvPr>
+        </p:nvSpPr>
+        <p:spPr/>
+      </p:sp>
+      <p:sp>
+        <p:nvSpPr>
+          <p:cNvPr id="3" name="Notes Placeholder 2"/>
+          <p:cNvSpPr>
+            <a:spLocks noGrp="1"/>
+          </p:cNvSpPr>
+          <p:nvPr>
+            <p:ph type="body" idx="1"/>
+          </p:nvPr>
+        </p:nvSpPr>
+        <p:spPr/>
+        <p:txBody>
+          <a:bodyPr/>
+          <a:lstStyle/>
+          <a:p>
+            <a:endParaRPr lang="en-US" dirty="0"/>
+          </a:p>
+        </p:txBody>
+      </p:sp>
+      <p:sp>
+        <p:nvSpPr>
+          <p:cNvPr id="4" name="Slide Number Placeholder 3"/>
+          <p:cNvSpPr>
+            <a:spLocks noGrp="1"/>
+          </p:cNvSpPr>
+          <p:nvPr>
+            <p:ph type="sldNum" sz="quarter" idx="5"/>
+          </p:nvPr>
+        </p:nvSpPr>
+        <p:spPr/>
+        <p:txBody>
+          <a:bodyPr/>
+          <a:lstStyle/>
+          <a:p>
+            <a:fld id="{E9E1DFC9-EE16-4136-8822-8361C2EB7D32}" type="slidenum">
+              <a:rPr lang="en-US" smtClean="0"/>
+              <a:t>14</a:t>
+            </a:fld>
+            <a:endParaRPr lang="en-US"/>
+          </a:p>
+        </p:txBody>
+      </p:sp>
+    </p:spTree>
+    <p:extLst>
+      <p:ext uri="{BB962C8B-B14F-4D97-AF65-F5344CB8AC3E}">
+        <p14:creationId xmlns:p14="http://schemas.microsoft.com/office/powerpoint/2010/main" val="431731124"/>
+      </p:ext>
+    </p:extLst>
+  </p:cSld>
+  <p:clrMapOvr>
+    <a:masterClrMapping/>
+  </p:clrMapOvr>
+</p:notes>
+</file>
+
 <file path=ppt/notesSlides/notesSlide2.xml><?xml version="1.0" encoding="utf-8"?>
 <p:notes xmlns:a="http://schemas.openxmlformats.org/drawingml/2006/main" xmlns:r="http://schemas.openxmlformats.org/officeDocument/2006/relationships" xmlns:p="http://schemas.openxmlformats.org/presentationml/2006/main">
   <p:cSld>
@@ -726,10 +810,7 @@
           <a:bodyPr/>
           <a:lstStyle/>
           <a:p>
-            <a:r>
-              <a:rPr lang="en-US" dirty="0"/>
-              <a:t>Better Define Locked out.</a:t>
-            </a:r>
+            <a:endParaRPr lang="en-US" dirty="0"/>
           </a:p>
         </p:txBody>
       </p:sp>
@@ -750,7 +831,7 @@
           <a:p>
             <a:fld id="{E9E1DFC9-EE16-4136-8822-8361C2EB7D32}" type="slidenum">
               <a:rPr lang="en-US" smtClean="0"/>
-              <a:t>5</a:t>
+              <a:t>4</a:t>
             </a:fld>
             <a:endParaRPr lang="en-US"/>
           </a:p>
@@ -759,7 +840,7 @@
     </p:spTree>
     <p:extLst>
       <p:ext uri="{BB962C8B-B14F-4D97-AF65-F5344CB8AC3E}">
-        <p14:creationId xmlns:p14="http://schemas.microsoft.com/office/powerpoint/2010/main" val="420198931"/>
+        <p14:creationId xmlns:p14="http://schemas.microsoft.com/office/powerpoint/2010/main" val="473062820"/>
       </p:ext>
     </p:extLst>
   </p:cSld>
@@ -815,7 +896,7 @@
           <a:p>
             <a:r>
               <a:rPr lang="en-US" dirty="0"/>
-              <a:t>A Client requires a connection to the server to get anything done. </a:t>
+              <a:t>Better Define Locked out.</a:t>
             </a:r>
           </a:p>
         </p:txBody>
@@ -835,9 +916,9 @@
           <a:bodyPr/>
           <a:lstStyle/>
           <a:p>
-            <a:fld id="{D831DA15-0810-404C-B38C-91CCA02F8F85}" type="slidenum">
+            <a:fld id="{E9E1DFC9-EE16-4136-8822-8361C2EB7D32}" type="slidenum">
               <a:rPr lang="en-US" smtClean="0"/>
-              <a:t>6</a:t>
+              <a:t>5</a:t>
             </a:fld>
             <a:endParaRPr lang="en-US"/>
           </a:p>
@@ -846,7 +927,7 @@
     </p:spTree>
     <p:extLst>
       <p:ext uri="{BB962C8B-B14F-4D97-AF65-F5344CB8AC3E}">
-        <p14:creationId xmlns:p14="http://schemas.microsoft.com/office/powerpoint/2010/main" val="2611573630"/>
+        <p14:creationId xmlns:p14="http://schemas.microsoft.com/office/powerpoint/2010/main" val="420198931"/>
       </p:ext>
     </p:extLst>
   </p:cSld>
@@ -900,10 +981,7 @@
           <a:bodyPr/>
           <a:lstStyle/>
           <a:p>
-            <a:r>
-              <a:rPr lang="en-US" dirty="0"/>
-              <a:t>Better define work</a:t>
-            </a:r>
+            <a:endParaRPr lang="en-US" dirty="0"/>
           </a:p>
         </p:txBody>
       </p:sp>
@@ -922,9 +1000,9 @@
           <a:bodyPr/>
           <a:lstStyle/>
           <a:p>
-            <a:fld id="{E9E1DFC9-EE16-4136-8822-8361C2EB7D32}" type="slidenum">
+            <a:fld id="{D831DA15-0810-404C-B38C-91CCA02F8F85}" type="slidenum">
               <a:rPr lang="en-US" smtClean="0"/>
-              <a:t>7</a:t>
+              <a:t>6</a:t>
             </a:fld>
             <a:endParaRPr lang="en-US"/>
           </a:p>
@@ -933,7 +1011,7 @@
     </p:spTree>
     <p:extLst>
       <p:ext uri="{BB962C8B-B14F-4D97-AF65-F5344CB8AC3E}">
-        <p14:creationId xmlns:p14="http://schemas.microsoft.com/office/powerpoint/2010/main" val="1214830215"/>
+        <p14:creationId xmlns:p14="http://schemas.microsoft.com/office/powerpoint/2010/main" val="2611573630"/>
       </p:ext>
     </p:extLst>
   </p:cSld>
@@ -1011,7 +1089,7 @@
           <a:p>
             <a:fld id="{E9E1DFC9-EE16-4136-8822-8361C2EB7D32}" type="slidenum">
               <a:rPr lang="en-US" smtClean="0"/>
-              <a:t>8</a:t>
+              <a:t>7</a:t>
             </a:fld>
             <a:endParaRPr lang="en-US"/>
           </a:p>
@@ -1020,7 +1098,7 @@
     </p:spTree>
     <p:extLst>
       <p:ext uri="{BB962C8B-B14F-4D97-AF65-F5344CB8AC3E}">
-        <p14:creationId xmlns:p14="http://schemas.microsoft.com/office/powerpoint/2010/main" val="2705225124"/>
+        <p14:creationId xmlns:p14="http://schemas.microsoft.com/office/powerpoint/2010/main" val="1214830215"/>
       </p:ext>
     </p:extLst>
   </p:cSld>
@@ -1076,6 +1154,93 @@
           <a:p>
             <a:r>
               <a:rPr lang="en-US" dirty="0"/>
+              <a:t>Better define work</a:t>
+            </a:r>
+          </a:p>
+        </p:txBody>
+      </p:sp>
+      <p:sp>
+        <p:nvSpPr>
+          <p:cNvPr id="4" name="Slide Number Placeholder 3"/>
+          <p:cNvSpPr>
+            <a:spLocks noGrp="1"/>
+          </p:cNvSpPr>
+          <p:nvPr>
+            <p:ph type="sldNum" sz="quarter" idx="5"/>
+          </p:nvPr>
+        </p:nvSpPr>
+        <p:spPr/>
+        <p:txBody>
+          <a:bodyPr/>
+          <a:lstStyle/>
+          <a:p>
+            <a:fld id="{E9E1DFC9-EE16-4136-8822-8361C2EB7D32}" type="slidenum">
+              <a:rPr lang="en-US" smtClean="0"/>
+              <a:t>8</a:t>
+            </a:fld>
+            <a:endParaRPr lang="en-US"/>
+          </a:p>
+        </p:txBody>
+      </p:sp>
+    </p:spTree>
+    <p:extLst>
+      <p:ext uri="{BB962C8B-B14F-4D97-AF65-F5344CB8AC3E}">
+        <p14:creationId xmlns:p14="http://schemas.microsoft.com/office/powerpoint/2010/main" val="2705225124"/>
+      </p:ext>
+    </p:extLst>
+  </p:cSld>
+  <p:clrMapOvr>
+    <a:masterClrMapping/>
+  </p:clrMapOvr>
+</p:notes>
+</file>
+
+<file path=ppt/notesSlides/notesSlide8.xml><?xml version="1.0" encoding="utf-8"?>
+<p:notes xmlns:a="http://schemas.openxmlformats.org/drawingml/2006/main" xmlns:r="http://schemas.openxmlformats.org/officeDocument/2006/relationships" xmlns:p="http://schemas.openxmlformats.org/presentationml/2006/main">
+  <p:cSld>
+    <p:spTree>
+      <p:nvGrpSpPr>
+        <p:cNvPr id="1" name=""/>
+        <p:cNvGrpSpPr/>
+        <p:nvPr/>
+      </p:nvGrpSpPr>
+      <p:grpSpPr>
+        <a:xfrm>
+          <a:off x="0" y="0"/>
+          <a:ext cx="0" cy="0"/>
+          <a:chOff x="0" y="0"/>
+          <a:chExt cx="0" cy="0"/>
+        </a:xfrm>
+      </p:grpSpPr>
+      <p:sp>
+        <p:nvSpPr>
+          <p:cNvPr id="2" name="Slide Image Placeholder 1"/>
+          <p:cNvSpPr>
+            <a:spLocks noGrp="1" noRot="1" noChangeAspect="1"/>
+          </p:cNvSpPr>
+          <p:nvPr>
+            <p:ph type="sldImg"/>
+          </p:nvPr>
+        </p:nvSpPr>
+        <p:spPr/>
+      </p:sp>
+      <p:sp>
+        <p:nvSpPr>
+          <p:cNvPr id="3" name="Notes Placeholder 2"/>
+          <p:cNvSpPr>
+            <a:spLocks noGrp="1"/>
+          </p:cNvSpPr>
+          <p:nvPr>
+            <p:ph type="body" idx="1"/>
+          </p:nvPr>
+        </p:nvSpPr>
+        <p:spPr/>
+        <p:txBody>
+          <a:bodyPr/>
+          <a:lstStyle/>
+          <a:p>
+            <a:r>
+              <a:rPr lang="en-US" dirty="0"/>
               <a:t>Add Visual References (Atlassian Diagrams)</a:t>
             </a:r>
           </a:p>
@@ -1117,7 +1282,7 @@
 </p:notes>
 </file>
 
-<file path=ppt/notesSlides/notesSlide8.xml><?xml version="1.0" encoding="utf-8"?>
+<file path=ppt/notesSlides/notesSlide9.xml><?xml version="1.0" encoding="utf-8"?>
 <p:notes xmlns:a="http://schemas.openxmlformats.org/drawingml/2006/main" xmlns:r="http://schemas.openxmlformats.org/officeDocument/2006/relationships" xmlns:p="http://schemas.openxmlformats.org/presentationml/2006/main">
   <p:cSld>
     <p:spTree>
@@ -1923,7 +2088,7 @@
           <a:p>
             <a:fld id="{38E594E3-4743-4683-81F7-698D2FA773A6}" type="datetimeFigureOut">
               <a:rPr lang="en-US" smtClean="0"/>
-              <a:t>10/26/2019</a:t>
+              <a:t>10/27/2019</a:t>
             </a:fld>
             <a:endParaRPr lang="en-US"/>
           </a:p>
@@ -2174,7 +2339,7 @@
           <a:p>
             <a:fld id="{38E594E3-4743-4683-81F7-698D2FA773A6}" type="datetimeFigureOut">
               <a:rPr lang="en-US" smtClean="0"/>
-              <a:t>10/26/2019</a:t>
+              <a:t>10/27/2019</a:t>
             </a:fld>
             <a:endParaRPr lang="en-US"/>
           </a:p>
@@ -2488,7 +2653,7 @@
           <a:p>
             <a:fld id="{38E594E3-4743-4683-81F7-698D2FA773A6}" type="datetimeFigureOut">
               <a:rPr lang="en-US" smtClean="0"/>
-              <a:t>10/26/2019</a:t>
+              <a:t>10/27/2019</a:t>
             </a:fld>
             <a:endParaRPr lang="en-US"/>
           </a:p>
@@ -2829,7 +2994,7 @@
           <a:p>
             <a:fld id="{38E594E3-4743-4683-81F7-698D2FA773A6}" type="datetimeFigureOut">
               <a:rPr lang="en-US" smtClean="0"/>
-              <a:t>10/26/2019</a:t>
+              <a:t>10/27/2019</a:t>
             </a:fld>
             <a:endParaRPr lang="en-US"/>
           </a:p>
@@ -3143,7 +3308,7 @@
           <a:p>
             <a:fld id="{38E594E3-4743-4683-81F7-698D2FA773A6}" type="datetimeFigureOut">
               <a:rPr lang="en-US" smtClean="0"/>
-              <a:t>10/26/2019</a:t>
+              <a:t>10/27/2019</a:t>
             </a:fld>
             <a:endParaRPr lang="en-US"/>
           </a:p>
@@ -3536,7 +3701,7 @@
           <a:p>
             <a:fld id="{38E594E3-4743-4683-81F7-698D2FA773A6}" type="datetimeFigureOut">
               <a:rPr lang="en-US" smtClean="0"/>
-              <a:t>10/26/2019</a:t>
+              <a:t>10/27/2019</a:t>
             </a:fld>
             <a:endParaRPr lang="en-US"/>
           </a:p>
@@ -3706,7 +3871,7 @@
           <a:p>
             <a:fld id="{38E594E3-4743-4683-81F7-698D2FA773A6}" type="datetimeFigureOut">
               <a:rPr lang="en-US" smtClean="0"/>
-              <a:t>10/26/2019</a:t>
+              <a:t>10/27/2019</a:t>
             </a:fld>
             <a:endParaRPr lang="en-US"/>
           </a:p>
@@ -3886,7 +4051,7 @@
           <a:p>
             <a:fld id="{38E594E3-4743-4683-81F7-698D2FA773A6}" type="datetimeFigureOut">
               <a:rPr lang="en-US" smtClean="0"/>
-              <a:t>10/26/2019</a:t>
+              <a:t>10/27/2019</a:t>
             </a:fld>
             <a:endParaRPr lang="en-US"/>
           </a:p>
@@ -4062,7 +4227,7 @@
           <a:p>
             <a:fld id="{38E594E3-4743-4683-81F7-698D2FA773A6}" type="datetimeFigureOut">
               <a:rPr lang="en-US" smtClean="0"/>
-              <a:t>10/26/2019</a:t>
+              <a:t>10/27/2019</a:t>
             </a:fld>
             <a:endParaRPr lang="en-US"/>
           </a:p>
@@ -4309,7 +4474,7 @@
           <a:p>
             <a:fld id="{38E594E3-4743-4683-81F7-698D2FA773A6}" type="datetimeFigureOut">
               <a:rPr lang="en-US" smtClean="0"/>
-              <a:t>10/26/2019</a:t>
+              <a:t>10/27/2019</a:t>
             </a:fld>
             <a:endParaRPr lang="en-US"/>
           </a:p>
@@ -4541,7 +4706,7 @@
           <a:p>
             <a:fld id="{38E594E3-4743-4683-81F7-698D2FA773A6}" type="datetimeFigureOut">
               <a:rPr lang="en-US" smtClean="0"/>
-              <a:t>10/26/2019</a:t>
+              <a:t>10/27/2019</a:t>
             </a:fld>
             <a:endParaRPr lang="en-US"/>
           </a:p>
@@ -4915,7 +5080,7 @@
           <a:p>
             <a:fld id="{38E594E3-4743-4683-81F7-698D2FA773A6}" type="datetimeFigureOut">
               <a:rPr lang="en-US" smtClean="0"/>
-              <a:t>10/26/2019</a:t>
+              <a:t>10/27/2019</a:t>
             </a:fld>
             <a:endParaRPr lang="en-US"/>
           </a:p>
@@ -5038,7 +5203,7 @@
           <a:p>
             <a:fld id="{38E594E3-4743-4683-81F7-698D2FA773A6}" type="datetimeFigureOut">
               <a:rPr lang="en-US" smtClean="0"/>
-              <a:t>10/26/2019</a:t>
+              <a:t>10/27/2019</a:t>
             </a:fld>
             <a:endParaRPr lang="en-US"/>
           </a:p>
@@ -5133,7 +5298,7 @@
           <a:p>
             <a:fld id="{38E594E3-4743-4683-81F7-698D2FA773A6}" type="datetimeFigureOut">
               <a:rPr lang="en-US" smtClean="0"/>
-              <a:t>10/26/2019</a:t>
+              <a:t>10/27/2019</a:t>
             </a:fld>
             <a:endParaRPr lang="en-US"/>
           </a:p>
@@ -5388,7 +5553,7 @@
           <a:p>
             <a:fld id="{38E594E3-4743-4683-81F7-698D2FA773A6}" type="datetimeFigureOut">
               <a:rPr lang="en-US" smtClean="0"/>
-              <a:t>10/26/2019</a:t>
+              <a:t>10/27/2019</a:t>
             </a:fld>
             <a:endParaRPr lang="en-US"/>
           </a:p>
@@ -5651,7 +5816,7 @@
           <a:p>
             <a:fld id="{38E594E3-4743-4683-81F7-698D2FA773A6}" type="datetimeFigureOut">
               <a:rPr lang="en-US" smtClean="0"/>
-              <a:t>10/26/2019</a:t>
+              <a:t>10/27/2019</a:t>
             </a:fld>
             <a:endParaRPr lang="en-US"/>
           </a:p>
@@ -6394,7 +6559,7 @@
           <a:p>
             <a:fld id="{38E594E3-4743-4683-81F7-698D2FA773A6}" type="datetimeFigureOut">
               <a:rPr lang="en-US" smtClean="0"/>
-              <a:t>10/26/2019</a:t>
+              <a:t>10/27/2019</a:t>
             </a:fld>
             <a:endParaRPr lang="en-US"/>
           </a:p>
@@ -6984,6 +7149,18 @@
   <p:clrMapOvr>
     <a:masterClrMapping/>
   </p:clrMapOvr>
+  <mc:AlternateContent xmlns:mc="http://schemas.openxmlformats.org/markup-compatibility/2006">
+    <mc:Choice xmlns:p159="http://schemas.microsoft.com/office/powerpoint/2015/09/main" Requires="p159">
+      <p:transition xmlns:p14="http://schemas.microsoft.com/office/powerpoint/2010/main" spd="slow" p14:dur="2000">
+        <p159:morph option="byObject"/>
+      </p:transition>
+    </mc:Choice>
+    <mc:Fallback>
+      <p:transition spd="slow">
+        <p:fade/>
+      </p:transition>
+    </mc:Fallback>
+  </mc:AlternateContent>
 </p:sld>
 </file>
 
@@ -7009,7 +7186,7 @@
           <p:cNvPr id="2" name="Title 1">
             <a:extLst>
               <a:ext uri="{FF2B5EF4-FFF2-40B4-BE49-F238E27FC236}">
-                <a16:creationId xmlns:a16="http://schemas.microsoft.com/office/drawing/2014/main" id="{BD61DC07-2119-4D76-8D85-02068B8AE439}"/>
+                <a16:creationId xmlns:a16="http://schemas.microsoft.com/office/drawing/2014/main" id="{7EE1DCE8-D311-4D99-A81C-BE65135FC7B1}"/>
               </a:ext>
             </a:extLst>
           </p:cNvPr>
@@ -7020,14 +7197,19 @@
             <p:ph type="title"/>
           </p:nvPr>
         </p:nvSpPr>
-        <p:spPr/>
+        <p:spPr>
+          <a:xfrm>
+            <a:off x="677334" y="609600"/>
+            <a:ext cx="8596668" cy="732639"/>
+          </a:xfrm>
+        </p:spPr>
         <p:txBody>
           <a:bodyPr/>
           <a:lstStyle/>
           <a:p>
             <a:r>
               <a:rPr lang="en-US" dirty="0"/>
-              <a:t>Repositories</a:t>
+              <a:t>How Does Git Work?</a:t>
             </a:r>
           </a:p>
         </p:txBody>
@@ -7037,7 +7219,7 @@
           <p:cNvPr id="3" name="Content Placeholder 2">
             <a:extLst>
               <a:ext uri="{FF2B5EF4-FFF2-40B4-BE49-F238E27FC236}">
-                <a16:creationId xmlns:a16="http://schemas.microsoft.com/office/drawing/2014/main" id="{296796AB-AD6F-4E4A-A8FD-D16B19175E75}"/>
+                <a16:creationId xmlns:a16="http://schemas.microsoft.com/office/drawing/2014/main" id="{9374DAC6-B719-4917-BD3A-9F035608224A}"/>
               </a:ext>
             </a:extLst>
           </p:cNvPr>
@@ -7048,46 +7230,364 @@
             <p:ph idx="1"/>
           </p:nvPr>
         </p:nvSpPr>
-        <p:spPr/>
+        <p:spPr>
+          <a:xfrm>
+            <a:off x="677334" y="1342239"/>
+            <a:ext cx="8596668" cy="4699123"/>
+          </a:xfrm>
+        </p:spPr>
         <p:txBody>
           <a:bodyPr/>
           <a:lstStyle/>
           <a:p>
+            <a:endParaRPr lang="en-US" dirty="0"/>
+          </a:p>
+          <a:p>
+            <a:endParaRPr lang="en-US" dirty="0"/>
+          </a:p>
+          <a:p>
             <a:r>
               <a:rPr lang="en-US" dirty="0"/>
-              <a:t>Store the files you want to track</a:t>
-            </a:r>
-          </a:p>
-          <a:p>
+              <a:t>Three primary activities</a:t>
+            </a:r>
+          </a:p>
+          <a:p>
+            <a:pPr lvl="1"/>
+            <a:r>
+              <a:rPr lang="en-US" dirty="0"/>
+              <a:t>Committing (making a new snapshot in time)</a:t>
+            </a:r>
+          </a:p>
+          <a:p>
+            <a:pPr lvl="1"/>
+            <a:r>
+              <a:rPr lang="en-US" dirty="0"/>
+              <a:t>Branching/Merging (aka unbranching)</a:t>
+            </a:r>
+          </a:p>
+          <a:p>
+            <a:pPr lvl="1"/>
+            <a:r>
+              <a:rPr lang="en-US" dirty="0"/>
+              <a:t>Distributing (Push and Pull)</a:t>
+            </a:r>
+          </a:p>
+          <a:p>
+            <a:pPr lvl="1"/>
             <a:endParaRPr lang="en-US" dirty="0"/>
           </a:p>
           <a:p>
             <a:r>
               <a:rPr lang="en-US" dirty="0"/>
-              <a:t>Are a single folder</a:t>
-            </a:r>
-          </a:p>
-          <a:p>
+              <a:t>Everything else serves these three functions.</a:t>
+            </a:r>
+          </a:p>
+          <a:p>
+            <a:pPr lvl="1"/>
             <a:endParaRPr lang="en-US" dirty="0"/>
-          </a:p>
-          <a:p>
-            <a:r>
-              <a:rPr lang="en-US" dirty="0"/>
-              <a:t>Also contain all the git meta-data. </a:t>
-            </a:r>
           </a:p>
         </p:txBody>
       </p:sp>
     </p:spTree>
     <p:extLst>
       <p:ext uri="{BB962C8B-B14F-4D97-AF65-F5344CB8AC3E}">
-        <p14:creationId xmlns:p14="http://schemas.microsoft.com/office/powerpoint/2010/main" val="2589151126"/>
+        <p14:creationId xmlns:p14="http://schemas.microsoft.com/office/powerpoint/2010/main" val="2490705565"/>
       </p:ext>
     </p:extLst>
   </p:cSld>
   <p:clrMapOvr>
     <a:masterClrMapping/>
   </p:clrMapOvr>
+  <mc:AlternateContent xmlns:mc="http://schemas.openxmlformats.org/markup-compatibility/2006">
+    <mc:Choice xmlns:p159="http://schemas.microsoft.com/office/powerpoint/2015/09/main" Requires="p159">
+      <p:transition xmlns:p14="http://schemas.microsoft.com/office/powerpoint/2010/main" spd="slow" p14:dur="2000">
+        <p159:morph option="byObject"/>
+      </p:transition>
+    </mc:Choice>
+    <mc:Fallback>
+      <p:transition spd="slow">
+        <p:fade/>
+      </p:transition>
+    </mc:Fallback>
+  </mc:AlternateContent>
+  <p:timing>
+    <p:tnLst>
+      <p:par>
+        <p:cTn id="1" dur="indefinite" restart="never" nodeType="tmRoot">
+          <p:childTnLst>
+            <p:seq concurrent="1" nextAc="seek">
+              <p:cTn id="2" dur="indefinite" nodeType="mainSeq">
+                <p:childTnLst>
+                  <p:par>
+                    <p:cTn id="3" fill="hold">
+                      <p:stCondLst>
+                        <p:cond delay="indefinite"/>
+                      </p:stCondLst>
+                      <p:childTnLst>
+                        <p:par>
+                          <p:cTn id="4" fill="hold">
+                            <p:stCondLst>
+                              <p:cond delay="0"/>
+                            </p:stCondLst>
+                            <p:childTnLst>
+                              <p:par>
+                                <p:cTn id="5" presetID="1" presetClass="entr" presetSubtype="0" fill="hold" grpId="0" nodeType="clickEffect">
+                                  <p:stCondLst>
+                                    <p:cond delay="0"/>
+                                  </p:stCondLst>
+                                  <p:childTnLst>
+                                    <p:set>
+                                      <p:cBhvr>
+                                        <p:cTn id="6" dur="1" fill="hold">
+                                          <p:stCondLst>
+                                            <p:cond delay="0"/>
+                                          </p:stCondLst>
+                                        </p:cTn>
+                                        <p:tgtEl>
+                                          <p:spTgt spid="3">
+                                            <p:txEl>
+                                              <p:pRg st="2" end="2"/>
+                                            </p:txEl>
+                                          </p:spTgt>
+                                        </p:tgtEl>
+                                        <p:attrNameLst>
+                                          <p:attrName>style.visibility</p:attrName>
+                                        </p:attrNameLst>
+                                      </p:cBhvr>
+                                      <p:to>
+                                        <p:strVal val="visible"/>
+                                      </p:to>
+                                    </p:set>
+                                  </p:childTnLst>
+                                </p:cTn>
+                              </p:par>
+                            </p:childTnLst>
+                          </p:cTn>
+                        </p:par>
+                      </p:childTnLst>
+                    </p:cTn>
+                  </p:par>
+                  <p:par>
+                    <p:cTn id="7" fill="hold">
+                      <p:stCondLst>
+                        <p:cond delay="indefinite"/>
+                      </p:stCondLst>
+                      <p:childTnLst>
+                        <p:par>
+                          <p:cTn id="8" fill="hold">
+                            <p:stCondLst>
+                              <p:cond delay="0"/>
+                            </p:stCondLst>
+                            <p:childTnLst>
+                              <p:par>
+                                <p:cTn id="9" presetID="1" presetClass="entr" presetSubtype="0" fill="hold" grpId="0" nodeType="clickEffect">
+                                  <p:stCondLst>
+                                    <p:cond delay="0"/>
+                                  </p:stCondLst>
+                                  <p:childTnLst>
+                                    <p:set>
+                                      <p:cBhvr>
+                                        <p:cTn id="10" dur="1" fill="hold">
+                                          <p:stCondLst>
+                                            <p:cond delay="0"/>
+                                          </p:stCondLst>
+                                        </p:cTn>
+                                        <p:tgtEl>
+                                          <p:spTgt spid="3">
+                                            <p:txEl>
+                                              <p:pRg st="3" end="3"/>
+                                            </p:txEl>
+                                          </p:spTgt>
+                                        </p:tgtEl>
+                                        <p:attrNameLst>
+                                          <p:attrName>style.visibility</p:attrName>
+                                        </p:attrNameLst>
+                                      </p:cBhvr>
+                                      <p:to>
+                                        <p:strVal val="visible"/>
+                                      </p:to>
+                                    </p:set>
+                                  </p:childTnLst>
+                                </p:cTn>
+                              </p:par>
+                            </p:childTnLst>
+                          </p:cTn>
+                        </p:par>
+                      </p:childTnLst>
+                    </p:cTn>
+                  </p:par>
+                  <p:par>
+                    <p:cTn id="11" fill="hold">
+                      <p:stCondLst>
+                        <p:cond delay="indefinite"/>
+                      </p:stCondLst>
+                      <p:childTnLst>
+                        <p:par>
+                          <p:cTn id="12" fill="hold">
+                            <p:stCondLst>
+                              <p:cond delay="0"/>
+                            </p:stCondLst>
+                            <p:childTnLst>
+                              <p:par>
+                                <p:cTn id="13" presetID="1" presetClass="entr" presetSubtype="0" fill="hold" grpId="0" nodeType="clickEffect">
+                                  <p:stCondLst>
+                                    <p:cond delay="0"/>
+                                  </p:stCondLst>
+                                  <p:childTnLst>
+                                    <p:set>
+                                      <p:cBhvr>
+                                        <p:cTn id="14" dur="1" fill="hold">
+                                          <p:stCondLst>
+                                            <p:cond delay="0"/>
+                                          </p:stCondLst>
+                                        </p:cTn>
+                                        <p:tgtEl>
+                                          <p:spTgt spid="3">
+                                            <p:txEl>
+                                              <p:pRg st="4" end="4"/>
+                                            </p:txEl>
+                                          </p:spTgt>
+                                        </p:tgtEl>
+                                        <p:attrNameLst>
+                                          <p:attrName>style.visibility</p:attrName>
+                                        </p:attrNameLst>
+                                      </p:cBhvr>
+                                      <p:to>
+                                        <p:strVal val="visible"/>
+                                      </p:to>
+                                    </p:set>
+                                  </p:childTnLst>
+                                </p:cTn>
+                              </p:par>
+                            </p:childTnLst>
+                          </p:cTn>
+                        </p:par>
+                      </p:childTnLst>
+                    </p:cTn>
+                  </p:par>
+                  <p:par>
+                    <p:cTn id="15" fill="hold">
+                      <p:stCondLst>
+                        <p:cond delay="indefinite"/>
+                      </p:stCondLst>
+                      <p:childTnLst>
+                        <p:par>
+                          <p:cTn id="16" fill="hold">
+                            <p:stCondLst>
+                              <p:cond delay="0"/>
+                            </p:stCondLst>
+                            <p:childTnLst>
+                              <p:par>
+                                <p:cTn id="17" presetID="1" presetClass="entr" presetSubtype="0" fill="hold" grpId="0" nodeType="clickEffect">
+                                  <p:stCondLst>
+                                    <p:cond delay="0"/>
+                                  </p:stCondLst>
+                                  <p:childTnLst>
+                                    <p:set>
+                                      <p:cBhvr>
+                                        <p:cTn id="18" dur="1" fill="hold">
+                                          <p:stCondLst>
+                                            <p:cond delay="0"/>
+                                          </p:stCondLst>
+                                        </p:cTn>
+                                        <p:tgtEl>
+                                          <p:spTgt spid="3">
+                                            <p:txEl>
+                                              <p:pRg st="5" end="5"/>
+                                            </p:txEl>
+                                          </p:spTgt>
+                                        </p:tgtEl>
+                                        <p:attrNameLst>
+                                          <p:attrName>style.visibility</p:attrName>
+                                        </p:attrNameLst>
+                                      </p:cBhvr>
+                                      <p:to>
+                                        <p:strVal val="visible"/>
+                                      </p:to>
+                                    </p:set>
+                                  </p:childTnLst>
+                                </p:cTn>
+                              </p:par>
+                            </p:childTnLst>
+                          </p:cTn>
+                        </p:par>
+                      </p:childTnLst>
+                    </p:cTn>
+                  </p:par>
+                  <p:par>
+                    <p:cTn id="19" fill="hold">
+                      <p:stCondLst>
+                        <p:cond delay="indefinite"/>
+                      </p:stCondLst>
+                      <p:childTnLst>
+                        <p:par>
+                          <p:cTn id="20" fill="hold">
+                            <p:stCondLst>
+                              <p:cond delay="0"/>
+                            </p:stCondLst>
+                            <p:childTnLst>
+                              <p:par>
+                                <p:cTn id="21" presetID="1" presetClass="entr" presetSubtype="0" fill="hold" grpId="0" nodeType="clickEffect">
+                                  <p:stCondLst>
+                                    <p:cond delay="0"/>
+                                  </p:stCondLst>
+                                  <p:childTnLst>
+                                    <p:set>
+                                      <p:cBhvr>
+                                        <p:cTn id="22" dur="1" fill="hold">
+                                          <p:stCondLst>
+                                            <p:cond delay="0"/>
+                                          </p:stCondLst>
+                                        </p:cTn>
+                                        <p:tgtEl>
+                                          <p:spTgt spid="3">
+                                            <p:txEl>
+                                              <p:pRg st="7" end="7"/>
+                                            </p:txEl>
+                                          </p:spTgt>
+                                        </p:tgtEl>
+                                        <p:attrNameLst>
+                                          <p:attrName>style.visibility</p:attrName>
+                                        </p:attrNameLst>
+                                      </p:cBhvr>
+                                      <p:to>
+                                        <p:strVal val="visible"/>
+                                      </p:to>
+                                    </p:set>
+                                  </p:childTnLst>
+                                </p:cTn>
+                              </p:par>
+                            </p:childTnLst>
+                          </p:cTn>
+                        </p:par>
+                      </p:childTnLst>
+                    </p:cTn>
+                  </p:par>
+                </p:childTnLst>
+              </p:cTn>
+              <p:prevCondLst>
+                <p:cond evt="onPrev" delay="0">
+                  <p:tgtEl>
+                    <p:sldTgt/>
+                  </p:tgtEl>
+                </p:cond>
+              </p:prevCondLst>
+              <p:nextCondLst>
+                <p:cond evt="onNext" delay="0">
+                  <p:tgtEl>
+                    <p:sldTgt/>
+                  </p:tgtEl>
+                </p:cond>
+              </p:nextCondLst>
+            </p:seq>
+          </p:childTnLst>
+        </p:cTn>
+      </p:par>
+    </p:tnLst>
+    <p:bldLst>
+      <p:bldP spid="3" grpId="0" uiExpand="1" build="p"/>
+    </p:bldLst>
+  </p:timing>
 </p:sld>
 </file>
 
@@ -7192,6 +7692,36 @@
           </a:p>
         </p:txBody>
       </p:sp>
+      <p:pic>
+        <p:nvPicPr>
+          <p:cNvPr id="5" name="Picture 4">
+            <a:extLst>
+              <a:ext uri="{FF2B5EF4-FFF2-40B4-BE49-F238E27FC236}">
+                <a16:creationId xmlns:a16="http://schemas.microsoft.com/office/drawing/2014/main" id="{71C06F67-906F-4439-9EBB-962EC6E52959}"/>
+              </a:ext>
+            </a:extLst>
+          </p:cNvPr>
+          <p:cNvPicPr>
+            <a:picLocks noChangeAspect="1"/>
+          </p:cNvPicPr>
+          <p:nvPr/>
+        </p:nvPicPr>
+        <p:blipFill>
+          <a:blip r:embed="rId2"/>
+          <a:stretch>
+            <a:fillRect/>
+          </a:stretch>
+        </p:blipFill>
+        <p:spPr>
+          <a:xfrm>
+            <a:off x="3824942" y="3691800"/>
+            <a:ext cx="5449060" cy="1829055"/>
+          </a:xfrm>
+          <a:prstGeom prst="rect">
+            <a:avLst/>
+          </a:prstGeom>
+        </p:spPr>
+      </p:pic>
     </p:spTree>
     <p:extLst>
       <p:ext uri="{BB962C8B-B14F-4D97-AF65-F5344CB8AC3E}">
@@ -7202,6 +7732,18 @@
   <p:clrMapOvr>
     <a:masterClrMapping/>
   </p:clrMapOvr>
+  <mc:AlternateContent xmlns:mc="http://schemas.openxmlformats.org/markup-compatibility/2006">
+    <mc:Choice xmlns:p159="http://schemas.microsoft.com/office/powerpoint/2015/09/main" Requires="p159">
+      <p:transition xmlns:p14="http://schemas.microsoft.com/office/powerpoint/2010/main" spd="slow" p14:dur="2000">
+        <p159:morph option="byObject"/>
+      </p:transition>
+    </mc:Choice>
+    <mc:Fallback>
+      <p:transition spd="slow">
+        <p:fade/>
+      </p:transition>
+    </mc:Fallback>
+  </mc:AlternateContent>
 </p:sld>
 </file>
 
@@ -7350,6 +7892,18 @@
   <p:clrMapOvr>
     <a:masterClrMapping/>
   </p:clrMapOvr>
+  <mc:AlternateContent xmlns:mc="http://schemas.openxmlformats.org/markup-compatibility/2006">
+    <mc:Choice xmlns:p159="http://schemas.microsoft.com/office/powerpoint/2015/09/main" Requires="p159">
+      <p:transition xmlns:p14="http://schemas.microsoft.com/office/powerpoint/2010/main" spd="slow" p14:dur="2000">
+        <p159:morph option="byObject"/>
+      </p:transition>
+    </mc:Choice>
+    <mc:Fallback>
+      <p:transition spd="slow">
+        <p:fade/>
+      </p:transition>
+    </mc:Fallback>
+  </mc:AlternateContent>
 </p:sld>
 </file>
 
@@ -7463,6 +8017,18 @@
   <p:clrMapOvr>
     <a:masterClrMapping/>
   </p:clrMapOvr>
+  <mc:AlternateContent xmlns:mc="http://schemas.openxmlformats.org/markup-compatibility/2006">
+    <mc:Choice xmlns:p159="http://schemas.microsoft.com/office/powerpoint/2015/09/main" Requires="p159">
+      <p:transition xmlns:p14="http://schemas.microsoft.com/office/powerpoint/2010/main" spd="slow" p14:dur="2000">
+        <p159:morph option="byObject"/>
+      </p:transition>
+    </mc:Choice>
+    <mc:Fallback>
+      <p:transition spd="slow">
+        <p:fade/>
+      </p:transition>
+    </mc:Fallback>
+  </mc:AlternateContent>
 </p:sld>
 </file>
 
@@ -7546,6 +8112,18 @@
   <p:clrMapOvr>
     <a:masterClrMapping/>
   </p:clrMapOvr>
+  <mc:AlternateContent xmlns:mc="http://schemas.openxmlformats.org/markup-compatibility/2006">
+    <mc:Choice xmlns:p159="http://schemas.microsoft.com/office/powerpoint/2015/09/main" Requires="p159">
+      <p:transition xmlns:p14="http://schemas.microsoft.com/office/powerpoint/2010/main" spd="slow" p14:dur="2000">
+        <p159:morph option="byObject"/>
+      </p:transition>
+    </mc:Choice>
+    <mc:Fallback>
+      <p:transition spd="slow">
+        <p:fade/>
+      </p:transition>
+    </mc:Fallback>
+  </mc:AlternateContent>
 </p:sld>
 </file>
 
@@ -7629,6 +8207,18 @@
   <p:clrMapOvr>
     <a:masterClrMapping/>
   </p:clrMapOvr>
+  <mc:AlternateContent xmlns:mc="http://schemas.openxmlformats.org/markup-compatibility/2006">
+    <mc:Choice xmlns:p159="http://schemas.microsoft.com/office/powerpoint/2015/09/main" Requires="p159">
+      <p:transition xmlns:p14="http://schemas.microsoft.com/office/powerpoint/2010/main" spd="slow" p14:dur="2000">
+        <p159:morph option="byObject"/>
+      </p:transition>
+    </mc:Choice>
+    <mc:Fallback>
+      <p:transition spd="slow">
+        <p:fade/>
+      </p:transition>
+    </mc:Fallback>
+  </mc:AlternateContent>
 </p:sld>
 </file>
 
@@ -7712,6 +8302,18 @@
   <p:clrMapOvr>
     <a:masterClrMapping/>
   </p:clrMapOvr>
+  <mc:AlternateContent xmlns:mc="http://schemas.openxmlformats.org/markup-compatibility/2006">
+    <mc:Choice xmlns:p159="http://schemas.microsoft.com/office/powerpoint/2015/09/main" Requires="p159">
+      <p:transition xmlns:p14="http://schemas.microsoft.com/office/powerpoint/2010/main" spd="slow" p14:dur="2000">
+        <p159:morph option="byObject"/>
+      </p:transition>
+    </mc:Choice>
+    <mc:Fallback>
+      <p:transition spd="slow">
+        <p:fade/>
+      </p:transition>
+    </mc:Fallback>
+  </mc:AlternateContent>
 </p:sld>
 </file>
 
@@ -7846,6 +8448,18 @@
   <p:clrMapOvr>
     <a:masterClrMapping/>
   </p:clrMapOvr>
+  <mc:AlternateContent xmlns:mc="http://schemas.openxmlformats.org/markup-compatibility/2006">
+    <mc:Choice xmlns:p159="http://schemas.microsoft.com/office/powerpoint/2015/09/main" Requires="p159">
+      <p:transition xmlns:p14="http://schemas.microsoft.com/office/powerpoint/2010/main" spd="slow" p14:dur="2000">
+        <p159:morph option="byObject"/>
+      </p:transition>
+    </mc:Choice>
+    <mc:Fallback>
+      <p:transition spd="slow">
+        <p:fade/>
+      </p:transition>
+    </mc:Fallback>
+  </mc:AlternateContent>
 </p:sld>
 </file>
 
@@ -7924,7 +8538,14 @@
             <a:pPr lvl="1"/>
             <a:r>
               <a:rPr lang="en-US" dirty="0"/>
-              <a:t>Find and describe the intersection of LabVIEW, which we all know, and Git, a modern and very popular revision control tool. </a:t>
+              <a:t>Find and describe the intersection of LabVIEW and Git. </a:t>
+            </a:r>
+          </a:p>
+          <a:p>
+            <a:pPr lvl="1"/>
+            <a:r>
+              <a:rPr lang="en-US" dirty="0"/>
+              <a:t>Present a guide to the tools available for using Git with LabVIEW. </a:t>
             </a:r>
           </a:p>
           <a:p>
@@ -7986,6 +8607,384 @@
   <p:clrMapOvr>
     <a:masterClrMapping/>
   </p:clrMapOvr>
+  <mc:AlternateContent xmlns:mc="http://schemas.openxmlformats.org/markup-compatibility/2006">
+    <mc:Choice xmlns:p159="http://schemas.microsoft.com/office/powerpoint/2015/09/main" Requires="p159">
+      <p:transition xmlns:p14="http://schemas.microsoft.com/office/powerpoint/2010/main" spd="slow" p14:dur="2000">
+        <p159:morph option="byObject"/>
+      </p:transition>
+    </mc:Choice>
+    <mc:Fallback>
+      <p:transition spd="slow">
+        <p:fade/>
+      </p:transition>
+    </mc:Fallback>
+  </mc:AlternateContent>
+  <p:timing>
+    <p:tnLst>
+      <p:par>
+        <p:cTn id="1" dur="indefinite" restart="never" nodeType="tmRoot">
+          <p:childTnLst>
+            <p:seq concurrent="1" nextAc="seek">
+              <p:cTn id="2" dur="indefinite" nodeType="mainSeq">
+                <p:childTnLst>
+                  <p:par>
+                    <p:cTn id="3" fill="hold">
+                      <p:stCondLst>
+                        <p:cond delay="indefinite"/>
+                      </p:stCondLst>
+                      <p:childTnLst>
+                        <p:par>
+                          <p:cTn id="4" fill="hold">
+                            <p:stCondLst>
+                              <p:cond delay="0"/>
+                            </p:stCondLst>
+                            <p:childTnLst>
+                              <p:par>
+                                <p:cTn id="5" presetID="1" presetClass="entr" presetSubtype="0" fill="hold" grpId="0" nodeType="clickEffect">
+                                  <p:stCondLst>
+                                    <p:cond delay="0"/>
+                                  </p:stCondLst>
+                                  <p:childTnLst>
+                                    <p:set>
+                                      <p:cBhvr>
+                                        <p:cTn id="6" dur="1" fill="hold">
+                                          <p:stCondLst>
+                                            <p:cond delay="0"/>
+                                          </p:stCondLst>
+                                        </p:cTn>
+                                        <p:tgtEl>
+                                          <p:spTgt spid="3">
+                                            <p:txEl>
+                                              <p:pRg st="0" end="0"/>
+                                            </p:txEl>
+                                          </p:spTgt>
+                                        </p:tgtEl>
+                                        <p:attrNameLst>
+                                          <p:attrName>style.visibility</p:attrName>
+                                        </p:attrNameLst>
+                                      </p:cBhvr>
+                                      <p:to>
+                                        <p:strVal val="visible"/>
+                                      </p:to>
+                                    </p:set>
+                                  </p:childTnLst>
+                                </p:cTn>
+                              </p:par>
+                              <p:par>
+                                <p:cTn id="7" presetID="1" presetClass="entr" presetSubtype="0" fill="hold" grpId="0" nodeType="withEffect">
+                                  <p:stCondLst>
+                                    <p:cond delay="0"/>
+                                  </p:stCondLst>
+                                  <p:childTnLst>
+                                    <p:set>
+                                      <p:cBhvr>
+                                        <p:cTn id="8" dur="1" fill="hold">
+                                          <p:stCondLst>
+                                            <p:cond delay="0"/>
+                                          </p:stCondLst>
+                                        </p:cTn>
+                                        <p:tgtEl>
+                                          <p:spTgt spid="3">
+                                            <p:txEl>
+                                              <p:pRg st="1" end="1"/>
+                                            </p:txEl>
+                                          </p:spTgt>
+                                        </p:tgtEl>
+                                        <p:attrNameLst>
+                                          <p:attrName>style.visibility</p:attrName>
+                                        </p:attrNameLst>
+                                      </p:cBhvr>
+                                      <p:to>
+                                        <p:strVal val="visible"/>
+                                      </p:to>
+                                    </p:set>
+                                  </p:childTnLst>
+                                </p:cTn>
+                              </p:par>
+                              <p:par>
+                                <p:cTn id="9" presetID="1" presetClass="entr" presetSubtype="0" fill="hold" grpId="0" nodeType="withEffect">
+                                  <p:stCondLst>
+                                    <p:cond delay="0"/>
+                                  </p:stCondLst>
+                                  <p:childTnLst>
+                                    <p:set>
+                                      <p:cBhvr>
+                                        <p:cTn id="10" dur="1" fill="hold">
+                                          <p:stCondLst>
+                                            <p:cond delay="0"/>
+                                          </p:stCondLst>
+                                        </p:cTn>
+                                        <p:tgtEl>
+                                          <p:spTgt spid="3">
+                                            <p:txEl>
+                                              <p:pRg st="2" end="2"/>
+                                            </p:txEl>
+                                          </p:spTgt>
+                                        </p:tgtEl>
+                                        <p:attrNameLst>
+                                          <p:attrName>style.visibility</p:attrName>
+                                        </p:attrNameLst>
+                                      </p:cBhvr>
+                                      <p:to>
+                                        <p:strVal val="visible"/>
+                                      </p:to>
+                                    </p:set>
+                                  </p:childTnLst>
+                                </p:cTn>
+                              </p:par>
+                            </p:childTnLst>
+                          </p:cTn>
+                        </p:par>
+                      </p:childTnLst>
+                    </p:cTn>
+                  </p:par>
+                  <p:par>
+                    <p:cTn id="11" fill="hold">
+                      <p:stCondLst>
+                        <p:cond delay="indefinite"/>
+                      </p:stCondLst>
+                      <p:childTnLst>
+                        <p:par>
+                          <p:cTn id="12" fill="hold">
+                            <p:stCondLst>
+                              <p:cond delay="0"/>
+                            </p:stCondLst>
+                            <p:childTnLst>
+                              <p:par>
+                                <p:cTn id="13" presetID="1" presetClass="entr" presetSubtype="0" fill="hold" grpId="0" nodeType="clickEffect">
+                                  <p:stCondLst>
+                                    <p:cond delay="0"/>
+                                  </p:stCondLst>
+                                  <p:childTnLst>
+                                    <p:set>
+                                      <p:cBhvr>
+                                        <p:cTn id="14" dur="1" fill="hold">
+                                          <p:stCondLst>
+                                            <p:cond delay="0"/>
+                                          </p:stCondLst>
+                                        </p:cTn>
+                                        <p:tgtEl>
+                                          <p:spTgt spid="3">
+                                            <p:txEl>
+                                              <p:pRg st="3" end="3"/>
+                                            </p:txEl>
+                                          </p:spTgt>
+                                        </p:tgtEl>
+                                        <p:attrNameLst>
+                                          <p:attrName>style.visibility</p:attrName>
+                                        </p:attrNameLst>
+                                      </p:cBhvr>
+                                      <p:to>
+                                        <p:strVal val="visible"/>
+                                      </p:to>
+                                    </p:set>
+                                  </p:childTnLst>
+                                </p:cTn>
+                              </p:par>
+                              <p:par>
+                                <p:cTn id="15" presetID="1" presetClass="entr" presetSubtype="0" fill="hold" grpId="0" nodeType="withEffect">
+                                  <p:stCondLst>
+                                    <p:cond delay="0"/>
+                                  </p:stCondLst>
+                                  <p:childTnLst>
+                                    <p:set>
+                                      <p:cBhvr>
+                                        <p:cTn id="16" dur="1" fill="hold">
+                                          <p:stCondLst>
+                                            <p:cond delay="0"/>
+                                          </p:stCondLst>
+                                        </p:cTn>
+                                        <p:tgtEl>
+                                          <p:spTgt spid="3">
+                                            <p:txEl>
+                                              <p:pRg st="4" end="4"/>
+                                            </p:txEl>
+                                          </p:spTgt>
+                                        </p:tgtEl>
+                                        <p:attrNameLst>
+                                          <p:attrName>style.visibility</p:attrName>
+                                        </p:attrNameLst>
+                                      </p:cBhvr>
+                                      <p:to>
+                                        <p:strVal val="visible"/>
+                                      </p:to>
+                                    </p:set>
+                                  </p:childTnLst>
+                                </p:cTn>
+                              </p:par>
+                            </p:childTnLst>
+                          </p:cTn>
+                        </p:par>
+                      </p:childTnLst>
+                    </p:cTn>
+                  </p:par>
+                  <p:par>
+                    <p:cTn id="17" fill="hold">
+                      <p:stCondLst>
+                        <p:cond delay="indefinite"/>
+                      </p:stCondLst>
+                      <p:childTnLst>
+                        <p:par>
+                          <p:cTn id="18" fill="hold">
+                            <p:stCondLst>
+                              <p:cond delay="0"/>
+                            </p:stCondLst>
+                            <p:childTnLst>
+                              <p:par>
+                                <p:cTn id="19" presetID="1" presetClass="entr" presetSubtype="0" fill="hold" grpId="0" nodeType="clickEffect">
+                                  <p:stCondLst>
+                                    <p:cond delay="0"/>
+                                  </p:stCondLst>
+                                  <p:childTnLst>
+                                    <p:set>
+                                      <p:cBhvr>
+                                        <p:cTn id="20" dur="1" fill="hold">
+                                          <p:stCondLst>
+                                            <p:cond delay="0"/>
+                                          </p:stCondLst>
+                                        </p:cTn>
+                                        <p:tgtEl>
+                                          <p:spTgt spid="3">
+                                            <p:txEl>
+                                              <p:pRg st="5" end="5"/>
+                                            </p:txEl>
+                                          </p:spTgt>
+                                        </p:tgtEl>
+                                        <p:attrNameLst>
+                                          <p:attrName>style.visibility</p:attrName>
+                                        </p:attrNameLst>
+                                      </p:cBhvr>
+                                      <p:to>
+                                        <p:strVal val="visible"/>
+                                      </p:to>
+                                    </p:set>
+                                  </p:childTnLst>
+                                </p:cTn>
+                              </p:par>
+                              <p:par>
+                                <p:cTn id="21" presetID="1" presetClass="entr" presetSubtype="0" fill="hold" grpId="0" nodeType="withEffect">
+                                  <p:stCondLst>
+                                    <p:cond delay="0"/>
+                                  </p:stCondLst>
+                                  <p:childTnLst>
+                                    <p:set>
+                                      <p:cBhvr>
+                                        <p:cTn id="22" dur="1" fill="hold">
+                                          <p:stCondLst>
+                                            <p:cond delay="0"/>
+                                          </p:stCondLst>
+                                        </p:cTn>
+                                        <p:tgtEl>
+                                          <p:spTgt spid="3">
+                                            <p:txEl>
+                                              <p:pRg st="6" end="6"/>
+                                            </p:txEl>
+                                          </p:spTgt>
+                                        </p:tgtEl>
+                                        <p:attrNameLst>
+                                          <p:attrName>style.visibility</p:attrName>
+                                        </p:attrNameLst>
+                                      </p:cBhvr>
+                                      <p:to>
+                                        <p:strVal val="visible"/>
+                                      </p:to>
+                                    </p:set>
+                                  </p:childTnLst>
+                                </p:cTn>
+                              </p:par>
+                              <p:par>
+                                <p:cTn id="23" presetID="1" presetClass="entr" presetSubtype="0" fill="hold" grpId="0" nodeType="withEffect">
+                                  <p:stCondLst>
+                                    <p:cond delay="0"/>
+                                  </p:stCondLst>
+                                  <p:childTnLst>
+                                    <p:set>
+                                      <p:cBhvr>
+                                        <p:cTn id="24" dur="1" fill="hold">
+                                          <p:stCondLst>
+                                            <p:cond delay="0"/>
+                                          </p:stCondLst>
+                                        </p:cTn>
+                                        <p:tgtEl>
+                                          <p:spTgt spid="3">
+                                            <p:txEl>
+                                              <p:pRg st="7" end="7"/>
+                                            </p:txEl>
+                                          </p:spTgt>
+                                        </p:tgtEl>
+                                        <p:attrNameLst>
+                                          <p:attrName>style.visibility</p:attrName>
+                                        </p:attrNameLst>
+                                      </p:cBhvr>
+                                      <p:to>
+                                        <p:strVal val="visible"/>
+                                      </p:to>
+                                    </p:set>
+                                  </p:childTnLst>
+                                </p:cTn>
+                              </p:par>
+                              <p:par>
+                                <p:cTn id="25" presetID="1" presetClass="entr" presetSubtype="0" fill="hold" grpId="0" nodeType="withEffect">
+                                  <p:stCondLst>
+                                    <p:cond delay="0"/>
+                                  </p:stCondLst>
+                                  <p:childTnLst>
+                                    <p:set>
+                                      <p:cBhvr>
+                                        <p:cTn id="26" dur="1" fill="hold">
+                                          <p:stCondLst>
+                                            <p:cond delay="0"/>
+                                          </p:stCondLst>
+                                        </p:cTn>
+                                        <p:tgtEl>
+                                          <p:spTgt spid="3">
+                                            <p:txEl>
+                                              <p:pRg st="8" end="8"/>
+                                            </p:txEl>
+                                          </p:spTgt>
+                                        </p:tgtEl>
+                                        <p:attrNameLst>
+                                          <p:attrName>style.visibility</p:attrName>
+                                        </p:attrNameLst>
+                                      </p:cBhvr>
+                                      <p:to>
+                                        <p:strVal val="visible"/>
+                                      </p:to>
+                                    </p:set>
+                                  </p:childTnLst>
+                                </p:cTn>
+                              </p:par>
+                            </p:childTnLst>
+                          </p:cTn>
+                        </p:par>
+                      </p:childTnLst>
+                    </p:cTn>
+                  </p:par>
+                </p:childTnLst>
+              </p:cTn>
+              <p:prevCondLst>
+                <p:cond evt="onPrev" delay="0">
+                  <p:tgtEl>
+                    <p:sldTgt/>
+                  </p:tgtEl>
+                </p:cond>
+              </p:prevCondLst>
+              <p:nextCondLst>
+                <p:cond evt="onNext" delay="0">
+                  <p:tgtEl>
+                    <p:sldTgt/>
+                  </p:tgtEl>
+                </p:cond>
+              </p:nextCondLst>
+            </p:seq>
+          </p:childTnLst>
+        </p:cTn>
+      </p:par>
+    </p:tnLst>
+    <p:bldLst>
+      <p:bldP spid="3" grpId="0" uiExpand="1" build="p"/>
+    </p:bldLst>
+  </p:timing>
 </p:sld>
 </file>
 
@@ -8064,21 +9063,21 @@
             <a:pPr lvl="1"/>
             <a:r>
               <a:rPr lang="en-US" dirty="0"/>
-              <a:t>Will learn about Git and Revision Control (Part 1)</a:t>
+              <a:t>Part 1: Will learn about Git and Revision Control</a:t>
             </a:r>
           </a:p>
           <a:p>
             <a:pPr lvl="1"/>
             <a:r>
               <a:rPr lang="en-US" dirty="0"/>
-              <a:t>Will learn about how to work with Git (Part 2)</a:t>
+              <a:t>Part 2: Will learn about how to work with Git</a:t>
             </a:r>
           </a:p>
           <a:p>
             <a:pPr lvl="1"/>
             <a:r>
               <a:rPr lang="en-US" dirty="0"/>
-              <a:t>Will learn about LabVIEW and Git combined (Part 3)</a:t>
+              <a:t>Part 3: Will learn about LabVIEW and Git combined</a:t>
             </a:r>
           </a:p>
           <a:p>
@@ -8117,6 +9116,273 @@
   <p:clrMapOvr>
     <a:masterClrMapping/>
   </p:clrMapOvr>
+  <mc:AlternateContent xmlns:mc="http://schemas.openxmlformats.org/markup-compatibility/2006">
+    <mc:Choice xmlns:p159="http://schemas.microsoft.com/office/powerpoint/2015/09/main" Requires="p159">
+      <p:transition xmlns:p14="http://schemas.microsoft.com/office/powerpoint/2010/main" spd="slow" p14:dur="2000">
+        <p159:morph option="byObject"/>
+      </p:transition>
+    </mc:Choice>
+    <mc:Fallback>
+      <p:transition spd="slow">
+        <p:fade/>
+      </p:transition>
+    </mc:Fallback>
+  </mc:AlternateContent>
+  <p:timing>
+    <p:tnLst>
+      <p:par>
+        <p:cTn id="1" dur="indefinite" restart="never" nodeType="tmRoot">
+          <p:childTnLst>
+            <p:seq concurrent="1" nextAc="seek">
+              <p:cTn id="2" dur="indefinite" nodeType="mainSeq">
+                <p:childTnLst>
+                  <p:par>
+                    <p:cTn id="3" fill="hold">
+                      <p:stCondLst>
+                        <p:cond delay="indefinite"/>
+                      </p:stCondLst>
+                      <p:childTnLst>
+                        <p:par>
+                          <p:cTn id="4" fill="hold">
+                            <p:stCondLst>
+                              <p:cond delay="0"/>
+                            </p:stCondLst>
+                            <p:childTnLst>
+                              <p:par>
+                                <p:cTn id="5" presetID="1" presetClass="entr" presetSubtype="0" fill="hold" grpId="0" nodeType="clickEffect">
+                                  <p:stCondLst>
+                                    <p:cond delay="0"/>
+                                  </p:stCondLst>
+                                  <p:childTnLst>
+                                    <p:set>
+                                      <p:cBhvr>
+                                        <p:cTn id="6" dur="1" fill="hold">
+                                          <p:stCondLst>
+                                            <p:cond delay="0"/>
+                                          </p:stCondLst>
+                                        </p:cTn>
+                                        <p:tgtEl>
+                                          <p:spTgt spid="3">
+                                            <p:txEl>
+                                              <p:pRg st="0" end="0"/>
+                                            </p:txEl>
+                                          </p:spTgt>
+                                        </p:tgtEl>
+                                        <p:attrNameLst>
+                                          <p:attrName>style.visibility</p:attrName>
+                                        </p:attrNameLst>
+                                      </p:cBhvr>
+                                      <p:to>
+                                        <p:strVal val="visible"/>
+                                      </p:to>
+                                    </p:set>
+                                  </p:childTnLst>
+                                </p:cTn>
+                              </p:par>
+                              <p:par>
+                                <p:cTn id="7" presetID="1" presetClass="entr" presetSubtype="0" fill="hold" grpId="0" nodeType="withEffect">
+                                  <p:stCondLst>
+                                    <p:cond delay="0"/>
+                                  </p:stCondLst>
+                                  <p:childTnLst>
+                                    <p:set>
+                                      <p:cBhvr>
+                                        <p:cTn id="8" dur="1" fill="hold">
+                                          <p:stCondLst>
+                                            <p:cond delay="0"/>
+                                          </p:stCondLst>
+                                        </p:cTn>
+                                        <p:tgtEl>
+                                          <p:spTgt spid="3">
+                                            <p:txEl>
+                                              <p:pRg st="1" end="1"/>
+                                            </p:txEl>
+                                          </p:spTgt>
+                                        </p:tgtEl>
+                                        <p:attrNameLst>
+                                          <p:attrName>style.visibility</p:attrName>
+                                        </p:attrNameLst>
+                                      </p:cBhvr>
+                                      <p:to>
+                                        <p:strVal val="visible"/>
+                                      </p:to>
+                                    </p:set>
+                                  </p:childTnLst>
+                                </p:cTn>
+                              </p:par>
+                              <p:par>
+                                <p:cTn id="9" presetID="1" presetClass="entr" presetSubtype="0" fill="hold" grpId="0" nodeType="withEffect">
+                                  <p:stCondLst>
+                                    <p:cond delay="0"/>
+                                  </p:stCondLst>
+                                  <p:childTnLst>
+                                    <p:set>
+                                      <p:cBhvr>
+                                        <p:cTn id="10" dur="1" fill="hold">
+                                          <p:stCondLst>
+                                            <p:cond delay="0"/>
+                                          </p:stCondLst>
+                                        </p:cTn>
+                                        <p:tgtEl>
+                                          <p:spTgt spid="3">
+                                            <p:txEl>
+                                              <p:pRg st="2" end="2"/>
+                                            </p:txEl>
+                                          </p:spTgt>
+                                        </p:tgtEl>
+                                        <p:attrNameLst>
+                                          <p:attrName>style.visibility</p:attrName>
+                                        </p:attrNameLst>
+                                      </p:cBhvr>
+                                      <p:to>
+                                        <p:strVal val="visible"/>
+                                      </p:to>
+                                    </p:set>
+                                  </p:childTnLst>
+                                </p:cTn>
+                              </p:par>
+                              <p:par>
+                                <p:cTn id="11" presetID="1" presetClass="entr" presetSubtype="0" fill="hold" grpId="0" nodeType="withEffect">
+                                  <p:stCondLst>
+                                    <p:cond delay="0"/>
+                                  </p:stCondLst>
+                                  <p:childTnLst>
+                                    <p:set>
+                                      <p:cBhvr>
+                                        <p:cTn id="12" dur="1" fill="hold">
+                                          <p:stCondLst>
+                                            <p:cond delay="0"/>
+                                          </p:stCondLst>
+                                        </p:cTn>
+                                        <p:tgtEl>
+                                          <p:spTgt spid="3">
+                                            <p:txEl>
+                                              <p:pRg st="3" end="3"/>
+                                            </p:txEl>
+                                          </p:spTgt>
+                                        </p:tgtEl>
+                                        <p:attrNameLst>
+                                          <p:attrName>style.visibility</p:attrName>
+                                        </p:attrNameLst>
+                                      </p:cBhvr>
+                                      <p:to>
+                                        <p:strVal val="visible"/>
+                                      </p:to>
+                                    </p:set>
+                                  </p:childTnLst>
+                                </p:cTn>
+                              </p:par>
+                            </p:childTnLst>
+                          </p:cTn>
+                        </p:par>
+                      </p:childTnLst>
+                    </p:cTn>
+                  </p:par>
+                  <p:par>
+                    <p:cTn id="13" fill="hold">
+                      <p:stCondLst>
+                        <p:cond delay="indefinite"/>
+                      </p:stCondLst>
+                      <p:childTnLst>
+                        <p:par>
+                          <p:cTn id="14" fill="hold">
+                            <p:stCondLst>
+                              <p:cond delay="0"/>
+                            </p:stCondLst>
+                            <p:childTnLst>
+                              <p:par>
+                                <p:cTn id="15" presetID="1" presetClass="entr" presetSubtype="0" fill="hold" grpId="0" nodeType="clickEffect">
+                                  <p:stCondLst>
+                                    <p:cond delay="0"/>
+                                  </p:stCondLst>
+                                  <p:childTnLst>
+                                    <p:set>
+                                      <p:cBhvr>
+                                        <p:cTn id="16" dur="1" fill="hold">
+                                          <p:stCondLst>
+                                            <p:cond delay="0"/>
+                                          </p:stCondLst>
+                                        </p:cTn>
+                                        <p:tgtEl>
+                                          <p:spTgt spid="3">
+                                            <p:txEl>
+                                              <p:pRg st="5" end="5"/>
+                                            </p:txEl>
+                                          </p:spTgt>
+                                        </p:tgtEl>
+                                        <p:attrNameLst>
+                                          <p:attrName>style.visibility</p:attrName>
+                                        </p:attrNameLst>
+                                      </p:cBhvr>
+                                      <p:to>
+                                        <p:strVal val="visible"/>
+                                      </p:to>
+                                    </p:set>
+                                  </p:childTnLst>
+                                </p:cTn>
+                              </p:par>
+                              <p:par>
+                                <p:cTn id="17" presetID="1" presetClass="entr" presetSubtype="0" fill="hold" grpId="0" nodeType="withEffect">
+                                  <p:stCondLst>
+                                    <p:cond delay="0"/>
+                                  </p:stCondLst>
+                                  <p:childTnLst>
+                                    <p:set>
+                                      <p:cBhvr>
+                                        <p:cTn id="18" dur="1" fill="hold">
+                                          <p:stCondLst>
+                                            <p:cond delay="0"/>
+                                          </p:stCondLst>
+                                        </p:cTn>
+                                        <p:tgtEl>
+                                          <p:spTgt spid="3">
+                                            <p:txEl>
+                                              <p:pRg st="6" end="6"/>
+                                            </p:txEl>
+                                          </p:spTgt>
+                                        </p:tgtEl>
+                                        <p:attrNameLst>
+                                          <p:attrName>style.visibility</p:attrName>
+                                        </p:attrNameLst>
+                                      </p:cBhvr>
+                                      <p:to>
+                                        <p:strVal val="visible"/>
+                                      </p:to>
+                                    </p:set>
+                                  </p:childTnLst>
+                                </p:cTn>
+                              </p:par>
+                            </p:childTnLst>
+                          </p:cTn>
+                        </p:par>
+                      </p:childTnLst>
+                    </p:cTn>
+                  </p:par>
+                </p:childTnLst>
+              </p:cTn>
+              <p:prevCondLst>
+                <p:cond evt="onPrev" delay="0">
+                  <p:tgtEl>
+                    <p:sldTgt/>
+                  </p:tgtEl>
+                </p:cond>
+              </p:prevCondLst>
+              <p:nextCondLst>
+                <p:cond evt="onNext" delay="0">
+                  <p:tgtEl>
+                    <p:sldTgt/>
+                  </p:tgtEl>
+                </p:cond>
+              </p:nextCondLst>
+            </p:seq>
+          </p:childTnLst>
+        </p:cTn>
+      </p:par>
+    </p:tnLst>
+    <p:bldLst>
+      <p:bldP spid="3" grpId="0" build="p"/>
+    </p:bldLst>
+  </p:timing>
 </p:sld>
 </file>
 
@@ -8196,6 +9462,9 @@
           <a:bodyPr/>
           <a:lstStyle/>
           <a:p>
+            <a:endParaRPr lang="en-US" dirty="0"/>
+          </a:p>
+          <a:p>
             <a:r>
               <a:rPr lang="en-US" dirty="0"/>
               <a:t>Revision control is a method of capturing snapshots of files (code, etc.) at specific points in time.</a:t>
@@ -8214,7 +9483,15 @@
             <a:pPr lvl="1"/>
             <a:r>
               <a:rPr lang="en-US" dirty="0"/>
-              <a:t>“I have this awesome software I developed that does everything I need, but it has this one tenacious bug.  I just spent the last 3 weeks finding this bug, and it turned out that it was a simple setting/register/</a:t>
+              <a:t>“I have this awesome software I developed that does everything I need, but it has this one tenacious bug.  I just spent the last </a:t>
+            </a:r>
+            <a:r>
+              <a:rPr lang="en-US" u="sng" dirty="0"/>
+              <a:t>3 weeks</a:t>
+            </a:r>
+            <a:r>
+              <a:rPr lang="en-US" dirty="0"/>
+              <a:t> finding this bug, and it turned out that it was a simple setting/register/</a:t>
             </a:r>
             <a:r>
               <a:rPr lang="en-US" dirty="0" err="1"/>
@@ -8244,6 +9521,229 @@
   <p:clrMapOvr>
     <a:masterClrMapping/>
   </p:clrMapOvr>
+  <mc:AlternateContent xmlns:mc="http://schemas.openxmlformats.org/markup-compatibility/2006">
+    <mc:Choice xmlns:p159="http://schemas.microsoft.com/office/powerpoint/2015/09/main" Requires="p159">
+      <p:transition xmlns:p14="http://schemas.microsoft.com/office/powerpoint/2010/main" spd="slow" p14:dur="2000">
+        <p159:morph option="byObject"/>
+      </p:transition>
+    </mc:Choice>
+    <mc:Fallback>
+      <p:transition spd="slow">
+        <p:fade/>
+      </p:transition>
+    </mc:Fallback>
+  </mc:AlternateContent>
+  <p:timing>
+    <p:tnLst>
+      <p:par>
+        <p:cTn id="1" dur="indefinite" restart="never" nodeType="tmRoot">
+          <p:childTnLst>
+            <p:seq concurrent="1" nextAc="seek">
+              <p:cTn id="2" dur="indefinite" nodeType="mainSeq">
+                <p:childTnLst>
+                  <p:par>
+                    <p:cTn id="3" fill="hold">
+                      <p:stCondLst>
+                        <p:cond delay="indefinite"/>
+                      </p:stCondLst>
+                      <p:childTnLst>
+                        <p:par>
+                          <p:cTn id="4" fill="hold">
+                            <p:stCondLst>
+                              <p:cond delay="0"/>
+                            </p:stCondLst>
+                            <p:childTnLst>
+                              <p:par>
+                                <p:cTn id="5" presetID="1" presetClass="entr" presetSubtype="0" fill="hold" grpId="0" nodeType="clickEffect">
+                                  <p:stCondLst>
+                                    <p:cond delay="0"/>
+                                  </p:stCondLst>
+                                  <p:childTnLst>
+                                    <p:set>
+                                      <p:cBhvr>
+                                        <p:cTn id="6" dur="1" fill="hold">
+                                          <p:stCondLst>
+                                            <p:cond delay="0"/>
+                                          </p:stCondLst>
+                                        </p:cTn>
+                                        <p:tgtEl>
+                                          <p:spTgt spid="3">
+                                            <p:txEl>
+                                              <p:pRg st="1" end="1"/>
+                                            </p:txEl>
+                                          </p:spTgt>
+                                        </p:tgtEl>
+                                        <p:attrNameLst>
+                                          <p:attrName>style.visibility</p:attrName>
+                                        </p:attrNameLst>
+                                      </p:cBhvr>
+                                      <p:to>
+                                        <p:strVal val="visible"/>
+                                      </p:to>
+                                    </p:set>
+                                  </p:childTnLst>
+                                </p:cTn>
+                              </p:par>
+                            </p:childTnLst>
+                          </p:cTn>
+                        </p:par>
+                      </p:childTnLst>
+                    </p:cTn>
+                  </p:par>
+                  <p:par>
+                    <p:cTn id="7" fill="hold">
+                      <p:stCondLst>
+                        <p:cond delay="indefinite"/>
+                      </p:stCondLst>
+                      <p:childTnLst>
+                        <p:par>
+                          <p:cTn id="8" fill="hold">
+                            <p:stCondLst>
+                              <p:cond delay="0"/>
+                            </p:stCondLst>
+                            <p:childTnLst>
+                              <p:par>
+                                <p:cTn id="9" presetID="1" presetClass="entr" presetSubtype="0" fill="hold" grpId="0" nodeType="clickEffect">
+                                  <p:stCondLst>
+                                    <p:cond delay="0"/>
+                                  </p:stCondLst>
+                                  <p:childTnLst>
+                                    <p:set>
+                                      <p:cBhvr>
+                                        <p:cTn id="10" dur="1" fill="hold">
+                                          <p:stCondLst>
+                                            <p:cond delay="0"/>
+                                          </p:stCondLst>
+                                        </p:cTn>
+                                        <p:tgtEl>
+                                          <p:spTgt spid="3">
+                                            <p:txEl>
+                                              <p:pRg st="3" end="3"/>
+                                            </p:txEl>
+                                          </p:spTgt>
+                                        </p:tgtEl>
+                                        <p:attrNameLst>
+                                          <p:attrName>style.visibility</p:attrName>
+                                        </p:attrNameLst>
+                                      </p:cBhvr>
+                                      <p:to>
+                                        <p:strVal val="visible"/>
+                                      </p:to>
+                                    </p:set>
+                                  </p:childTnLst>
+                                </p:cTn>
+                              </p:par>
+                            </p:childTnLst>
+                          </p:cTn>
+                        </p:par>
+                      </p:childTnLst>
+                    </p:cTn>
+                  </p:par>
+                  <p:par>
+                    <p:cTn id="11" fill="hold">
+                      <p:stCondLst>
+                        <p:cond delay="indefinite"/>
+                      </p:stCondLst>
+                      <p:childTnLst>
+                        <p:par>
+                          <p:cTn id="12" fill="hold">
+                            <p:stCondLst>
+                              <p:cond delay="0"/>
+                            </p:stCondLst>
+                            <p:childTnLst>
+                              <p:par>
+                                <p:cTn id="13" presetID="1" presetClass="entr" presetSubtype="0" fill="hold" grpId="0" nodeType="clickEffect">
+                                  <p:stCondLst>
+                                    <p:cond delay="0"/>
+                                  </p:stCondLst>
+                                  <p:childTnLst>
+                                    <p:set>
+                                      <p:cBhvr>
+                                        <p:cTn id="14" dur="1" fill="hold">
+                                          <p:stCondLst>
+                                            <p:cond delay="0"/>
+                                          </p:stCondLst>
+                                        </p:cTn>
+                                        <p:tgtEl>
+                                          <p:spTgt spid="3">
+                                            <p:txEl>
+                                              <p:pRg st="4" end="4"/>
+                                            </p:txEl>
+                                          </p:spTgt>
+                                        </p:tgtEl>
+                                        <p:attrNameLst>
+                                          <p:attrName>style.visibility</p:attrName>
+                                        </p:attrNameLst>
+                                      </p:cBhvr>
+                                      <p:to>
+                                        <p:strVal val="visible"/>
+                                      </p:to>
+                                    </p:set>
+                                  </p:childTnLst>
+                                </p:cTn>
+                              </p:par>
+                              <p:par>
+                                <p:cTn id="15" presetID="1" presetClass="entr" presetSubtype="0" fill="hold" grpId="0" nodeType="withEffect">
+                                  <p:stCondLst>
+                                    <p:cond delay="0"/>
+                                  </p:stCondLst>
+                                  <p:childTnLst>
+                                    <p:set>
+                                      <p:cBhvr>
+                                        <p:cTn id="16" dur="1" fill="hold">
+                                          <p:stCondLst>
+                                            <p:cond delay="0"/>
+                                          </p:stCondLst>
+                                        </p:cTn>
+                                        <p:tgtEl>
+                                          <p:spTgt spid="3">
+                                            <p:txEl>
+                                              <p:pRg st="5" end="5"/>
+                                            </p:txEl>
+                                          </p:spTgt>
+                                        </p:tgtEl>
+                                        <p:attrNameLst>
+                                          <p:attrName>style.visibility</p:attrName>
+                                        </p:attrNameLst>
+                                      </p:cBhvr>
+                                      <p:to>
+                                        <p:strVal val="visible"/>
+                                      </p:to>
+                                    </p:set>
+                                  </p:childTnLst>
+                                </p:cTn>
+                              </p:par>
+                            </p:childTnLst>
+                          </p:cTn>
+                        </p:par>
+                      </p:childTnLst>
+                    </p:cTn>
+                  </p:par>
+                </p:childTnLst>
+              </p:cTn>
+              <p:prevCondLst>
+                <p:cond evt="onPrev" delay="0">
+                  <p:tgtEl>
+                    <p:sldTgt/>
+                  </p:tgtEl>
+                </p:cond>
+              </p:prevCondLst>
+              <p:nextCondLst>
+                <p:cond evt="onNext" delay="0">
+                  <p:tgtEl>
+                    <p:sldTgt/>
+                  </p:tgtEl>
+                </p:cond>
+              </p:nextCondLst>
+            </p:seq>
+          </p:childTnLst>
+        </p:cTn>
+      </p:par>
+    </p:tnLst>
+    <p:bldLst>
+      <p:bldP spid="3" grpId="0" uiExpand="1" build="p"/>
+    </p:bldLst>
+  </p:timing>
 </p:sld>
 </file>
 
@@ -8378,6 +9878,273 @@
   <p:clrMapOvr>
     <a:masterClrMapping/>
   </p:clrMapOvr>
+  <mc:AlternateContent xmlns:mc="http://schemas.openxmlformats.org/markup-compatibility/2006">
+    <mc:Choice xmlns:p159="http://schemas.microsoft.com/office/powerpoint/2015/09/main" Requires="p159">
+      <p:transition xmlns:p14="http://schemas.microsoft.com/office/powerpoint/2010/main" spd="slow" p14:dur="2000">
+        <p159:morph option="byObject"/>
+      </p:transition>
+    </mc:Choice>
+    <mc:Fallback>
+      <p:transition spd="slow">
+        <p:fade/>
+      </p:transition>
+    </mc:Fallback>
+  </mc:AlternateContent>
+  <p:timing>
+    <p:tnLst>
+      <p:par>
+        <p:cTn id="1" dur="indefinite" restart="never" nodeType="tmRoot">
+          <p:childTnLst>
+            <p:seq concurrent="1" nextAc="seek">
+              <p:cTn id="2" dur="indefinite" nodeType="mainSeq">
+                <p:childTnLst>
+                  <p:par>
+                    <p:cTn id="3" fill="hold">
+                      <p:stCondLst>
+                        <p:cond delay="indefinite"/>
+                      </p:stCondLst>
+                      <p:childTnLst>
+                        <p:par>
+                          <p:cTn id="4" fill="hold">
+                            <p:stCondLst>
+                              <p:cond delay="0"/>
+                            </p:stCondLst>
+                            <p:childTnLst>
+                              <p:par>
+                                <p:cTn id="5" presetID="1" presetClass="entr" presetSubtype="0" fill="hold" grpId="0" nodeType="clickEffect">
+                                  <p:stCondLst>
+                                    <p:cond delay="0"/>
+                                  </p:stCondLst>
+                                  <p:childTnLst>
+                                    <p:set>
+                                      <p:cBhvr>
+                                        <p:cTn id="6" dur="1" fill="hold">
+                                          <p:stCondLst>
+                                            <p:cond delay="0"/>
+                                          </p:stCondLst>
+                                        </p:cTn>
+                                        <p:tgtEl>
+                                          <p:spTgt spid="3">
+                                            <p:txEl>
+                                              <p:pRg st="0" end="0"/>
+                                            </p:txEl>
+                                          </p:spTgt>
+                                        </p:tgtEl>
+                                        <p:attrNameLst>
+                                          <p:attrName>style.visibility</p:attrName>
+                                        </p:attrNameLst>
+                                      </p:cBhvr>
+                                      <p:to>
+                                        <p:strVal val="visible"/>
+                                      </p:to>
+                                    </p:set>
+                                  </p:childTnLst>
+                                </p:cTn>
+                              </p:par>
+                              <p:par>
+                                <p:cTn id="7" presetID="1" presetClass="entr" presetSubtype="0" fill="hold" grpId="0" nodeType="withEffect">
+                                  <p:stCondLst>
+                                    <p:cond delay="0"/>
+                                  </p:stCondLst>
+                                  <p:childTnLst>
+                                    <p:set>
+                                      <p:cBhvr>
+                                        <p:cTn id="8" dur="1" fill="hold">
+                                          <p:stCondLst>
+                                            <p:cond delay="0"/>
+                                          </p:stCondLst>
+                                        </p:cTn>
+                                        <p:tgtEl>
+                                          <p:spTgt spid="3">
+                                            <p:txEl>
+                                              <p:pRg st="1" end="1"/>
+                                            </p:txEl>
+                                          </p:spTgt>
+                                        </p:tgtEl>
+                                        <p:attrNameLst>
+                                          <p:attrName>style.visibility</p:attrName>
+                                        </p:attrNameLst>
+                                      </p:cBhvr>
+                                      <p:to>
+                                        <p:strVal val="visible"/>
+                                      </p:to>
+                                    </p:set>
+                                  </p:childTnLst>
+                                </p:cTn>
+                              </p:par>
+                              <p:par>
+                                <p:cTn id="9" presetID="1" presetClass="entr" presetSubtype="0" fill="hold" grpId="0" nodeType="withEffect">
+                                  <p:stCondLst>
+                                    <p:cond delay="0"/>
+                                  </p:stCondLst>
+                                  <p:childTnLst>
+                                    <p:set>
+                                      <p:cBhvr>
+                                        <p:cTn id="10" dur="1" fill="hold">
+                                          <p:stCondLst>
+                                            <p:cond delay="0"/>
+                                          </p:stCondLst>
+                                        </p:cTn>
+                                        <p:tgtEl>
+                                          <p:spTgt spid="3">
+                                            <p:txEl>
+                                              <p:pRg st="2" end="2"/>
+                                            </p:txEl>
+                                          </p:spTgt>
+                                        </p:tgtEl>
+                                        <p:attrNameLst>
+                                          <p:attrName>style.visibility</p:attrName>
+                                        </p:attrNameLst>
+                                      </p:cBhvr>
+                                      <p:to>
+                                        <p:strVal val="visible"/>
+                                      </p:to>
+                                    </p:set>
+                                  </p:childTnLst>
+                                </p:cTn>
+                              </p:par>
+                            </p:childTnLst>
+                          </p:cTn>
+                        </p:par>
+                      </p:childTnLst>
+                    </p:cTn>
+                  </p:par>
+                  <p:par>
+                    <p:cTn id="11" fill="hold">
+                      <p:stCondLst>
+                        <p:cond delay="indefinite"/>
+                      </p:stCondLst>
+                      <p:childTnLst>
+                        <p:par>
+                          <p:cTn id="12" fill="hold">
+                            <p:stCondLst>
+                              <p:cond delay="0"/>
+                            </p:stCondLst>
+                            <p:childTnLst>
+                              <p:par>
+                                <p:cTn id="13" presetID="1" presetClass="entr" presetSubtype="0" fill="hold" grpId="0" nodeType="clickEffect">
+                                  <p:stCondLst>
+                                    <p:cond delay="0"/>
+                                  </p:stCondLst>
+                                  <p:childTnLst>
+                                    <p:set>
+                                      <p:cBhvr>
+                                        <p:cTn id="14" dur="1" fill="hold">
+                                          <p:stCondLst>
+                                            <p:cond delay="0"/>
+                                          </p:stCondLst>
+                                        </p:cTn>
+                                        <p:tgtEl>
+                                          <p:spTgt spid="3">
+                                            <p:txEl>
+                                              <p:pRg st="4" end="4"/>
+                                            </p:txEl>
+                                          </p:spTgt>
+                                        </p:tgtEl>
+                                        <p:attrNameLst>
+                                          <p:attrName>style.visibility</p:attrName>
+                                        </p:attrNameLst>
+                                      </p:cBhvr>
+                                      <p:to>
+                                        <p:strVal val="visible"/>
+                                      </p:to>
+                                    </p:set>
+                                  </p:childTnLst>
+                                </p:cTn>
+                              </p:par>
+                              <p:par>
+                                <p:cTn id="15" presetID="1" presetClass="entr" presetSubtype="0" fill="hold" grpId="0" nodeType="withEffect">
+                                  <p:stCondLst>
+                                    <p:cond delay="0"/>
+                                  </p:stCondLst>
+                                  <p:childTnLst>
+                                    <p:set>
+                                      <p:cBhvr>
+                                        <p:cTn id="16" dur="1" fill="hold">
+                                          <p:stCondLst>
+                                            <p:cond delay="0"/>
+                                          </p:stCondLst>
+                                        </p:cTn>
+                                        <p:tgtEl>
+                                          <p:spTgt spid="3">
+                                            <p:txEl>
+                                              <p:pRg st="5" end="5"/>
+                                            </p:txEl>
+                                          </p:spTgt>
+                                        </p:tgtEl>
+                                        <p:attrNameLst>
+                                          <p:attrName>style.visibility</p:attrName>
+                                        </p:attrNameLst>
+                                      </p:cBhvr>
+                                      <p:to>
+                                        <p:strVal val="visible"/>
+                                      </p:to>
+                                    </p:set>
+                                  </p:childTnLst>
+                                </p:cTn>
+                              </p:par>
+                              <p:par>
+                                <p:cTn id="17" presetID="1" presetClass="entr" presetSubtype="0" fill="hold" grpId="0" nodeType="withEffect">
+                                  <p:stCondLst>
+                                    <p:cond delay="0"/>
+                                  </p:stCondLst>
+                                  <p:childTnLst>
+                                    <p:set>
+                                      <p:cBhvr>
+                                        <p:cTn id="18" dur="1" fill="hold">
+                                          <p:stCondLst>
+                                            <p:cond delay="0"/>
+                                          </p:stCondLst>
+                                        </p:cTn>
+                                        <p:tgtEl>
+                                          <p:spTgt spid="3">
+                                            <p:txEl>
+                                              <p:pRg st="6" end="6"/>
+                                            </p:txEl>
+                                          </p:spTgt>
+                                        </p:tgtEl>
+                                        <p:attrNameLst>
+                                          <p:attrName>style.visibility</p:attrName>
+                                        </p:attrNameLst>
+                                      </p:cBhvr>
+                                      <p:to>
+                                        <p:strVal val="visible"/>
+                                      </p:to>
+                                    </p:set>
+                                  </p:childTnLst>
+                                </p:cTn>
+                              </p:par>
+                            </p:childTnLst>
+                          </p:cTn>
+                        </p:par>
+                      </p:childTnLst>
+                    </p:cTn>
+                  </p:par>
+                </p:childTnLst>
+              </p:cTn>
+              <p:prevCondLst>
+                <p:cond evt="onPrev" delay="0">
+                  <p:tgtEl>
+                    <p:sldTgt/>
+                  </p:tgtEl>
+                </p:cond>
+              </p:prevCondLst>
+              <p:nextCondLst>
+                <p:cond evt="onNext" delay="0">
+                  <p:tgtEl>
+                    <p:sldTgt/>
+                  </p:tgtEl>
+                </p:cond>
+              </p:nextCondLst>
+            </p:seq>
+          </p:childTnLst>
+        </p:cTn>
+      </p:par>
+    </p:tnLst>
+    <p:bldLst>
+      <p:bldP spid="3" grpId="0" build="p"/>
+    </p:bldLst>
+  </p:timing>
 </p:sld>
 </file>
 
@@ -8470,6 +10237,12 @@
           <a:p>
             <a:r>
               <a:rPr lang="en-US" dirty="0"/>
+              <a:t>Simplest in terms of explaining the hierarchy and modus operandi. </a:t>
+            </a:r>
+          </a:p>
+          <a:p>
+            <a:r>
+              <a:rPr lang="en-US" dirty="0"/>
               <a:t>The server acts as the master.</a:t>
             </a:r>
           </a:p>
@@ -8484,7 +10257,7 @@
             <a:pPr lvl="1"/>
             <a:r>
               <a:rPr lang="en-US" dirty="0"/>
-              <a:t>It stores the revision history.</a:t>
+              <a:t>It stores the revision history. </a:t>
             </a:r>
           </a:p>
           <a:p>
@@ -8508,18 +10281,16 @@
             </a:r>
           </a:p>
           <a:p>
-            <a:endParaRPr lang="en-US" dirty="0"/>
-          </a:p>
-          <a:p>
+            <a:pPr lvl="1"/>
             <a:r>
               <a:rPr lang="en-US" dirty="0"/>
-              <a:t>Files cannot be worked on simultaneously.</a:t>
+              <a:t>Clients can only make changes while connected to the server. </a:t>
             </a:r>
           </a:p>
           <a:p>
             <a:r>
               <a:rPr lang="en-US" dirty="0"/>
-              <a:t>Simplest in terms of explaining the hierarchy and modus operandi. </a:t>
+              <a:t>Changes cannot be captured simultaneously.</a:t>
             </a:r>
           </a:p>
           <a:p>
@@ -8537,6 +10308,541 @@
   <p:clrMapOvr>
     <a:masterClrMapping/>
   </p:clrMapOvr>
+  <mc:AlternateContent xmlns:mc="http://schemas.openxmlformats.org/markup-compatibility/2006">
+    <mc:Choice xmlns:p159="http://schemas.microsoft.com/office/powerpoint/2015/09/main" Requires="p159">
+      <p:transition xmlns:p14="http://schemas.microsoft.com/office/powerpoint/2010/main" spd="slow" p14:dur="2000">
+        <p159:morph option="byObject"/>
+      </p:transition>
+    </mc:Choice>
+    <mc:Fallback>
+      <p:transition spd="slow">
+        <p:fade/>
+      </p:transition>
+    </mc:Fallback>
+  </mc:AlternateContent>
+  <p:timing>
+    <p:tnLst>
+      <p:par>
+        <p:cTn id="1" dur="indefinite" restart="never" nodeType="tmRoot">
+          <p:childTnLst>
+            <p:seq concurrent="1" nextAc="seek">
+              <p:cTn id="2" dur="indefinite" nodeType="mainSeq">
+                <p:childTnLst>
+                  <p:par>
+                    <p:cTn id="3" fill="hold">
+                      <p:stCondLst>
+                        <p:cond delay="indefinite"/>
+                      </p:stCondLst>
+                      <p:childTnLst>
+                        <p:par>
+                          <p:cTn id="4" fill="hold">
+                            <p:stCondLst>
+                              <p:cond delay="0"/>
+                            </p:stCondLst>
+                            <p:childTnLst>
+                              <p:par>
+                                <p:cTn id="5" presetID="1" presetClass="entr" presetSubtype="0" fill="hold" grpId="0" nodeType="clickEffect">
+                                  <p:stCondLst>
+                                    <p:cond delay="0"/>
+                                  </p:stCondLst>
+                                  <p:childTnLst>
+                                    <p:set>
+                                      <p:cBhvr>
+                                        <p:cTn id="6" dur="1" fill="hold">
+                                          <p:stCondLst>
+                                            <p:cond delay="0"/>
+                                          </p:stCondLst>
+                                        </p:cTn>
+                                        <p:tgtEl>
+                                          <p:spTgt spid="3">
+                                            <p:txEl>
+                                              <p:pRg st="0" end="0"/>
+                                            </p:txEl>
+                                          </p:spTgt>
+                                        </p:tgtEl>
+                                        <p:attrNameLst>
+                                          <p:attrName>style.visibility</p:attrName>
+                                        </p:attrNameLst>
+                                      </p:cBhvr>
+                                      <p:to>
+                                        <p:strVal val="visible"/>
+                                      </p:to>
+                                    </p:set>
+                                  </p:childTnLst>
+                                </p:cTn>
+                              </p:par>
+                            </p:childTnLst>
+                          </p:cTn>
+                        </p:par>
+                      </p:childTnLst>
+                    </p:cTn>
+                  </p:par>
+                  <p:par>
+                    <p:cTn id="7" fill="hold">
+                      <p:stCondLst>
+                        <p:cond delay="indefinite"/>
+                      </p:stCondLst>
+                      <p:childTnLst>
+                        <p:par>
+                          <p:cTn id="8" fill="hold">
+                            <p:stCondLst>
+                              <p:cond delay="0"/>
+                            </p:stCondLst>
+                            <p:childTnLst>
+                              <p:par>
+                                <p:cTn id="9" presetID="1" presetClass="entr" presetSubtype="0" fill="hold" grpId="0" nodeType="clickEffect">
+                                  <p:stCondLst>
+                                    <p:cond delay="0"/>
+                                  </p:stCondLst>
+                                  <p:childTnLst>
+                                    <p:set>
+                                      <p:cBhvr>
+                                        <p:cTn id="10" dur="1" fill="hold">
+                                          <p:stCondLst>
+                                            <p:cond delay="0"/>
+                                          </p:stCondLst>
+                                        </p:cTn>
+                                        <p:tgtEl>
+                                          <p:spTgt spid="3">
+                                            <p:txEl>
+                                              <p:pRg st="2" end="2"/>
+                                            </p:txEl>
+                                          </p:spTgt>
+                                        </p:tgtEl>
+                                        <p:attrNameLst>
+                                          <p:attrName>style.visibility</p:attrName>
+                                        </p:attrNameLst>
+                                      </p:cBhvr>
+                                      <p:to>
+                                        <p:strVal val="visible"/>
+                                      </p:to>
+                                    </p:set>
+                                  </p:childTnLst>
+                                </p:cTn>
+                              </p:par>
+                            </p:childTnLst>
+                          </p:cTn>
+                        </p:par>
+                      </p:childTnLst>
+                    </p:cTn>
+                  </p:par>
+                  <p:par>
+                    <p:cTn id="11" fill="hold">
+                      <p:stCondLst>
+                        <p:cond delay="indefinite"/>
+                      </p:stCondLst>
+                      <p:childTnLst>
+                        <p:par>
+                          <p:cTn id="12" fill="hold">
+                            <p:stCondLst>
+                              <p:cond delay="0"/>
+                            </p:stCondLst>
+                            <p:childTnLst>
+                              <p:par>
+                                <p:cTn id="13" presetID="1" presetClass="entr" presetSubtype="0" fill="hold" grpId="0" nodeType="clickEffect">
+                                  <p:stCondLst>
+                                    <p:cond delay="0"/>
+                                  </p:stCondLst>
+                                  <p:childTnLst>
+                                    <p:set>
+                                      <p:cBhvr>
+                                        <p:cTn id="14" dur="1" fill="hold">
+                                          <p:stCondLst>
+                                            <p:cond delay="0"/>
+                                          </p:stCondLst>
+                                        </p:cTn>
+                                        <p:tgtEl>
+                                          <p:spTgt spid="3">
+                                            <p:txEl>
+                                              <p:pRg st="3" end="3"/>
+                                            </p:txEl>
+                                          </p:spTgt>
+                                        </p:tgtEl>
+                                        <p:attrNameLst>
+                                          <p:attrName>style.visibility</p:attrName>
+                                        </p:attrNameLst>
+                                      </p:cBhvr>
+                                      <p:to>
+                                        <p:strVal val="visible"/>
+                                      </p:to>
+                                    </p:set>
+                                  </p:childTnLst>
+                                </p:cTn>
+                              </p:par>
+                            </p:childTnLst>
+                          </p:cTn>
+                        </p:par>
+                      </p:childTnLst>
+                    </p:cTn>
+                  </p:par>
+                  <p:par>
+                    <p:cTn id="15" fill="hold">
+                      <p:stCondLst>
+                        <p:cond delay="indefinite"/>
+                      </p:stCondLst>
+                      <p:childTnLst>
+                        <p:par>
+                          <p:cTn id="16" fill="hold">
+                            <p:stCondLst>
+                              <p:cond delay="0"/>
+                            </p:stCondLst>
+                            <p:childTnLst>
+                              <p:par>
+                                <p:cTn id="17" presetID="1" presetClass="entr" presetSubtype="0" fill="hold" grpId="0" nodeType="clickEffect">
+                                  <p:stCondLst>
+                                    <p:cond delay="0"/>
+                                  </p:stCondLst>
+                                  <p:childTnLst>
+                                    <p:set>
+                                      <p:cBhvr>
+                                        <p:cTn id="18" dur="1" fill="hold">
+                                          <p:stCondLst>
+                                            <p:cond delay="0"/>
+                                          </p:stCondLst>
+                                        </p:cTn>
+                                        <p:tgtEl>
+                                          <p:spTgt spid="3">
+                                            <p:txEl>
+                                              <p:pRg st="4" end="4"/>
+                                            </p:txEl>
+                                          </p:spTgt>
+                                        </p:tgtEl>
+                                        <p:attrNameLst>
+                                          <p:attrName>style.visibility</p:attrName>
+                                        </p:attrNameLst>
+                                      </p:cBhvr>
+                                      <p:to>
+                                        <p:strVal val="visible"/>
+                                      </p:to>
+                                    </p:set>
+                                  </p:childTnLst>
+                                </p:cTn>
+                              </p:par>
+                            </p:childTnLst>
+                          </p:cTn>
+                        </p:par>
+                      </p:childTnLst>
+                    </p:cTn>
+                  </p:par>
+                  <p:par>
+                    <p:cTn id="19" fill="hold">
+                      <p:stCondLst>
+                        <p:cond delay="indefinite"/>
+                      </p:stCondLst>
+                      <p:childTnLst>
+                        <p:par>
+                          <p:cTn id="20" fill="hold">
+                            <p:stCondLst>
+                              <p:cond delay="0"/>
+                            </p:stCondLst>
+                            <p:childTnLst>
+                              <p:par>
+                                <p:cTn id="21" presetID="1" presetClass="entr" presetSubtype="0" fill="hold" grpId="0" nodeType="clickEffect">
+                                  <p:stCondLst>
+                                    <p:cond delay="0"/>
+                                  </p:stCondLst>
+                                  <p:childTnLst>
+                                    <p:set>
+                                      <p:cBhvr>
+                                        <p:cTn id="22" dur="1" fill="hold">
+                                          <p:stCondLst>
+                                            <p:cond delay="0"/>
+                                          </p:stCondLst>
+                                        </p:cTn>
+                                        <p:tgtEl>
+                                          <p:spTgt spid="3">
+                                            <p:txEl>
+                                              <p:pRg st="5" end="5"/>
+                                            </p:txEl>
+                                          </p:spTgt>
+                                        </p:tgtEl>
+                                        <p:attrNameLst>
+                                          <p:attrName>style.visibility</p:attrName>
+                                        </p:attrNameLst>
+                                      </p:cBhvr>
+                                      <p:to>
+                                        <p:strVal val="visible"/>
+                                      </p:to>
+                                    </p:set>
+                                  </p:childTnLst>
+                                </p:cTn>
+                              </p:par>
+                            </p:childTnLst>
+                          </p:cTn>
+                        </p:par>
+                      </p:childTnLst>
+                    </p:cTn>
+                  </p:par>
+                  <p:par>
+                    <p:cTn id="23" fill="hold">
+                      <p:stCondLst>
+                        <p:cond delay="indefinite"/>
+                      </p:stCondLst>
+                      <p:childTnLst>
+                        <p:par>
+                          <p:cTn id="24" fill="hold">
+                            <p:stCondLst>
+                              <p:cond delay="0"/>
+                            </p:stCondLst>
+                            <p:childTnLst>
+                              <p:par>
+                                <p:cTn id="25" presetID="1" presetClass="entr" presetSubtype="0" fill="hold" grpId="0" nodeType="clickEffect">
+                                  <p:stCondLst>
+                                    <p:cond delay="0"/>
+                                  </p:stCondLst>
+                                  <p:childTnLst>
+                                    <p:set>
+                                      <p:cBhvr>
+                                        <p:cTn id="26" dur="1" fill="hold">
+                                          <p:stCondLst>
+                                            <p:cond delay="0"/>
+                                          </p:stCondLst>
+                                        </p:cTn>
+                                        <p:tgtEl>
+                                          <p:spTgt spid="3">
+                                            <p:txEl>
+                                              <p:pRg st="6" end="6"/>
+                                            </p:txEl>
+                                          </p:spTgt>
+                                        </p:tgtEl>
+                                        <p:attrNameLst>
+                                          <p:attrName>style.visibility</p:attrName>
+                                        </p:attrNameLst>
+                                      </p:cBhvr>
+                                      <p:to>
+                                        <p:strVal val="visible"/>
+                                      </p:to>
+                                    </p:set>
+                                  </p:childTnLst>
+                                </p:cTn>
+                              </p:par>
+                            </p:childTnLst>
+                          </p:cTn>
+                        </p:par>
+                      </p:childTnLst>
+                    </p:cTn>
+                  </p:par>
+                  <p:par>
+                    <p:cTn id="27" fill="hold">
+                      <p:stCondLst>
+                        <p:cond delay="indefinite"/>
+                      </p:stCondLst>
+                      <p:childTnLst>
+                        <p:par>
+                          <p:cTn id="28" fill="hold">
+                            <p:stCondLst>
+                              <p:cond delay="0"/>
+                            </p:stCondLst>
+                            <p:childTnLst>
+                              <p:par>
+                                <p:cTn id="29" presetID="1" presetClass="entr" presetSubtype="0" fill="hold" grpId="0" nodeType="clickEffect">
+                                  <p:stCondLst>
+                                    <p:cond delay="0"/>
+                                  </p:stCondLst>
+                                  <p:childTnLst>
+                                    <p:set>
+                                      <p:cBhvr>
+                                        <p:cTn id="30" dur="1" fill="hold">
+                                          <p:stCondLst>
+                                            <p:cond delay="0"/>
+                                          </p:stCondLst>
+                                        </p:cTn>
+                                        <p:tgtEl>
+                                          <p:spTgt spid="3">
+                                            <p:txEl>
+                                              <p:pRg st="7" end="7"/>
+                                            </p:txEl>
+                                          </p:spTgt>
+                                        </p:tgtEl>
+                                        <p:attrNameLst>
+                                          <p:attrName>style.visibility</p:attrName>
+                                        </p:attrNameLst>
+                                      </p:cBhvr>
+                                      <p:to>
+                                        <p:strVal val="visible"/>
+                                      </p:to>
+                                    </p:set>
+                                  </p:childTnLst>
+                                </p:cTn>
+                              </p:par>
+                            </p:childTnLst>
+                          </p:cTn>
+                        </p:par>
+                      </p:childTnLst>
+                    </p:cTn>
+                  </p:par>
+                  <p:par>
+                    <p:cTn id="31" fill="hold">
+                      <p:stCondLst>
+                        <p:cond delay="indefinite"/>
+                      </p:stCondLst>
+                      <p:childTnLst>
+                        <p:par>
+                          <p:cTn id="32" fill="hold">
+                            <p:stCondLst>
+                              <p:cond delay="0"/>
+                            </p:stCondLst>
+                            <p:childTnLst>
+                              <p:par>
+                                <p:cTn id="33" presetID="1" presetClass="entr" presetSubtype="0" fill="hold" grpId="0" nodeType="clickEffect">
+                                  <p:stCondLst>
+                                    <p:cond delay="0"/>
+                                  </p:stCondLst>
+                                  <p:childTnLst>
+                                    <p:set>
+                                      <p:cBhvr>
+                                        <p:cTn id="34" dur="1" fill="hold">
+                                          <p:stCondLst>
+                                            <p:cond delay="0"/>
+                                          </p:stCondLst>
+                                        </p:cTn>
+                                        <p:tgtEl>
+                                          <p:spTgt spid="3">
+                                            <p:txEl>
+                                              <p:pRg st="8" end="8"/>
+                                            </p:txEl>
+                                          </p:spTgt>
+                                        </p:tgtEl>
+                                        <p:attrNameLst>
+                                          <p:attrName>style.visibility</p:attrName>
+                                        </p:attrNameLst>
+                                      </p:cBhvr>
+                                      <p:to>
+                                        <p:strVal val="visible"/>
+                                      </p:to>
+                                    </p:set>
+                                  </p:childTnLst>
+                                </p:cTn>
+                              </p:par>
+                            </p:childTnLst>
+                          </p:cTn>
+                        </p:par>
+                      </p:childTnLst>
+                    </p:cTn>
+                  </p:par>
+                  <p:par>
+                    <p:cTn id="35" fill="hold">
+                      <p:stCondLst>
+                        <p:cond delay="indefinite"/>
+                      </p:stCondLst>
+                      <p:childTnLst>
+                        <p:par>
+                          <p:cTn id="36" fill="hold">
+                            <p:stCondLst>
+                              <p:cond delay="0"/>
+                            </p:stCondLst>
+                            <p:childTnLst>
+                              <p:par>
+                                <p:cTn id="37" presetID="1" presetClass="entr" presetSubtype="0" fill="hold" grpId="0" nodeType="clickEffect">
+                                  <p:stCondLst>
+                                    <p:cond delay="0"/>
+                                  </p:stCondLst>
+                                  <p:childTnLst>
+                                    <p:set>
+                                      <p:cBhvr>
+                                        <p:cTn id="38" dur="1" fill="hold">
+                                          <p:stCondLst>
+                                            <p:cond delay="0"/>
+                                          </p:stCondLst>
+                                        </p:cTn>
+                                        <p:tgtEl>
+                                          <p:spTgt spid="3">
+                                            <p:txEl>
+                                              <p:pRg st="9" end="9"/>
+                                            </p:txEl>
+                                          </p:spTgt>
+                                        </p:tgtEl>
+                                        <p:attrNameLst>
+                                          <p:attrName>style.visibility</p:attrName>
+                                        </p:attrNameLst>
+                                      </p:cBhvr>
+                                      <p:to>
+                                        <p:strVal val="visible"/>
+                                      </p:to>
+                                    </p:set>
+                                  </p:childTnLst>
+                                </p:cTn>
+                              </p:par>
+                            </p:childTnLst>
+                          </p:cTn>
+                        </p:par>
+                      </p:childTnLst>
+                    </p:cTn>
+                  </p:par>
+                  <p:par>
+                    <p:cTn id="39" fill="hold">
+                      <p:stCondLst>
+                        <p:cond delay="indefinite"/>
+                      </p:stCondLst>
+                      <p:childTnLst>
+                        <p:par>
+                          <p:cTn id="40" fill="hold">
+                            <p:stCondLst>
+                              <p:cond delay="0"/>
+                            </p:stCondLst>
+                            <p:childTnLst>
+                              <p:par>
+                                <p:cTn id="41" presetID="1" presetClass="entr" presetSubtype="0" fill="hold" grpId="0" nodeType="clickEffect">
+                                  <p:stCondLst>
+                                    <p:cond delay="0"/>
+                                  </p:stCondLst>
+                                  <p:childTnLst>
+                                    <p:set>
+                                      <p:cBhvr>
+                                        <p:cTn id="42" dur="1" fill="hold">
+                                          <p:stCondLst>
+                                            <p:cond delay="0"/>
+                                          </p:stCondLst>
+                                        </p:cTn>
+                                        <p:tgtEl>
+                                          <p:spTgt spid="3">
+                                            <p:txEl>
+                                              <p:pRg st="10" end="10"/>
+                                            </p:txEl>
+                                          </p:spTgt>
+                                        </p:tgtEl>
+                                        <p:attrNameLst>
+                                          <p:attrName>style.visibility</p:attrName>
+                                        </p:attrNameLst>
+                                      </p:cBhvr>
+                                      <p:to>
+                                        <p:strVal val="visible"/>
+                                      </p:to>
+                                    </p:set>
+                                  </p:childTnLst>
+                                </p:cTn>
+                              </p:par>
+                            </p:childTnLst>
+                          </p:cTn>
+                        </p:par>
+                      </p:childTnLst>
+                    </p:cTn>
+                  </p:par>
+                </p:childTnLst>
+              </p:cTn>
+              <p:prevCondLst>
+                <p:cond evt="onPrev" delay="0">
+                  <p:tgtEl>
+                    <p:sldTgt/>
+                  </p:tgtEl>
+                </p:cond>
+              </p:prevCondLst>
+              <p:nextCondLst>
+                <p:cond evt="onNext" delay="0">
+                  <p:tgtEl>
+                    <p:sldTgt/>
+                  </p:tgtEl>
+                </p:cond>
+              </p:nextCondLst>
+            </p:seq>
+          </p:childTnLst>
+        </p:cTn>
+      </p:par>
+    </p:tnLst>
+    <p:bldLst>
+      <p:bldP spid="3" grpId="0" uiExpand="1" build="p"/>
+    </p:bldLst>
+  </p:timing>
 </p:sld>
 </file>
 
@@ -8671,6 +10977,345 @@
   <p:clrMapOvr>
     <a:masterClrMapping/>
   </p:clrMapOvr>
+  <mc:AlternateContent xmlns:mc="http://schemas.openxmlformats.org/markup-compatibility/2006">
+    <mc:Choice xmlns:p159="http://schemas.microsoft.com/office/powerpoint/2015/09/main" Requires="p159">
+      <p:transition xmlns:p14="http://schemas.microsoft.com/office/powerpoint/2010/main" spd="slow" p14:dur="2000">
+        <p159:morph option="byObject"/>
+      </p:transition>
+    </mc:Choice>
+    <mc:Fallback>
+      <p:transition spd="slow">
+        <p:fade/>
+      </p:transition>
+    </mc:Fallback>
+  </mc:AlternateContent>
+  <p:timing>
+    <p:tnLst>
+      <p:par>
+        <p:cTn id="1" dur="indefinite" restart="never" nodeType="tmRoot">
+          <p:childTnLst>
+            <p:seq concurrent="1" nextAc="seek">
+              <p:cTn id="2" dur="indefinite" nodeType="mainSeq">
+                <p:childTnLst>
+                  <p:par>
+                    <p:cTn id="3" fill="hold">
+                      <p:stCondLst>
+                        <p:cond delay="indefinite"/>
+                      </p:stCondLst>
+                      <p:childTnLst>
+                        <p:par>
+                          <p:cTn id="4" fill="hold">
+                            <p:stCondLst>
+                              <p:cond delay="0"/>
+                            </p:stCondLst>
+                            <p:childTnLst>
+                              <p:par>
+                                <p:cTn id="5" presetID="1" presetClass="entr" presetSubtype="0" fill="hold" grpId="0" nodeType="clickEffect">
+                                  <p:stCondLst>
+                                    <p:cond delay="0"/>
+                                  </p:stCondLst>
+                                  <p:childTnLst>
+                                    <p:set>
+                                      <p:cBhvr>
+                                        <p:cTn id="6" dur="1" fill="hold">
+                                          <p:stCondLst>
+                                            <p:cond delay="0"/>
+                                          </p:stCondLst>
+                                        </p:cTn>
+                                        <p:tgtEl>
+                                          <p:spTgt spid="3">
+                                            <p:txEl>
+                                              <p:pRg st="0" end="0"/>
+                                            </p:txEl>
+                                          </p:spTgt>
+                                        </p:tgtEl>
+                                        <p:attrNameLst>
+                                          <p:attrName>style.visibility</p:attrName>
+                                        </p:attrNameLst>
+                                      </p:cBhvr>
+                                      <p:to>
+                                        <p:strVal val="visible"/>
+                                      </p:to>
+                                    </p:set>
+                                  </p:childTnLst>
+                                </p:cTn>
+                              </p:par>
+                            </p:childTnLst>
+                          </p:cTn>
+                        </p:par>
+                      </p:childTnLst>
+                    </p:cTn>
+                  </p:par>
+                  <p:par>
+                    <p:cTn id="7" fill="hold">
+                      <p:stCondLst>
+                        <p:cond delay="indefinite"/>
+                      </p:stCondLst>
+                      <p:childTnLst>
+                        <p:par>
+                          <p:cTn id="8" fill="hold">
+                            <p:stCondLst>
+                              <p:cond delay="0"/>
+                            </p:stCondLst>
+                            <p:childTnLst>
+                              <p:par>
+                                <p:cTn id="9" presetID="1" presetClass="entr" presetSubtype="0" fill="hold" grpId="0" nodeType="clickEffect">
+                                  <p:stCondLst>
+                                    <p:cond delay="0"/>
+                                  </p:stCondLst>
+                                  <p:childTnLst>
+                                    <p:set>
+                                      <p:cBhvr>
+                                        <p:cTn id="10" dur="1" fill="hold">
+                                          <p:stCondLst>
+                                            <p:cond delay="0"/>
+                                          </p:stCondLst>
+                                        </p:cTn>
+                                        <p:tgtEl>
+                                          <p:spTgt spid="3">
+                                            <p:txEl>
+                                              <p:pRg st="2" end="2"/>
+                                            </p:txEl>
+                                          </p:spTgt>
+                                        </p:tgtEl>
+                                        <p:attrNameLst>
+                                          <p:attrName>style.visibility</p:attrName>
+                                        </p:attrNameLst>
+                                      </p:cBhvr>
+                                      <p:to>
+                                        <p:strVal val="visible"/>
+                                      </p:to>
+                                    </p:set>
+                                  </p:childTnLst>
+                                </p:cTn>
+                              </p:par>
+                            </p:childTnLst>
+                          </p:cTn>
+                        </p:par>
+                      </p:childTnLst>
+                    </p:cTn>
+                  </p:par>
+                  <p:par>
+                    <p:cTn id="11" fill="hold">
+                      <p:stCondLst>
+                        <p:cond delay="indefinite"/>
+                      </p:stCondLst>
+                      <p:childTnLst>
+                        <p:par>
+                          <p:cTn id="12" fill="hold">
+                            <p:stCondLst>
+                              <p:cond delay="0"/>
+                            </p:stCondLst>
+                            <p:childTnLst>
+                              <p:par>
+                                <p:cTn id="13" presetID="1" presetClass="entr" presetSubtype="0" fill="hold" grpId="0" nodeType="clickEffect">
+                                  <p:stCondLst>
+                                    <p:cond delay="0"/>
+                                  </p:stCondLst>
+                                  <p:childTnLst>
+                                    <p:set>
+                                      <p:cBhvr>
+                                        <p:cTn id="14" dur="1" fill="hold">
+                                          <p:stCondLst>
+                                            <p:cond delay="0"/>
+                                          </p:stCondLst>
+                                        </p:cTn>
+                                        <p:tgtEl>
+                                          <p:spTgt spid="3">
+                                            <p:txEl>
+                                              <p:pRg st="3" end="3"/>
+                                            </p:txEl>
+                                          </p:spTgt>
+                                        </p:tgtEl>
+                                        <p:attrNameLst>
+                                          <p:attrName>style.visibility</p:attrName>
+                                        </p:attrNameLst>
+                                      </p:cBhvr>
+                                      <p:to>
+                                        <p:strVal val="visible"/>
+                                      </p:to>
+                                    </p:set>
+                                  </p:childTnLst>
+                                </p:cTn>
+                              </p:par>
+                            </p:childTnLst>
+                          </p:cTn>
+                        </p:par>
+                      </p:childTnLst>
+                    </p:cTn>
+                  </p:par>
+                  <p:par>
+                    <p:cTn id="15" fill="hold">
+                      <p:stCondLst>
+                        <p:cond delay="indefinite"/>
+                      </p:stCondLst>
+                      <p:childTnLst>
+                        <p:par>
+                          <p:cTn id="16" fill="hold">
+                            <p:stCondLst>
+                              <p:cond delay="0"/>
+                            </p:stCondLst>
+                            <p:childTnLst>
+                              <p:par>
+                                <p:cTn id="17" presetID="1" presetClass="entr" presetSubtype="0" fill="hold" grpId="0" nodeType="clickEffect">
+                                  <p:stCondLst>
+                                    <p:cond delay="0"/>
+                                  </p:stCondLst>
+                                  <p:childTnLst>
+                                    <p:set>
+                                      <p:cBhvr>
+                                        <p:cTn id="18" dur="1" fill="hold">
+                                          <p:stCondLst>
+                                            <p:cond delay="0"/>
+                                          </p:stCondLst>
+                                        </p:cTn>
+                                        <p:tgtEl>
+                                          <p:spTgt spid="3">
+                                            <p:txEl>
+                                              <p:pRg st="4" end="4"/>
+                                            </p:txEl>
+                                          </p:spTgt>
+                                        </p:tgtEl>
+                                        <p:attrNameLst>
+                                          <p:attrName>style.visibility</p:attrName>
+                                        </p:attrNameLst>
+                                      </p:cBhvr>
+                                      <p:to>
+                                        <p:strVal val="visible"/>
+                                      </p:to>
+                                    </p:set>
+                                  </p:childTnLst>
+                                </p:cTn>
+                              </p:par>
+                            </p:childTnLst>
+                          </p:cTn>
+                        </p:par>
+                      </p:childTnLst>
+                    </p:cTn>
+                  </p:par>
+                  <p:par>
+                    <p:cTn id="19" fill="hold">
+                      <p:stCondLst>
+                        <p:cond delay="indefinite"/>
+                      </p:stCondLst>
+                      <p:childTnLst>
+                        <p:par>
+                          <p:cTn id="20" fill="hold">
+                            <p:stCondLst>
+                              <p:cond delay="0"/>
+                            </p:stCondLst>
+                            <p:childTnLst>
+                              <p:par>
+                                <p:cTn id="21" presetID="1" presetClass="entr" presetSubtype="0" fill="hold" grpId="0" nodeType="clickEffect">
+                                  <p:stCondLst>
+                                    <p:cond delay="0"/>
+                                  </p:stCondLst>
+                                  <p:childTnLst>
+                                    <p:set>
+                                      <p:cBhvr>
+                                        <p:cTn id="22" dur="1" fill="hold">
+                                          <p:stCondLst>
+                                            <p:cond delay="0"/>
+                                          </p:stCondLst>
+                                        </p:cTn>
+                                        <p:tgtEl>
+                                          <p:spTgt spid="3">
+                                            <p:txEl>
+                                              <p:pRg st="5" end="5"/>
+                                            </p:txEl>
+                                          </p:spTgt>
+                                        </p:tgtEl>
+                                        <p:attrNameLst>
+                                          <p:attrName>style.visibility</p:attrName>
+                                        </p:attrNameLst>
+                                      </p:cBhvr>
+                                      <p:to>
+                                        <p:strVal val="visible"/>
+                                      </p:to>
+                                    </p:set>
+                                  </p:childTnLst>
+                                </p:cTn>
+                              </p:par>
+                            </p:childTnLst>
+                          </p:cTn>
+                        </p:par>
+                      </p:childTnLst>
+                    </p:cTn>
+                  </p:par>
+                  <p:par>
+                    <p:cTn id="23" fill="hold">
+                      <p:stCondLst>
+                        <p:cond delay="indefinite"/>
+                      </p:stCondLst>
+                      <p:childTnLst>
+                        <p:par>
+                          <p:cTn id="24" fill="hold">
+                            <p:stCondLst>
+                              <p:cond delay="0"/>
+                            </p:stCondLst>
+                            <p:childTnLst>
+                              <p:par>
+                                <p:cTn id="25" presetID="1" presetClass="entr" presetSubtype="0" fill="hold" grpId="0" nodeType="clickEffect">
+                                  <p:stCondLst>
+                                    <p:cond delay="0"/>
+                                  </p:stCondLst>
+                                  <p:childTnLst>
+                                    <p:set>
+                                      <p:cBhvr>
+                                        <p:cTn id="26" dur="1" fill="hold">
+                                          <p:stCondLst>
+                                            <p:cond delay="0"/>
+                                          </p:stCondLst>
+                                        </p:cTn>
+                                        <p:tgtEl>
+                                          <p:spTgt spid="3">
+                                            <p:txEl>
+                                              <p:pRg st="7" end="7"/>
+                                            </p:txEl>
+                                          </p:spTgt>
+                                        </p:tgtEl>
+                                        <p:attrNameLst>
+                                          <p:attrName>style.visibility</p:attrName>
+                                        </p:attrNameLst>
+                                      </p:cBhvr>
+                                      <p:to>
+                                        <p:strVal val="visible"/>
+                                      </p:to>
+                                    </p:set>
+                                  </p:childTnLst>
+                                </p:cTn>
+                              </p:par>
+                            </p:childTnLst>
+                          </p:cTn>
+                        </p:par>
+                      </p:childTnLst>
+                    </p:cTn>
+                  </p:par>
+                </p:childTnLst>
+              </p:cTn>
+              <p:prevCondLst>
+                <p:cond evt="onPrev" delay="0">
+                  <p:tgtEl>
+                    <p:sldTgt/>
+                  </p:tgtEl>
+                </p:cond>
+              </p:prevCondLst>
+              <p:nextCondLst>
+                <p:cond evt="onNext" delay="0">
+                  <p:tgtEl>
+                    <p:sldTgt/>
+                  </p:tgtEl>
+                </p:cond>
+              </p:nextCondLst>
+            </p:seq>
+          </p:childTnLst>
+        </p:cTn>
+      </p:par>
+    </p:tnLst>
+    <p:bldLst>
+      <p:bldP spid="3" grpId="0" uiExpand="1" build="p"/>
+    </p:bldLst>
+  </p:timing>
 </p:sld>
 </file>
 
@@ -8750,6 +11395,9 @@
           <a:bodyPr/>
           <a:lstStyle/>
           <a:p>
+            <a:endParaRPr lang="en-US" dirty="0"/>
+          </a:p>
+          <a:p>
             <a:r>
               <a:rPr lang="en-US" dirty="0"/>
               <a:t>Who is the source of authority?</a:t>
@@ -8763,9 +11411,28 @@
             </a:r>
           </a:p>
           <a:p>
+            <a:endParaRPr lang="en-US" dirty="0"/>
+          </a:p>
+          <a:p>
             <a:r>
               <a:rPr lang="en-US" dirty="0"/>
               <a:t>If working in a team, you must have good teamwork</a:t>
+            </a:r>
+          </a:p>
+          <a:p>
+            <a:endParaRPr lang="en-US" dirty="0"/>
+          </a:p>
+          <a:p>
+            <a:r>
+              <a:rPr lang="en-US" dirty="0"/>
+              <a:t>Seems like it could be chaos.</a:t>
+            </a:r>
+          </a:p>
+          <a:p>
+            <a:pPr lvl="1"/>
+            <a:r>
+              <a:rPr lang="en-US" dirty="0"/>
+              <a:t>This can be managed through some rules and workflows. </a:t>
             </a:r>
           </a:p>
           <a:p>
@@ -8783,6 +11450,296 @@
   <p:clrMapOvr>
     <a:masterClrMapping/>
   </p:clrMapOvr>
+  <mc:AlternateContent xmlns:mc="http://schemas.openxmlformats.org/markup-compatibility/2006">
+    <mc:Choice xmlns:p159="http://schemas.microsoft.com/office/powerpoint/2015/09/main" Requires="p159">
+      <p:transition xmlns:p14="http://schemas.microsoft.com/office/powerpoint/2010/main" spd="slow" p14:dur="2000">
+        <p159:morph option="byObject"/>
+      </p:transition>
+    </mc:Choice>
+    <mc:Fallback>
+      <p:transition spd="slow">
+        <p:fade/>
+      </p:transition>
+    </mc:Fallback>
+  </mc:AlternateContent>
+  <p:timing>
+    <p:tnLst>
+      <p:par>
+        <p:cTn id="1" dur="indefinite" restart="never" nodeType="tmRoot">
+          <p:childTnLst>
+            <p:seq concurrent="1" nextAc="seek">
+              <p:cTn id="2" dur="indefinite" nodeType="mainSeq">
+                <p:childTnLst>
+                  <p:par>
+                    <p:cTn id="3" fill="hold">
+                      <p:stCondLst>
+                        <p:cond delay="indefinite"/>
+                      </p:stCondLst>
+                      <p:childTnLst>
+                        <p:par>
+                          <p:cTn id="4" fill="hold">
+                            <p:stCondLst>
+                              <p:cond delay="0"/>
+                            </p:stCondLst>
+                            <p:childTnLst>
+                              <p:par>
+                                <p:cTn id="5" presetID="1" presetClass="entr" presetSubtype="0" fill="hold" grpId="0" nodeType="clickEffect">
+                                  <p:stCondLst>
+                                    <p:cond delay="0"/>
+                                  </p:stCondLst>
+                                  <p:childTnLst>
+                                    <p:set>
+                                      <p:cBhvr>
+                                        <p:cTn id="6" dur="1" fill="hold">
+                                          <p:stCondLst>
+                                            <p:cond delay="0"/>
+                                          </p:stCondLst>
+                                        </p:cTn>
+                                        <p:tgtEl>
+                                          <p:spTgt spid="3">
+                                            <p:txEl>
+                                              <p:pRg st="1" end="1"/>
+                                            </p:txEl>
+                                          </p:spTgt>
+                                        </p:tgtEl>
+                                        <p:attrNameLst>
+                                          <p:attrName>style.visibility</p:attrName>
+                                        </p:attrNameLst>
+                                      </p:cBhvr>
+                                      <p:to>
+                                        <p:strVal val="visible"/>
+                                      </p:to>
+                                    </p:set>
+                                  </p:childTnLst>
+                                </p:cTn>
+                              </p:par>
+                            </p:childTnLst>
+                          </p:cTn>
+                        </p:par>
+                      </p:childTnLst>
+                    </p:cTn>
+                  </p:par>
+                  <p:par>
+                    <p:cTn id="7" fill="hold">
+                      <p:stCondLst>
+                        <p:cond delay="indefinite"/>
+                      </p:stCondLst>
+                      <p:childTnLst>
+                        <p:par>
+                          <p:cTn id="8" fill="hold">
+                            <p:stCondLst>
+                              <p:cond delay="0"/>
+                            </p:stCondLst>
+                            <p:childTnLst>
+                              <p:par>
+                                <p:cTn id="9" presetID="1" presetClass="entr" presetSubtype="0" fill="hold" grpId="0" nodeType="clickEffect">
+                                  <p:stCondLst>
+                                    <p:cond delay="0"/>
+                                  </p:stCondLst>
+                                  <p:childTnLst>
+                                    <p:set>
+                                      <p:cBhvr>
+                                        <p:cTn id="10" dur="1" fill="hold">
+                                          <p:stCondLst>
+                                            <p:cond delay="0"/>
+                                          </p:stCondLst>
+                                        </p:cTn>
+                                        <p:tgtEl>
+                                          <p:spTgt spid="3">
+                                            <p:txEl>
+                                              <p:pRg st="2" end="2"/>
+                                            </p:txEl>
+                                          </p:spTgt>
+                                        </p:tgtEl>
+                                        <p:attrNameLst>
+                                          <p:attrName>style.visibility</p:attrName>
+                                        </p:attrNameLst>
+                                      </p:cBhvr>
+                                      <p:to>
+                                        <p:strVal val="visible"/>
+                                      </p:to>
+                                    </p:set>
+                                  </p:childTnLst>
+                                </p:cTn>
+                              </p:par>
+                            </p:childTnLst>
+                          </p:cTn>
+                        </p:par>
+                      </p:childTnLst>
+                    </p:cTn>
+                  </p:par>
+                  <p:par>
+                    <p:cTn id="11" fill="hold">
+                      <p:stCondLst>
+                        <p:cond delay="indefinite"/>
+                      </p:stCondLst>
+                      <p:childTnLst>
+                        <p:par>
+                          <p:cTn id="12" fill="hold">
+                            <p:stCondLst>
+                              <p:cond delay="0"/>
+                            </p:stCondLst>
+                            <p:childTnLst>
+                              <p:par>
+                                <p:cTn id="13" presetID="1" presetClass="entr" presetSubtype="0" fill="hold" grpId="0" nodeType="clickEffect">
+                                  <p:stCondLst>
+                                    <p:cond delay="0"/>
+                                  </p:stCondLst>
+                                  <p:childTnLst>
+                                    <p:set>
+                                      <p:cBhvr>
+                                        <p:cTn id="14" dur="1" fill="hold">
+                                          <p:stCondLst>
+                                            <p:cond delay="0"/>
+                                          </p:stCondLst>
+                                        </p:cTn>
+                                        <p:tgtEl>
+                                          <p:spTgt spid="3">
+                                            <p:txEl>
+                                              <p:pRg st="4" end="4"/>
+                                            </p:txEl>
+                                          </p:spTgt>
+                                        </p:tgtEl>
+                                        <p:attrNameLst>
+                                          <p:attrName>style.visibility</p:attrName>
+                                        </p:attrNameLst>
+                                      </p:cBhvr>
+                                      <p:to>
+                                        <p:strVal val="visible"/>
+                                      </p:to>
+                                    </p:set>
+                                  </p:childTnLst>
+                                </p:cTn>
+                              </p:par>
+                            </p:childTnLst>
+                          </p:cTn>
+                        </p:par>
+                      </p:childTnLst>
+                    </p:cTn>
+                  </p:par>
+                  <p:par>
+                    <p:cTn id="15" fill="hold">
+                      <p:stCondLst>
+                        <p:cond delay="indefinite"/>
+                      </p:stCondLst>
+                      <p:childTnLst>
+                        <p:par>
+                          <p:cTn id="16" fill="hold">
+                            <p:stCondLst>
+                              <p:cond delay="0"/>
+                            </p:stCondLst>
+                            <p:childTnLst>
+                              <p:par>
+                                <p:cTn id="17" presetID="1" presetClass="entr" presetSubtype="0" fill="hold" grpId="0" nodeType="clickEffect">
+                                  <p:stCondLst>
+                                    <p:cond delay="0"/>
+                                  </p:stCondLst>
+                                  <p:childTnLst>
+                                    <p:set>
+                                      <p:cBhvr>
+                                        <p:cTn id="18" dur="1" fill="hold">
+                                          <p:stCondLst>
+                                            <p:cond delay="0"/>
+                                          </p:stCondLst>
+                                        </p:cTn>
+                                        <p:tgtEl>
+                                          <p:spTgt spid="3">
+                                            <p:txEl>
+                                              <p:pRg st="6" end="6"/>
+                                            </p:txEl>
+                                          </p:spTgt>
+                                        </p:tgtEl>
+                                        <p:attrNameLst>
+                                          <p:attrName>style.visibility</p:attrName>
+                                        </p:attrNameLst>
+                                      </p:cBhvr>
+                                      <p:to>
+                                        <p:strVal val="visible"/>
+                                      </p:to>
+                                    </p:set>
+                                  </p:childTnLst>
+                                </p:cTn>
+                              </p:par>
+                            </p:childTnLst>
+                          </p:cTn>
+                        </p:par>
+                      </p:childTnLst>
+                    </p:cTn>
+                  </p:par>
+                  <p:par>
+                    <p:cTn id="19" fill="hold">
+                      <p:stCondLst>
+                        <p:cond delay="indefinite"/>
+                      </p:stCondLst>
+                      <p:childTnLst>
+                        <p:par>
+                          <p:cTn id="20" fill="hold">
+                            <p:stCondLst>
+                              <p:cond delay="0"/>
+                            </p:stCondLst>
+                            <p:childTnLst>
+                              <p:par>
+                                <p:cTn id="21" presetID="1" presetClass="entr" presetSubtype="0" fill="hold" grpId="0" nodeType="clickEffect">
+                                  <p:stCondLst>
+                                    <p:cond delay="0"/>
+                                  </p:stCondLst>
+                                  <p:childTnLst>
+                                    <p:set>
+                                      <p:cBhvr>
+                                        <p:cTn id="22" dur="1" fill="hold">
+                                          <p:stCondLst>
+                                            <p:cond delay="0"/>
+                                          </p:stCondLst>
+                                        </p:cTn>
+                                        <p:tgtEl>
+                                          <p:spTgt spid="3">
+                                            <p:txEl>
+                                              <p:pRg st="7" end="7"/>
+                                            </p:txEl>
+                                          </p:spTgt>
+                                        </p:tgtEl>
+                                        <p:attrNameLst>
+                                          <p:attrName>style.visibility</p:attrName>
+                                        </p:attrNameLst>
+                                      </p:cBhvr>
+                                      <p:to>
+                                        <p:strVal val="visible"/>
+                                      </p:to>
+                                    </p:set>
+                                  </p:childTnLst>
+                                </p:cTn>
+                              </p:par>
+                            </p:childTnLst>
+                          </p:cTn>
+                        </p:par>
+                      </p:childTnLst>
+                    </p:cTn>
+                  </p:par>
+                </p:childTnLst>
+              </p:cTn>
+              <p:prevCondLst>
+                <p:cond evt="onPrev" delay="0">
+                  <p:tgtEl>
+                    <p:sldTgt/>
+                  </p:tgtEl>
+                </p:cond>
+              </p:prevCondLst>
+              <p:nextCondLst>
+                <p:cond evt="onNext" delay="0">
+                  <p:tgtEl>
+                    <p:sldTgt/>
+                  </p:tgtEl>
+                </p:cond>
+              </p:nextCondLst>
+            </p:seq>
+          </p:childTnLst>
+        </p:cTn>
+      </p:par>
+    </p:tnLst>
+    <p:bldLst>
+      <p:bldP spid="3" grpId="0" uiExpand="1" build="p"/>
+    </p:bldLst>
+  </p:timing>
 </p:sld>
 </file>
 
@@ -8808,7 +11765,7 @@
           <p:cNvPr id="2" name="Title 1">
             <a:extLst>
               <a:ext uri="{FF2B5EF4-FFF2-40B4-BE49-F238E27FC236}">
-                <a16:creationId xmlns:a16="http://schemas.microsoft.com/office/drawing/2014/main" id="{7EE1DCE8-D311-4D99-A81C-BE65135FC7B1}"/>
+                <a16:creationId xmlns:a16="http://schemas.microsoft.com/office/drawing/2014/main" id="{BD61DC07-2119-4D76-8D85-02068B8AE439}"/>
               </a:ext>
             </a:extLst>
           </p:cNvPr>
@@ -8819,19 +11776,14 @@
             <p:ph type="title"/>
           </p:nvPr>
         </p:nvSpPr>
-        <p:spPr>
-          <a:xfrm>
-            <a:off x="677334" y="609600"/>
-            <a:ext cx="8596668" cy="732639"/>
-          </a:xfrm>
-        </p:spPr>
+        <p:spPr/>
         <p:txBody>
           <a:bodyPr/>
           <a:lstStyle/>
           <a:p>
             <a:r>
               <a:rPr lang="en-US" dirty="0"/>
-              <a:t>How Does Git Work?</a:t>
+              <a:t>Repositories</a:t>
             </a:r>
           </a:p>
         </p:txBody>
@@ -8841,7 +11793,7 @@
           <p:cNvPr id="3" name="Content Placeholder 2">
             <a:extLst>
               <a:ext uri="{FF2B5EF4-FFF2-40B4-BE49-F238E27FC236}">
-                <a16:creationId xmlns:a16="http://schemas.microsoft.com/office/drawing/2014/main" id="{9374DAC6-B719-4917-BD3A-9F035608224A}"/>
+                <a16:creationId xmlns:a16="http://schemas.microsoft.com/office/drawing/2014/main" id="{296796AB-AD6F-4E4A-A8FD-D16B19175E75}"/>
               </a:ext>
             </a:extLst>
           </p:cNvPr>
@@ -8852,68 +11804,296 @@
             <p:ph idx="1"/>
           </p:nvPr>
         </p:nvSpPr>
-        <p:spPr>
-          <a:xfrm>
-            <a:off x="677334" y="1342239"/>
-            <a:ext cx="8596668" cy="4699123"/>
-          </a:xfrm>
-        </p:spPr>
+        <p:spPr/>
         <p:txBody>
           <a:bodyPr/>
           <a:lstStyle/>
           <a:p>
             <a:r>
               <a:rPr lang="en-US" dirty="0"/>
-              <a:t>Three primary activities</a:t>
-            </a:r>
-          </a:p>
-          <a:p>
-            <a:pPr lvl="1"/>
+              <a:t>Store the files you want to track</a:t>
+            </a:r>
+          </a:p>
+          <a:p>
+            <a:endParaRPr lang="en-US" dirty="0"/>
+          </a:p>
+          <a:p>
             <a:r>
               <a:rPr lang="en-US" dirty="0"/>
-              <a:t>Committing</a:t>
-            </a:r>
-          </a:p>
-          <a:p>
-            <a:pPr lvl="1"/>
+              <a:t>Are a single folder</a:t>
+            </a:r>
+          </a:p>
+          <a:p>
+            <a:endParaRPr lang="en-US" dirty="0"/>
+          </a:p>
+          <a:p>
             <a:r>
               <a:rPr lang="en-US" dirty="0"/>
-              <a:t>Branching/Merging (aka unbranching)</a:t>
-            </a:r>
-          </a:p>
-          <a:p>
-            <a:pPr lvl="1"/>
+              <a:t>Contain all the git meta-data. </a:t>
+            </a:r>
+          </a:p>
+          <a:p>
+            <a:endParaRPr lang="en-US" dirty="0"/>
+          </a:p>
+          <a:p>
             <a:r>
               <a:rPr lang="en-US" dirty="0"/>
-              <a:t>Distributing (Push and Pull)</a:t>
-            </a:r>
-          </a:p>
-          <a:p>
-            <a:pPr lvl="1"/>
-            <a:endParaRPr lang="en-US" dirty="0"/>
-          </a:p>
-          <a:p>
-            <a:r>
-              <a:rPr lang="en-US" dirty="0"/>
-              <a:t>Everything else serves these three functions.</a:t>
-            </a:r>
-          </a:p>
-          <a:p>
-            <a:pPr lvl="1"/>
-            <a:endParaRPr lang="en-US" dirty="0"/>
+              <a:t>Contain ALL the changes that have been made to the files being tracked. </a:t>
+            </a:r>
           </a:p>
         </p:txBody>
       </p:sp>
     </p:spTree>
     <p:extLst>
       <p:ext uri="{BB962C8B-B14F-4D97-AF65-F5344CB8AC3E}">
-        <p14:creationId xmlns:p14="http://schemas.microsoft.com/office/powerpoint/2010/main" val="2490705565"/>
+        <p14:creationId xmlns:p14="http://schemas.microsoft.com/office/powerpoint/2010/main" val="2589151126"/>
       </p:ext>
     </p:extLst>
   </p:cSld>
   <p:clrMapOvr>
     <a:masterClrMapping/>
   </p:clrMapOvr>
+  <mc:AlternateContent xmlns:mc="http://schemas.openxmlformats.org/markup-compatibility/2006">
+    <mc:Choice xmlns:p159="http://schemas.microsoft.com/office/powerpoint/2015/09/main" Requires="p159">
+      <p:transition xmlns:p14="http://schemas.microsoft.com/office/powerpoint/2010/main" spd="slow" p14:dur="2000">
+        <p159:morph option="byObject"/>
+      </p:transition>
+    </mc:Choice>
+    <mc:Fallback>
+      <p:transition spd="slow">
+        <p:fade/>
+      </p:transition>
+    </mc:Fallback>
+  </mc:AlternateContent>
+  <p:timing>
+    <p:tnLst>
+      <p:par>
+        <p:cTn id="1" dur="indefinite" restart="never" nodeType="tmRoot">
+          <p:childTnLst>
+            <p:seq concurrent="1" nextAc="seek">
+              <p:cTn id="2" dur="indefinite" nodeType="mainSeq">
+                <p:childTnLst>
+                  <p:par>
+                    <p:cTn id="3" fill="hold">
+                      <p:stCondLst>
+                        <p:cond delay="indefinite"/>
+                      </p:stCondLst>
+                      <p:childTnLst>
+                        <p:par>
+                          <p:cTn id="4" fill="hold">
+                            <p:stCondLst>
+                              <p:cond delay="0"/>
+                            </p:stCondLst>
+                            <p:childTnLst>
+                              <p:par>
+                                <p:cTn id="5" presetID="1" presetClass="entr" presetSubtype="0" fill="hold" grpId="0" nodeType="clickEffect">
+                                  <p:stCondLst>
+                                    <p:cond delay="0"/>
+                                  </p:stCondLst>
+                                  <p:childTnLst>
+                                    <p:set>
+                                      <p:cBhvr>
+                                        <p:cTn id="6" dur="1" fill="hold">
+                                          <p:stCondLst>
+                                            <p:cond delay="0"/>
+                                          </p:stCondLst>
+                                        </p:cTn>
+                                        <p:tgtEl>
+                                          <p:spTgt spid="3">
+                                            <p:txEl>
+                                              <p:pRg st="0" end="0"/>
+                                            </p:txEl>
+                                          </p:spTgt>
+                                        </p:tgtEl>
+                                        <p:attrNameLst>
+                                          <p:attrName>style.visibility</p:attrName>
+                                        </p:attrNameLst>
+                                      </p:cBhvr>
+                                      <p:to>
+                                        <p:strVal val="visible"/>
+                                      </p:to>
+                                    </p:set>
+                                  </p:childTnLst>
+                                </p:cTn>
+                              </p:par>
+                            </p:childTnLst>
+                          </p:cTn>
+                        </p:par>
+                      </p:childTnLst>
+                    </p:cTn>
+                  </p:par>
+                  <p:par>
+                    <p:cTn id="7" fill="hold">
+                      <p:stCondLst>
+                        <p:cond delay="indefinite"/>
+                      </p:stCondLst>
+                      <p:childTnLst>
+                        <p:par>
+                          <p:cTn id="8" fill="hold">
+                            <p:stCondLst>
+                              <p:cond delay="0"/>
+                            </p:stCondLst>
+                            <p:childTnLst>
+                              <p:par>
+                                <p:cTn id="9" presetID="1" presetClass="entr" presetSubtype="0" fill="hold" grpId="0" nodeType="clickEffect">
+                                  <p:stCondLst>
+                                    <p:cond delay="0"/>
+                                  </p:stCondLst>
+                                  <p:childTnLst>
+                                    <p:set>
+                                      <p:cBhvr>
+                                        <p:cTn id="10" dur="1" fill="hold">
+                                          <p:stCondLst>
+                                            <p:cond delay="0"/>
+                                          </p:stCondLst>
+                                        </p:cTn>
+                                        <p:tgtEl>
+                                          <p:spTgt spid="3">
+                                            <p:txEl>
+                                              <p:pRg st="2" end="2"/>
+                                            </p:txEl>
+                                          </p:spTgt>
+                                        </p:tgtEl>
+                                        <p:attrNameLst>
+                                          <p:attrName>style.visibility</p:attrName>
+                                        </p:attrNameLst>
+                                      </p:cBhvr>
+                                      <p:to>
+                                        <p:strVal val="visible"/>
+                                      </p:to>
+                                    </p:set>
+                                  </p:childTnLst>
+                                </p:cTn>
+                              </p:par>
+                            </p:childTnLst>
+                          </p:cTn>
+                        </p:par>
+                      </p:childTnLst>
+                    </p:cTn>
+                  </p:par>
+                  <p:par>
+                    <p:cTn id="11" fill="hold">
+                      <p:stCondLst>
+                        <p:cond delay="indefinite"/>
+                      </p:stCondLst>
+                      <p:childTnLst>
+                        <p:par>
+                          <p:cTn id="12" fill="hold">
+                            <p:stCondLst>
+                              <p:cond delay="0"/>
+                            </p:stCondLst>
+                            <p:childTnLst>
+                              <p:par>
+                                <p:cTn id="13" presetID="1" presetClass="entr" presetSubtype="0" fill="hold" grpId="0" nodeType="clickEffect">
+                                  <p:stCondLst>
+                                    <p:cond delay="0"/>
+                                  </p:stCondLst>
+                                  <p:childTnLst>
+                                    <p:set>
+                                      <p:cBhvr>
+                                        <p:cTn id="14" dur="1" fill="hold">
+                                          <p:stCondLst>
+                                            <p:cond delay="0"/>
+                                          </p:stCondLst>
+                                        </p:cTn>
+                                        <p:tgtEl>
+                                          <p:spTgt spid="3">
+                                            <p:txEl>
+                                              <p:pRg st="4" end="4"/>
+                                            </p:txEl>
+                                          </p:spTgt>
+                                        </p:tgtEl>
+                                        <p:attrNameLst>
+                                          <p:attrName>style.visibility</p:attrName>
+                                        </p:attrNameLst>
+                                      </p:cBhvr>
+                                      <p:to>
+                                        <p:strVal val="visible"/>
+                                      </p:to>
+                                    </p:set>
+                                  </p:childTnLst>
+                                </p:cTn>
+                              </p:par>
+                            </p:childTnLst>
+                          </p:cTn>
+                        </p:par>
+                      </p:childTnLst>
+                    </p:cTn>
+                  </p:par>
+                  <p:par>
+                    <p:cTn id="15" fill="hold">
+                      <p:stCondLst>
+                        <p:cond delay="indefinite"/>
+                      </p:stCondLst>
+                      <p:childTnLst>
+                        <p:par>
+                          <p:cTn id="16" fill="hold">
+                            <p:stCondLst>
+                              <p:cond delay="0"/>
+                            </p:stCondLst>
+                            <p:childTnLst>
+                              <p:par>
+                                <p:cTn id="17" presetID="1" presetClass="entr" presetSubtype="0" fill="hold" grpId="0" nodeType="clickEffect">
+                                  <p:stCondLst>
+                                    <p:cond delay="0"/>
+                                  </p:stCondLst>
+                                  <p:childTnLst>
+                                    <p:set>
+                                      <p:cBhvr>
+                                        <p:cTn id="18" dur="1" fill="hold">
+                                          <p:stCondLst>
+                                            <p:cond delay="0"/>
+                                          </p:stCondLst>
+                                        </p:cTn>
+                                        <p:tgtEl>
+                                          <p:spTgt spid="3">
+                                            <p:txEl>
+                                              <p:pRg st="6" end="6"/>
+                                            </p:txEl>
+                                          </p:spTgt>
+                                        </p:tgtEl>
+                                        <p:attrNameLst>
+                                          <p:attrName>style.visibility</p:attrName>
+                                        </p:attrNameLst>
+                                      </p:cBhvr>
+                                      <p:to>
+                                        <p:strVal val="visible"/>
+                                      </p:to>
+                                    </p:set>
+                                  </p:childTnLst>
+                                </p:cTn>
+                              </p:par>
+                            </p:childTnLst>
+                          </p:cTn>
+                        </p:par>
+                      </p:childTnLst>
+                    </p:cTn>
+                  </p:par>
+                </p:childTnLst>
+              </p:cTn>
+              <p:prevCondLst>
+                <p:cond evt="onPrev" delay="0">
+                  <p:tgtEl>
+                    <p:sldTgt/>
+                  </p:tgtEl>
+                </p:cond>
+              </p:prevCondLst>
+              <p:nextCondLst>
+                <p:cond evt="onNext" delay="0">
+                  <p:tgtEl>
+                    <p:sldTgt/>
+                  </p:tgtEl>
+                </p:cond>
+              </p:nextCondLst>
+            </p:seq>
+          </p:childTnLst>
+        </p:cTn>
+      </p:par>
+    </p:tnLst>
+    <p:bldLst>
+      <p:bldP spid="3" grpId="0" uiExpand="1" build="p"/>
+    </p:bldLst>
+  </p:timing>
 </p:sld>
 </file>
 

</xml_diff>

<commit_message>
Added outline.  Also added source image for wikipedia tree.
</commit_message>
<xml_diff>
--- a/Git and LV.pptx
+++ b/Git and LV.pptx
@@ -5,26 +5,28 @@
     <p:sldMasterId id="2147483660" r:id="rId1"/>
   </p:sldMasterIdLst>
   <p:notesMasterIdLst>
-    <p:notesMasterId r:id="rId19"/>
+    <p:notesMasterId r:id="rId21"/>
   </p:notesMasterIdLst>
   <p:sldIdLst>
     <p:sldId id="256" r:id="rId2"/>
     <p:sldId id="257" r:id="rId3"/>
     <p:sldId id="258" r:id="rId4"/>
     <p:sldId id="259" r:id="rId5"/>
-    <p:sldId id="260" r:id="rId6"/>
-    <p:sldId id="261" r:id="rId7"/>
-    <p:sldId id="262" r:id="rId8"/>
-    <p:sldId id="272" r:id="rId9"/>
-    <p:sldId id="269" r:id="rId10"/>
-    <p:sldId id="263" r:id="rId11"/>
-    <p:sldId id="264" r:id="rId12"/>
-    <p:sldId id="265" r:id="rId13"/>
-    <p:sldId id="266" r:id="rId14"/>
-    <p:sldId id="270" r:id="rId15"/>
-    <p:sldId id="267" r:id="rId16"/>
-    <p:sldId id="268" r:id="rId17"/>
-    <p:sldId id="271" r:id="rId18"/>
+    <p:sldId id="274" r:id="rId6"/>
+    <p:sldId id="260" r:id="rId7"/>
+    <p:sldId id="261" r:id="rId8"/>
+    <p:sldId id="262" r:id="rId9"/>
+    <p:sldId id="272" r:id="rId10"/>
+    <p:sldId id="269" r:id="rId11"/>
+    <p:sldId id="270" r:id="rId12"/>
+    <p:sldId id="263" r:id="rId13"/>
+    <p:sldId id="264" r:id="rId14"/>
+    <p:sldId id="265" r:id="rId15"/>
+    <p:sldId id="273" r:id="rId16"/>
+    <p:sldId id="266" r:id="rId17"/>
+    <p:sldId id="267" r:id="rId18"/>
+    <p:sldId id="268" r:id="rId19"/>
+    <p:sldId id="271" r:id="rId20"/>
   </p:sldIdLst>
   <p:sldSz cx="12192000" cy="6858000"/>
   <p:notesSz cx="6858000" cy="9144000"/>
@@ -225,7 +227,7 @@
           <a:p>
             <a:fld id="{340551C4-E36D-4DF7-AAE7-E45DF88FF737}" type="datetimeFigureOut">
               <a:rPr lang="en-US" smtClean="0"/>
-              <a:t>10/27/2019</a:t>
+              <a:t>10/28/2019</a:t>
             </a:fld>
             <a:endParaRPr lang="en-US"/>
           </a:p>
@@ -642,7 +644,75 @@
           <a:bodyPr/>
           <a:lstStyle/>
           <a:p>
+            <a:r>
+              <a:rPr lang="en-US" dirty="0"/>
+              <a:t>Add Visual References (Atlassian Diagrams)</a:t>
+            </a:r>
+          </a:p>
+          <a:p>
             <a:endParaRPr lang="en-US" dirty="0"/>
+          </a:p>
+          <a:p>
+            <a:r>
+              <a:rPr lang="en-US" dirty="0"/>
+              <a:t>By </a:t>
+            </a:r>
+            <a:r>
+              <a:rPr lang="en-US" dirty="0" err="1"/>
+              <a:t>Revision_controlled_project_visualization.svg</a:t>
+            </a:r>
+            <a:r>
+              <a:rPr lang="en-US" dirty="0"/>
+              <a:t>: *</a:t>
+            </a:r>
+            <a:r>
+              <a:rPr lang="en-US" dirty="0" err="1"/>
+              <a:t>Subversion_project_visualization.svg</a:t>
+            </a:r>
+            <a:r>
+              <a:rPr lang="en-US" dirty="0"/>
+              <a:t>: Traced by </a:t>
+            </a:r>
+            <a:r>
+              <a:rPr lang="en-US" dirty="0" err="1"/>
+              <a:t>User:Stannered</a:t>
+            </a:r>
+            <a:r>
+              <a:rPr lang="en-US" dirty="0"/>
+              <a:t>, original by </a:t>
+            </a:r>
+            <a:r>
+              <a:rPr lang="en-US" dirty="0" err="1"/>
+              <a:t>en:User:Sami</a:t>
+            </a:r>
+            <a:r>
+              <a:rPr lang="en-US" dirty="0"/>
+              <a:t> </a:t>
+            </a:r>
+            <a:r>
+              <a:rPr lang="en-US" dirty="0" err="1"/>
+              <a:t>Keroladerivative</a:t>
+            </a:r>
+            <a:r>
+              <a:rPr lang="en-US" dirty="0"/>
+              <a:t> work: </a:t>
+            </a:r>
+            <a:r>
+              <a:rPr lang="en-US" dirty="0" err="1"/>
+              <a:t>Moxfyre</a:t>
+            </a:r>
+            <a:r>
+              <a:rPr lang="en-US" dirty="0"/>
+              <a:t> (talk)derivative work: Echion2 (talk) - </a:t>
+            </a:r>
+            <a:r>
+              <a:rPr lang="en-US" dirty="0" err="1"/>
+              <a:t>Revision_controlled_project_visualization.svg</a:t>
+            </a:r>
+            <a:r>
+              <a:rPr lang="en-US" dirty="0"/>
+              <a:t>, CC BY-SA 3.0, https://commons.wikimedia.org/w/index.php?curid=9562807</a:t>
+            </a:r>
           </a:p>
         </p:txBody>
       </p:sp>
@@ -672,7 +742,246 @@
     </p:spTree>
     <p:extLst>
       <p:ext uri="{BB962C8B-B14F-4D97-AF65-F5344CB8AC3E}">
-        <p14:creationId xmlns:p14="http://schemas.microsoft.com/office/powerpoint/2010/main" val="431731124"/>
+        <p14:creationId xmlns:p14="http://schemas.microsoft.com/office/powerpoint/2010/main" val="2749384323"/>
+      </p:ext>
+    </p:extLst>
+  </p:cSld>
+  <p:clrMapOvr>
+    <a:masterClrMapping/>
+  </p:clrMapOvr>
+</p:notes>
+</file>
+
+<file path=ppt/notesSlides/notesSlide11.xml><?xml version="1.0" encoding="utf-8"?>
+<p:notes xmlns:a="http://schemas.openxmlformats.org/drawingml/2006/main" xmlns:r="http://schemas.openxmlformats.org/officeDocument/2006/relationships" xmlns:p="http://schemas.openxmlformats.org/presentationml/2006/main">
+  <p:cSld>
+    <p:spTree>
+      <p:nvGrpSpPr>
+        <p:cNvPr id="1" name=""/>
+        <p:cNvGrpSpPr/>
+        <p:nvPr/>
+      </p:nvGrpSpPr>
+      <p:grpSpPr>
+        <a:xfrm>
+          <a:off x="0" y="0"/>
+          <a:ext cx="0" cy="0"/>
+          <a:chOff x="0" y="0"/>
+          <a:chExt cx="0" cy="0"/>
+        </a:xfrm>
+      </p:grpSpPr>
+      <p:sp>
+        <p:nvSpPr>
+          <p:cNvPr id="2" name="Slide Image Placeholder 1"/>
+          <p:cNvSpPr>
+            <a:spLocks noGrp="1" noRot="1" noChangeAspect="1"/>
+          </p:cNvSpPr>
+          <p:nvPr>
+            <p:ph type="sldImg"/>
+          </p:nvPr>
+        </p:nvSpPr>
+        <p:spPr/>
+      </p:sp>
+      <p:sp>
+        <p:nvSpPr>
+          <p:cNvPr id="3" name="Notes Placeholder 2"/>
+          <p:cNvSpPr>
+            <a:spLocks noGrp="1"/>
+          </p:cNvSpPr>
+          <p:nvPr>
+            <p:ph type="body" idx="1"/>
+          </p:nvPr>
+        </p:nvSpPr>
+        <p:spPr/>
+        <p:txBody>
+          <a:bodyPr/>
+          <a:lstStyle/>
+          <a:p>
+            <a:r>
+              <a:rPr lang="en-US" dirty="0"/>
+              <a:t>Add Visual References (Atlassian Diagrams)</a:t>
+            </a:r>
+          </a:p>
+          <a:p>
+            <a:endParaRPr lang="en-US" dirty="0"/>
+          </a:p>
+          <a:p>
+            <a:r>
+              <a:rPr lang="en-US" dirty="0"/>
+              <a:t>By </a:t>
+            </a:r>
+            <a:r>
+              <a:rPr lang="en-US" dirty="0" err="1"/>
+              <a:t>Revision_controlled_project_visualization.svg</a:t>
+            </a:r>
+            <a:r>
+              <a:rPr lang="en-US" dirty="0"/>
+              <a:t>: *</a:t>
+            </a:r>
+            <a:r>
+              <a:rPr lang="en-US" dirty="0" err="1"/>
+              <a:t>Subversion_project_visualization.svg</a:t>
+            </a:r>
+            <a:r>
+              <a:rPr lang="en-US" dirty="0"/>
+              <a:t>: Traced by </a:t>
+            </a:r>
+            <a:r>
+              <a:rPr lang="en-US" dirty="0" err="1"/>
+              <a:t>User:Stannered</a:t>
+            </a:r>
+            <a:r>
+              <a:rPr lang="en-US" dirty="0"/>
+              <a:t>, original by </a:t>
+            </a:r>
+            <a:r>
+              <a:rPr lang="en-US" dirty="0" err="1"/>
+              <a:t>en:User:Sami</a:t>
+            </a:r>
+            <a:r>
+              <a:rPr lang="en-US" dirty="0"/>
+              <a:t> </a:t>
+            </a:r>
+            <a:r>
+              <a:rPr lang="en-US" dirty="0" err="1"/>
+              <a:t>Keroladerivative</a:t>
+            </a:r>
+            <a:r>
+              <a:rPr lang="en-US" dirty="0"/>
+              <a:t> work: </a:t>
+            </a:r>
+            <a:r>
+              <a:rPr lang="en-US" dirty="0" err="1"/>
+              <a:t>Moxfyre</a:t>
+            </a:r>
+            <a:r>
+              <a:rPr lang="en-US" dirty="0"/>
+              <a:t> (talk)derivative work: Echion2 (talk) - </a:t>
+            </a:r>
+            <a:r>
+              <a:rPr lang="en-US" dirty="0" err="1"/>
+              <a:t>Revision_controlled_project_visualization.svg</a:t>
+            </a:r>
+            <a:r>
+              <a:rPr lang="en-US" dirty="0"/>
+              <a:t>, CC BY-SA 3.0, https://commons.wikimedia.org/w/index.php?curid=9562807</a:t>
+            </a:r>
+          </a:p>
+        </p:txBody>
+      </p:sp>
+      <p:sp>
+        <p:nvSpPr>
+          <p:cNvPr id="4" name="Slide Number Placeholder 3"/>
+          <p:cNvSpPr>
+            <a:spLocks noGrp="1"/>
+          </p:cNvSpPr>
+          <p:nvPr>
+            <p:ph type="sldNum" sz="quarter" idx="5"/>
+          </p:nvPr>
+        </p:nvSpPr>
+        <p:spPr/>
+        <p:txBody>
+          <a:bodyPr/>
+          <a:lstStyle/>
+          <a:p>
+            <a:fld id="{E9E1DFC9-EE16-4136-8822-8361C2EB7D32}" type="slidenum">
+              <a:rPr lang="en-US" smtClean="0"/>
+              <a:t>15</a:t>
+            </a:fld>
+            <a:endParaRPr lang="en-US"/>
+          </a:p>
+        </p:txBody>
+      </p:sp>
+    </p:spTree>
+    <p:extLst>
+      <p:ext uri="{BB962C8B-B14F-4D97-AF65-F5344CB8AC3E}">
+        <p14:creationId xmlns:p14="http://schemas.microsoft.com/office/powerpoint/2010/main" val="1292920640"/>
+      </p:ext>
+    </p:extLst>
+  </p:cSld>
+  <p:clrMapOvr>
+    <a:masterClrMapping/>
+  </p:clrMapOvr>
+</p:notes>
+</file>
+
+<file path=ppt/notesSlides/notesSlide12.xml><?xml version="1.0" encoding="utf-8"?>
+<p:notes xmlns:a="http://schemas.openxmlformats.org/drawingml/2006/main" xmlns:r="http://schemas.openxmlformats.org/officeDocument/2006/relationships" xmlns:p="http://schemas.openxmlformats.org/presentationml/2006/main">
+  <p:cSld>
+    <p:spTree>
+      <p:nvGrpSpPr>
+        <p:cNvPr id="1" name=""/>
+        <p:cNvGrpSpPr/>
+        <p:nvPr/>
+      </p:nvGrpSpPr>
+      <p:grpSpPr>
+        <a:xfrm>
+          <a:off x="0" y="0"/>
+          <a:ext cx="0" cy="0"/>
+          <a:chOff x="0" y="0"/>
+          <a:chExt cx="0" cy="0"/>
+        </a:xfrm>
+      </p:grpSpPr>
+      <p:sp>
+        <p:nvSpPr>
+          <p:cNvPr id="2" name="Slide Image Placeholder 1"/>
+          <p:cNvSpPr>
+            <a:spLocks noGrp="1" noRot="1" noChangeAspect="1"/>
+          </p:cNvSpPr>
+          <p:nvPr>
+            <p:ph type="sldImg"/>
+          </p:nvPr>
+        </p:nvSpPr>
+        <p:spPr/>
+      </p:sp>
+      <p:sp>
+        <p:nvSpPr>
+          <p:cNvPr id="3" name="Notes Placeholder 2"/>
+          <p:cNvSpPr>
+            <a:spLocks noGrp="1"/>
+          </p:cNvSpPr>
+          <p:nvPr>
+            <p:ph type="body" idx="1"/>
+          </p:nvPr>
+        </p:nvSpPr>
+        <p:spPr/>
+        <p:txBody>
+          <a:bodyPr/>
+          <a:lstStyle/>
+          <a:p>
+            <a:r>
+              <a:rPr lang="en-US" dirty="0"/>
+              <a:t>Split Pull and Pull Request</a:t>
+            </a:r>
+          </a:p>
+        </p:txBody>
+      </p:sp>
+      <p:sp>
+        <p:nvSpPr>
+          <p:cNvPr id="4" name="Slide Number Placeholder 3"/>
+          <p:cNvSpPr>
+            <a:spLocks noGrp="1"/>
+          </p:cNvSpPr>
+          <p:nvPr>
+            <p:ph type="sldNum" sz="quarter" idx="5"/>
+          </p:nvPr>
+        </p:nvSpPr>
+        <p:spPr/>
+        <p:txBody>
+          <a:bodyPr/>
+          <a:lstStyle/>
+          <a:p>
+            <a:fld id="{E9E1DFC9-EE16-4136-8822-8361C2EB7D32}" type="slidenum">
+              <a:rPr lang="en-US" smtClean="0"/>
+              <a:t>16</a:t>
+            </a:fld>
+            <a:endParaRPr lang="en-US"/>
+          </a:p>
+        </p:txBody>
+      </p:sp>
+    </p:spTree>
+    <p:extLst>
+      <p:ext uri="{BB962C8B-B14F-4D97-AF65-F5344CB8AC3E}">
+        <p14:creationId xmlns:p14="http://schemas.microsoft.com/office/powerpoint/2010/main" val="238496880"/>
       </p:ext>
     </p:extLst>
   </p:cSld>
@@ -894,10 +1203,7 @@
           <a:bodyPr/>
           <a:lstStyle/>
           <a:p>
-            <a:r>
-              <a:rPr lang="en-US" dirty="0"/>
-              <a:t>Better Define Locked out.</a:t>
-            </a:r>
+            <a:endParaRPr lang="en-US" dirty="0"/>
           </a:p>
         </p:txBody>
       </p:sp>
@@ -927,7 +1233,7 @@
     </p:spTree>
     <p:extLst>
       <p:ext uri="{BB962C8B-B14F-4D97-AF65-F5344CB8AC3E}">
-        <p14:creationId xmlns:p14="http://schemas.microsoft.com/office/powerpoint/2010/main" val="420198931"/>
+        <p14:creationId xmlns:p14="http://schemas.microsoft.com/office/powerpoint/2010/main" val="3795168807"/>
       </p:ext>
     </p:extLst>
   </p:cSld>
@@ -981,7 +1287,10 @@
           <a:bodyPr/>
           <a:lstStyle/>
           <a:p>
-            <a:endParaRPr lang="en-US" dirty="0"/>
+            <a:r>
+              <a:rPr lang="en-US" dirty="0"/>
+              <a:t>Better Define Locked out.</a:t>
+            </a:r>
           </a:p>
         </p:txBody>
       </p:sp>
@@ -1000,7 +1309,7 @@
           <a:bodyPr/>
           <a:lstStyle/>
           <a:p>
-            <a:fld id="{D831DA15-0810-404C-B38C-91CCA02F8F85}" type="slidenum">
+            <a:fld id="{E9E1DFC9-EE16-4136-8822-8361C2EB7D32}" type="slidenum">
               <a:rPr lang="en-US" smtClean="0"/>
               <a:t>6</a:t>
             </a:fld>
@@ -1011,7 +1320,7 @@
     </p:spTree>
     <p:extLst>
       <p:ext uri="{BB962C8B-B14F-4D97-AF65-F5344CB8AC3E}">
-        <p14:creationId xmlns:p14="http://schemas.microsoft.com/office/powerpoint/2010/main" val="2611573630"/>
+        <p14:creationId xmlns:p14="http://schemas.microsoft.com/office/powerpoint/2010/main" val="420198931"/>
       </p:ext>
     </p:extLst>
   </p:cSld>
@@ -1065,10 +1374,7 @@
           <a:bodyPr/>
           <a:lstStyle/>
           <a:p>
-            <a:r>
-              <a:rPr lang="en-US" dirty="0"/>
-              <a:t>Better define work</a:t>
-            </a:r>
+            <a:endParaRPr lang="en-US" dirty="0"/>
           </a:p>
         </p:txBody>
       </p:sp>
@@ -1087,7 +1393,7 @@
           <a:bodyPr/>
           <a:lstStyle/>
           <a:p>
-            <a:fld id="{E9E1DFC9-EE16-4136-8822-8361C2EB7D32}" type="slidenum">
+            <a:fld id="{D831DA15-0810-404C-B38C-91CCA02F8F85}" type="slidenum">
               <a:rPr lang="en-US" smtClean="0"/>
               <a:t>7</a:t>
             </a:fld>
@@ -1098,7 +1404,7 @@
     </p:spTree>
     <p:extLst>
       <p:ext uri="{BB962C8B-B14F-4D97-AF65-F5344CB8AC3E}">
-        <p14:creationId xmlns:p14="http://schemas.microsoft.com/office/powerpoint/2010/main" val="1214830215"/>
+        <p14:creationId xmlns:p14="http://schemas.microsoft.com/office/powerpoint/2010/main" val="2611573630"/>
       </p:ext>
     </p:extLst>
   </p:cSld>
@@ -1185,7 +1491,7 @@
     </p:spTree>
     <p:extLst>
       <p:ext uri="{BB962C8B-B14F-4D97-AF65-F5344CB8AC3E}">
-        <p14:creationId xmlns:p14="http://schemas.microsoft.com/office/powerpoint/2010/main" val="2705225124"/>
+        <p14:creationId xmlns:p14="http://schemas.microsoft.com/office/powerpoint/2010/main" val="1214830215"/>
       </p:ext>
     </p:extLst>
   </p:cSld>
@@ -1241,7 +1547,7 @@
           <a:p>
             <a:r>
               <a:rPr lang="en-US" dirty="0"/>
-              <a:t>Add Visual References (Atlassian Diagrams)</a:t>
+              <a:t>Better define work</a:t>
             </a:r>
           </a:p>
         </p:txBody>
@@ -1263,7 +1569,7 @@
           <a:p>
             <a:fld id="{E9E1DFC9-EE16-4136-8822-8361C2EB7D32}" type="slidenum">
               <a:rPr lang="en-US" smtClean="0"/>
-              <a:t>12</a:t>
+              <a:t>9</a:t>
             </a:fld>
             <a:endParaRPr lang="en-US"/>
           </a:p>
@@ -1272,7 +1578,7 @@
     </p:spTree>
     <p:extLst>
       <p:ext uri="{BB962C8B-B14F-4D97-AF65-F5344CB8AC3E}">
-        <p14:creationId xmlns:p14="http://schemas.microsoft.com/office/powerpoint/2010/main" val="2749384323"/>
+        <p14:creationId xmlns:p14="http://schemas.microsoft.com/office/powerpoint/2010/main" val="2705225124"/>
       </p:ext>
     </p:extLst>
   </p:cSld>
@@ -1347,7 +1653,7 @@
           <a:p>
             <a:fld id="{E9E1DFC9-EE16-4136-8822-8361C2EB7D32}" type="slidenum">
               <a:rPr lang="en-US" smtClean="0"/>
-              <a:t>13</a:t>
+              <a:t>11</a:t>
             </a:fld>
             <a:endParaRPr lang="en-US"/>
           </a:p>
@@ -1356,7 +1662,7 @@
     </p:spTree>
     <p:extLst>
       <p:ext uri="{BB962C8B-B14F-4D97-AF65-F5344CB8AC3E}">
-        <p14:creationId xmlns:p14="http://schemas.microsoft.com/office/powerpoint/2010/main" val="238496880"/>
+        <p14:creationId xmlns:p14="http://schemas.microsoft.com/office/powerpoint/2010/main" val="431731124"/>
       </p:ext>
     </p:extLst>
   </p:cSld>
@@ -2088,7 +2394,7 @@
           <a:p>
             <a:fld id="{38E594E3-4743-4683-81F7-698D2FA773A6}" type="datetimeFigureOut">
               <a:rPr lang="en-US" smtClean="0"/>
-              <a:t>10/27/2019</a:t>
+              <a:t>10/28/2019</a:t>
             </a:fld>
             <a:endParaRPr lang="en-US"/>
           </a:p>
@@ -2339,7 +2645,7 @@
           <a:p>
             <a:fld id="{38E594E3-4743-4683-81F7-698D2FA773A6}" type="datetimeFigureOut">
               <a:rPr lang="en-US" smtClean="0"/>
-              <a:t>10/27/2019</a:t>
+              <a:t>10/28/2019</a:t>
             </a:fld>
             <a:endParaRPr lang="en-US"/>
           </a:p>
@@ -2653,7 +2959,7 @@
           <a:p>
             <a:fld id="{38E594E3-4743-4683-81F7-698D2FA773A6}" type="datetimeFigureOut">
               <a:rPr lang="en-US" smtClean="0"/>
-              <a:t>10/27/2019</a:t>
+              <a:t>10/28/2019</a:t>
             </a:fld>
             <a:endParaRPr lang="en-US"/>
           </a:p>
@@ -2994,7 +3300,7 @@
           <a:p>
             <a:fld id="{38E594E3-4743-4683-81F7-698D2FA773A6}" type="datetimeFigureOut">
               <a:rPr lang="en-US" smtClean="0"/>
-              <a:t>10/27/2019</a:t>
+              <a:t>10/28/2019</a:t>
             </a:fld>
             <a:endParaRPr lang="en-US"/>
           </a:p>
@@ -3308,7 +3614,7 @@
           <a:p>
             <a:fld id="{38E594E3-4743-4683-81F7-698D2FA773A6}" type="datetimeFigureOut">
               <a:rPr lang="en-US" smtClean="0"/>
-              <a:t>10/27/2019</a:t>
+              <a:t>10/28/2019</a:t>
             </a:fld>
             <a:endParaRPr lang="en-US"/>
           </a:p>
@@ -3701,7 +4007,7 @@
           <a:p>
             <a:fld id="{38E594E3-4743-4683-81F7-698D2FA773A6}" type="datetimeFigureOut">
               <a:rPr lang="en-US" smtClean="0"/>
-              <a:t>10/27/2019</a:t>
+              <a:t>10/28/2019</a:t>
             </a:fld>
             <a:endParaRPr lang="en-US"/>
           </a:p>
@@ -3871,7 +4177,7 @@
           <a:p>
             <a:fld id="{38E594E3-4743-4683-81F7-698D2FA773A6}" type="datetimeFigureOut">
               <a:rPr lang="en-US" smtClean="0"/>
-              <a:t>10/27/2019</a:t>
+              <a:t>10/28/2019</a:t>
             </a:fld>
             <a:endParaRPr lang="en-US"/>
           </a:p>
@@ -4051,7 +4357,7 @@
           <a:p>
             <a:fld id="{38E594E3-4743-4683-81F7-698D2FA773A6}" type="datetimeFigureOut">
               <a:rPr lang="en-US" smtClean="0"/>
-              <a:t>10/27/2019</a:t>
+              <a:t>10/28/2019</a:t>
             </a:fld>
             <a:endParaRPr lang="en-US"/>
           </a:p>
@@ -4227,7 +4533,7 @@
           <a:p>
             <a:fld id="{38E594E3-4743-4683-81F7-698D2FA773A6}" type="datetimeFigureOut">
               <a:rPr lang="en-US" smtClean="0"/>
-              <a:t>10/27/2019</a:t>
+              <a:t>10/28/2019</a:t>
             </a:fld>
             <a:endParaRPr lang="en-US"/>
           </a:p>
@@ -4474,7 +4780,7 @@
           <a:p>
             <a:fld id="{38E594E3-4743-4683-81F7-698D2FA773A6}" type="datetimeFigureOut">
               <a:rPr lang="en-US" smtClean="0"/>
-              <a:t>10/27/2019</a:t>
+              <a:t>10/28/2019</a:t>
             </a:fld>
             <a:endParaRPr lang="en-US"/>
           </a:p>
@@ -4706,7 +5012,7 @@
           <a:p>
             <a:fld id="{38E594E3-4743-4683-81F7-698D2FA773A6}" type="datetimeFigureOut">
               <a:rPr lang="en-US" smtClean="0"/>
-              <a:t>10/27/2019</a:t>
+              <a:t>10/28/2019</a:t>
             </a:fld>
             <a:endParaRPr lang="en-US"/>
           </a:p>
@@ -5080,7 +5386,7 @@
           <a:p>
             <a:fld id="{38E594E3-4743-4683-81F7-698D2FA773A6}" type="datetimeFigureOut">
               <a:rPr lang="en-US" smtClean="0"/>
-              <a:t>10/27/2019</a:t>
+              <a:t>10/28/2019</a:t>
             </a:fld>
             <a:endParaRPr lang="en-US"/>
           </a:p>
@@ -5203,7 +5509,7 @@
           <a:p>
             <a:fld id="{38E594E3-4743-4683-81F7-698D2FA773A6}" type="datetimeFigureOut">
               <a:rPr lang="en-US" smtClean="0"/>
-              <a:t>10/27/2019</a:t>
+              <a:t>10/28/2019</a:t>
             </a:fld>
             <a:endParaRPr lang="en-US"/>
           </a:p>
@@ -5298,7 +5604,7 @@
           <a:p>
             <a:fld id="{38E594E3-4743-4683-81F7-698D2FA773A6}" type="datetimeFigureOut">
               <a:rPr lang="en-US" smtClean="0"/>
-              <a:t>10/27/2019</a:t>
+              <a:t>10/28/2019</a:t>
             </a:fld>
             <a:endParaRPr lang="en-US"/>
           </a:p>
@@ -5553,7 +5859,7 @@
           <a:p>
             <a:fld id="{38E594E3-4743-4683-81F7-698D2FA773A6}" type="datetimeFigureOut">
               <a:rPr lang="en-US" smtClean="0"/>
-              <a:t>10/27/2019</a:t>
+              <a:t>10/28/2019</a:t>
             </a:fld>
             <a:endParaRPr lang="en-US"/>
           </a:p>
@@ -5816,7 +6122,7 @@
           <a:p>
             <a:fld id="{38E594E3-4743-4683-81F7-698D2FA773A6}" type="datetimeFigureOut">
               <a:rPr lang="en-US" smtClean="0"/>
-              <a:t>10/27/2019</a:t>
+              <a:t>10/28/2019</a:t>
             </a:fld>
             <a:endParaRPr lang="en-US"/>
           </a:p>
@@ -6559,7 +6865,7 @@
           <a:p>
             <a:fld id="{38E594E3-4743-4683-81F7-698D2FA773A6}" type="datetimeFigureOut">
               <a:rPr lang="en-US" smtClean="0"/>
-              <a:t>10/27/2019</a:t>
+              <a:t>10/28/2019</a:t>
             </a:fld>
             <a:endParaRPr lang="en-US"/>
           </a:p>
@@ -7149,13 +7455,13 @@
   <p:clrMapOvr>
     <a:masterClrMapping/>
   </p:clrMapOvr>
-  <mc:AlternateContent xmlns:mc="http://schemas.openxmlformats.org/markup-compatibility/2006">
-    <mc:Choice xmlns:p159="http://schemas.microsoft.com/office/powerpoint/2015/09/main" Requires="p159">
+  <mc:AlternateContent xmlns:mc="http://schemas.openxmlformats.org/markup-compatibility/2006" xmlns:p159="http://schemas.microsoft.com/office/powerpoint/2015/09/main">
+    <mc:Choice Requires="p159">
       <p:transition xmlns:p14="http://schemas.microsoft.com/office/powerpoint/2010/main" spd="slow" p14:dur="2000">
         <p159:morph option="byObject"/>
       </p:transition>
     </mc:Choice>
-    <mc:Fallback>
+    <mc:Fallback xmlns="">
       <p:transition spd="slow">
         <p:fade/>
       </p:transition>
@@ -7186,6 +7492,468 @@
           <p:cNvPr id="2" name="Title 1">
             <a:extLst>
               <a:ext uri="{FF2B5EF4-FFF2-40B4-BE49-F238E27FC236}">
+                <a16:creationId xmlns:a16="http://schemas.microsoft.com/office/drawing/2014/main" id="{BD61DC07-2119-4D76-8D85-02068B8AE439}"/>
+              </a:ext>
+            </a:extLst>
+          </p:cNvPr>
+          <p:cNvSpPr>
+            <a:spLocks noGrp="1"/>
+          </p:cNvSpPr>
+          <p:nvPr>
+            <p:ph type="title"/>
+          </p:nvPr>
+        </p:nvSpPr>
+        <p:spPr/>
+        <p:txBody>
+          <a:bodyPr/>
+          <a:lstStyle/>
+          <a:p>
+            <a:r>
+              <a:rPr lang="en-US" dirty="0"/>
+              <a:t>Repositories</a:t>
+            </a:r>
+          </a:p>
+        </p:txBody>
+      </p:sp>
+      <p:sp>
+        <p:nvSpPr>
+          <p:cNvPr id="3" name="Content Placeholder 2">
+            <a:extLst>
+              <a:ext uri="{FF2B5EF4-FFF2-40B4-BE49-F238E27FC236}">
+                <a16:creationId xmlns:a16="http://schemas.microsoft.com/office/drawing/2014/main" id="{296796AB-AD6F-4E4A-A8FD-D16B19175E75}"/>
+              </a:ext>
+            </a:extLst>
+          </p:cNvPr>
+          <p:cNvSpPr>
+            <a:spLocks noGrp="1"/>
+          </p:cNvSpPr>
+          <p:nvPr>
+            <p:ph idx="1"/>
+          </p:nvPr>
+        </p:nvSpPr>
+        <p:spPr/>
+        <p:txBody>
+          <a:bodyPr/>
+          <a:lstStyle/>
+          <a:p>
+            <a:r>
+              <a:rPr lang="en-US" dirty="0"/>
+              <a:t>Store the files you want to track</a:t>
+            </a:r>
+          </a:p>
+          <a:p>
+            <a:endParaRPr lang="en-US" dirty="0"/>
+          </a:p>
+          <a:p>
+            <a:r>
+              <a:rPr lang="en-US" dirty="0"/>
+              <a:t>Are a single folder</a:t>
+            </a:r>
+          </a:p>
+          <a:p>
+            <a:endParaRPr lang="en-US" dirty="0"/>
+          </a:p>
+          <a:p>
+            <a:r>
+              <a:rPr lang="en-US" dirty="0"/>
+              <a:t>Contain all the git meta-data. </a:t>
+            </a:r>
+          </a:p>
+          <a:p>
+            <a:endParaRPr lang="en-US" dirty="0"/>
+          </a:p>
+          <a:p>
+            <a:r>
+              <a:rPr lang="en-US" dirty="0"/>
+              <a:t>Contain ALL the changes that have been made to the files being tracked. </a:t>
+            </a:r>
+          </a:p>
+        </p:txBody>
+      </p:sp>
+    </p:spTree>
+    <p:extLst>
+      <p:ext uri="{BB962C8B-B14F-4D97-AF65-F5344CB8AC3E}">
+        <p14:creationId xmlns:p14="http://schemas.microsoft.com/office/powerpoint/2010/main" val="2589151126"/>
+      </p:ext>
+    </p:extLst>
+  </p:cSld>
+  <p:clrMapOvr>
+    <a:masterClrMapping/>
+  </p:clrMapOvr>
+  <mc:AlternateContent xmlns:mc="http://schemas.openxmlformats.org/markup-compatibility/2006" xmlns:p159="http://schemas.microsoft.com/office/powerpoint/2015/09/main">
+    <mc:Choice Requires="p159">
+      <p:transition xmlns:p14="http://schemas.microsoft.com/office/powerpoint/2010/main" spd="slow" p14:dur="2000">
+        <p159:morph option="byObject"/>
+      </p:transition>
+    </mc:Choice>
+    <mc:Fallback xmlns="">
+      <p:transition spd="slow">
+        <p:fade/>
+      </p:transition>
+    </mc:Fallback>
+  </mc:AlternateContent>
+  <p:timing>
+    <p:tnLst>
+      <p:par>
+        <p:cTn id="1" dur="indefinite" restart="never" nodeType="tmRoot">
+          <p:childTnLst>
+            <p:seq concurrent="1" nextAc="seek">
+              <p:cTn id="2" dur="indefinite" nodeType="mainSeq">
+                <p:childTnLst>
+                  <p:par>
+                    <p:cTn id="3" fill="hold">
+                      <p:stCondLst>
+                        <p:cond delay="indefinite"/>
+                      </p:stCondLst>
+                      <p:childTnLst>
+                        <p:par>
+                          <p:cTn id="4" fill="hold">
+                            <p:stCondLst>
+                              <p:cond delay="0"/>
+                            </p:stCondLst>
+                            <p:childTnLst>
+                              <p:par>
+                                <p:cTn id="5" presetID="1" presetClass="entr" presetSubtype="0" fill="hold" grpId="0" nodeType="clickEffect">
+                                  <p:stCondLst>
+                                    <p:cond delay="0"/>
+                                  </p:stCondLst>
+                                  <p:childTnLst>
+                                    <p:set>
+                                      <p:cBhvr>
+                                        <p:cTn id="6" dur="1" fill="hold">
+                                          <p:stCondLst>
+                                            <p:cond delay="0"/>
+                                          </p:stCondLst>
+                                        </p:cTn>
+                                        <p:tgtEl>
+                                          <p:spTgt spid="3">
+                                            <p:txEl>
+                                              <p:pRg st="0" end="0"/>
+                                            </p:txEl>
+                                          </p:spTgt>
+                                        </p:tgtEl>
+                                        <p:attrNameLst>
+                                          <p:attrName>style.visibility</p:attrName>
+                                        </p:attrNameLst>
+                                      </p:cBhvr>
+                                      <p:to>
+                                        <p:strVal val="visible"/>
+                                      </p:to>
+                                    </p:set>
+                                  </p:childTnLst>
+                                </p:cTn>
+                              </p:par>
+                            </p:childTnLst>
+                          </p:cTn>
+                        </p:par>
+                      </p:childTnLst>
+                    </p:cTn>
+                  </p:par>
+                  <p:par>
+                    <p:cTn id="7" fill="hold">
+                      <p:stCondLst>
+                        <p:cond delay="indefinite"/>
+                      </p:stCondLst>
+                      <p:childTnLst>
+                        <p:par>
+                          <p:cTn id="8" fill="hold">
+                            <p:stCondLst>
+                              <p:cond delay="0"/>
+                            </p:stCondLst>
+                            <p:childTnLst>
+                              <p:par>
+                                <p:cTn id="9" presetID="1" presetClass="entr" presetSubtype="0" fill="hold" grpId="0" nodeType="clickEffect">
+                                  <p:stCondLst>
+                                    <p:cond delay="0"/>
+                                  </p:stCondLst>
+                                  <p:childTnLst>
+                                    <p:set>
+                                      <p:cBhvr>
+                                        <p:cTn id="10" dur="1" fill="hold">
+                                          <p:stCondLst>
+                                            <p:cond delay="0"/>
+                                          </p:stCondLst>
+                                        </p:cTn>
+                                        <p:tgtEl>
+                                          <p:spTgt spid="3">
+                                            <p:txEl>
+                                              <p:pRg st="2" end="2"/>
+                                            </p:txEl>
+                                          </p:spTgt>
+                                        </p:tgtEl>
+                                        <p:attrNameLst>
+                                          <p:attrName>style.visibility</p:attrName>
+                                        </p:attrNameLst>
+                                      </p:cBhvr>
+                                      <p:to>
+                                        <p:strVal val="visible"/>
+                                      </p:to>
+                                    </p:set>
+                                  </p:childTnLst>
+                                </p:cTn>
+                              </p:par>
+                            </p:childTnLst>
+                          </p:cTn>
+                        </p:par>
+                      </p:childTnLst>
+                    </p:cTn>
+                  </p:par>
+                  <p:par>
+                    <p:cTn id="11" fill="hold">
+                      <p:stCondLst>
+                        <p:cond delay="indefinite"/>
+                      </p:stCondLst>
+                      <p:childTnLst>
+                        <p:par>
+                          <p:cTn id="12" fill="hold">
+                            <p:stCondLst>
+                              <p:cond delay="0"/>
+                            </p:stCondLst>
+                            <p:childTnLst>
+                              <p:par>
+                                <p:cTn id="13" presetID="1" presetClass="entr" presetSubtype="0" fill="hold" grpId="0" nodeType="clickEffect">
+                                  <p:stCondLst>
+                                    <p:cond delay="0"/>
+                                  </p:stCondLst>
+                                  <p:childTnLst>
+                                    <p:set>
+                                      <p:cBhvr>
+                                        <p:cTn id="14" dur="1" fill="hold">
+                                          <p:stCondLst>
+                                            <p:cond delay="0"/>
+                                          </p:stCondLst>
+                                        </p:cTn>
+                                        <p:tgtEl>
+                                          <p:spTgt spid="3">
+                                            <p:txEl>
+                                              <p:pRg st="4" end="4"/>
+                                            </p:txEl>
+                                          </p:spTgt>
+                                        </p:tgtEl>
+                                        <p:attrNameLst>
+                                          <p:attrName>style.visibility</p:attrName>
+                                        </p:attrNameLst>
+                                      </p:cBhvr>
+                                      <p:to>
+                                        <p:strVal val="visible"/>
+                                      </p:to>
+                                    </p:set>
+                                  </p:childTnLst>
+                                </p:cTn>
+                              </p:par>
+                            </p:childTnLst>
+                          </p:cTn>
+                        </p:par>
+                      </p:childTnLst>
+                    </p:cTn>
+                  </p:par>
+                  <p:par>
+                    <p:cTn id="15" fill="hold">
+                      <p:stCondLst>
+                        <p:cond delay="indefinite"/>
+                      </p:stCondLst>
+                      <p:childTnLst>
+                        <p:par>
+                          <p:cTn id="16" fill="hold">
+                            <p:stCondLst>
+                              <p:cond delay="0"/>
+                            </p:stCondLst>
+                            <p:childTnLst>
+                              <p:par>
+                                <p:cTn id="17" presetID="1" presetClass="entr" presetSubtype="0" fill="hold" grpId="0" nodeType="clickEffect">
+                                  <p:stCondLst>
+                                    <p:cond delay="0"/>
+                                  </p:stCondLst>
+                                  <p:childTnLst>
+                                    <p:set>
+                                      <p:cBhvr>
+                                        <p:cTn id="18" dur="1" fill="hold">
+                                          <p:stCondLst>
+                                            <p:cond delay="0"/>
+                                          </p:stCondLst>
+                                        </p:cTn>
+                                        <p:tgtEl>
+                                          <p:spTgt spid="3">
+                                            <p:txEl>
+                                              <p:pRg st="6" end="6"/>
+                                            </p:txEl>
+                                          </p:spTgt>
+                                        </p:tgtEl>
+                                        <p:attrNameLst>
+                                          <p:attrName>style.visibility</p:attrName>
+                                        </p:attrNameLst>
+                                      </p:cBhvr>
+                                      <p:to>
+                                        <p:strVal val="visible"/>
+                                      </p:to>
+                                    </p:set>
+                                  </p:childTnLst>
+                                </p:cTn>
+                              </p:par>
+                            </p:childTnLst>
+                          </p:cTn>
+                        </p:par>
+                      </p:childTnLst>
+                    </p:cTn>
+                  </p:par>
+                </p:childTnLst>
+              </p:cTn>
+              <p:prevCondLst>
+                <p:cond evt="onPrev" delay="0">
+                  <p:tgtEl>
+                    <p:sldTgt/>
+                  </p:tgtEl>
+                </p:cond>
+              </p:prevCondLst>
+              <p:nextCondLst>
+                <p:cond evt="onNext" delay="0">
+                  <p:tgtEl>
+                    <p:sldTgt/>
+                  </p:tgtEl>
+                </p:cond>
+              </p:nextCondLst>
+            </p:seq>
+          </p:childTnLst>
+        </p:cTn>
+      </p:par>
+    </p:tnLst>
+    <p:bldLst>
+      <p:bldP spid="3" grpId="0" uiExpand="1" build="p"/>
+    </p:bldLst>
+  </p:timing>
+</p:sld>
+</file>
+
+<file path=ppt/slides/slide11.xml><?xml version="1.0" encoding="utf-8"?>
+<p:sld xmlns:a="http://schemas.openxmlformats.org/drawingml/2006/main" xmlns:r="http://schemas.openxmlformats.org/officeDocument/2006/relationships" xmlns:p="http://schemas.openxmlformats.org/presentationml/2006/main">
+  <p:cSld>
+    <p:spTree>
+      <p:nvGrpSpPr>
+        <p:cNvPr id="1" name=""/>
+        <p:cNvGrpSpPr/>
+        <p:nvPr/>
+      </p:nvGrpSpPr>
+      <p:grpSpPr>
+        <a:xfrm>
+          <a:off x="0" y="0"/>
+          <a:ext cx="0" cy="0"/>
+          <a:chOff x="0" y="0"/>
+          <a:chExt cx="0" cy="0"/>
+        </a:xfrm>
+      </p:grpSpPr>
+      <p:sp>
+        <p:nvSpPr>
+          <p:cNvPr id="2" name="Title 1">
+            <a:extLst>
+              <a:ext uri="{FF2B5EF4-FFF2-40B4-BE49-F238E27FC236}">
+                <a16:creationId xmlns:a16="http://schemas.microsoft.com/office/drawing/2014/main" id="{C85963BB-D731-466E-9B53-F39BEDD14A67}"/>
+              </a:ext>
+            </a:extLst>
+          </p:cNvPr>
+          <p:cNvSpPr>
+            <a:spLocks noGrp="1"/>
+          </p:cNvSpPr>
+          <p:nvPr>
+            <p:ph type="title"/>
+          </p:nvPr>
+        </p:nvSpPr>
+        <p:spPr/>
+        <p:txBody>
+          <a:bodyPr/>
+          <a:lstStyle/>
+          <a:p>
+            <a:r>
+              <a:rPr lang="en-US" dirty="0"/>
+              <a:t>GitHub/GitLab/</a:t>
+            </a:r>
+            <a:r>
+              <a:rPr lang="en-US" dirty="0" err="1"/>
+              <a:t>BitBucket</a:t>
+            </a:r>
+            <a:r>
+              <a:rPr lang="en-US" dirty="0"/>
+              <a:t>/</a:t>
+            </a:r>
+            <a:r>
+              <a:rPr lang="en-US" dirty="0" err="1"/>
+              <a:t>etc</a:t>
+            </a:r>
+            <a:endParaRPr lang="en-US" dirty="0"/>
+          </a:p>
+        </p:txBody>
+      </p:sp>
+      <p:sp>
+        <p:nvSpPr>
+          <p:cNvPr id="3" name="Content Placeholder 2">
+            <a:extLst>
+              <a:ext uri="{FF2B5EF4-FFF2-40B4-BE49-F238E27FC236}">
+                <a16:creationId xmlns:a16="http://schemas.microsoft.com/office/drawing/2014/main" id="{28DCBE85-F0B3-46DD-9244-8E0C4FA104DD}"/>
+              </a:ext>
+            </a:extLst>
+          </p:cNvPr>
+          <p:cNvSpPr>
+            <a:spLocks noGrp="1"/>
+          </p:cNvSpPr>
+          <p:nvPr>
+            <p:ph idx="1"/>
+          </p:nvPr>
+        </p:nvSpPr>
+        <p:spPr/>
+        <p:txBody>
+          <a:bodyPr/>
+          <a:lstStyle/>
+          <a:p>
+            <a:endParaRPr lang="en-US" dirty="0"/>
+          </a:p>
+        </p:txBody>
+      </p:sp>
+    </p:spTree>
+    <p:extLst>
+      <p:ext uri="{BB962C8B-B14F-4D97-AF65-F5344CB8AC3E}">
+        <p14:creationId xmlns:p14="http://schemas.microsoft.com/office/powerpoint/2010/main" val="1367772460"/>
+      </p:ext>
+    </p:extLst>
+  </p:cSld>
+  <p:clrMapOvr>
+    <a:masterClrMapping/>
+  </p:clrMapOvr>
+  <mc:AlternateContent xmlns:mc="http://schemas.openxmlformats.org/markup-compatibility/2006" xmlns:p159="http://schemas.microsoft.com/office/powerpoint/2015/09/main">
+    <mc:Choice Requires="p159">
+      <p:transition xmlns:p14="http://schemas.microsoft.com/office/powerpoint/2010/main" spd="slow" p14:dur="2000">
+        <p159:morph option="byObject"/>
+      </p:transition>
+    </mc:Choice>
+    <mc:Fallback xmlns="">
+      <p:transition spd="slow">
+        <p:fade/>
+      </p:transition>
+    </mc:Fallback>
+  </mc:AlternateContent>
+</p:sld>
+</file>
+
+<file path=ppt/slides/slide12.xml><?xml version="1.0" encoding="utf-8"?>
+<p:sld xmlns:a="http://schemas.openxmlformats.org/drawingml/2006/main" xmlns:r="http://schemas.openxmlformats.org/officeDocument/2006/relationships" xmlns:p="http://schemas.openxmlformats.org/presentationml/2006/main">
+  <p:cSld>
+    <p:spTree>
+      <p:nvGrpSpPr>
+        <p:cNvPr id="1" name=""/>
+        <p:cNvGrpSpPr/>
+        <p:nvPr/>
+      </p:nvGrpSpPr>
+      <p:grpSpPr>
+        <a:xfrm>
+          <a:off x="0" y="0"/>
+          <a:ext cx="0" cy="0"/>
+          <a:chOff x="0" y="0"/>
+          <a:chExt cx="0" cy="0"/>
+        </a:xfrm>
+      </p:grpSpPr>
+      <p:sp>
+        <p:nvSpPr>
+          <p:cNvPr id="2" name="Title 1">
+            <a:extLst>
+              <a:ext uri="{FF2B5EF4-FFF2-40B4-BE49-F238E27FC236}">
                 <a16:creationId xmlns:a16="http://schemas.microsoft.com/office/drawing/2014/main" id="{7EE1DCE8-D311-4D99-A81C-BE65135FC7B1}"/>
               </a:ext>
             </a:extLst>
@@ -7298,13 +8066,13 @@
   <p:clrMapOvr>
     <a:masterClrMapping/>
   </p:clrMapOvr>
-  <mc:AlternateContent xmlns:mc="http://schemas.openxmlformats.org/markup-compatibility/2006">
-    <mc:Choice xmlns:p159="http://schemas.microsoft.com/office/powerpoint/2015/09/main" Requires="p159">
+  <mc:AlternateContent xmlns:mc="http://schemas.openxmlformats.org/markup-compatibility/2006" xmlns:p159="http://schemas.microsoft.com/office/powerpoint/2015/09/main">
+    <mc:Choice Requires="p159">
       <p:transition xmlns:p14="http://schemas.microsoft.com/office/powerpoint/2010/main" spd="slow" p14:dur="2000">
         <p159:morph option="byObject"/>
       </p:transition>
     </mc:Choice>
-    <mc:Fallback>
+    <mc:Fallback xmlns="">
       <p:transition spd="slow">
         <p:fade/>
       </p:transition>
@@ -7591,7 +8359,7 @@
 </p:sld>
 </file>
 
-<file path=ppt/slides/slide11.xml><?xml version="1.0" encoding="utf-8"?>
+<file path=ppt/slides/slide13.xml><?xml version="1.0" encoding="utf-8"?>
 <p:sld xmlns:a="http://schemas.openxmlformats.org/drawingml/2006/main" xmlns:r="http://schemas.openxmlformats.org/officeDocument/2006/relationships" xmlns:p="http://schemas.openxmlformats.org/presentationml/2006/main">
   <p:cSld>
     <p:spTree>
@@ -7732,888 +8500,13 @@
   <p:clrMapOvr>
     <a:masterClrMapping/>
   </p:clrMapOvr>
-  <mc:AlternateContent xmlns:mc="http://schemas.openxmlformats.org/markup-compatibility/2006">
-    <mc:Choice xmlns:p159="http://schemas.microsoft.com/office/powerpoint/2015/09/main" Requires="p159">
+  <mc:AlternateContent xmlns:mc="http://schemas.openxmlformats.org/markup-compatibility/2006" xmlns:p159="http://schemas.microsoft.com/office/powerpoint/2015/09/main">
+    <mc:Choice Requires="p159">
       <p:transition xmlns:p14="http://schemas.microsoft.com/office/powerpoint/2010/main" spd="slow" p14:dur="2000">
         <p159:morph option="byObject"/>
       </p:transition>
     </mc:Choice>
-    <mc:Fallback>
-      <p:transition spd="slow">
-        <p:fade/>
-      </p:transition>
-    </mc:Fallback>
-  </mc:AlternateContent>
-</p:sld>
-</file>
-
-<file path=ppt/slides/slide12.xml><?xml version="1.0" encoding="utf-8"?>
-<p:sld xmlns:a="http://schemas.openxmlformats.org/drawingml/2006/main" xmlns:r="http://schemas.openxmlformats.org/officeDocument/2006/relationships" xmlns:p="http://schemas.openxmlformats.org/presentationml/2006/main">
-  <p:cSld>
-    <p:bg>
-      <p:bgPr>
-        <a:solidFill>
-          <a:schemeClr val="bg1"/>
-        </a:solidFill>
-        <a:effectLst/>
-      </p:bgPr>
-    </p:bg>
-    <p:spTree>
-      <p:nvGrpSpPr>
-        <p:cNvPr id="1" name=""/>
-        <p:cNvGrpSpPr/>
-        <p:nvPr/>
-      </p:nvGrpSpPr>
-      <p:grpSpPr>
-        <a:xfrm>
-          <a:off x="0" y="0"/>
-          <a:ext cx="0" cy="0"/>
-          <a:chOff x="0" y="0"/>
-          <a:chExt cx="0" cy="0"/>
-        </a:xfrm>
-      </p:grpSpPr>
-      <p:sp>
-        <p:nvSpPr>
-          <p:cNvPr id="2" name="Title 1">
-            <a:extLst>
-              <a:ext uri="{FF2B5EF4-FFF2-40B4-BE49-F238E27FC236}">
-                <a16:creationId xmlns:a16="http://schemas.microsoft.com/office/drawing/2014/main" id="{7EE1DCE8-D311-4D99-A81C-BE65135FC7B1}"/>
-              </a:ext>
-            </a:extLst>
-          </p:cNvPr>
-          <p:cNvSpPr>
-            <a:spLocks noGrp="1"/>
-          </p:cNvSpPr>
-          <p:nvPr>
-            <p:ph type="title"/>
-          </p:nvPr>
-        </p:nvSpPr>
-        <p:spPr>
-          <a:xfrm>
-            <a:off x="676746" y="609600"/>
-            <a:ext cx="3729076" cy="1320800"/>
-          </a:xfrm>
-        </p:spPr>
-        <p:txBody>
-          <a:bodyPr anchor="ctr">
-            <a:normAutofit/>
-          </a:bodyPr>
-          <a:lstStyle/>
-          <a:p>
-            <a:r>
-              <a:rPr lang="en-US" sz="3600"/>
-              <a:t>Branching and Merging</a:t>
-            </a:r>
-          </a:p>
-        </p:txBody>
-      </p:sp>
-      <p:sp>
-        <p:nvSpPr>
-          <p:cNvPr id="3" name="Content Placeholder 2">
-            <a:extLst>
-              <a:ext uri="{FF2B5EF4-FFF2-40B4-BE49-F238E27FC236}">
-                <a16:creationId xmlns:a16="http://schemas.microsoft.com/office/drawing/2014/main" id="{9374DAC6-B719-4917-BD3A-9F035608224A}"/>
-              </a:ext>
-            </a:extLst>
-          </p:cNvPr>
-          <p:cNvSpPr>
-            <a:spLocks noGrp="1"/>
-          </p:cNvSpPr>
-          <p:nvPr>
-            <p:ph idx="1"/>
-          </p:nvPr>
-        </p:nvSpPr>
-        <p:spPr>
-          <a:xfrm>
-            <a:off x="685167" y="2160589"/>
-            <a:ext cx="3720916" cy="3560733"/>
-          </a:xfrm>
-        </p:spPr>
-        <p:txBody>
-          <a:bodyPr>
-            <a:normAutofit/>
-          </a:bodyPr>
-          <a:lstStyle/>
-          <a:p>
-            <a:r>
-              <a:rPr lang="en-US" dirty="0"/>
-              <a:t>A branch is a copy of the working set that can be modified independently of other branches.</a:t>
-            </a:r>
-          </a:p>
-          <a:p>
-            <a:r>
-              <a:rPr lang="en-US" dirty="0"/>
-              <a:t>Merging is the act of applying the changes from one branch to another branch.</a:t>
-            </a:r>
-          </a:p>
-          <a:p>
-            <a:pPr lvl="1"/>
-            <a:endParaRPr lang="en-US" dirty="0"/>
-          </a:p>
-        </p:txBody>
-      </p:sp>
-      <p:pic>
-        <p:nvPicPr>
-          <p:cNvPr id="4" name="Picture 3">
-            <a:extLst>
-              <a:ext uri="{FF2B5EF4-FFF2-40B4-BE49-F238E27FC236}">
-                <a16:creationId xmlns:a16="http://schemas.microsoft.com/office/drawing/2014/main" id="{BD5BEA6F-173C-4D5E-BFBE-669D2CCB2796}"/>
-              </a:ext>
-            </a:extLst>
-          </p:cNvPr>
-          <p:cNvPicPr>
-            <a:picLocks noChangeAspect="1"/>
-          </p:cNvPicPr>
-          <p:nvPr/>
-        </p:nvPicPr>
-        <p:blipFill>
-          <a:blip r:embed="rId3"/>
-          <a:stretch>
-            <a:fillRect/>
-          </a:stretch>
-        </p:blipFill>
-        <p:spPr>
-          <a:xfrm>
-            <a:off x="4654035" y="1134265"/>
-            <a:ext cx="4602747" cy="4084937"/>
-          </a:xfrm>
-          <a:prstGeom prst="rect">
-            <a:avLst/>
-          </a:prstGeom>
-        </p:spPr>
-      </p:pic>
-    </p:spTree>
-    <p:extLst>
-      <p:ext uri="{BB962C8B-B14F-4D97-AF65-F5344CB8AC3E}">
-        <p14:creationId xmlns:p14="http://schemas.microsoft.com/office/powerpoint/2010/main" val="1546890086"/>
-      </p:ext>
-    </p:extLst>
-  </p:cSld>
-  <p:clrMapOvr>
-    <a:masterClrMapping/>
-  </p:clrMapOvr>
-  <mc:AlternateContent xmlns:mc="http://schemas.openxmlformats.org/markup-compatibility/2006">
-    <mc:Choice xmlns:p159="http://schemas.microsoft.com/office/powerpoint/2015/09/main" Requires="p159">
-      <p:transition xmlns:p14="http://schemas.microsoft.com/office/powerpoint/2010/main" spd="slow" p14:dur="2000">
-        <p159:morph option="byObject"/>
-      </p:transition>
-    </mc:Choice>
-    <mc:Fallback>
-      <p:transition spd="slow">
-        <p:fade/>
-      </p:transition>
-    </mc:Fallback>
-  </mc:AlternateContent>
-</p:sld>
-</file>
-
-<file path=ppt/slides/slide13.xml><?xml version="1.0" encoding="utf-8"?>
-<p:sld xmlns:a="http://schemas.openxmlformats.org/drawingml/2006/main" xmlns:r="http://schemas.openxmlformats.org/officeDocument/2006/relationships" xmlns:p="http://schemas.openxmlformats.org/presentationml/2006/main">
-  <p:cSld>
-    <p:spTree>
-      <p:nvGrpSpPr>
-        <p:cNvPr id="1" name=""/>
-        <p:cNvGrpSpPr/>
-        <p:nvPr/>
-      </p:nvGrpSpPr>
-      <p:grpSpPr>
-        <a:xfrm>
-          <a:off x="0" y="0"/>
-          <a:ext cx="0" cy="0"/>
-          <a:chOff x="0" y="0"/>
-          <a:chExt cx="0" cy="0"/>
-        </a:xfrm>
-      </p:grpSpPr>
-      <p:sp>
-        <p:nvSpPr>
-          <p:cNvPr id="2" name="Title 1">
-            <a:extLst>
-              <a:ext uri="{FF2B5EF4-FFF2-40B4-BE49-F238E27FC236}">
-                <a16:creationId xmlns:a16="http://schemas.microsoft.com/office/drawing/2014/main" id="{7EE1DCE8-D311-4D99-A81C-BE65135FC7B1}"/>
-              </a:ext>
-            </a:extLst>
-          </p:cNvPr>
-          <p:cNvSpPr>
-            <a:spLocks noGrp="1"/>
-          </p:cNvSpPr>
-          <p:nvPr>
-            <p:ph type="title"/>
-          </p:nvPr>
-        </p:nvSpPr>
-        <p:spPr>
-          <a:xfrm>
-            <a:off x="677334" y="609600"/>
-            <a:ext cx="8596668" cy="732639"/>
-          </a:xfrm>
-        </p:spPr>
-        <p:txBody>
-          <a:bodyPr/>
-          <a:lstStyle/>
-          <a:p>
-            <a:r>
-              <a:rPr lang="en-US" dirty="0"/>
-              <a:t>Push (and Pull)</a:t>
-            </a:r>
-          </a:p>
-        </p:txBody>
-      </p:sp>
-      <p:sp>
-        <p:nvSpPr>
-          <p:cNvPr id="3" name="Content Placeholder 2">
-            <a:extLst>
-              <a:ext uri="{FF2B5EF4-FFF2-40B4-BE49-F238E27FC236}">
-                <a16:creationId xmlns:a16="http://schemas.microsoft.com/office/drawing/2014/main" id="{9374DAC6-B719-4917-BD3A-9F035608224A}"/>
-              </a:ext>
-            </a:extLst>
-          </p:cNvPr>
-          <p:cNvSpPr>
-            <a:spLocks noGrp="1"/>
-          </p:cNvSpPr>
-          <p:nvPr>
-            <p:ph idx="1"/>
-          </p:nvPr>
-        </p:nvSpPr>
-        <p:spPr>
-          <a:xfrm>
-            <a:off x="677334" y="1342239"/>
-            <a:ext cx="8596668" cy="4699123"/>
-          </a:xfrm>
-        </p:spPr>
-        <p:txBody>
-          <a:bodyPr/>
-          <a:lstStyle/>
-          <a:p>
-            <a:r>
-              <a:rPr lang="en-US" dirty="0"/>
-              <a:t>Pushing is the act of moving the changeset from your repo to another repo.</a:t>
-            </a:r>
-          </a:p>
-          <a:p>
-            <a:pPr lvl="1"/>
-            <a:r>
-              <a:rPr lang="en-US" dirty="0"/>
-              <a:t>This is the way changesets are shared. </a:t>
-            </a:r>
-          </a:p>
-          <a:p>
-            <a:r>
-              <a:rPr lang="en-US" dirty="0"/>
-              <a:t>Pull Requests (Short for: Requesting Someone Else To Pull Your Changes)</a:t>
-            </a:r>
-          </a:p>
-          <a:p>
-            <a:pPr lvl="1"/>
-            <a:endParaRPr lang="en-US" dirty="0"/>
-          </a:p>
-        </p:txBody>
-      </p:sp>
-    </p:spTree>
-    <p:extLst>
-      <p:ext uri="{BB962C8B-B14F-4D97-AF65-F5344CB8AC3E}">
-        <p14:creationId xmlns:p14="http://schemas.microsoft.com/office/powerpoint/2010/main" val="52621604"/>
-      </p:ext>
-    </p:extLst>
-  </p:cSld>
-  <p:clrMapOvr>
-    <a:masterClrMapping/>
-  </p:clrMapOvr>
-  <mc:AlternateContent xmlns:mc="http://schemas.openxmlformats.org/markup-compatibility/2006">
-    <mc:Choice xmlns:p159="http://schemas.microsoft.com/office/powerpoint/2015/09/main" Requires="p159">
-      <p:transition xmlns:p14="http://schemas.microsoft.com/office/powerpoint/2010/main" spd="slow" p14:dur="2000">
-        <p159:morph option="byObject"/>
-      </p:transition>
-    </mc:Choice>
-    <mc:Fallback>
-      <p:transition spd="slow">
-        <p:fade/>
-      </p:transition>
-    </mc:Fallback>
-  </mc:AlternateContent>
-</p:sld>
-</file>
-
-<file path=ppt/slides/slide14.xml><?xml version="1.0" encoding="utf-8"?>
-<p:sld xmlns:a="http://schemas.openxmlformats.org/drawingml/2006/main" xmlns:r="http://schemas.openxmlformats.org/officeDocument/2006/relationships" xmlns:p="http://schemas.openxmlformats.org/presentationml/2006/main">
-  <p:cSld>
-    <p:spTree>
-      <p:nvGrpSpPr>
-        <p:cNvPr id="1" name=""/>
-        <p:cNvGrpSpPr/>
-        <p:nvPr/>
-      </p:nvGrpSpPr>
-      <p:grpSpPr>
-        <a:xfrm>
-          <a:off x="0" y="0"/>
-          <a:ext cx="0" cy="0"/>
-          <a:chOff x="0" y="0"/>
-          <a:chExt cx="0" cy="0"/>
-        </a:xfrm>
-      </p:grpSpPr>
-      <p:sp>
-        <p:nvSpPr>
-          <p:cNvPr id="2" name="Title 1">
-            <a:extLst>
-              <a:ext uri="{FF2B5EF4-FFF2-40B4-BE49-F238E27FC236}">
-                <a16:creationId xmlns:a16="http://schemas.microsoft.com/office/drawing/2014/main" id="{C85963BB-D731-466E-9B53-F39BEDD14A67}"/>
-              </a:ext>
-            </a:extLst>
-          </p:cNvPr>
-          <p:cNvSpPr>
-            <a:spLocks noGrp="1"/>
-          </p:cNvSpPr>
-          <p:nvPr>
-            <p:ph type="title"/>
-          </p:nvPr>
-        </p:nvSpPr>
-        <p:spPr/>
-        <p:txBody>
-          <a:bodyPr/>
-          <a:lstStyle/>
-          <a:p>
-            <a:r>
-              <a:rPr lang="en-US" dirty="0"/>
-              <a:t>GitHub</a:t>
-            </a:r>
-          </a:p>
-        </p:txBody>
-      </p:sp>
-      <p:sp>
-        <p:nvSpPr>
-          <p:cNvPr id="3" name="Content Placeholder 2">
-            <a:extLst>
-              <a:ext uri="{FF2B5EF4-FFF2-40B4-BE49-F238E27FC236}">
-                <a16:creationId xmlns:a16="http://schemas.microsoft.com/office/drawing/2014/main" id="{28DCBE85-F0B3-46DD-9244-8E0C4FA104DD}"/>
-              </a:ext>
-            </a:extLst>
-          </p:cNvPr>
-          <p:cNvSpPr>
-            <a:spLocks noGrp="1"/>
-          </p:cNvSpPr>
-          <p:nvPr>
-            <p:ph idx="1"/>
-          </p:nvPr>
-        </p:nvSpPr>
-        <p:spPr/>
-        <p:txBody>
-          <a:bodyPr/>
-          <a:lstStyle/>
-          <a:p>
-            <a:endParaRPr lang="en-US" dirty="0"/>
-          </a:p>
-        </p:txBody>
-      </p:sp>
-    </p:spTree>
-    <p:extLst>
-      <p:ext uri="{BB962C8B-B14F-4D97-AF65-F5344CB8AC3E}">
-        <p14:creationId xmlns:p14="http://schemas.microsoft.com/office/powerpoint/2010/main" val="1367772460"/>
-      </p:ext>
-    </p:extLst>
-  </p:cSld>
-  <p:clrMapOvr>
-    <a:masterClrMapping/>
-  </p:clrMapOvr>
-  <mc:AlternateContent xmlns:mc="http://schemas.openxmlformats.org/markup-compatibility/2006">
-    <mc:Choice xmlns:p159="http://schemas.microsoft.com/office/powerpoint/2015/09/main" Requires="p159">
-      <p:transition xmlns:p14="http://schemas.microsoft.com/office/powerpoint/2010/main" spd="slow" p14:dur="2000">
-        <p159:morph option="byObject"/>
-      </p:transition>
-    </mc:Choice>
-    <mc:Fallback>
-      <p:transition spd="slow">
-        <p:fade/>
-      </p:transition>
-    </mc:Fallback>
-  </mc:AlternateContent>
-</p:sld>
-</file>
-
-<file path=ppt/slides/slide15.xml><?xml version="1.0" encoding="utf-8"?>
-<p:sld xmlns:a="http://schemas.openxmlformats.org/drawingml/2006/main" xmlns:r="http://schemas.openxmlformats.org/officeDocument/2006/relationships" xmlns:p="http://schemas.openxmlformats.org/presentationml/2006/main">
-  <p:cSld>
-    <p:spTree>
-      <p:nvGrpSpPr>
-        <p:cNvPr id="1" name=""/>
-        <p:cNvGrpSpPr/>
-        <p:nvPr/>
-      </p:nvGrpSpPr>
-      <p:grpSpPr>
-        <a:xfrm>
-          <a:off x="0" y="0"/>
-          <a:ext cx="0" cy="0"/>
-          <a:chOff x="0" y="0"/>
-          <a:chExt cx="0" cy="0"/>
-        </a:xfrm>
-      </p:grpSpPr>
-      <p:sp>
-        <p:nvSpPr>
-          <p:cNvPr id="2" name="Title 1">
-            <a:extLst>
-              <a:ext uri="{FF2B5EF4-FFF2-40B4-BE49-F238E27FC236}">
-                <a16:creationId xmlns:a16="http://schemas.microsoft.com/office/drawing/2014/main" id="{ECBF22E6-9EF8-4EB2-88B3-3875ED450CAF}"/>
-              </a:ext>
-            </a:extLst>
-          </p:cNvPr>
-          <p:cNvSpPr>
-            <a:spLocks noGrp="1"/>
-          </p:cNvSpPr>
-          <p:nvPr>
-            <p:ph type="ctrTitle"/>
-          </p:nvPr>
-        </p:nvSpPr>
-        <p:spPr/>
-        <p:txBody>
-          <a:bodyPr/>
-          <a:lstStyle/>
-          <a:p>
-            <a:r>
-              <a:rPr lang="en-US" dirty="0"/>
-              <a:t>Questions?</a:t>
-            </a:r>
-          </a:p>
-        </p:txBody>
-      </p:sp>
-      <p:sp>
-        <p:nvSpPr>
-          <p:cNvPr id="3" name="Subtitle 2">
-            <a:extLst>
-              <a:ext uri="{FF2B5EF4-FFF2-40B4-BE49-F238E27FC236}">
-                <a16:creationId xmlns:a16="http://schemas.microsoft.com/office/drawing/2014/main" id="{929B19A5-6D33-451A-8FC4-594FDCA00286}"/>
-              </a:ext>
-            </a:extLst>
-          </p:cNvPr>
-          <p:cNvSpPr>
-            <a:spLocks noGrp="1"/>
-          </p:cNvSpPr>
-          <p:nvPr>
-            <p:ph type="subTitle" idx="1"/>
-          </p:nvPr>
-        </p:nvSpPr>
-        <p:spPr/>
-        <p:txBody>
-          <a:bodyPr/>
-          <a:lstStyle/>
-          <a:p>
-            <a:endParaRPr lang="en-US" dirty="0"/>
-          </a:p>
-        </p:txBody>
-      </p:sp>
-    </p:spTree>
-    <p:extLst>
-      <p:ext uri="{BB962C8B-B14F-4D97-AF65-F5344CB8AC3E}">
-        <p14:creationId xmlns:p14="http://schemas.microsoft.com/office/powerpoint/2010/main" val="2403661108"/>
-      </p:ext>
-    </p:extLst>
-  </p:cSld>
-  <p:clrMapOvr>
-    <a:masterClrMapping/>
-  </p:clrMapOvr>
-  <mc:AlternateContent xmlns:mc="http://schemas.openxmlformats.org/markup-compatibility/2006">
-    <mc:Choice xmlns:p159="http://schemas.microsoft.com/office/powerpoint/2015/09/main" Requires="p159">
-      <p:transition xmlns:p14="http://schemas.microsoft.com/office/powerpoint/2010/main" spd="slow" p14:dur="2000">
-        <p159:morph option="byObject"/>
-      </p:transition>
-    </mc:Choice>
-    <mc:Fallback>
-      <p:transition spd="slow">
-        <p:fade/>
-      </p:transition>
-    </mc:Fallback>
-  </mc:AlternateContent>
-</p:sld>
-</file>
-
-<file path=ppt/slides/slide16.xml><?xml version="1.0" encoding="utf-8"?>
-<p:sld xmlns:a="http://schemas.openxmlformats.org/drawingml/2006/main" xmlns:r="http://schemas.openxmlformats.org/officeDocument/2006/relationships" xmlns:p="http://schemas.openxmlformats.org/presentationml/2006/main">
-  <p:cSld>
-    <p:spTree>
-      <p:nvGrpSpPr>
-        <p:cNvPr id="1" name=""/>
-        <p:cNvGrpSpPr/>
-        <p:nvPr/>
-      </p:nvGrpSpPr>
-      <p:grpSpPr>
-        <a:xfrm>
-          <a:off x="0" y="0"/>
-          <a:ext cx="0" cy="0"/>
-          <a:chOff x="0" y="0"/>
-          <a:chExt cx="0" cy="0"/>
-        </a:xfrm>
-      </p:grpSpPr>
-      <p:sp>
-        <p:nvSpPr>
-          <p:cNvPr id="2" name="Title 1">
-            <a:extLst>
-              <a:ext uri="{FF2B5EF4-FFF2-40B4-BE49-F238E27FC236}">
-                <a16:creationId xmlns:a16="http://schemas.microsoft.com/office/drawing/2014/main" id="{683E4871-360F-44C3-A8FD-445890CEC74C}"/>
-              </a:ext>
-            </a:extLst>
-          </p:cNvPr>
-          <p:cNvSpPr>
-            <a:spLocks noGrp="1"/>
-          </p:cNvSpPr>
-          <p:nvPr>
-            <p:ph type="ctrTitle"/>
-          </p:nvPr>
-        </p:nvSpPr>
-        <p:spPr/>
-        <p:txBody>
-          <a:bodyPr/>
-          <a:lstStyle/>
-          <a:p>
-            <a:r>
-              <a:rPr lang="en-US" dirty="0"/>
-              <a:t>Thank you</a:t>
-            </a:r>
-          </a:p>
-        </p:txBody>
-      </p:sp>
-      <p:sp>
-        <p:nvSpPr>
-          <p:cNvPr id="3" name="Subtitle 2">
-            <a:extLst>
-              <a:ext uri="{FF2B5EF4-FFF2-40B4-BE49-F238E27FC236}">
-                <a16:creationId xmlns:a16="http://schemas.microsoft.com/office/drawing/2014/main" id="{20A51FFC-0255-460B-A489-5E875685389D}"/>
-              </a:ext>
-            </a:extLst>
-          </p:cNvPr>
-          <p:cNvSpPr>
-            <a:spLocks noGrp="1"/>
-          </p:cNvSpPr>
-          <p:nvPr>
-            <p:ph type="subTitle" idx="1"/>
-          </p:nvPr>
-        </p:nvSpPr>
-        <p:spPr/>
-        <p:txBody>
-          <a:bodyPr/>
-          <a:lstStyle/>
-          <a:p>
-            <a:endParaRPr lang="en-US" dirty="0"/>
-          </a:p>
-        </p:txBody>
-      </p:sp>
-    </p:spTree>
-    <p:extLst>
-      <p:ext uri="{BB962C8B-B14F-4D97-AF65-F5344CB8AC3E}">
-        <p14:creationId xmlns:p14="http://schemas.microsoft.com/office/powerpoint/2010/main" val="3301109532"/>
-      </p:ext>
-    </p:extLst>
-  </p:cSld>
-  <p:clrMapOvr>
-    <a:masterClrMapping/>
-  </p:clrMapOvr>
-  <mc:AlternateContent xmlns:mc="http://schemas.openxmlformats.org/markup-compatibility/2006">
-    <mc:Choice xmlns:p159="http://schemas.microsoft.com/office/powerpoint/2015/09/main" Requires="p159">
-      <p:transition xmlns:p14="http://schemas.microsoft.com/office/powerpoint/2010/main" spd="slow" p14:dur="2000">
-        <p159:morph option="byObject"/>
-      </p:transition>
-    </mc:Choice>
-    <mc:Fallback>
-      <p:transition spd="slow">
-        <p:fade/>
-      </p:transition>
-    </mc:Fallback>
-  </mc:AlternateContent>
-</p:sld>
-</file>
-
-<file path=ppt/slides/slide17.xml><?xml version="1.0" encoding="utf-8"?>
-<p:sld xmlns:a="http://schemas.openxmlformats.org/drawingml/2006/main" xmlns:r="http://schemas.openxmlformats.org/officeDocument/2006/relationships" xmlns:p="http://schemas.openxmlformats.org/presentationml/2006/main">
-  <p:cSld>
-    <p:spTree>
-      <p:nvGrpSpPr>
-        <p:cNvPr id="1" name=""/>
-        <p:cNvGrpSpPr/>
-        <p:nvPr/>
-      </p:nvGrpSpPr>
-      <p:grpSpPr>
-        <a:xfrm>
-          <a:off x="0" y="0"/>
-          <a:ext cx="0" cy="0"/>
-          <a:chOff x="0" y="0"/>
-          <a:chExt cx="0" cy="0"/>
-        </a:xfrm>
-      </p:grpSpPr>
-      <p:sp>
-        <p:nvSpPr>
-          <p:cNvPr id="2" name="Title 1">
-            <a:extLst>
-              <a:ext uri="{FF2B5EF4-FFF2-40B4-BE49-F238E27FC236}">
-                <a16:creationId xmlns:a16="http://schemas.microsoft.com/office/drawing/2014/main" id="{C85963BB-D731-466E-9B53-F39BEDD14A67}"/>
-              </a:ext>
-            </a:extLst>
-          </p:cNvPr>
-          <p:cNvSpPr>
-            <a:spLocks noGrp="1"/>
-          </p:cNvSpPr>
-          <p:nvPr>
-            <p:ph type="title"/>
-          </p:nvPr>
-        </p:nvSpPr>
-        <p:spPr>
-          <a:xfrm>
-            <a:off x="677334" y="609600"/>
-            <a:ext cx="8596668" cy="696686"/>
-          </a:xfrm>
-        </p:spPr>
-        <p:txBody>
-          <a:bodyPr/>
-          <a:lstStyle/>
-          <a:p>
-            <a:r>
-              <a:rPr lang="en-US" dirty="0"/>
-              <a:t>References	</a:t>
-            </a:r>
-          </a:p>
-        </p:txBody>
-      </p:sp>
-      <p:sp>
-        <p:nvSpPr>
-          <p:cNvPr id="3" name="Content Placeholder 2">
-            <a:extLst>
-              <a:ext uri="{FF2B5EF4-FFF2-40B4-BE49-F238E27FC236}">
-                <a16:creationId xmlns:a16="http://schemas.microsoft.com/office/drawing/2014/main" id="{28DCBE85-F0B3-46DD-9244-8E0C4FA104DD}"/>
-              </a:ext>
-            </a:extLst>
-          </p:cNvPr>
-          <p:cNvSpPr>
-            <a:spLocks noGrp="1"/>
-          </p:cNvSpPr>
-          <p:nvPr>
-            <p:ph idx="1"/>
-          </p:nvPr>
-        </p:nvSpPr>
-        <p:spPr>
-          <a:xfrm>
-            <a:off x="677334" y="1306287"/>
-            <a:ext cx="8596668" cy="4735076"/>
-          </a:xfrm>
-        </p:spPr>
-        <p:txBody>
-          <a:bodyPr/>
-          <a:lstStyle/>
-          <a:p>
-            <a:r>
-              <a:rPr lang="en-US" dirty="0"/>
-              <a:t>Atlassian Tutorial (</a:t>
-            </a:r>
-            <a:r>
-              <a:rPr lang="en-US" dirty="0">
-                <a:hlinkClick r:id="rId2"/>
-              </a:rPr>
-              <a:t>https://www.atlassian.com/git/tutorials</a:t>
-            </a:r>
-            <a:r>
-              <a:rPr lang="en-US" dirty="0"/>
-              <a:t>)</a:t>
-            </a:r>
-          </a:p>
-          <a:p>
-            <a:r>
-              <a:rPr lang="en-US" dirty="0"/>
-              <a:t>Git SCM docs (</a:t>
-            </a:r>
-            <a:r>
-              <a:rPr lang="en-US" dirty="0">
-                <a:hlinkClick r:id="rId3"/>
-              </a:rPr>
-              <a:t>https://git-scm.com/docs/</a:t>
-            </a:r>
-            <a:r>
-              <a:rPr lang="en-US" dirty="0"/>
-              <a:t>)</a:t>
-            </a:r>
-          </a:p>
-          <a:p>
-            <a:r>
-              <a:rPr lang="en-US" dirty="0"/>
-              <a:t>Git for Teams (</a:t>
-            </a:r>
-          </a:p>
-          <a:p>
-            <a:endParaRPr lang="en-US" dirty="0"/>
-          </a:p>
-          <a:p>
-            <a:endParaRPr lang="en-US" dirty="0"/>
-          </a:p>
-        </p:txBody>
-      </p:sp>
-    </p:spTree>
-    <p:extLst>
-      <p:ext uri="{BB962C8B-B14F-4D97-AF65-F5344CB8AC3E}">
-        <p14:creationId xmlns:p14="http://schemas.microsoft.com/office/powerpoint/2010/main" val="1585113183"/>
-      </p:ext>
-    </p:extLst>
-  </p:cSld>
-  <p:clrMapOvr>
-    <a:masterClrMapping/>
-  </p:clrMapOvr>
-  <mc:AlternateContent xmlns:mc="http://schemas.openxmlformats.org/markup-compatibility/2006">
-    <mc:Choice xmlns:p159="http://schemas.microsoft.com/office/powerpoint/2015/09/main" Requires="p159">
-      <p:transition xmlns:p14="http://schemas.microsoft.com/office/powerpoint/2010/main" spd="slow" p14:dur="2000">
-        <p159:morph option="byObject"/>
-      </p:transition>
-    </mc:Choice>
-    <mc:Fallback>
-      <p:transition spd="slow">
-        <p:fade/>
-      </p:transition>
-    </mc:Fallback>
-  </mc:AlternateContent>
-</p:sld>
-</file>
-
-<file path=ppt/slides/slide2.xml><?xml version="1.0" encoding="utf-8"?>
-<p:sld xmlns:a="http://schemas.openxmlformats.org/drawingml/2006/main" xmlns:r="http://schemas.openxmlformats.org/officeDocument/2006/relationships" xmlns:p="http://schemas.openxmlformats.org/presentationml/2006/main">
-  <p:cSld>
-    <p:spTree>
-      <p:nvGrpSpPr>
-        <p:cNvPr id="1" name=""/>
-        <p:cNvGrpSpPr/>
-        <p:nvPr/>
-      </p:nvGrpSpPr>
-      <p:grpSpPr>
-        <a:xfrm>
-          <a:off x="0" y="0"/>
-          <a:ext cx="0" cy="0"/>
-          <a:chOff x="0" y="0"/>
-          <a:chExt cx="0" cy="0"/>
-        </a:xfrm>
-      </p:grpSpPr>
-      <p:sp>
-        <p:nvSpPr>
-          <p:cNvPr id="2" name="Title 1">
-            <a:extLst>
-              <a:ext uri="{FF2B5EF4-FFF2-40B4-BE49-F238E27FC236}">
-                <a16:creationId xmlns:a16="http://schemas.microsoft.com/office/drawing/2014/main" id="{B2104145-6527-42ED-997A-3D730D821717}"/>
-              </a:ext>
-            </a:extLst>
-          </p:cNvPr>
-          <p:cNvSpPr>
-            <a:spLocks noGrp="1"/>
-          </p:cNvSpPr>
-          <p:nvPr>
-            <p:ph type="title"/>
-          </p:nvPr>
-        </p:nvSpPr>
-        <p:spPr/>
-        <p:txBody>
-          <a:bodyPr/>
-          <a:lstStyle/>
-          <a:p>
-            <a:r>
-              <a:rPr lang="en-US" dirty="0"/>
-              <a:t>Goal and Target Audience</a:t>
-            </a:r>
-          </a:p>
-        </p:txBody>
-      </p:sp>
-      <p:sp>
-        <p:nvSpPr>
-          <p:cNvPr id="3" name="Content Placeholder 2">
-            <a:extLst>
-              <a:ext uri="{FF2B5EF4-FFF2-40B4-BE49-F238E27FC236}">
-                <a16:creationId xmlns:a16="http://schemas.microsoft.com/office/drawing/2014/main" id="{912A3B78-C535-47A3-B05D-2D4696A554ED}"/>
-              </a:ext>
-            </a:extLst>
-          </p:cNvPr>
-          <p:cNvSpPr>
-            <a:spLocks noGrp="1"/>
-          </p:cNvSpPr>
-          <p:nvPr>
-            <p:ph idx="1"/>
-          </p:nvPr>
-        </p:nvSpPr>
-        <p:spPr/>
-        <p:txBody>
-          <a:bodyPr/>
-          <a:lstStyle/>
-          <a:p>
-            <a:r>
-              <a:rPr lang="en-US" dirty="0"/>
-              <a:t>Goal</a:t>
-            </a:r>
-          </a:p>
-          <a:p>
-            <a:pPr lvl="1"/>
-            <a:r>
-              <a:rPr lang="en-US" dirty="0"/>
-              <a:t>Find and describe the intersection of LabVIEW and Git. </a:t>
-            </a:r>
-          </a:p>
-          <a:p>
-            <a:pPr lvl="1"/>
-            <a:r>
-              <a:rPr lang="en-US" dirty="0"/>
-              <a:t>Present a guide to the tools available for using Git with LabVIEW. </a:t>
-            </a:r>
-          </a:p>
-          <a:p>
-            <a:r>
-              <a:rPr lang="en-US" dirty="0"/>
-              <a:t>Ideal Target Audience</a:t>
-            </a:r>
-          </a:p>
-          <a:p>
-            <a:pPr lvl="1"/>
-            <a:r>
-              <a:rPr lang="en-US" dirty="0"/>
-              <a:t>Has LabVIEW experience, but has little Git (or revision control) experience</a:t>
-            </a:r>
-          </a:p>
-          <a:p>
-            <a:r>
-              <a:rPr lang="en-US" dirty="0"/>
-              <a:t>Worst Case Audience</a:t>
-            </a:r>
-          </a:p>
-          <a:p>
-            <a:pPr lvl="1"/>
-            <a:r>
-              <a:rPr lang="en-US" dirty="0"/>
-              <a:t>Git experts!</a:t>
-            </a:r>
-          </a:p>
-          <a:p>
-            <a:pPr lvl="1"/>
-            <a:r>
-              <a:rPr lang="en-US" dirty="0"/>
-              <a:t>I apologize in advance for any gross simplifications and errors. </a:t>
-            </a:r>
-          </a:p>
-          <a:p>
-            <a:pPr lvl="1"/>
-            <a:r>
-              <a:rPr lang="en-US" dirty="0"/>
-              <a:t>Please try to avoid “but what about…”s.  I will be focusing on the core feature set and not any extra modules. </a:t>
-            </a:r>
-          </a:p>
-          <a:p>
-            <a:pPr lvl="1"/>
-            <a:endParaRPr lang="en-US" dirty="0"/>
-          </a:p>
-          <a:p>
-            <a:endParaRPr lang="en-US" dirty="0"/>
-          </a:p>
-        </p:txBody>
-      </p:sp>
-    </p:spTree>
-    <p:extLst>
-      <p:ext uri="{BB962C8B-B14F-4D97-AF65-F5344CB8AC3E}">
-        <p14:creationId xmlns:p14="http://schemas.microsoft.com/office/powerpoint/2010/main" val="523057872"/>
-      </p:ext>
-    </p:extLst>
-  </p:cSld>
-  <p:clrMapOvr>
-    <a:masterClrMapping/>
-  </p:clrMapOvr>
-  <mc:AlternateContent xmlns:mc="http://schemas.openxmlformats.org/markup-compatibility/2006">
-    <mc:Choice xmlns:p159="http://schemas.microsoft.com/office/powerpoint/2015/09/main" Requires="p159">
-      <p:transition xmlns:p14="http://schemas.microsoft.com/office/powerpoint/2010/main" spd="slow" p14:dur="2000">
-        <p159:morph option="byObject"/>
-      </p:transition>
-    </mc:Choice>
-    <mc:Fallback>
+    <mc:Fallback xmlns="">
       <p:transition spd="slow">
         <p:fade/>
       </p:transition>
@@ -8670,39 +8563,26 @@
                                   </p:childTnLst>
                                 </p:cTn>
                               </p:par>
+                            </p:childTnLst>
+                          </p:cTn>
+                        </p:par>
+                      </p:childTnLst>
+                    </p:cTn>
+                  </p:par>
+                  <p:par>
+                    <p:cTn id="7" fill="hold">
+                      <p:stCondLst>
+                        <p:cond delay="indefinite"/>
+                      </p:stCondLst>
+                      <p:childTnLst>
+                        <p:par>
+                          <p:cTn id="8" fill="hold">
+                            <p:stCondLst>
+                              <p:cond delay="0"/>
+                            </p:stCondLst>
+                            <p:childTnLst>
                               <p:par>
-                                <p:cTn id="7" presetID="1" presetClass="entr" presetSubtype="0" fill="hold" grpId="0" nodeType="withEffect">
-                                  <p:stCondLst>
-                                    <p:cond delay="0"/>
-                                  </p:stCondLst>
-                                  <p:childTnLst>
-                                    <p:set>
-                                      <p:cBhvr>
-                                        <p:cTn id="8" dur="1" fill="hold">
-                                          <p:stCondLst>
-                                            <p:cond delay="0"/>
-                                          </p:stCondLst>
-                                        </p:cTn>
-                                        <p:tgtEl>
-                                          <p:spTgt spid="3">
-                                            <p:txEl>
-                                              <p:pRg st="1" end="1"/>
-                                            </p:txEl>
-                                          </p:spTgt>
-                                        </p:tgtEl>
-                                        <p:attrNameLst>
-                                          <p:attrName>style.visibility</p:attrName>
-                                        </p:attrNameLst>
-                                      </p:cBhvr>
-                                      <p:to>
-                                        <p:strVal val="visible"/>
-                                      </p:to>
-                                    </p:set>
-                                  </p:childTnLst>
-                                </p:cTn>
-                              </p:par>
-                              <p:par>
-                                <p:cTn id="9" presetID="1" presetClass="entr" presetSubtype="0" fill="hold" grpId="0" nodeType="withEffect">
+                                <p:cTn id="9" presetID="1" presetClass="entr" presetSubtype="0" fill="hold" grpId="0" nodeType="clickEffect">
                                   <p:stCondLst>
                                     <p:cond delay="0"/>
                                   </p:stCondLst>
@@ -8717,7 +8597,7 @@
                                         <p:tgtEl>
                                           <p:spTgt spid="3">
                                             <p:txEl>
-                                              <p:pRg st="2" end="2"/>
+                                              <p:pRg st="1" end="1"/>
                                             </p:txEl>
                                           </p:spTgt>
                                         </p:tgtEl>
@@ -8766,6 +8646,1431 @@
                                         <p:tgtEl>
                                           <p:spTgt spid="3">
                                             <p:txEl>
+                                              <p:pRg st="2" end="2"/>
+                                            </p:txEl>
+                                          </p:spTgt>
+                                        </p:tgtEl>
+                                        <p:attrNameLst>
+                                          <p:attrName>style.visibility</p:attrName>
+                                        </p:attrNameLst>
+                                      </p:cBhvr>
+                                      <p:to>
+                                        <p:strVal val="visible"/>
+                                      </p:to>
+                                    </p:set>
+                                  </p:childTnLst>
+                                </p:cTn>
+                              </p:par>
+                            </p:childTnLst>
+                          </p:cTn>
+                        </p:par>
+                      </p:childTnLst>
+                    </p:cTn>
+                  </p:par>
+                </p:childTnLst>
+              </p:cTn>
+              <p:prevCondLst>
+                <p:cond evt="onPrev" delay="0">
+                  <p:tgtEl>
+                    <p:sldTgt/>
+                  </p:tgtEl>
+                </p:cond>
+              </p:prevCondLst>
+              <p:nextCondLst>
+                <p:cond evt="onNext" delay="0">
+                  <p:tgtEl>
+                    <p:sldTgt/>
+                  </p:tgtEl>
+                </p:cond>
+              </p:nextCondLst>
+            </p:seq>
+          </p:childTnLst>
+        </p:cTn>
+      </p:par>
+    </p:tnLst>
+    <p:bldLst>
+      <p:bldP spid="3" grpId="0" uiExpand="1" build="p"/>
+    </p:bldLst>
+  </p:timing>
+</p:sld>
+</file>
+
+<file path=ppt/slides/slide14.xml><?xml version="1.0" encoding="utf-8"?>
+<p:sld xmlns:a="http://schemas.openxmlformats.org/drawingml/2006/main" xmlns:r="http://schemas.openxmlformats.org/officeDocument/2006/relationships" xmlns:p="http://schemas.openxmlformats.org/presentationml/2006/main">
+  <p:cSld>
+    <p:bg>
+      <p:bgPr>
+        <a:solidFill>
+          <a:schemeClr val="bg1"/>
+        </a:solidFill>
+        <a:effectLst/>
+      </p:bgPr>
+    </p:bg>
+    <p:spTree>
+      <p:nvGrpSpPr>
+        <p:cNvPr id="1" name=""/>
+        <p:cNvGrpSpPr/>
+        <p:nvPr/>
+      </p:nvGrpSpPr>
+      <p:grpSpPr>
+        <a:xfrm>
+          <a:off x="0" y="0"/>
+          <a:ext cx="0" cy="0"/>
+          <a:chOff x="0" y="0"/>
+          <a:chExt cx="0" cy="0"/>
+        </a:xfrm>
+      </p:grpSpPr>
+      <p:sp>
+        <p:nvSpPr>
+          <p:cNvPr id="2" name="Title 1">
+            <a:extLst>
+              <a:ext uri="{FF2B5EF4-FFF2-40B4-BE49-F238E27FC236}">
+                <a16:creationId xmlns:a16="http://schemas.microsoft.com/office/drawing/2014/main" id="{7EE1DCE8-D311-4D99-A81C-BE65135FC7B1}"/>
+              </a:ext>
+            </a:extLst>
+          </p:cNvPr>
+          <p:cNvSpPr>
+            <a:spLocks noGrp="1"/>
+          </p:cNvSpPr>
+          <p:nvPr>
+            <p:ph type="title"/>
+          </p:nvPr>
+        </p:nvSpPr>
+        <p:spPr>
+          <a:xfrm>
+            <a:off x="676746" y="609600"/>
+            <a:ext cx="3729076" cy="1320800"/>
+          </a:xfrm>
+        </p:spPr>
+        <p:txBody>
+          <a:bodyPr anchor="ctr">
+            <a:normAutofit/>
+          </a:bodyPr>
+          <a:lstStyle/>
+          <a:p>
+            <a:r>
+              <a:rPr lang="en-US" sz="3600" dirty="0"/>
+              <a:t>Branching</a:t>
+            </a:r>
+          </a:p>
+        </p:txBody>
+      </p:sp>
+      <p:sp>
+        <p:nvSpPr>
+          <p:cNvPr id="3" name="Content Placeholder 2">
+            <a:extLst>
+              <a:ext uri="{FF2B5EF4-FFF2-40B4-BE49-F238E27FC236}">
+                <a16:creationId xmlns:a16="http://schemas.microsoft.com/office/drawing/2014/main" id="{9374DAC6-B719-4917-BD3A-9F035608224A}"/>
+              </a:ext>
+            </a:extLst>
+          </p:cNvPr>
+          <p:cNvSpPr>
+            <a:spLocks noGrp="1"/>
+          </p:cNvSpPr>
+          <p:nvPr>
+            <p:ph idx="1"/>
+          </p:nvPr>
+        </p:nvSpPr>
+        <p:spPr>
+          <a:xfrm>
+            <a:off x="685167" y="2160589"/>
+            <a:ext cx="3720916" cy="3560733"/>
+          </a:xfrm>
+        </p:spPr>
+        <p:txBody>
+          <a:bodyPr>
+            <a:normAutofit/>
+          </a:bodyPr>
+          <a:lstStyle/>
+          <a:p>
+            <a:r>
+              <a:rPr lang="en-US" dirty="0"/>
+              <a:t>A branch is a copy of the working set that can be modified independently of other branches.</a:t>
+            </a:r>
+          </a:p>
+          <a:p>
+            <a:pPr lvl="1"/>
+            <a:endParaRPr lang="en-US" dirty="0"/>
+          </a:p>
+        </p:txBody>
+      </p:sp>
+      <p:pic>
+        <p:nvPicPr>
+          <p:cNvPr id="6" name="Graphic 5">
+            <a:extLst>
+              <a:ext uri="{FF2B5EF4-FFF2-40B4-BE49-F238E27FC236}">
+                <a16:creationId xmlns:a16="http://schemas.microsoft.com/office/drawing/2014/main" id="{F531648D-FF77-4C2E-B401-5014B32744E3}"/>
+              </a:ext>
+            </a:extLst>
+          </p:cNvPr>
+          <p:cNvPicPr>
+            <a:picLocks noChangeAspect="1"/>
+          </p:cNvPicPr>
+          <p:nvPr/>
+        </p:nvPicPr>
+        <p:blipFill>
+          <a:blip r:embed="rId3">
+            <a:extLst>
+              <a:ext uri="{28A0092B-C50C-407E-A947-70E740481C1C}">
+                <a14:useLocalDpi xmlns:a14="http://schemas.microsoft.com/office/drawing/2010/main" val="0"/>
+              </a:ext>
+              <a:ext uri="{96DAC541-7B7A-43D3-8B79-37D633B846F1}">
+                <asvg:svgBlip xmlns:asvg="http://schemas.microsoft.com/office/drawing/2016/SVG/main" r:embed="rId4"/>
+              </a:ext>
+            </a:extLst>
+          </a:blip>
+          <a:stretch>
+            <a:fillRect/>
+          </a:stretch>
+        </p:blipFill>
+        <p:spPr>
+          <a:xfrm>
+            <a:off x="5048249" y="366280"/>
+            <a:ext cx="2295525" cy="5634470"/>
+          </a:xfrm>
+          <a:prstGeom prst="rect">
+            <a:avLst/>
+          </a:prstGeom>
+        </p:spPr>
+      </p:pic>
+      <p:sp>
+        <p:nvSpPr>
+          <p:cNvPr id="7" name="TextBox 6">
+            <a:extLst>
+              <a:ext uri="{FF2B5EF4-FFF2-40B4-BE49-F238E27FC236}">
+                <a16:creationId xmlns:a16="http://schemas.microsoft.com/office/drawing/2014/main" id="{0F5797FB-0F65-439D-8875-A7ABCEEF9D74}"/>
+              </a:ext>
+            </a:extLst>
+          </p:cNvPr>
+          <p:cNvSpPr txBox="1"/>
+          <p:nvPr/>
+        </p:nvSpPr>
+        <p:spPr>
+          <a:xfrm>
+            <a:off x="5048250" y="6296025"/>
+            <a:ext cx="2642417" cy="246221"/>
+          </a:xfrm>
+          <a:prstGeom prst="rect">
+            <a:avLst/>
+          </a:prstGeom>
+          <a:noFill/>
+        </p:spPr>
+        <p:txBody>
+          <a:bodyPr wrap="square" rtlCol="0">
+            <a:spAutoFit/>
+          </a:bodyPr>
+          <a:lstStyle/>
+          <a:p>
+            <a:r>
+              <a:rPr lang="en-US" sz="1000" dirty="0"/>
+              <a:t>(CC BY-SA 3.0, </a:t>
+            </a:r>
+            <a:r>
+              <a:rPr lang="en-US" sz="1000" dirty="0" err="1"/>
+              <a:t>Stannered</a:t>
+            </a:r>
+            <a:r>
+              <a:rPr lang="en-US" sz="1000" dirty="0"/>
+              <a:t> &amp; Sami </a:t>
+            </a:r>
+            <a:r>
+              <a:rPr lang="en-US" sz="1000" dirty="0" err="1"/>
+              <a:t>Kerola</a:t>
+            </a:r>
+            <a:r>
+              <a:rPr lang="en-US" sz="1000" dirty="0"/>
+              <a:t>)</a:t>
+            </a:r>
+          </a:p>
+        </p:txBody>
+      </p:sp>
+    </p:spTree>
+    <p:extLst>
+      <p:ext uri="{BB962C8B-B14F-4D97-AF65-F5344CB8AC3E}">
+        <p14:creationId xmlns:p14="http://schemas.microsoft.com/office/powerpoint/2010/main" val="1546890086"/>
+      </p:ext>
+    </p:extLst>
+  </p:cSld>
+  <p:clrMapOvr>
+    <a:masterClrMapping/>
+  </p:clrMapOvr>
+  <mc:AlternateContent xmlns:mc="http://schemas.openxmlformats.org/markup-compatibility/2006" xmlns:p159="http://schemas.microsoft.com/office/powerpoint/2015/09/main">
+    <mc:Choice Requires="p159">
+      <p:transition xmlns:p14="http://schemas.microsoft.com/office/powerpoint/2010/main" spd="slow" p14:dur="2000">
+        <p159:morph option="byObject"/>
+      </p:transition>
+    </mc:Choice>
+    <mc:Fallback xmlns="">
+      <p:transition spd="slow">
+        <p:fade/>
+      </p:transition>
+    </mc:Fallback>
+  </mc:AlternateContent>
+</p:sld>
+</file>
+
+<file path=ppt/slides/slide15.xml><?xml version="1.0" encoding="utf-8"?>
+<p:sld xmlns:a="http://schemas.openxmlformats.org/drawingml/2006/main" xmlns:r="http://schemas.openxmlformats.org/officeDocument/2006/relationships" xmlns:p="http://schemas.openxmlformats.org/presentationml/2006/main">
+  <p:cSld>
+    <p:spTree>
+      <p:nvGrpSpPr>
+        <p:cNvPr id="1" name=""/>
+        <p:cNvGrpSpPr/>
+        <p:nvPr/>
+      </p:nvGrpSpPr>
+      <p:grpSpPr>
+        <a:xfrm>
+          <a:off x="0" y="0"/>
+          <a:ext cx="0" cy="0"/>
+          <a:chOff x="0" y="0"/>
+          <a:chExt cx="0" cy="0"/>
+        </a:xfrm>
+      </p:grpSpPr>
+      <p:sp>
+        <p:nvSpPr>
+          <p:cNvPr id="2" name="Title 1">
+            <a:extLst>
+              <a:ext uri="{FF2B5EF4-FFF2-40B4-BE49-F238E27FC236}">
+                <a16:creationId xmlns:a16="http://schemas.microsoft.com/office/drawing/2014/main" id="{7EE1DCE8-D311-4D99-A81C-BE65135FC7B1}"/>
+              </a:ext>
+            </a:extLst>
+          </p:cNvPr>
+          <p:cNvSpPr>
+            <a:spLocks noGrp="1"/>
+          </p:cNvSpPr>
+          <p:nvPr>
+            <p:ph type="title"/>
+          </p:nvPr>
+        </p:nvSpPr>
+        <p:spPr>
+          <a:xfrm>
+            <a:off x="676746" y="609600"/>
+            <a:ext cx="3729076" cy="1320800"/>
+          </a:xfrm>
+        </p:spPr>
+        <p:txBody>
+          <a:bodyPr anchor="ctr">
+            <a:normAutofit/>
+          </a:bodyPr>
+          <a:lstStyle/>
+          <a:p>
+            <a:r>
+              <a:rPr lang="en-US" sz="3600" dirty="0"/>
+              <a:t>Merging</a:t>
+            </a:r>
+          </a:p>
+        </p:txBody>
+      </p:sp>
+      <p:sp>
+        <p:nvSpPr>
+          <p:cNvPr id="3" name="Content Placeholder 2">
+            <a:extLst>
+              <a:ext uri="{FF2B5EF4-FFF2-40B4-BE49-F238E27FC236}">
+                <a16:creationId xmlns:a16="http://schemas.microsoft.com/office/drawing/2014/main" id="{9374DAC6-B719-4917-BD3A-9F035608224A}"/>
+              </a:ext>
+            </a:extLst>
+          </p:cNvPr>
+          <p:cNvSpPr>
+            <a:spLocks noGrp="1"/>
+          </p:cNvSpPr>
+          <p:nvPr>
+            <p:ph idx="1"/>
+          </p:nvPr>
+        </p:nvSpPr>
+        <p:spPr>
+          <a:xfrm>
+            <a:off x="685167" y="2160589"/>
+            <a:ext cx="3720916" cy="3560733"/>
+          </a:xfrm>
+        </p:spPr>
+        <p:txBody>
+          <a:bodyPr>
+            <a:normAutofit/>
+          </a:bodyPr>
+          <a:lstStyle/>
+          <a:p>
+            <a:r>
+              <a:rPr lang="en-US" dirty="0"/>
+              <a:t>Merging is the act of applying the changes from one branch to another branch.</a:t>
+            </a:r>
+          </a:p>
+          <a:p>
+            <a:pPr lvl="1"/>
+            <a:endParaRPr lang="en-US" dirty="0"/>
+          </a:p>
+        </p:txBody>
+      </p:sp>
+      <p:pic>
+        <p:nvPicPr>
+          <p:cNvPr id="6" name="Graphic 5">
+            <a:extLst>
+              <a:ext uri="{FF2B5EF4-FFF2-40B4-BE49-F238E27FC236}">
+                <a16:creationId xmlns:a16="http://schemas.microsoft.com/office/drawing/2014/main" id="{F531648D-FF77-4C2E-B401-5014B32744E3}"/>
+              </a:ext>
+            </a:extLst>
+          </p:cNvPr>
+          <p:cNvPicPr>
+            <a:picLocks noChangeAspect="1"/>
+          </p:cNvPicPr>
+          <p:nvPr/>
+        </p:nvPicPr>
+        <p:blipFill>
+          <a:blip r:embed="rId3">
+            <a:extLst>
+              <a:ext uri="{28A0092B-C50C-407E-A947-70E740481C1C}">
+                <a14:useLocalDpi xmlns:a14="http://schemas.microsoft.com/office/drawing/2010/main" val="0"/>
+              </a:ext>
+              <a:ext uri="{96DAC541-7B7A-43D3-8B79-37D633B846F1}">
+                <asvg:svgBlip xmlns:asvg="http://schemas.microsoft.com/office/drawing/2016/SVG/main" r:embed="rId4"/>
+              </a:ext>
+            </a:extLst>
+          </a:blip>
+          <a:stretch>
+            <a:fillRect/>
+          </a:stretch>
+        </p:blipFill>
+        <p:spPr>
+          <a:xfrm>
+            <a:off x="5048249" y="366280"/>
+            <a:ext cx="2295525" cy="5634470"/>
+          </a:xfrm>
+          <a:prstGeom prst="rect">
+            <a:avLst/>
+          </a:prstGeom>
+        </p:spPr>
+      </p:pic>
+      <p:sp>
+        <p:nvSpPr>
+          <p:cNvPr id="7" name="TextBox 6">
+            <a:extLst>
+              <a:ext uri="{FF2B5EF4-FFF2-40B4-BE49-F238E27FC236}">
+                <a16:creationId xmlns:a16="http://schemas.microsoft.com/office/drawing/2014/main" id="{0F5797FB-0F65-439D-8875-A7ABCEEF9D74}"/>
+              </a:ext>
+            </a:extLst>
+          </p:cNvPr>
+          <p:cNvSpPr txBox="1"/>
+          <p:nvPr/>
+        </p:nvSpPr>
+        <p:spPr>
+          <a:xfrm>
+            <a:off x="5048250" y="6296025"/>
+            <a:ext cx="2642417" cy="246221"/>
+          </a:xfrm>
+          <a:prstGeom prst="rect">
+            <a:avLst/>
+          </a:prstGeom>
+          <a:noFill/>
+        </p:spPr>
+        <p:txBody>
+          <a:bodyPr wrap="square" rtlCol="0">
+            <a:spAutoFit/>
+          </a:bodyPr>
+          <a:lstStyle/>
+          <a:p>
+            <a:r>
+              <a:rPr lang="en-US" sz="1000" dirty="0"/>
+              <a:t>(CC BY-SA 3.0, </a:t>
+            </a:r>
+            <a:r>
+              <a:rPr lang="en-US" sz="1000" dirty="0" err="1"/>
+              <a:t>Stannered</a:t>
+            </a:r>
+            <a:r>
+              <a:rPr lang="en-US" sz="1000" dirty="0"/>
+              <a:t> &amp; Sami </a:t>
+            </a:r>
+            <a:r>
+              <a:rPr lang="en-US" sz="1000" dirty="0" err="1"/>
+              <a:t>Kerola</a:t>
+            </a:r>
+            <a:r>
+              <a:rPr lang="en-US" sz="1000" dirty="0"/>
+              <a:t>)</a:t>
+            </a:r>
+          </a:p>
+        </p:txBody>
+      </p:sp>
+    </p:spTree>
+    <p:extLst>
+      <p:ext uri="{BB962C8B-B14F-4D97-AF65-F5344CB8AC3E}">
+        <p14:creationId xmlns:p14="http://schemas.microsoft.com/office/powerpoint/2010/main" val="361885107"/>
+      </p:ext>
+    </p:extLst>
+  </p:cSld>
+  <p:clrMapOvr>
+    <a:masterClrMapping/>
+  </p:clrMapOvr>
+  <mc:AlternateContent xmlns:mc="http://schemas.openxmlformats.org/markup-compatibility/2006" xmlns:p159="http://schemas.microsoft.com/office/powerpoint/2015/09/main">
+    <mc:Choice Requires="p159">
+      <p:transition xmlns:p14="http://schemas.microsoft.com/office/powerpoint/2010/main" spd="slow" p14:dur="2000">
+        <p159:morph option="byObject"/>
+      </p:transition>
+    </mc:Choice>
+    <mc:Fallback xmlns="">
+      <p:transition spd="slow">
+        <p:fade/>
+      </p:transition>
+    </mc:Fallback>
+  </mc:AlternateContent>
+</p:sld>
+</file>
+
+<file path=ppt/slides/slide16.xml><?xml version="1.0" encoding="utf-8"?>
+<p:sld xmlns:a="http://schemas.openxmlformats.org/drawingml/2006/main" xmlns:r="http://schemas.openxmlformats.org/officeDocument/2006/relationships" xmlns:p="http://schemas.openxmlformats.org/presentationml/2006/main">
+  <p:cSld>
+    <p:spTree>
+      <p:nvGrpSpPr>
+        <p:cNvPr id="1" name=""/>
+        <p:cNvGrpSpPr/>
+        <p:nvPr/>
+      </p:nvGrpSpPr>
+      <p:grpSpPr>
+        <a:xfrm>
+          <a:off x="0" y="0"/>
+          <a:ext cx="0" cy="0"/>
+          <a:chOff x="0" y="0"/>
+          <a:chExt cx="0" cy="0"/>
+        </a:xfrm>
+      </p:grpSpPr>
+      <p:sp>
+        <p:nvSpPr>
+          <p:cNvPr id="2" name="Title 1">
+            <a:extLst>
+              <a:ext uri="{FF2B5EF4-FFF2-40B4-BE49-F238E27FC236}">
+                <a16:creationId xmlns:a16="http://schemas.microsoft.com/office/drawing/2014/main" id="{7EE1DCE8-D311-4D99-A81C-BE65135FC7B1}"/>
+              </a:ext>
+            </a:extLst>
+          </p:cNvPr>
+          <p:cNvSpPr>
+            <a:spLocks noGrp="1"/>
+          </p:cNvSpPr>
+          <p:nvPr>
+            <p:ph type="title"/>
+          </p:nvPr>
+        </p:nvSpPr>
+        <p:spPr>
+          <a:xfrm>
+            <a:off x="677334" y="609600"/>
+            <a:ext cx="8596668" cy="732639"/>
+          </a:xfrm>
+        </p:spPr>
+        <p:txBody>
+          <a:bodyPr/>
+          <a:lstStyle/>
+          <a:p>
+            <a:r>
+              <a:rPr lang="en-US" dirty="0"/>
+              <a:t>Push (and Pull)</a:t>
+            </a:r>
+          </a:p>
+        </p:txBody>
+      </p:sp>
+      <p:sp>
+        <p:nvSpPr>
+          <p:cNvPr id="3" name="Content Placeholder 2">
+            <a:extLst>
+              <a:ext uri="{FF2B5EF4-FFF2-40B4-BE49-F238E27FC236}">
+                <a16:creationId xmlns:a16="http://schemas.microsoft.com/office/drawing/2014/main" id="{9374DAC6-B719-4917-BD3A-9F035608224A}"/>
+              </a:ext>
+            </a:extLst>
+          </p:cNvPr>
+          <p:cNvSpPr>
+            <a:spLocks noGrp="1"/>
+          </p:cNvSpPr>
+          <p:nvPr>
+            <p:ph idx="1"/>
+          </p:nvPr>
+        </p:nvSpPr>
+        <p:spPr>
+          <a:xfrm>
+            <a:off x="677334" y="1342239"/>
+            <a:ext cx="8596668" cy="4699123"/>
+          </a:xfrm>
+        </p:spPr>
+        <p:txBody>
+          <a:bodyPr/>
+          <a:lstStyle/>
+          <a:p>
+            <a:endParaRPr lang="en-US" dirty="0"/>
+          </a:p>
+          <a:p>
+            <a:endParaRPr lang="en-US" dirty="0"/>
+          </a:p>
+          <a:p>
+            <a:r>
+              <a:rPr lang="en-US" dirty="0"/>
+              <a:t>Pushing is the act of moving the changeset from your repo to another repo.</a:t>
+            </a:r>
+          </a:p>
+          <a:p>
+            <a:pPr lvl="1"/>
+            <a:r>
+              <a:rPr lang="en-US" dirty="0"/>
+              <a:t>This is the way changesets are shared. </a:t>
+            </a:r>
+          </a:p>
+          <a:p>
+            <a:endParaRPr lang="en-US" dirty="0"/>
+          </a:p>
+          <a:p>
+            <a:endParaRPr lang="en-US" dirty="0"/>
+          </a:p>
+          <a:p>
+            <a:r>
+              <a:rPr lang="en-US" dirty="0"/>
+              <a:t>Pull Requests (Short for: Requesting Someone Else To Pull Your Changes)</a:t>
+            </a:r>
+          </a:p>
+          <a:p>
+            <a:pPr lvl="1"/>
+            <a:endParaRPr lang="en-US" dirty="0"/>
+          </a:p>
+        </p:txBody>
+      </p:sp>
+    </p:spTree>
+    <p:extLst>
+      <p:ext uri="{BB962C8B-B14F-4D97-AF65-F5344CB8AC3E}">
+        <p14:creationId xmlns:p14="http://schemas.microsoft.com/office/powerpoint/2010/main" val="52621604"/>
+      </p:ext>
+    </p:extLst>
+  </p:cSld>
+  <p:clrMapOvr>
+    <a:masterClrMapping/>
+  </p:clrMapOvr>
+  <mc:AlternateContent xmlns:mc="http://schemas.openxmlformats.org/markup-compatibility/2006" xmlns:p159="http://schemas.microsoft.com/office/powerpoint/2015/09/main">
+    <mc:Choice Requires="p159">
+      <p:transition xmlns:p14="http://schemas.microsoft.com/office/powerpoint/2010/main" spd="slow" p14:dur="2000">
+        <p159:morph option="byObject"/>
+      </p:transition>
+    </mc:Choice>
+    <mc:Fallback xmlns="">
+      <p:transition spd="slow">
+        <p:fade/>
+      </p:transition>
+    </mc:Fallback>
+  </mc:AlternateContent>
+  <p:timing>
+    <p:tnLst>
+      <p:par>
+        <p:cTn id="1" dur="indefinite" restart="never" nodeType="tmRoot">
+          <p:childTnLst>
+            <p:seq concurrent="1" nextAc="seek">
+              <p:cTn id="2" dur="indefinite" nodeType="mainSeq">
+                <p:childTnLst>
+                  <p:par>
+                    <p:cTn id="3" fill="hold">
+                      <p:stCondLst>
+                        <p:cond delay="indefinite"/>
+                      </p:stCondLst>
+                      <p:childTnLst>
+                        <p:par>
+                          <p:cTn id="4" fill="hold">
+                            <p:stCondLst>
+                              <p:cond delay="0"/>
+                            </p:stCondLst>
+                            <p:childTnLst>
+                              <p:par>
+                                <p:cTn id="5" presetID="1" presetClass="entr" presetSubtype="0" fill="hold" grpId="0" nodeType="clickEffect">
+                                  <p:stCondLst>
+                                    <p:cond delay="0"/>
+                                  </p:stCondLst>
+                                  <p:childTnLst>
+                                    <p:set>
+                                      <p:cBhvr>
+                                        <p:cTn id="6" dur="1" fill="hold">
+                                          <p:stCondLst>
+                                            <p:cond delay="0"/>
+                                          </p:stCondLst>
+                                        </p:cTn>
+                                        <p:tgtEl>
+                                          <p:spTgt spid="3">
+                                            <p:txEl>
+                                              <p:pRg st="2" end="2"/>
+                                            </p:txEl>
+                                          </p:spTgt>
+                                        </p:tgtEl>
+                                        <p:attrNameLst>
+                                          <p:attrName>style.visibility</p:attrName>
+                                        </p:attrNameLst>
+                                      </p:cBhvr>
+                                      <p:to>
+                                        <p:strVal val="visible"/>
+                                      </p:to>
+                                    </p:set>
+                                  </p:childTnLst>
+                                </p:cTn>
+                              </p:par>
+                              <p:par>
+                                <p:cTn id="7" presetID="1" presetClass="entr" presetSubtype="0" fill="hold" grpId="0" nodeType="withEffect">
+                                  <p:stCondLst>
+                                    <p:cond delay="0"/>
+                                  </p:stCondLst>
+                                  <p:childTnLst>
+                                    <p:set>
+                                      <p:cBhvr>
+                                        <p:cTn id="8" dur="1" fill="hold">
+                                          <p:stCondLst>
+                                            <p:cond delay="0"/>
+                                          </p:stCondLst>
+                                        </p:cTn>
+                                        <p:tgtEl>
+                                          <p:spTgt spid="3">
+                                            <p:txEl>
+                                              <p:pRg st="3" end="3"/>
+                                            </p:txEl>
+                                          </p:spTgt>
+                                        </p:tgtEl>
+                                        <p:attrNameLst>
+                                          <p:attrName>style.visibility</p:attrName>
+                                        </p:attrNameLst>
+                                      </p:cBhvr>
+                                      <p:to>
+                                        <p:strVal val="visible"/>
+                                      </p:to>
+                                    </p:set>
+                                  </p:childTnLst>
+                                </p:cTn>
+                              </p:par>
+                            </p:childTnLst>
+                          </p:cTn>
+                        </p:par>
+                      </p:childTnLst>
+                    </p:cTn>
+                  </p:par>
+                  <p:par>
+                    <p:cTn id="9" fill="hold">
+                      <p:stCondLst>
+                        <p:cond delay="indefinite"/>
+                      </p:stCondLst>
+                      <p:childTnLst>
+                        <p:par>
+                          <p:cTn id="10" fill="hold">
+                            <p:stCondLst>
+                              <p:cond delay="0"/>
+                            </p:stCondLst>
+                            <p:childTnLst>
+                              <p:par>
+                                <p:cTn id="11" presetID="1" presetClass="entr" presetSubtype="0" fill="hold" grpId="0" nodeType="clickEffect">
+                                  <p:stCondLst>
+                                    <p:cond delay="0"/>
+                                  </p:stCondLst>
+                                  <p:childTnLst>
+                                    <p:set>
+                                      <p:cBhvr>
+                                        <p:cTn id="12" dur="1" fill="hold">
+                                          <p:stCondLst>
+                                            <p:cond delay="0"/>
+                                          </p:stCondLst>
+                                        </p:cTn>
+                                        <p:tgtEl>
+                                          <p:spTgt spid="3">
+                                            <p:txEl>
+                                              <p:pRg st="6" end="6"/>
+                                            </p:txEl>
+                                          </p:spTgt>
+                                        </p:tgtEl>
+                                        <p:attrNameLst>
+                                          <p:attrName>style.visibility</p:attrName>
+                                        </p:attrNameLst>
+                                      </p:cBhvr>
+                                      <p:to>
+                                        <p:strVal val="visible"/>
+                                      </p:to>
+                                    </p:set>
+                                  </p:childTnLst>
+                                </p:cTn>
+                              </p:par>
+                            </p:childTnLst>
+                          </p:cTn>
+                        </p:par>
+                      </p:childTnLst>
+                    </p:cTn>
+                  </p:par>
+                </p:childTnLst>
+              </p:cTn>
+              <p:prevCondLst>
+                <p:cond evt="onPrev" delay="0">
+                  <p:tgtEl>
+                    <p:sldTgt/>
+                  </p:tgtEl>
+                </p:cond>
+              </p:prevCondLst>
+              <p:nextCondLst>
+                <p:cond evt="onNext" delay="0">
+                  <p:tgtEl>
+                    <p:sldTgt/>
+                  </p:tgtEl>
+                </p:cond>
+              </p:nextCondLst>
+            </p:seq>
+          </p:childTnLst>
+        </p:cTn>
+      </p:par>
+    </p:tnLst>
+    <p:bldLst>
+      <p:bldP spid="3" grpId="0" build="p"/>
+    </p:bldLst>
+  </p:timing>
+</p:sld>
+</file>
+
+<file path=ppt/slides/slide17.xml><?xml version="1.0" encoding="utf-8"?>
+<p:sld xmlns:a="http://schemas.openxmlformats.org/drawingml/2006/main" xmlns:r="http://schemas.openxmlformats.org/officeDocument/2006/relationships" xmlns:p="http://schemas.openxmlformats.org/presentationml/2006/main">
+  <p:cSld>
+    <p:spTree>
+      <p:nvGrpSpPr>
+        <p:cNvPr id="1" name=""/>
+        <p:cNvGrpSpPr/>
+        <p:nvPr/>
+      </p:nvGrpSpPr>
+      <p:grpSpPr>
+        <a:xfrm>
+          <a:off x="0" y="0"/>
+          <a:ext cx="0" cy="0"/>
+          <a:chOff x="0" y="0"/>
+          <a:chExt cx="0" cy="0"/>
+        </a:xfrm>
+      </p:grpSpPr>
+      <p:sp>
+        <p:nvSpPr>
+          <p:cNvPr id="2" name="Title 1">
+            <a:extLst>
+              <a:ext uri="{FF2B5EF4-FFF2-40B4-BE49-F238E27FC236}">
+                <a16:creationId xmlns:a16="http://schemas.microsoft.com/office/drawing/2014/main" id="{ECBF22E6-9EF8-4EB2-88B3-3875ED450CAF}"/>
+              </a:ext>
+            </a:extLst>
+          </p:cNvPr>
+          <p:cNvSpPr>
+            <a:spLocks noGrp="1"/>
+          </p:cNvSpPr>
+          <p:nvPr>
+            <p:ph type="ctrTitle"/>
+          </p:nvPr>
+        </p:nvSpPr>
+        <p:spPr/>
+        <p:txBody>
+          <a:bodyPr/>
+          <a:lstStyle/>
+          <a:p>
+            <a:r>
+              <a:rPr lang="en-US" dirty="0"/>
+              <a:t>Questions?</a:t>
+            </a:r>
+          </a:p>
+        </p:txBody>
+      </p:sp>
+      <p:sp>
+        <p:nvSpPr>
+          <p:cNvPr id="3" name="Subtitle 2">
+            <a:extLst>
+              <a:ext uri="{FF2B5EF4-FFF2-40B4-BE49-F238E27FC236}">
+                <a16:creationId xmlns:a16="http://schemas.microsoft.com/office/drawing/2014/main" id="{929B19A5-6D33-451A-8FC4-594FDCA00286}"/>
+              </a:ext>
+            </a:extLst>
+          </p:cNvPr>
+          <p:cNvSpPr>
+            <a:spLocks noGrp="1"/>
+          </p:cNvSpPr>
+          <p:nvPr>
+            <p:ph type="subTitle" idx="1"/>
+          </p:nvPr>
+        </p:nvSpPr>
+        <p:spPr/>
+        <p:txBody>
+          <a:bodyPr/>
+          <a:lstStyle/>
+          <a:p>
+            <a:endParaRPr lang="en-US" dirty="0"/>
+          </a:p>
+        </p:txBody>
+      </p:sp>
+    </p:spTree>
+    <p:extLst>
+      <p:ext uri="{BB962C8B-B14F-4D97-AF65-F5344CB8AC3E}">
+        <p14:creationId xmlns:p14="http://schemas.microsoft.com/office/powerpoint/2010/main" val="2403661108"/>
+      </p:ext>
+    </p:extLst>
+  </p:cSld>
+  <p:clrMapOvr>
+    <a:masterClrMapping/>
+  </p:clrMapOvr>
+  <mc:AlternateContent xmlns:mc="http://schemas.openxmlformats.org/markup-compatibility/2006" xmlns:p159="http://schemas.microsoft.com/office/powerpoint/2015/09/main">
+    <mc:Choice Requires="p159">
+      <p:transition xmlns:p14="http://schemas.microsoft.com/office/powerpoint/2010/main" spd="slow" p14:dur="2000">
+        <p159:morph option="byObject"/>
+      </p:transition>
+    </mc:Choice>
+    <mc:Fallback xmlns="">
+      <p:transition spd="slow">
+        <p:fade/>
+      </p:transition>
+    </mc:Fallback>
+  </mc:AlternateContent>
+</p:sld>
+</file>
+
+<file path=ppt/slides/slide18.xml><?xml version="1.0" encoding="utf-8"?>
+<p:sld xmlns:a="http://schemas.openxmlformats.org/drawingml/2006/main" xmlns:r="http://schemas.openxmlformats.org/officeDocument/2006/relationships" xmlns:p="http://schemas.openxmlformats.org/presentationml/2006/main">
+  <p:cSld>
+    <p:spTree>
+      <p:nvGrpSpPr>
+        <p:cNvPr id="1" name=""/>
+        <p:cNvGrpSpPr/>
+        <p:nvPr/>
+      </p:nvGrpSpPr>
+      <p:grpSpPr>
+        <a:xfrm>
+          <a:off x="0" y="0"/>
+          <a:ext cx="0" cy="0"/>
+          <a:chOff x="0" y="0"/>
+          <a:chExt cx="0" cy="0"/>
+        </a:xfrm>
+      </p:grpSpPr>
+      <p:sp>
+        <p:nvSpPr>
+          <p:cNvPr id="2" name="Title 1">
+            <a:extLst>
+              <a:ext uri="{FF2B5EF4-FFF2-40B4-BE49-F238E27FC236}">
+                <a16:creationId xmlns:a16="http://schemas.microsoft.com/office/drawing/2014/main" id="{683E4871-360F-44C3-A8FD-445890CEC74C}"/>
+              </a:ext>
+            </a:extLst>
+          </p:cNvPr>
+          <p:cNvSpPr>
+            <a:spLocks noGrp="1"/>
+          </p:cNvSpPr>
+          <p:nvPr>
+            <p:ph type="ctrTitle"/>
+          </p:nvPr>
+        </p:nvSpPr>
+        <p:spPr/>
+        <p:txBody>
+          <a:bodyPr/>
+          <a:lstStyle/>
+          <a:p>
+            <a:r>
+              <a:rPr lang="en-US" dirty="0"/>
+              <a:t>Thank you</a:t>
+            </a:r>
+          </a:p>
+        </p:txBody>
+      </p:sp>
+      <p:sp>
+        <p:nvSpPr>
+          <p:cNvPr id="3" name="Subtitle 2">
+            <a:extLst>
+              <a:ext uri="{FF2B5EF4-FFF2-40B4-BE49-F238E27FC236}">
+                <a16:creationId xmlns:a16="http://schemas.microsoft.com/office/drawing/2014/main" id="{20A51FFC-0255-460B-A489-5E875685389D}"/>
+              </a:ext>
+            </a:extLst>
+          </p:cNvPr>
+          <p:cNvSpPr>
+            <a:spLocks noGrp="1"/>
+          </p:cNvSpPr>
+          <p:nvPr>
+            <p:ph type="subTitle" idx="1"/>
+          </p:nvPr>
+        </p:nvSpPr>
+        <p:spPr/>
+        <p:txBody>
+          <a:bodyPr/>
+          <a:lstStyle/>
+          <a:p>
+            <a:endParaRPr lang="en-US" dirty="0"/>
+          </a:p>
+        </p:txBody>
+      </p:sp>
+    </p:spTree>
+    <p:extLst>
+      <p:ext uri="{BB962C8B-B14F-4D97-AF65-F5344CB8AC3E}">
+        <p14:creationId xmlns:p14="http://schemas.microsoft.com/office/powerpoint/2010/main" val="3301109532"/>
+      </p:ext>
+    </p:extLst>
+  </p:cSld>
+  <p:clrMapOvr>
+    <a:masterClrMapping/>
+  </p:clrMapOvr>
+  <mc:AlternateContent xmlns:mc="http://schemas.openxmlformats.org/markup-compatibility/2006" xmlns:p159="http://schemas.microsoft.com/office/powerpoint/2015/09/main">
+    <mc:Choice Requires="p159">
+      <p:transition xmlns:p14="http://schemas.microsoft.com/office/powerpoint/2010/main" spd="slow" p14:dur="2000">
+        <p159:morph option="byObject"/>
+      </p:transition>
+    </mc:Choice>
+    <mc:Fallback xmlns="">
+      <p:transition spd="slow">
+        <p:fade/>
+      </p:transition>
+    </mc:Fallback>
+  </mc:AlternateContent>
+</p:sld>
+</file>
+
+<file path=ppt/slides/slide19.xml><?xml version="1.0" encoding="utf-8"?>
+<p:sld xmlns:a="http://schemas.openxmlformats.org/drawingml/2006/main" xmlns:r="http://schemas.openxmlformats.org/officeDocument/2006/relationships" xmlns:p="http://schemas.openxmlformats.org/presentationml/2006/main">
+  <p:cSld>
+    <p:spTree>
+      <p:nvGrpSpPr>
+        <p:cNvPr id="1" name=""/>
+        <p:cNvGrpSpPr/>
+        <p:nvPr/>
+      </p:nvGrpSpPr>
+      <p:grpSpPr>
+        <a:xfrm>
+          <a:off x="0" y="0"/>
+          <a:ext cx="0" cy="0"/>
+          <a:chOff x="0" y="0"/>
+          <a:chExt cx="0" cy="0"/>
+        </a:xfrm>
+      </p:grpSpPr>
+      <p:sp>
+        <p:nvSpPr>
+          <p:cNvPr id="2" name="Title 1">
+            <a:extLst>
+              <a:ext uri="{FF2B5EF4-FFF2-40B4-BE49-F238E27FC236}">
+                <a16:creationId xmlns:a16="http://schemas.microsoft.com/office/drawing/2014/main" id="{C85963BB-D731-466E-9B53-F39BEDD14A67}"/>
+              </a:ext>
+            </a:extLst>
+          </p:cNvPr>
+          <p:cNvSpPr>
+            <a:spLocks noGrp="1"/>
+          </p:cNvSpPr>
+          <p:nvPr>
+            <p:ph type="title"/>
+          </p:nvPr>
+        </p:nvSpPr>
+        <p:spPr>
+          <a:xfrm>
+            <a:off x="677334" y="609600"/>
+            <a:ext cx="8596668" cy="696686"/>
+          </a:xfrm>
+        </p:spPr>
+        <p:txBody>
+          <a:bodyPr/>
+          <a:lstStyle/>
+          <a:p>
+            <a:r>
+              <a:rPr lang="en-US" dirty="0"/>
+              <a:t>References	</a:t>
+            </a:r>
+          </a:p>
+        </p:txBody>
+      </p:sp>
+      <p:sp>
+        <p:nvSpPr>
+          <p:cNvPr id="3" name="Content Placeholder 2">
+            <a:extLst>
+              <a:ext uri="{FF2B5EF4-FFF2-40B4-BE49-F238E27FC236}">
+                <a16:creationId xmlns:a16="http://schemas.microsoft.com/office/drawing/2014/main" id="{28DCBE85-F0B3-46DD-9244-8E0C4FA104DD}"/>
+              </a:ext>
+            </a:extLst>
+          </p:cNvPr>
+          <p:cNvSpPr>
+            <a:spLocks noGrp="1"/>
+          </p:cNvSpPr>
+          <p:nvPr>
+            <p:ph idx="1"/>
+          </p:nvPr>
+        </p:nvSpPr>
+        <p:spPr>
+          <a:xfrm>
+            <a:off x="677334" y="1306287"/>
+            <a:ext cx="8596668" cy="4735076"/>
+          </a:xfrm>
+        </p:spPr>
+        <p:txBody>
+          <a:bodyPr/>
+          <a:lstStyle/>
+          <a:p>
+            <a:r>
+              <a:rPr lang="en-US" dirty="0"/>
+              <a:t>Atlassian Tutorial (</a:t>
+            </a:r>
+            <a:r>
+              <a:rPr lang="en-US" dirty="0">
+                <a:hlinkClick r:id="rId2"/>
+              </a:rPr>
+              <a:t>https://www.atlassian.com/git/tutorials</a:t>
+            </a:r>
+            <a:r>
+              <a:rPr lang="en-US" dirty="0"/>
+              <a:t>)</a:t>
+            </a:r>
+          </a:p>
+          <a:p>
+            <a:r>
+              <a:rPr lang="en-US" dirty="0"/>
+              <a:t>Git SCM docs (</a:t>
+            </a:r>
+            <a:r>
+              <a:rPr lang="en-US" dirty="0">
+                <a:hlinkClick r:id="rId3"/>
+              </a:rPr>
+              <a:t>https://git-scm.com/docs/</a:t>
+            </a:r>
+            <a:r>
+              <a:rPr lang="en-US" dirty="0"/>
+              <a:t>)</a:t>
+            </a:r>
+          </a:p>
+          <a:p>
+            <a:r>
+              <a:rPr lang="en-US" dirty="0"/>
+              <a:t>Git for Teams (</a:t>
+            </a:r>
+          </a:p>
+          <a:p>
+            <a:endParaRPr lang="en-US" dirty="0"/>
+          </a:p>
+          <a:p>
+            <a:endParaRPr lang="en-US" dirty="0"/>
+          </a:p>
+        </p:txBody>
+      </p:sp>
+    </p:spTree>
+    <p:extLst>
+      <p:ext uri="{BB962C8B-B14F-4D97-AF65-F5344CB8AC3E}">
+        <p14:creationId xmlns:p14="http://schemas.microsoft.com/office/powerpoint/2010/main" val="1585113183"/>
+      </p:ext>
+    </p:extLst>
+  </p:cSld>
+  <p:clrMapOvr>
+    <a:masterClrMapping/>
+  </p:clrMapOvr>
+  <mc:AlternateContent xmlns:mc="http://schemas.openxmlformats.org/markup-compatibility/2006" xmlns:p159="http://schemas.microsoft.com/office/powerpoint/2015/09/main">
+    <mc:Choice Requires="p159">
+      <p:transition xmlns:p14="http://schemas.microsoft.com/office/powerpoint/2010/main" spd="slow" p14:dur="2000">
+        <p159:morph option="byObject"/>
+      </p:transition>
+    </mc:Choice>
+    <mc:Fallback xmlns="">
+      <p:transition spd="slow">
+        <p:fade/>
+      </p:transition>
+    </mc:Fallback>
+  </mc:AlternateContent>
+</p:sld>
+</file>
+
+<file path=ppt/slides/slide2.xml><?xml version="1.0" encoding="utf-8"?>
+<p:sld xmlns:a="http://schemas.openxmlformats.org/drawingml/2006/main" xmlns:r="http://schemas.openxmlformats.org/officeDocument/2006/relationships" xmlns:p="http://schemas.openxmlformats.org/presentationml/2006/main">
+  <p:cSld>
+    <p:spTree>
+      <p:nvGrpSpPr>
+        <p:cNvPr id="1" name=""/>
+        <p:cNvGrpSpPr/>
+        <p:nvPr/>
+      </p:nvGrpSpPr>
+      <p:grpSpPr>
+        <a:xfrm>
+          <a:off x="0" y="0"/>
+          <a:ext cx="0" cy="0"/>
+          <a:chOff x="0" y="0"/>
+          <a:chExt cx="0" cy="0"/>
+        </a:xfrm>
+      </p:grpSpPr>
+      <p:sp>
+        <p:nvSpPr>
+          <p:cNvPr id="2" name="Title 1">
+            <a:extLst>
+              <a:ext uri="{FF2B5EF4-FFF2-40B4-BE49-F238E27FC236}">
+                <a16:creationId xmlns:a16="http://schemas.microsoft.com/office/drawing/2014/main" id="{B2104145-6527-42ED-997A-3D730D821717}"/>
+              </a:ext>
+            </a:extLst>
+          </p:cNvPr>
+          <p:cNvSpPr>
+            <a:spLocks noGrp="1"/>
+          </p:cNvSpPr>
+          <p:nvPr>
+            <p:ph type="title"/>
+          </p:nvPr>
+        </p:nvSpPr>
+        <p:spPr/>
+        <p:txBody>
+          <a:bodyPr/>
+          <a:lstStyle/>
+          <a:p>
+            <a:r>
+              <a:rPr lang="en-US" dirty="0"/>
+              <a:t>Goal and Target Audience</a:t>
+            </a:r>
+          </a:p>
+        </p:txBody>
+      </p:sp>
+      <p:sp>
+        <p:nvSpPr>
+          <p:cNvPr id="3" name="Content Placeholder 2">
+            <a:extLst>
+              <a:ext uri="{FF2B5EF4-FFF2-40B4-BE49-F238E27FC236}">
+                <a16:creationId xmlns:a16="http://schemas.microsoft.com/office/drawing/2014/main" id="{912A3B78-C535-47A3-B05D-2D4696A554ED}"/>
+              </a:ext>
+            </a:extLst>
+          </p:cNvPr>
+          <p:cNvSpPr>
+            <a:spLocks noGrp="1"/>
+          </p:cNvSpPr>
+          <p:nvPr>
+            <p:ph idx="1"/>
+          </p:nvPr>
+        </p:nvSpPr>
+        <p:spPr/>
+        <p:txBody>
+          <a:bodyPr/>
+          <a:lstStyle/>
+          <a:p>
+            <a:r>
+              <a:rPr lang="en-US" dirty="0"/>
+              <a:t>Goals</a:t>
+            </a:r>
+          </a:p>
+          <a:p>
+            <a:pPr lvl="1"/>
+            <a:r>
+              <a:rPr lang="en-US" dirty="0"/>
+              <a:t>Find and describe the intersection of LabVIEW and Git. </a:t>
+            </a:r>
+          </a:p>
+          <a:p>
+            <a:pPr lvl="1"/>
+            <a:r>
+              <a:rPr lang="en-US" dirty="0"/>
+              <a:t>Present a guide to the tools available for using Git with LabVIEW. </a:t>
+            </a:r>
+          </a:p>
+          <a:p>
+            <a:r>
+              <a:rPr lang="en-US" dirty="0"/>
+              <a:t>Ideal Target Audience</a:t>
+            </a:r>
+          </a:p>
+          <a:p>
+            <a:pPr lvl="1"/>
+            <a:r>
+              <a:rPr lang="en-US" dirty="0"/>
+              <a:t>Has LabVIEW experience, but has little Git (or revision control) experience</a:t>
+            </a:r>
+          </a:p>
+          <a:p>
+            <a:r>
+              <a:rPr lang="en-US" dirty="0"/>
+              <a:t>Worst Case Audience</a:t>
+            </a:r>
+          </a:p>
+          <a:p>
+            <a:pPr lvl="1"/>
+            <a:r>
+              <a:rPr lang="en-US" dirty="0"/>
+              <a:t>Git experts!</a:t>
+            </a:r>
+          </a:p>
+          <a:p>
+            <a:pPr lvl="1"/>
+            <a:r>
+              <a:rPr lang="en-US" dirty="0"/>
+              <a:t>I apologize in advance for any gross simplifications and errors. </a:t>
+            </a:r>
+          </a:p>
+          <a:p>
+            <a:pPr lvl="1"/>
+            <a:r>
+              <a:rPr lang="en-US" dirty="0"/>
+              <a:t>Please try to avoid “but what about…”s.  I will be focusing on the core feature set and not any extra modules. </a:t>
+            </a:r>
+          </a:p>
+          <a:p>
+            <a:pPr lvl="1"/>
+            <a:endParaRPr lang="en-US" dirty="0"/>
+          </a:p>
+          <a:p>
+            <a:endParaRPr lang="en-US" dirty="0"/>
+          </a:p>
+        </p:txBody>
+      </p:sp>
+    </p:spTree>
+    <p:extLst>
+      <p:ext uri="{BB962C8B-B14F-4D97-AF65-F5344CB8AC3E}">
+        <p14:creationId xmlns:p14="http://schemas.microsoft.com/office/powerpoint/2010/main" val="523057872"/>
+      </p:ext>
+    </p:extLst>
+  </p:cSld>
+  <p:clrMapOvr>
+    <a:masterClrMapping/>
+  </p:clrMapOvr>
+  <mc:AlternateContent xmlns:mc="http://schemas.openxmlformats.org/markup-compatibility/2006" xmlns:p159="http://schemas.microsoft.com/office/powerpoint/2015/09/main">
+    <mc:Choice Requires="p159">
+      <p:transition xmlns:p14="http://schemas.microsoft.com/office/powerpoint/2010/main" spd="slow" p14:dur="2000">
+        <p159:morph option="byObject"/>
+      </p:transition>
+    </mc:Choice>
+    <mc:Fallback xmlns="">
+      <p:transition spd="slow">
+        <p:fade/>
+      </p:transition>
+    </mc:Fallback>
+  </mc:AlternateContent>
+  <p:timing>
+    <p:tnLst>
+      <p:par>
+        <p:cTn id="1" dur="indefinite" restart="never" nodeType="tmRoot">
+          <p:childTnLst>
+            <p:seq concurrent="1" nextAc="seek">
+              <p:cTn id="2" dur="indefinite" nodeType="mainSeq">
+                <p:childTnLst>
+                  <p:par>
+                    <p:cTn id="3" fill="hold">
+                      <p:stCondLst>
+                        <p:cond delay="indefinite"/>
+                      </p:stCondLst>
+                      <p:childTnLst>
+                        <p:par>
+                          <p:cTn id="4" fill="hold">
+                            <p:stCondLst>
+                              <p:cond delay="0"/>
+                            </p:stCondLst>
+                            <p:childTnLst>
+                              <p:par>
+                                <p:cTn id="5" presetID="1" presetClass="entr" presetSubtype="0" fill="hold" grpId="0" nodeType="clickEffect">
+                                  <p:stCondLst>
+                                    <p:cond delay="0"/>
+                                  </p:stCondLst>
+                                  <p:childTnLst>
+                                    <p:set>
+                                      <p:cBhvr>
+                                        <p:cTn id="6" dur="1" fill="hold">
+                                          <p:stCondLst>
+                                            <p:cond delay="0"/>
+                                          </p:stCondLst>
+                                        </p:cTn>
+                                        <p:tgtEl>
+                                          <p:spTgt spid="3">
+                                            <p:txEl>
+                                              <p:pRg st="0" end="0"/>
+                                            </p:txEl>
+                                          </p:spTgt>
+                                        </p:tgtEl>
+                                        <p:attrNameLst>
+                                          <p:attrName>style.visibility</p:attrName>
+                                        </p:attrNameLst>
+                                      </p:cBhvr>
+                                      <p:to>
+                                        <p:strVal val="visible"/>
+                                      </p:to>
+                                    </p:set>
+                                  </p:childTnLst>
+                                </p:cTn>
+                              </p:par>
+                            </p:childTnLst>
+                          </p:cTn>
+                        </p:par>
+                      </p:childTnLst>
+                    </p:cTn>
+                  </p:par>
+                  <p:par>
+                    <p:cTn id="7" fill="hold">
+                      <p:stCondLst>
+                        <p:cond delay="indefinite"/>
+                      </p:stCondLst>
+                      <p:childTnLst>
+                        <p:par>
+                          <p:cTn id="8" fill="hold">
+                            <p:stCondLst>
+                              <p:cond delay="0"/>
+                            </p:stCondLst>
+                            <p:childTnLst>
+                              <p:par>
+                                <p:cTn id="9" presetID="1" presetClass="entr" presetSubtype="0" fill="hold" grpId="0" nodeType="clickEffect">
+                                  <p:stCondLst>
+                                    <p:cond delay="0"/>
+                                  </p:stCondLst>
+                                  <p:childTnLst>
+                                    <p:set>
+                                      <p:cBhvr>
+                                        <p:cTn id="10" dur="1" fill="hold">
+                                          <p:stCondLst>
+                                            <p:cond delay="0"/>
+                                          </p:stCondLst>
+                                        </p:cTn>
+                                        <p:tgtEl>
+                                          <p:spTgt spid="3">
+                                            <p:txEl>
+                                              <p:pRg st="1" end="1"/>
+                                            </p:txEl>
+                                          </p:spTgt>
+                                        </p:tgtEl>
+                                        <p:attrNameLst>
+                                          <p:attrName>style.visibility</p:attrName>
+                                        </p:attrNameLst>
+                                      </p:cBhvr>
+                                      <p:to>
+                                        <p:strVal val="visible"/>
+                                      </p:to>
+                                    </p:set>
+                                  </p:childTnLst>
+                                </p:cTn>
+                              </p:par>
+                              <p:par>
+                                <p:cTn id="11" presetID="1" presetClass="entr" presetSubtype="0" fill="hold" grpId="0" nodeType="withEffect">
+                                  <p:stCondLst>
+                                    <p:cond delay="0"/>
+                                  </p:stCondLst>
+                                  <p:childTnLst>
+                                    <p:set>
+                                      <p:cBhvr>
+                                        <p:cTn id="12" dur="1" fill="hold">
+                                          <p:stCondLst>
+                                            <p:cond delay="0"/>
+                                          </p:stCondLst>
+                                        </p:cTn>
+                                        <p:tgtEl>
+                                          <p:spTgt spid="3">
+                                            <p:txEl>
+                                              <p:pRg st="2" end="2"/>
+                                            </p:txEl>
+                                          </p:spTgt>
+                                        </p:tgtEl>
+                                        <p:attrNameLst>
+                                          <p:attrName>style.visibility</p:attrName>
+                                        </p:attrNameLst>
+                                      </p:cBhvr>
+                                      <p:to>
+                                        <p:strVal val="visible"/>
+                                      </p:to>
+                                    </p:set>
+                                  </p:childTnLst>
+                                </p:cTn>
+                              </p:par>
+                            </p:childTnLst>
+                          </p:cTn>
+                        </p:par>
+                      </p:childTnLst>
+                    </p:cTn>
+                  </p:par>
+                  <p:par>
+                    <p:cTn id="13" fill="hold">
+                      <p:stCondLst>
+                        <p:cond delay="indefinite"/>
+                      </p:stCondLst>
+                      <p:childTnLst>
+                        <p:par>
+                          <p:cTn id="14" fill="hold">
+                            <p:stCondLst>
+                              <p:cond delay="0"/>
+                            </p:stCondLst>
+                            <p:childTnLst>
+                              <p:par>
+                                <p:cTn id="15" presetID="1" presetClass="entr" presetSubtype="0" fill="hold" grpId="0" nodeType="clickEffect">
+                                  <p:stCondLst>
+                                    <p:cond delay="0"/>
+                                  </p:stCondLst>
+                                  <p:childTnLst>
+                                    <p:set>
+                                      <p:cBhvr>
+                                        <p:cTn id="16" dur="1" fill="hold">
+                                          <p:stCondLst>
+                                            <p:cond delay="0"/>
+                                          </p:stCondLst>
+                                        </p:cTn>
+                                        <p:tgtEl>
+                                          <p:spTgt spid="3">
+                                            <p:txEl>
                                               <p:pRg st="3" end="3"/>
                                             </p:txEl>
                                           </p:spTgt>
@@ -8782,14 +10087,14 @@
                                 </p:cTn>
                               </p:par>
                               <p:par>
-                                <p:cTn id="15" presetID="1" presetClass="entr" presetSubtype="0" fill="hold" grpId="0" nodeType="withEffect">
+                                <p:cTn id="17" presetID="1" presetClass="entr" presetSubtype="0" fill="hold" grpId="0" nodeType="withEffect">
                                   <p:stCondLst>
                                     <p:cond delay="0"/>
                                   </p:stCondLst>
                                   <p:childTnLst>
                                     <p:set>
                                       <p:cBhvr>
-                                        <p:cTn id="16" dur="1" fill="hold">
+                                        <p:cTn id="18" dur="1" fill="hold">
                                           <p:stCondLst>
                                             <p:cond delay="0"/>
                                           </p:stCondLst>
@@ -8819,50 +10124,19 @@
                     </p:cTn>
                   </p:par>
                   <p:par>
-                    <p:cTn id="17" fill="hold">
+                    <p:cTn id="19" fill="hold">
                       <p:stCondLst>
                         <p:cond delay="indefinite"/>
                       </p:stCondLst>
                       <p:childTnLst>
                         <p:par>
-                          <p:cTn id="18" fill="hold">
+                          <p:cTn id="20" fill="hold">
                             <p:stCondLst>
                               <p:cond delay="0"/>
                             </p:stCondLst>
                             <p:childTnLst>
                               <p:par>
-                                <p:cTn id="19" presetID="1" presetClass="entr" presetSubtype="0" fill="hold" grpId="0" nodeType="clickEffect">
-                                  <p:stCondLst>
-                                    <p:cond delay="0"/>
-                                  </p:stCondLst>
-                                  <p:childTnLst>
-                                    <p:set>
-                                      <p:cBhvr>
-                                        <p:cTn id="20" dur="1" fill="hold">
-                                          <p:stCondLst>
-                                            <p:cond delay="0"/>
-                                          </p:stCondLst>
-                                        </p:cTn>
-                                        <p:tgtEl>
-                                          <p:spTgt spid="3">
-                                            <p:txEl>
-                                              <p:pRg st="5" end="5"/>
-                                            </p:txEl>
-                                          </p:spTgt>
-                                        </p:tgtEl>
-                                        <p:attrNameLst>
-                                          <p:attrName>style.visibility</p:attrName>
-                                        </p:attrNameLst>
-                                      </p:cBhvr>
-                                      <p:to>
-                                        <p:strVal val="visible"/>
-                                      </p:to>
-                                    </p:set>
-                                  </p:childTnLst>
-                                </p:cTn>
-                              </p:par>
-                              <p:par>
-                                <p:cTn id="21" presetID="1" presetClass="entr" presetSubtype="0" fill="hold" grpId="0" nodeType="withEffect">
+                                <p:cTn id="21" presetID="1" presetClass="entr" presetSubtype="0" fill="hold" grpId="0" nodeType="clickEffect">
                                   <p:stCondLst>
                                     <p:cond delay="0"/>
                                   </p:stCondLst>
@@ -8877,7 +10151,7 @@
                                         <p:tgtEl>
                                           <p:spTgt spid="3">
                                             <p:txEl>
-                                              <p:pRg st="6" end="6"/>
+                                              <p:pRg st="5" end="5"/>
                                             </p:txEl>
                                           </p:spTgt>
                                         </p:tgtEl>
@@ -8908,6 +10182,55 @@
                                         <p:tgtEl>
                                           <p:spTgt spid="3">
                                             <p:txEl>
+                                              <p:pRg st="6" end="6"/>
+                                            </p:txEl>
+                                          </p:spTgt>
+                                        </p:tgtEl>
+                                        <p:attrNameLst>
+                                          <p:attrName>style.visibility</p:attrName>
+                                        </p:attrNameLst>
+                                      </p:cBhvr>
+                                      <p:to>
+                                        <p:strVal val="visible"/>
+                                      </p:to>
+                                    </p:set>
+                                  </p:childTnLst>
+                                </p:cTn>
+                              </p:par>
+                            </p:childTnLst>
+                          </p:cTn>
+                        </p:par>
+                      </p:childTnLst>
+                    </p:cTn>
+                  </p:par>
+                  <p:par>
+                    <p:cTn id="25" fill="hold">
+                      <p:stCondLst>
+                        <p:cond delay="indefinite"/>
+                      </p:stCondLst>
+                      <p:childTnLst>
+                        <p:par>
+                          <p:cTn id="26" fill="hold">
+                            <p:stCondLst>
+                              <p:cond delay="0"/>
+                            </p:stCondLst>
+                            <p:childTnLst>
+                              <p:par>
+                                <p:cTn id="27" presetID="1" presetClass="entr" presetSubtype="0" fill="hold" grpId="0" nodeType="clickEffect">
+                                  <p:stCondLst>
+                                    <p:cond delay="0"/>
+                                  </p:stCondLst>
+                                  <p:childTnLst>
+                                    <p:set>
+                                      <p:cBhvr>
+                                        <p:cTn id="28" dur="1" fill="hold">
+                                          <p:stCondLst>
+                                            <p:cond delay="0"/>
+                                          </p:stCondLst>
+                                        </p:cTn>
+                                        <p:tgtEl>
+                                          <p:spTgt spid="3">
+                                            <p:txEl>
                                               <p:pRg st="7" end="7"/>
                                             </p:txEl>
                                           </p:spTgt>
@@ -8923,15 +10246,33 @@
                                   </p:childTnLst>
                                 </p:cTn>
                               </p:par>
+                            </p:childTnLst>
+                          </p:cTn>
+                        </p:par>
+                      </p:childTnLst>
+                    </p:cTn>
+                  </p:par>
+                  <p:par>
+                    <p:cTn id="29" fill="hold">
+                      <p:stCondLst>
+                        <p:cond delay="indefinite"/>
+                      </p:stCondLst>
+                      <p:childTnLst>
+                        <p:par>
+                          <p:cTn id="30" fill="hold">
+                            <p:stCondLst>
+                              <p:cond delay="0"/>
+                            </p:stCondLst>
+                            <p:childTnLst>
                               <p:par>
-                                <p:cTn id="25" presetID="1" presetClass="entr" presetSubtype="0" fill="hold" grpId="0" nodeType="withEffect">
+                                <p:cTn id="31" presetID="1" presetClass="entr" presetSubtype="0" fill="hold" grpId="0" nodeType="clickEffect">
                                   <p:stCondLst>
                                     <p:cond delay="0"/>
                                   </p:stCondLst>
                                   <p:childTnLst>
                                     <p:set>
                                       <p:cBhvr>
-                                        <p:cTn id="26" dur="1" fill="hold">
+                                        <p:cTn id="32" dur="1" fill="hold">
                                           <p:stCondLst>
                                             <p:cond delay="0"/>
                                           </p:stCondLst>
@@ -9116,13 +10457,13 @@
   <p:clrMapOvr>
     <a:masterClrMapping/>
   </p:clrMapOvr>
-  <mc:AlternateContent xmlns:mc="http://schemas.openxmlformats.org/markup-compatibility/2006">
-    <mc:Choice xmlns:p159="http://schemas.microsoft.com/office/powerpoint/2015/09/main" Requires="p159">
+  <mc:AlternateContent xmlns:mc="http://schemas.openxmlformats.org/markup-compatibility/2006" xmlns:p159="http://schemas.microsoft.com/office/powerpoint/2015/09/main">
+    <mc:Choice Requires="p159">
       <p:transition xmlns:p14="http://schemas.microsoft.com/office/powerpoint/2010/main" spd="slow" p14:dur="2000">
         <p159:morph option="byObject"/>
       </p:transition>
     </mc:Choice>
-    <mc:Fallback>
+    <mc:Fallback xmlns="">
       <p:transition spd="slow">
         <p:fade/>
       </p:transition>
@@ -9431,7 +10772,7 @@
           <a:p>
             <a:r>
               <a:rPr lang="en-US" dirty="0"/>
-              <a:t>What is Revision Control?</a:t>
+              <a:t>Outline</a:t>
             </a:r>
           </a:p>
         </p:txBody>
@@ -9465,9 +10806,12 @@
             <a:endParaRPr lang="en-US" dirty="0"/>
           </a:p>
           <a:p>
+            <a:endParaRPr lang="en-US" dirty="0"/>
+          </a:p>
+          <a:p>
             <a:r>
               <a:rPr lang="en-US" dirty="0"/>
-              <a:t>Revision control is a method of capturing snapshots of files (code, etc.) at specific points in time.</a:t>
+              <a:t>Defining Revision Control and its benefits</a:t>
             </a:r>
           </a:p>
           <a:p>
@@ -9476,38 +10820,41 @@
           <a:p>
             <a:r>
               <a:rPr lang="en-US" dirty="0"/>
-              <a:t>What happens if I don’t have revision control?</a:t>
-            </a:r>
-          </a:p>
-          <a:p>
-            <a:pPr lvl="1"/>
+              <a:t>Comparing and contrasting the two style of revision control</a:t>
+            </a:r>
+          </a:p>
+          <a:p>
+            <a:endParaRPr lang="en-US" dirty="0"/>
+          </a:p>
+          <a:p>
             <a:r>
               <a:rPr lang="en-US" dirty="0"/>
-              <a:t>“I have this awesome software I developed that does everything I need, but it has this one tenacious bug.  I just spent the last </a:t>
-            </a:r>
-            <a:r>
-              <a:rPr lang="en-US" u="sng" dirty="0"/>
-              <a:t>3 weeks</a:t>
-            </a:r>
+              <a:t>Going over some background concepts and definitions</a:t>
+            </a:r>
+          </a:p>
+          <a:p>
+            <a:endParaRPr lang="en-US" dirty="0"/>
+          </a:p>
+          <a:p>
             <a:r>
               <a:rPr lang="en-US" dirty="0"/>
-              <a:t> finding this bug, and it turned out that it was a simple setting/register/</a:t>
-            </a:r>
-            <a:r>
-              <a:rPr lang="en-US" dirty="0" err="1"/>
-              <a:t>subVI</a:t>
-            </a:r>
-            <a:r>
-              <a:rPr lang="en-US" dirty="0"/>
-              <a:t>.  But now, I don’t remember all the things I changed in trying to find that one thing I needed to change.”</a:t>
-            </a:r>
-          </a:p>
-          <a:p>
-            <a:pPr lvl="1"/>
-            <a:r>
-              <a:rPr lang="en-US" dirty="0"/>
-              <a:t>Revision control can fix that!</a:t>
-            </a:r>
+              <a:t>Explaining how Git works</a:t>
+            </a:r>
+          </a:p>
+          <a:p>
+            <a:pPr marL="0" indent="0">
+              <a:buNone/>
+            </a:pPr>
+            <a:endParaRPr lang="en-US" dirty="0"/>
+          </a:p>
+          <a:p>
+            <a:endParaRPr lang="en-US" dirty="0"/>
+          </a:p>
+          <a:p>
+            <a:endParaRPr lang="en-US" dirty="0"/>
+          </a:p>
+          <a:p>
+            <a:endParaRPr lang="en-US" dirty="0"/>
           </a:p>
         </p:txBody>
       </p:sp>
@@ -9521,13 +10868,392 @@
   <p:clrMapOvr>
     <a:masterClrMapping/>
   </p:clrMapOvr>
-  <mc:AlternateContent xmlns:mc="http://schemas.openxmlformats.org/markup-compatibility/2006">
-    <mc:Choice xmlns:p159="http://schemas.microsoft.com/office/powerpoint/2015/09/main" Requires="p159">
+  <mc:AlternateContent xmlns:mc="http://schemas.openxmlformats.org/markup-compatibility/2006" xmlns:p159="http://schemas.microsoft.com/office/powerpoint/2015/09/main">
+    <mc:Choice Requires="p159">
       <p:transition xmlns:p14="http://schemas.microsoft.com/office/powerpoint/2010/main" spd="slow" p14:dur="2000">
         <p159:morph option="byObject"/>
       </p:transition>
     </mc:Choice>
-    <mc:Fallback>
+    <mc:Fallback xmlns="">
+      <p:transition spd="slow">
+        <p:fade/>
+      </p:transition>
+    </mc:Fallback>
+  </mc:AlternateContent>
+  <p:timing>
+    <p:tnLst>
+      <p:par>
+        <p:cTn id="1" dur="indefinite" restart="never" nodeType="tmRoot">
+          <p:childTnLst>
+            <p:seq concurrent="1" nextAc="seek">
+              <p:cTn id="2" dur="indefinite" nodeType="mainSeq">
+                <p:childTnLst>
+                  <p:par>
+                    <p:cTn id="3" fill="hold">
+                      <p:stCondLst>
+                        <p:cond delay="indefinite"/>
+                      </p:stCondLst>
+                      <p:childTnLst>
+                        <p:par>
+                          <p:cTn id="4" fill="hold">
+                            <p:stCondLst>
+                              <p:cond delay="0"/>
+                            </p:stCondLst>
+                            <p:childTnLst>
+                              <p:par>
+                                <p:cTn id="5" presetID="1" presetClass="entr" presetSubtype="0" fill="hold" grpId="0" nodeType="clickEffect">
+                                  <p:stCondLst>
+                                    <p:cond delay="0"/>
+                                  </p:stCondLst>
+                                  <p:childTnLst>
+                                    <p:set>
+                                      <p:cBhvr>
+                                        <p:cTn id="6" dur="1" fill="hold">
+                                          <p:stCondLst>
+                                            <p:cond delay="0"/>
+                                          </p:stCondLst>
+                                        </p:cTn>
+                                        <p:tgtEl>
+                                          <p:spTgt spid="3">
+                                            <p:txEl>
+                                              <p:pRg st="2" end="2"/>
+                                            </p:txEl>
+                                          </p:spTgt>
+                                        </p:tgtEl>
+                                        <p:attrNameLst>
+                                          <p:attrName>style.visibility</p:attrName>
+                                        </p:attrNameLst>
+                                      </p:cBhvr>
+                                      <p:to>
+                                        <p:strVal val="visible"/>
+                                      </p:to>
+                                    </p:set>
+                                  </p:childTnLst>
+                                </p:cTn>
+                              </p:par>
+                            </p:childTnLst>
+                          </p:cTn>
+                        </p:par>
+                      </p:childTnLst>
+                    </p:cTn>
+                  </p:par>
+                  <p:par>
+                    <p:cTn id="7" fill="hold">
+                      <p:stCondLst>
+                        <p:cond delay="indefinite"/>
+                      </p:stCondLst>
+                      <p:childTnLst>
+                        <p:par>
+                          <p:cTn id="8" fill="hold">
+                            <p:stCondLst>
+                              <p:cond delay="0"/>
+                            </p:stCondLst>
+                            <p:childTnLst>
+                              <p:par>
+                                <p:cTn id="9" presetID="1" presetClass="entr" presetSubtype="0" fill="hold" grpId="0" nodeType="clickEffect">
+                                  <p:stCondLst>
+                                    <p:cond delay="0"/>
+                                  </p:stCondLst>
+                                  <p:childTnLst>
+                                    <p:set>
+                                      <p:cBhvr>
+                                        <p:cTn id="10" dur="1" fill="hold">
+                                          <p:stCondLst>
+                                            <p:cond delay="0"/>
+                                          </p:stCondLst>
+                                        </p:cTn>
+                                        <p:tgtEl>
+                                          <p:spTgt spid="3">
+                                            <p:txEl>
+                                              <p:pRg st="4" end="4"/>
+                                            </p:txEl>
+                                          </p:spTgt>
+                                        </p:tgtEl>
+                                        <p:attrNameLst>
+                                          <p:attrName>style.visibility</p:attrName>
+                                        </p:attrNameLst>
+                                      </p:cBhvr>
+                                      <p:to>
+                                        <p:strVal val="visible"/>
+                                      </p:to>
+                                    </p:set>
+                                  </p:childTnLst>
+                                </p:cTn>
+                              </p:par>
+                            </p:childTnLst>
+                          </p:cTn>
+                        </p:par>
+                      </p:childTnLst>
+                    </p:cTn>
+                  </p:par>
+                  <p:par>
+                    <p:cTn id="11" fill="hold">
+                      <p:stCondLst>
+                        <p:cond delay="indefinite"/>
+                      </p:stCondLst>
+                      <p:childTnLst>
+                        <p:par>
+                          <p:cTn id="12" fill="hold">
+                            <p:stCondLst>
+                              <p:cond delay="0"/>
+                            </p:stCondLst>
+                            <p:childTnLst>
+                              <p:par>
+                                <p:cTn id="13" presetID="1" presetClass="entr" presetSubtype="0" fill="hold" grpId="0" nodeType="clickEffect">
+                                  <p:stCondLst>
+                                    <p:cond delay="0"/>
+                                  </p:stCondLst>
+                                  <p:childTnLst>
+                                    <p:set>
+                                      <p:cBhvr>
+                                        <p:cTn id="14" dur="1" fill="hold">
+                                          <p:stCondLst>
+                                            <p:cond delay="0"/>
+                                          </p:stCondLst>
+                                        </p:cTn>
+                                        <p:tgtEl>
+                                          <p:spTgt spid="3">
+                                            <p:txEl>
+                                              <p:pRg st="6" end="6"/>
+                                            </p:txEl>
+                                          </p:spTgt>
+                                        </p:tgtEl>
+                                        <p:attrNameLst>
+                                          <p:attrName>style.visibility</p:attrName>
+                                        </p:attrNameLst>
+                                      </p:cBhvr>
+                                      <p:to>
+                                        <p:strVal val="visible"/>
+                                      </p:to>
+                                    </p:set>
+                                  </p:childTnLst>
+                                </p:cTn>
+                              </p:par>
+                            </p:childTnLst>
+                          </p:cTn>
+                        </p:par>
+                      </p:childTnLst>
+                    </p:cTn>
+                  </p:par>
+                  <p:par>
+                    <p:cTn id="15" fill="hold">
+                      <p:stCondLst>
+                        <p:cond delay="indefinite"/>
+                      </p:stCondLst>
+                      <p:childTnLst>
+                        <p:par>
+                          <p:cTn id="16" fill="hold">
+                            <p:stCondLst>
+                              <p:cond delay="0"/>
+                            </p:stCondLst>
+                            <p:childTnLst>
+                              <p:par>
+                                <p:cTn id="17" presetID="1" presetClass="entr" presetSubtype="0" fill="hold" grpId="0" nodeType="clickEffect">
+                                  <p:stCondLst>
+                                    <p:cond delay="0"/>
+                                  </p:stCondLst>
+                                  <p:childTnLst>
+                                    <p:set>
+                                      <p:cBhvr>
+                                        <p:cTn id="18" dur="1" fill="hold">
+                                          <p:stCondLst>
+                                            <p:cond delay="0"/>
+                                          </p:stCondLst>
+                                        </p:cTn>
+                                        <p:tgtEl>
+                                          <p:spTgt spid="3">
+                                            <p:txEl>
+                                              <p:pRg st="8" end="8"/>
+                                            </p:txEl>
+                                          </p:spTgt>
+                                        </p:tgtEl>
+                                        <p:attrNameLst>
+                                          <p:attrName>style.visibility</p:attrName>
+                                        </p:attrNameLst>
+                                      </p:cBhvr>
+                                      <p:to>
+                                        <p:strVal val="visible"/>
+                                      </p:to>
+                                    </p:set>
+                                  </p:childTnLst>
+                                </p:cTn>
+                              </p:par>
+                            </p:childTnLst>
+                          </p:cTn>
+                        </p:par>
+                      </p:childTnLst>
+                    </p:cTn>
+                  </p:par>
+                </p:childTnLst>
+              </p:cTn>
+              <p:prevCondLst>
+                <p:cond evt="onPrev" delay="0">
+                  <p:tgtEl>
+                    <p:sldTgt/>
+                  </p:tgtEl>
+                </p:cond>
+              </p:prevCondLst>
+              <p:nextCondLst>
+                <p:cond evt="onNext" delay="0">
+                  <p:tgtEl>
+                    <p:sldTgt/>
+                  </p:tgtEl>
+                </p:cond>
+              </p:nextCondLst>
+            </p:seq>
+          </p:childTnLst>
+        </p:cTn>
+      </p:par>
+    </p:tnLst>
+    <p:bldLst>
+      <p:bldP spid="3" grpId="0" uiExpand="1" build="p"/>
+    </p:bldLst>
+  </p:timing>
+</p:sld>
+</file>
+
+<file path=ppt/slides/slide5.xml><?xml version="1.0" encoding="utf-8"?>
+<p:sld xmlns:a="http://schemas.openxmlformats.org/drawingml/2006/main" xmlns:r="http://schemas.openxmlformats.org/officeDocument/2006/relationships" xmlns:p="http://schemas.openxmlformats.org/presentationml/2006/main">
+  <p:cSld>
+    <p:spTree>
+      <p:nvGrpSpPr>
+        <p:cNvPr id="1" name=""/>
+        <p:cNvGrpSpPr/>
+        <p:nvPr/>
+      </p:nvGrpSpPr>
+      <p:grpSpPr>
+        <a:xfrm>
+          <a:off x="0" y="0"/>
+          <a:ext cx="0" cy="0"/>
+          <a:chOff x="0" y="0"/>
+          <a:chExt cx="0" cy="0"/>
+        </a:xfrm>
+      </p:grpSpPr>
+      <p:sp>
+        <p:nvSpPr>
+          <p:cNvPr id="2" name="Title 1">
+            <a:extLst>
+              <a:ext uri="{FF2B5EF4-FFF2-40B4-BE49-F238E27FC236}">
+                <a16:creationId xmlns:a16="http://schemas.microsoft.com/office/drawing/2014/main" id="{C8CB4D04-F501-42DB-9F38-52B10BA52142}"/>
+              </a:ext>
+            </a:extLst>
+          </p:cNvPr>
+          <p:cNvSpPr>
+            <a:spLocks noGrp="1"/>
+          </p:cNvSpPr>
+          <p:nvPr>
+            <p:ph type="title"/>
+          </p:nvPr>
+        </p:nvSpPr>
+        <p:spPr>
+          <a:xfrm>
+            <a:off x="677334" y="609600"/>
+            <a:ext cx="8596668" cy="808139"/>
+          </a:xfrm>
+        </p:spPr>
+        <p:txBody>
+          <a:bodyPr/>
+          <a:lstStyle/>
+          <a:p>
+            <a:r>
+              <a:rPr lang="en-US" dirty="0"/>
+              <a:t>What is Revision Control?</a:t>
+            </a:r>
+          </a:p>
+        </p:txBody>
+      </p:sp>
+      <p:sp>
+        <p:nvSpPr>
+          <p:cNvPr id="3" name="Content Placeholder 2">
+            <a:extLst>
+              <a:ext uri="{FF2B5EF4-FFF2-40B4-BE49-F238E27FC236}">
+                <a16:creationId xmlns:a16="http://schemas.microsoft.com/office/drawing/2014/main" id="{6AD7360C-5DE1-4104-9363-5AD4F4C33A94}"/>
+              </a:ext>
+            </a:extLst>
+          </p:cNvPr>
+          <p:cNvSpPr>
+            <a:spLocks noGrp="1"/>
+          </p:cNvSpPr>
+          <p:nvPr>
+            <p:ph idx="1"/>
+          </p:nvPr>
+        </p:nvSpPr>
+        <p:spPr>
+          <a:xfrm>
+            <a:off x="677334" y="1417739"/>
+            <a:ext cx="8596668" cy="4657179"/>
+          </a:xfrm>
+        </p:spPr>
+        <p:txBody>
+          <a:bodyPr/>
+          <a:lstStyle/>
+          <a:p>
+            <a:endParaRPr lang="en-US" dirty="0"/>
+          </a:p>
+          <a:p>
+            <a:r>
+              <a:rPr lang="en-US" dirty="0"/>
+              <a:t>Revision control is a method of capturing snapshots of files (code, etc.) at specific points in time.</a:t>
+            </a:r>
+          </a:p>
+          <a:p>
+            <a:endParaRPr lang="en-US" dirty="0"/>
+          </a:p>
+          <a:p>
+            <a:r>
+              <a:rPr lang="en-US" dirty="0"/>
+              <a:t>What happens if I don’t have revision control?</a:t>
+            </a:r>
+          </a:p>
+          <a:p>
+            <a:pPr lvl="1"/>
+            <a:r>
+              <a:rPr lang="en-US" dirty="0"/>
+              <a:t>“I have this awesome software I developed that does everything I need, but it has this one tenacious bug.  I just spent the last </a:t>
+            </a:r>
+            <a:r>
+              <a:rPr lang="en-US" u="sng" dirty="0"/>
+              <a:t>3 weeks</a:t>
+            </a:r>
+            <a:r>
+              <a:rPr lang="en-US" dirty="0"/>
+              <a:t> finding this bug, and it turned out that it was a simple setting/register/</a:t>
+            </a:r>
+            <a:r>
+              <a:rPr lang="en-US" dirty="0" err="1"/>
+              <a:t>subVI</a:t>
+            </a:r>
+            <a:r>
+              <a:rPr lang="en-US" dirty="0"/>
+              <a:t>.  But now, I don’t remember all the things I changed in trying to find that one thing I needed to change.”</a:t>
+            </a:r>
+          </a:p>
+          <a:p>
+            <a:pPr lvl="1"/>
+            <a:r>
+              <a:rPr lang="en-US" dirty="0"/>
+              <a:t>Revision control can fix that!</a:t>
+            </a:r>
+          </a:p>
+        </p:txBody>
+      </p:sp>
+    </p:spTree>
+    <p:extLst>
+      <p:ext uri="{BB962C8B-B14F-4D97-AF65-F5344CB8AC3E}">
+        <p14:creationId xmlns:p14="http://schemas.microsoft.com/office/powerpoint/2010/main" val="1140422243"/>
+      </p:ext>
+    </p:extLst>
+  </p:cSld>
+  <p:clrMapOvr>
+    <a:masterClrMapping/>
+  </p:clrMapOvr>
+  <mc:AlternateContent xmlns:mc="http://schemas.openxmlformats.org/markup-compatibility/2006" xmlns:p159="http://schemas.microsoft.com/office/powerpoint/2015/09/main">
+    <mc:Choice Requires="p159">
+      <p:transition xmlns:p14="http://schemas.microsoft.com/office/powerpoint/2010/main" spd="slow" p14:dur="2000">
+        <p159:morph option="byObject"/>
+      </p:transition>
+    </mc:Choice>
+    <mc:Fallback xmlns="">
       <p:transition spd="slow">
         <p:fade/>
       </p:transition>
@@ -9747,7 +11473,7 @@
 </p:sld>
 </file>
 
-<file path=ppt/slides/slide5.xml><?xml version="1.0" encoding="utf-8"?>
+<file path=ppt/slides/slide6.xml><?xml version="1.0" encoding="utf-8"?>
 <p:sld xmlns:a="http://schemas.openxmlformats.org/drawingml/2006/main" xmlns:r="http://schemas.openxmlformats.org/officeDocument/2006/relationships" xmlns:p="http://schemas.openxmlformats.org/presentationml/2006/main">
   <p:cSld>
     <p:spTree>
@@ -9878,13 +11604,13 @@
   <p:clrMapOvr>
     <a:masterClrMapping/>
   </p:clrMapOvr>
-  <mc:AlternateContent xmlns:mc="http://schemas.openxmlformats.org/markup-compatibility/2006">
-    <mc:Choice xmlns:p159="http://schemas.microsoft.com/office/powerpoint/2015/09/main" Requires="p159">
+  <mc:AlternateContent xmlns:mc="http://schemas.openxmlformats.org/markup-compatibility/2006" xmlns:p159="http://schemas.microsoft.com/office/powerpoint/2015/09/main">
+    <mc:Choice Requires="p159">
       <p:transition xmlns:p14="http://schemas.microsoft.com/office/powerpoint/2010/main" spd="slow" p14:dur="2000">
         <p159:morph option="byObject"/>
       </p:transition>
     </mc:Choice>
-    <mc:Fallback>
+    <mc:Fallback xmlns="">
       <p:transition spd="slow">
         <p:fade/>
       </p:transition>
@@ -9972,15 +11698,33 @@
                                   </p:childTnLst>
                                 </p:cTn>
                               </p:par>
+                            </p:childTnLst>
+                          </p:cTn>
+                        </p:par>
+                      </p:childTnLst>
+                    </p:cTn>
+                  </p:par>
+                  <p:par>
+                    <p:cTn id="9" fill="hold">
+                      <p:stCondLst>
+                        <p:cond delay="indefinite"/>
+                      </p:stCondLst>
+                      <p:childTnLst>
+                        <p:par>
+                          <p:cTn id="10" fill="hold">
+                            <p:stCondLst>
+                              <p:cond delay="0"/>
+                            </p:stCondLst>
+                            <p:childTnLst>
                               <p:par>
-                                <p:cTn id="9" presetID="1" presetClass="entr" presetSubtype="0" fill="hold" grpId="0" nodeType="withEffect">
+                                <p:cTn id="11" presetID="1" presetClass="entr" presetSubtype="0" fill="hold" grpId="0" nodeType="clickEffect">
                                   <p:stCondLst>
                                     <p:cond delay="0"/>
                                   </p:stCondLst>
                                   <p:childTnLst>
                                     <p:set>
                                       <p:cBhvr>
-                                        <p:cTn id="10" dur="1" fill="hold">
+                                        <p:cTn id="12" dur="1" fill="hold">
                                           <p:stCondLst>
                                             <p:cond delay="0"/>
                                           </p:stCondLst>
@@ -10010,26 +11754,26 @@
                     </p:cTn>
                   </p:par>
                   <p:par>
-                    <p:cTn id="11" fill="hold">
+                    <p:cTn id="13" fill="hold">
                       <p:stCondLst>
                         <p:cond delay="indefinite"/>
                       </p:stCondLst>
                       <p:childTnLst>
                         <p:par>
-                          <p:cTn id="12" fill="hold">
+                          <p:cTn id="14" fill="hold">
                             <p:stCondLst>
                               <p:cond delay="0"/>
                             </p:stCondLst>
                             <p:childTnLst>
                               <p:par>
-                                <p:cTn id="13" presetID="1" presetClass="entr" presetSubtype="0" fill="hold" grpId="0" nodeType="clickEffect">
+                                <p:cTn id="15" presetID="1" presetClass="entr" presetSubtype="0" fill="hold" grpId="0" nodeType="clickEffect">
                                   <p:stCondLst>
                                     <p:cond delay="0"/>
                                   </p:stCondLst>
                                   <p:childTnLst>
                                     <p:set>
                                       <p:cBhvr>
-                                        <p:cTn id="14" dur="1" fill="hold">
+                                        <p:cTn id="16" dur="1" fill="hold">
                                           <p:stCondLst>
                                             <p:cond delay="0"/>
                                           </p:stCondLst>
@@ -10053,14 +11797,14 @@
                                 </p:cTn>
                               </p:par>
                               <p:par>
-                                <p:cTn id="15" presetID="1" presetClass="entr" presetSubtype="0" fill="hold" grpId="0" nodeType="withEffect">
+                                <p:cTn id="17" presetID="1" presetClass="entr" presetSubtype="0" fill="hold" grpId="0" nodeType="withEffect">
                                   <p:stCondLst>
                                     <p:cond delay="0"/>
                                   </p:stCondLst>
                                   <p:childTnLst>
                                     <p:set>
                                       <p:cBhvr>
-                                        <p:cTn id="16" dur="1" fill="hold">
+                                        <p:cTn id="18" dur="1" fill="hold">
                                           <p:stCondLst>
                                             <p:cond delay="0"/>
                                           </p:stCondLst>
@@ -10083,15 +11827,33 @@
                                   </p:childTnLst>
                                 </p:cTn>
                               </p:par>
+                            </p:childTnLst>
+                          </p:cTn>
+                        </p:par>
+                      </p:childTnLst>
+                    </p:cTn>
+                  </p:par>
+                  <p:par>
+                    <p:cTn id="19" fill="hold">
+                      <p:stCondLst>
+                        <p:cond delay="indefinite"/>
+                      </p:stCondLst>
+                      <p:childTnLst>
+                        <p:par>
+                          <p:cTn id="20" fill="hold">
+                            <p:stCondLst>
+                              <p:cond delay="0"/>
+                            </p:stCondLst>
+                            <p:childTnLst>
                               <p:par>
-                                <p:cTn id="17" presetID="1" presetClass="entr" presetSubtype="0" fill="hold" grpId="0" nodeType="withEffect">
+                                <p:cTn id="21" presetID="1" presetClass="entr" presetSubtype="0" fill="hold" grpId="0" nodeType="clickEffect">
                                   <p:stCondLst>
                                     <p:cond delay="0"/>
                                   </p:stCondLst>
                                   <p:childTnLst>
                                     <p:set>
                                       <p:cBhvr>
-                                        <p:cTn id="18" dur="1" fill="hold">
+                                        <p:cTn id="22" dur="1" fill="hold">
                                           <p:stCondLst>
                                             <p:cond delay="0"/>
                                           </p:stCondLst>
@@ -10142,13 +11904,13 @@
       </p:par>
     </p:tnLst>
     <p:bldLst>
-      <p:bldP spid="3" grpId="0" build="p"/>
+      <p:bldP spid="3" grpId="0" uiExpand="1" build="p"/>
     </p:bldLst>
   </p:timing>
 </p:sld>
 </file>
 
-<file path=ppt/slides/slide6.xml><?xml version="1.0" encoding="utf-8"?>
+<file path=ppt/slides/slide7.xml><?xml version="1.0" encoding="utf-8"?>
 <p:sld xmlns:a="http://schemas.openxmlformats.org/drawingml/2006/main" xmlns:r="http://schemas.openxmlformats.org/officeDocument/2006/relationships" xmlns:p="http://schemas.openxmlformats.org/presentationml/2006/main">
   <p:cSld>
     <p:spTree>
@@ -10308,13 +12070,13 @@
   <p:clrMapOvr>
     <a:masterClrMapping/>
   </p:clrMapOvr>
-  <mc:AlternateContent xmlns:mc="http://schemas.openxmlformats.org/markup-compatibility/2006">
-    <mc:Choice xmlns:p159="http://schemas.microsoft.com/office/powerpoint/2015/09/main" Requires="p159">
+  <mc:AlternateContent xmlns:mc="http://schemas.openxmlformats.org/markup-compatibility/2006" xmlns:p159="http://schemas.microsoft.com/office/powerpoint/2015/09/main">
+    <mc:Choice Requires="p159">
       <p:transition xmlns:p14="http://schemas.microsoft.com/office/powerpoint/2010/main" spd="slow" p14:dur="2000">
         <p159:morph option="byObject"/>
       </p:transition>
     </mc:Choice>
-    <mc:Fallback>
+    <mc:Fallback xmlns="">
       <p:transition spd="slow">
         <p:fade/>
       </p:transition>
@@ -10846,7 +12608,7 @@
 </p:sld>
 </file>
 
-<file path=ppt/slides/slide7.xml><?xml version="1.0" encoding="utf-8"?>
+<file path=ppt/slides/slide8.xml><?xml version="1.0" encoding="utf-8"?>
 <p:sld xmlns:a="http://schemas.openxmlformats.org/drawingml/2006/main" xmlns:r="http://schemas.openxmlformats.org/officeDocument/2006/relationships" xmlns:p="http://schemas.openxmlformats.org/presentationml/2006/main">
   <p:cSld>
     <p:spTree>
@@ -10977,13 +12739,13 @@
   <p:clrMapOvr>
     <a:masterClrMapping/>
   </p:clrMapOvr>
-  <mc:AlternateContent xmlns:mc="http://schemas.openxmlformats.org/markup-compatibility/2006">
-    <mc:Choice xmlns:p159="http://schemas.microsoft.com/office/powerpoint/2015/09/main" Requires="p159">
+  <mc:AlternateContent xmlns:mc="http://schemas.openxmlformats.org/markup-compatibility/2006" xmlns:p159="http://schemas.microsoft.com/office/powerpoint/2015/09/main">
+    <mc:Choice Requires="p159">
       <p:transition xmlns:p14="http://schemas.microsoft.com/office/powerpoint/2010/main" spd="slow" p14:dur="2000">
         <p159:morph option="byObject"/>
       </p:transition>
     </mc:Choice>
-    <mc:Fallback>
+    <mc:Fallback xmlns="">
       <p:transition spd="slow">
         <p:fade/>
       </p:transition>
@@ -11319,7 +13081,7 @@
 </p:sld>
 </file>
 
-<file path=ppt/slides/slide8.xml><?xml version="1.0" encoding="utf-8"?>
+<file path=ppt/slides/slide9.xml><?xml version="1.0" encoding="utf-8"?>
 <p:sld xmlns:a="http://schemas.openxmlformats.org/drawingml/2006/main" xmlns:r="http://schemas.openxmlformats.org/officeDocument/2006/relationships" xmlns:p="http://schemas.openxmlformats.org/presentationml/2006/main">
   <p:cSld>
     <p:spTree>
@@ -11450,13 +13212,13 @@
   <p:clrMapOvr>
     <a:masterClrMapping/>
   </p:clrMapOvr>
-  <mc:AlternateContent xmlns:mc="http://schemas.openxmlformats.org/markup-compatibility/2006">
-    <mc:Choice xmlns:p159="http://schemas.microsoft.com/office/powerpoint/2015/09/main" Requires="p159">
+  <mc:AlternateContent xmlns:mc="http://schemas.openxmlformats.org/markup-compatibility/2006" xmlns:p159="http://schemas.microsoft.com/office/powerpoint/2015/09/main">
+    <mc:Choice Requires="p159">
       <p:transition xmlns:p14="http://schemas.microsoft.com/office/powerpoint/2010/main" spd="slow" p14:dur="2000">
         <p159:morph option="byObject"/>
       </p:transition>
     </mc:Choice>
-    <mc:Fallback>
+    <mc:Fallback xmlns="">
       <p:transition spd="slow">
         <p:fade/>
       </p:transition>
@@ -11695,360 +13457,6 @@
                                           <p:spTgt spid="3">
                                             <p:txEl>
                                               <p:pRg st="7" end="7"/>
-                                            </p:txEl>
-                                          </p:spTgt>
-                                        </p:tgtEl>
-                                        <p:attrNameLst>
-                                          <p:attrName>style.visibility</p:attrName>
-                                        </p:attrNameLst>
-                                      </p:cBhvr>
-                                      <p:to>
-                                        <p:strVal val="visible"/>
-                                      </p:to>
-                                    </p:set>
-                                  </p:childTnLst>
-                                </p:cTn>
-                              </p:par>
-                            </p:childTnLst>
-                          </p:cTn>
-                        </p:par>
-                      </p:childTnLst>
-                    </p:cTn>
-                  </p:par>
-                </p:childTnLst>
-              </p:cTn>
-              <p:prevCondLst>
-                <p:cond evt="onPrev" delay="0">
-                  <p:tgtEl>
-                    <p:sldTgt/>
-                  </p:tgtEl>
-                </p:cond>
-              </p:prevCondLst>
-              <p:nextCondLst>
-                <p:cond evt="onNext" delay="0">
-                  <p:tgtEl>
-                    <p:sldTgt/>
-                  </p:tgtEl>
-                </p:cond>
-              </p:nextCondLst>
-            </p:seq>
-          </p:childTnLst>
-        </p:cTn>
-      </p:par>
-    </p:tnLst>
-    <p:bldLst>
-      <p:bldP spid="3" grpId="0" uiExpand="1" build="p"/>
-    </p:bldLst>
-  </p:timing>
-</p:sld>
-</file>
-
-<file path=ppt/slides/slide9.xml><?xml version="1.0" encoding="utf-8"?>
-<p:sld xmlns:a="http://schemas.openxmlformats.org/drawingml/2006/main" xmlns:r="http://schemas.openxmlformats.org/officeDocument/2006/relationships" xmlns:p="http://schemas.openxmlformats.org/presentationml/2006/main">
-  <p:cSld>
-    <p:spTree>
-      <p:nvGrpSpPr>
-        <p:cNvPr id="1" name=""/>
-        <p:cNvGrpSpPr/>
-        <p:nvPr/>
-      </p:nvGrpSpPr>
-      <p:grpSpPr>
-        <a:xfrm>
-          <a:off x="0" y="0"/>
-          <a:ext cx="0" cy="0"/>
-          <a:chOff x="0" y="0"/>
-          <a:chExt cx="0" cy="0"/>
-        </a:xfrm>
-      </p:grpSpPr>
-      <p:sp>
-        <p:nvSpPr>
-          <p:cNvPr id="2" name="Title 1">
-            <a:extLst>
-              <a:ext uri="{FF2B5EF4-FFF2-40B4-BE49-F238E27FC236}">
-                <a16:creationId xmlns:a16="http://schemas.microsoft.com/office/drawing/2014/main" id="{BD61DC07-2119-4D76-8D85-02068B8AE439}"/>
-              </a:ext>
-            </a:extLst>
-          </p:cNvPr>
-          <p:cNvSpPr>
-            <a:spLocks noGrp="1"/>
-          </p:cNvSpPr>
-          <p:nvPr>
-            <p:ph type="title"/>
-          </p:nvPr>
-        </p:nvSpPr>
-        <p:spPr/>
-        <p:txBody>
-          <a:bodyPr/>
-          <a:lstStyle/>
-          <a:p>
-            <a:r>
-              <a:rPr lang="en-US" dirty="0"/>
-              <a:t>Repositories</a:t>
-            </a:r>
-          </a:p>
-        </p:txBody>
-      </p:sp>
-      <p:sp>
-        <p:nvSpPr>
-          <p:cNvPr id="3" name="Content Placeholder 2">
-            <a:extLst>
-              <a:ext uri="{FF2B5EF4-FFF2-40B4-BE49-F238E27FC236}">
-                <a16:creationId xmlns:a16="http://schemas.microsoft.com/office/drawing/2014/main" id="{296796AB-AD6F-4E4A-A8FD-D16B19175E75}"/>
-              </a:ext>
-            </a:extLst>
-          </p:cNvPr>
-          <p:cNvSpPr>
-            <a:spLocks noGrp="1"/>
-          </p:cNvSpPr>
-          <p:nvPr>
-            <p:ph idx="1"/>
-          </p:nvPr>
-        </p:nvSpPr>
-        <p:spPr/>
-        <p:txBody>
-          <a:bodyPr/>
-          <a:lstStyle/>
-          <a:p>
-            <a:r>
-              <a:rPr lang="en-US" dirty="0"/>
-              <a:t>Store the files you want to track</a:t>
-            </a:r>
-          </a:p>
-          <a:p>
-            <a:endParaRPr lang="en-US" dirty="0"/>
-          </a:p>
-          <a:p>
-            <a:r>
-              <a:rPr lang="en-US" dirty="0"/>
-              <a:t>Are a single folder</a:t>
-            </a:r>
-          </a:p>
-          <a:p>
-            <a:endParaRPr lang="en-US" dirty="0"/>
-          </a:p>
-          <a:p>
-            <a:r>
-              <a:rPr lang="en-US" dirty="0"/>
-              <a:t>Contain all the git meta-data. </a:t>
-            </a:r>
-          </a:p>
-          <a:p>
-            <a:endParaRPr lang="en-US" dirty="0"/>
-          </a:p>
-          <a:p>
-            <a:r>
-              <a:rPr lang="en-US" dirty="0"/>
-              <a:t>Contain ALL the changes that have been made to the files being tracked. </a:t>
-            </a:r>
-          </a:p>
-        </p:txBody>
-      </p:sp>
-    </p:spTree>
-    <p:extLst>
-      <p:ext uri="{BB962C8B-B14F-4D97-AF65-F5344CB8AC3E}">
-        <p14:creationId xmlns:p14="http://schemas.microsoft.com/office/powerpoint/2010/main" val="2589151126"/>
-      </p:ext>
-    </p:extLst>
-  </p:cSld>
-  <p:clrMapOvr>
-    <a:masterClrMapping/>
-  </p:clrMapOvr>
-  <mc:AlternateContent xmlns:mc="http://schemas.openxmlformats.org/markup-compatibility/2006">
-    <mc:Choice xmlns:p159="http://schemas.microsoft.com/office/powerpoint/2015/09/main" Requires="p159">
-      <p:transition xmlns:p14="http://schemas.microsoft.com/office/powerpoint/2010/main" spd="slow" p14:dur="2000">
-        <p159:morph option="byObject"/>
-      </p:transition>
-    </mc:Choice>
-    <mc:Fallback>
-      <p:transition spd="slow">
-        <p:fade/>
-      </p:transition>
-    </mc:Fallback>
-  </mc:AlternateContent>
-  <p:timing>
-    <p:tnLst>
-      <p:par>
-        <p:cTn id="1" dur="indefinite" restart="never" nodeType="tmRoot">
-          <p:childTnLst>
-            <p:seq concurrent="1" nextAc="seek">
-              <p:cTn id="2" dur="indefinite" nodeType="mainSeq">
-                <p:childTnLst>
-                  <p:par>
-                    <p:cTn id="3" fill="hold">
-                      <p:stCondLst>
-                        <p:cond delay="indefinite"/>
-                      </p:stCondLst>
-                      <p:childTnLst>
-                        <p:par>
-                          <p:cTn id="4" fill="hold">
-                            <p:stCondLst>
-                              <p:cond delay="0"/>
-                            </p:stCondLst>
-                            <p:childTnLst>
-                              <p:par>
-                                <p:cTn id="5" presetID="1" presetClass="entr" presetSubtype="0" fill="hold" grpId="0" nodeType="clickEffect">
-                                  <p:stCondLst>
-                                    <p:cond delay="0"/>
-                                  </p:stCondLst>
-                                  <p:childTnLst>
-                                    <p:set>
-                                      <p:cBhvr>
-                                        <p:cTn id="6" dur="1" fill="hold">
-                                          <p:stCondLst>
-                                            <p:cond delay="0"/>
-                                          </p:stCondLst>
-                                        </p:cTn>
-                                        <p:tgtEl>
-                                          <p:spTgt spid="3">
-                                            <p:txEl>
-                                              <p:pRg st="0" end="0"/>
-                                            </p:txEl>
-                                          </p:spTgt>
-                                        </p:tgtEl>
-                                        <p:attrNameLst>
-                                          <p:attrName>style.visibility</p:attrName>
-                                        </p:attrNameLst>
-                                      </p:cBhvr>
-                                      <p:to>
-                                        <p:strVal val="visible"/>
-                                      </p:to>
-                                    </p:set>
-                                  </p:childTnLst>
-                                </p:cTn>
-                              </p:par>
-                            </p:childTnLst>
-                          </p:cTn>
-                        </p:par>
-                      </p:childTnLst>
-                    </p:cTn>
-                  </p:par>
-                  <p:par>
-                    <p:cTn id="7" fill="hold">
-                      <p:stCondLst>
-                        <p:cond delay="indefinite"/>
-                      </p:stCondLst>
-                      <p:childTnLst>
-                        <p:par>
-                          <p:cTn id="8" fill="hold">
-                            <p:stCondLst>
-                              <p:cond delay="0"/>
-                            </p:stCondLst>
-                            <p:childTnLst>
-                              <p:par>
-                                <p:cTn id="9" presetID="1" presetClass="entr" presetSubtype="0" fill="hold" grpId="0" nodeType="clickEffect">
-                                  <p:stCondLst>
-                                    <p:cond delay="0"/>
-                                  </p:stCondLst>
-                                  <p:childTnLst>
-                                    <p:set>
-                                      <p:cBhvr>
-                                        <p:cTn id="10" dur="1" fill="hold">
-                                          <p:stCondLst>
-                                            <p:cond delay="0"/>
-                                          </p:stCondLst>
-                                        </p:cTn>
-                                        <p:tgtEl>
-                                          <p:spTgt spid="3">
-                                            <p:txEl>
-                                              <p:pRg st="2" end="2"/>
-                                            </p:txEl>
-                                          </p:spTgt>
-                                        </p:tgtEl>
-                                        <p:attrNameLst>
-                                          <p:attrName>style.visibility</p:attrName>
-                                        </p:attrNameLst>
-                                      </p:cBhvr>
-                                      <p:to>
-                                        <p:strVal val="visible"/>
-                                      </p:to>
-                                    </p:set>
-                                  </p:childTnLst>
-                                </p:cTn>
-                              </p:par>
-                            </p:childTnLst>
-                          </p:cTn>
-                        </p:par>
-                      </p:childTnLst>
-                    </p:cTn>
-                  </p:par>
-                  <p:par>
-                    <p:cTn id="11" fill="hold">
-                      <p:stCondLst>
-                        <p:cond delay="indefinite"/>
-                      </p:stCondLst>
-                      <p:childTnLst>
-                        <p:par>
-                          <p:cTn id="12" fill="hold">
-                            <p:stCondLst>
-                              <p:cond delay="0"/>
-                            </p:stCondLst>
-                            <p:childTnLst>
-                              <p:par>
-                                <p:cTn id="13" presetID="1" presetClass="entr" presetSubtype="0" fill="hold" grpId="0" nodeType="clickEffect">
-                                  <p:stCondLst>
-                                    <p:cond delay="0"/>
-                                  </p:stCondLst>
-                                  <p:childTnLst>
-                                    <p:set>
-                                      <p:cBhvr>
-                                        <p:cTn id="14" dur="1" fill="hold">
-                                          <p:stCondLst>
-                                            <p:cond delay="0"/>
-                                          </p:stCondLst>
-                                        </p:cTn>
-                                        <p:tgtEl>
-                                          <p:spTgt spid="3">
-                                            <p:txEl>
-                                              <p:pRg st="4" end="4"/>
-                                            </p:txEl>
-                                          </p:spTgt>
-                                        </p:tgtEl>
-                                        <p:attrNameLst>
-                                          <p:attrName>style.visibility</p:attrName>
-                                        </p:attrNameLst>
-                                      </p:cBhvr>
-                                      <p:to>
-                                        <p:strVal val="visible"/>
-                                      </p:to>
-                                    </p:set>
-                                  </p:childTnLst>
-                                </p:cTn>
-                              </p:par>
-                            </p:childTnLst>
-                          </p:cTn>
-                        </p:par>
-                      </p:childTnLst>
-                    </p:cTn>
-                  </p:par>
-                  <p:par>
-                    <p:cTn id="15" fill="hold">
-                      <p:stCondLst>
-                        <p:cond delay="indefinite"/>
-                      </p:stCondLst>
-                      <p:childTnLst>
-                        <p:par>
-                          <p:cTn id="16" fill="hold">
-                            <p:stCondLst>
-                              <p:cond delay="0"/>
-                            </p:stCondLst>
-                            <p:childTnLst>
-                              <p:par>
-                                <p:cTn id="17" presetID="1" presetClass="entr" presetSubtype="0" fill="hold" grpId="0" nodeType="clickEffect">
-                                  <p:stCondLst>
-                                    <p:cond delay="0"/>
-                                  </p:stCondLst>
-                                  <p:childTnLst>
-                                    <p:set>
-                                      <p:cBhvr>
-                                        <p:cTn id="18" dur="1" fill="hold">
-                                          <p:stCondLst>
-                                            <p:cond delay="0"/>
-                                          </p:stCondLst>
-                                        </p:cTn>
-                                        <p:tgtEl>
-                                          <p:spTgt spid="3">
-                                            <p:txEl>
-                                              <p:pRg st="6" end="6"/>
                                             </p:txEl>
                                           </p:spTgt>
                                         </p:tgtEl>

</xml_diff>

<commit_message>
Added info to Branch and Merge.  Also added more resources
</commit_message>
<xml_diff>
--- a/Git and LV.pptx
+++ b/Git and LV.pptx
@@ -7903,7 +7903,10 @@
           <a:bodyPr/>
           <a:lstStyle/>
           <a:p>
-            <a:endParaRPr lang="en-US" dirty="0"/>
+            <a:r>
+              <a:rPr lang="en-US" dirty="0"/>
+              <a:t>These are what most people think of when they think of Git.  </a:t>
+            </a:r>
           </a:p>
         </p:txBody>
       </p:sp>
@@ -8789,6 +8792,12 @@
             </a:r>
           </a:p>
           <a:p>
+            <a:r>
+              <a:rPr lang="en-US" dirty="0"/>
+              <a:t>Checking out branches shelves all the changes you’ve made and brings up all the changes you’ve made on the other branch. </a:t>
+            </a:r>
+          </a:p>
+          <a:p>
             <a:pPr lvl="1"/>
             <a:endParaRPr lang="en-US" dirty="0"/>
           </a:p>
@@ -8995,6 +9004,12 @@
             </a:r>
           </a:p>
           <a:p>
+            <a:r>
+              <a:rPr lang="en-US" dirty="0"/>
+              <a:t>Typically merges are linked with deleting the branch that was merged, but is not mandatory. </a:t>
+            </a:r>
+          </a:p>
+          <a:p>
             <a:pPr lvl="1"/>
             <a:endParaRPr lang="en-US" dirty="0"/>
           </a:p>
@@ -9194,6 +9209,20 @@
             <a:endParaRPr lang="en-US" dirty="0"/>
           </a:p>
           <a:p>
+            <a:r>
+              <a:rPr lang="en-US" dirty="0"/>
+              <a:t>These are the way </a:t>
+            </a:r>
+            <a:r>
+              <a:rPr lang="en-US" dirty="0" err="1"/>
+              <a:t>changsets</a:t>
+            </a:r>
+            <a:r>
+              <a:rPr lang="en-US" dirty="0"/>
+              <a:t> are shared. </a:t>
+            </a:r>
+          </a:p>
+          <a:p>
             <a:endParaRPr lang="en-US" dirty="0"/>
           </a:p>
           <a:p>
@@ -9203,23 +9232,41 @@
             </a:r>
           </a:p>
           <a:p>
+            <a:r>
+              <a:rPr lang="en-US" dirty="0"/>
+              <a:t>Pulling is the opposite, taking changes from another repo and bringing it to your own. </a:t>
+            </a:r>
+          </a:p>
+          <a:p>
+            <a:endParaRPr lang="en-US" dirty="0"/>
+          </a:p>
+          <a:p>
+            <a:r>
+              <a:rPr lang="en-US" dirty="0"/>
+              <a:t>Pull Requests are a very different thing. </a:t>
+            </a:r>
+          </a:p>
+          <a:p>
             <a:pPr lvl="1"/>
             <a:r>
               <a:rPr lang="en-US" dirty="0"/>
-              <a:t>This is the way changesets are shared. </a:t>
-            </a:r>
-          </a:p>
-          <a:p>
+              <a:t>(Short for: Requesting Someone Else To Pull Your Changes)</a:t>
+            </a:r>
+          </a:p>
+          <a:p>
+            <a:pPr lvl="1"/>
+            <a:r>
+              <a:rPr lang="en-US" dirty="0"/>
+              <a:t>Are used to trigger reviews of the submitted changes.</a:t>
+            </a:r>
+          </a:p>
+          <a:p>
+            <a:pPr lvl="1"/>
             <a:endParaRPr lang="en-US" dirty="0"/>
           </a:p>
           <a:p>
+            <a:pPr lvl="1"/>
             <a:endParaRPr lang="en-US" dirty="0"/>
-          </a:p>
-          <a:p>
-            <a:r>
-              <a:rPr lang="en-US" dirty="0"/>
-              <a:t>Pull Requests (Short for: Requesting Someone Else To Pull Your Changes)</a:t>
-            </a:r>
           </a:p>
           <a:p>
             <a:pPr lvl="1"/>
@@ -9285,7 +9332,7 @@
                                         <p:tgtEl>
                                           <p:spTgt spid="3">
                                             <p:txEl>
-                                              <p:pRg st="2" end="2"/>
+                                              <p:pRg st="1" end="1"/>
                                             </p:txEl>
                                           </p:spTgt>
                                         </p:tgtEl>
@@ -9300,15 +9347,33 @@
                                   </p:childTnLst>
                                 </p:cTn>
                               </p:par>
+                            </p:childTnLst>
+                          </p:cTn>
+                        </p:par>
+                      </p:childTnLst>
+                    </p:cTn>
+                  </p:par>
+                  <p:par>
+                    <p:cTn id="7" fill="hold">
+                      <p:stCondLst>
+                        <p:cond delay="indefinite"/>
+                      </p:stCondLst>
+                      <p:childTnLst>
+                        <p:par>
+                          <p:cTn id="8" fill="hold">
+                            <p:stCondLst>
+                              <p:cond delay="0"/>
+                            </p:stCondLst>
+                            <p:childTnLst>
                               <p:par>
-                                <p:cTn id="7" presetID="1" presetClass="entr" presetSubtype="0" fill="hold" grpId="0" nodeType="withEffect">
+                                <p:cTn id="9" presetID="1" presetClass="entr" presetSubtype="0" fill="hold" grpId="0" nodeType="clickEffect">
                                   <p:stCondLst>
                                     <p:cond delay="0"/>
                                   </p:stCondLst>
                                   <p:childTnLst>
                                     <p:set>
                                       <p:cBhvr>
-                                        <p:cTn id="8" dur="1" fill="hold">
+                                        <p:cTn id="10" dur="1" fill="hold">
                                           <p:stCondLst>
                                             <p:cond delay="0"/>
                                           </p:stCondLst>
@@ -9338,26 +9403,75 @@
                     </p:cTn>
                   </p:par>
                   <p:par>
-                    <p:cTn id="9" fill="hold">
+                    <p:cTn id="11" fill="hold">
                       <p:stCondLst>
                         <p:cond delay="indefinite"/>
                       </p:stCondLst>
                       <p:childTnLst>
                         <p:par>
-                          <p:cTn id="10" fill="hold">
+                          <p:cTn id="12" fill="hold">
                             <p:stCondLst>
                               <p:cond delay="0"/>
                             </p:stCondLst>
                             <p:childTnLst>
                               <p:par>
-                                <p:cTn id="11" presetID="1" presetClass="entr" presetSubtype="0" fill="hold" grpId="0" nodeType="clickEffect">
+                                <p:cTn id="13" presetID="1" presetClass="entr" presetSubtype="0" fill="hold" grpId="0" nodeType="clickEffect">
                                   <p:stCondLst>
                                     <p:cond delay="0"/>
                                   </p:stCondLst>
                                   <p:childTnLst>
                                     <p:set>
                                       <p:cBhvr>
-                                        <p:cTn id="12" dur="1" fill="hold">
+                                        <p:cTn id="14" dur="1" fill="hold">
+                                          <p:stCondLst>
+                                            <p:cond delay="0"/>
+                                          </p:stCondLst>
+                                        </p:cTn>
+                                        <p:tgtEl>
+                                          <p:spTgt spid="3">
+                                            <p:txEl>
+                                              <p:pRg st="4" end="4"/>
+                                            </p:txEl>
+                                          </p:spTgt>
+                                        </p:tgtEl>
+                                        <p:attrNameLst>
+                                          <p:attrName>style.visibility</p:attrName>
+                                        </p:attrNameLst>
+                                      </p:cBhvr>
+                                      <p:to>
+                                        <p:strVal val="visible"/>
+                                      </p:to>
+                                    </p:set>
+                                  </p:childTnLst>
+                                </p:cTn>
+                              </p:par>
+                            </p:childTnLst>
+                          </p:cTn>
+                        </p:par>
+                      </p:childTnLst>
+                    </p:cTn>
+                  </p:par>
+                  <p:par>
+                    <p:cTn id="15" fill="hold">
+                      <p:stCondLst>
+                        <p:cond delay="indefinite"/>
+                      </p:stCondLst>
+                      <p:childTnLst>
+                        <p:par>
+                          <p:cTn id="16" fill="hold">
+                            <p:stCondLst>
+                              <p:cond delay="0"/>
+                            </p:stCondLst>
+                            <p:childTnLst>
+                              <p:par>
+                                <p:cTn id="17" presetID="1" presetClass="entr" presetSubtype="0" fill="hold" grpId="0" nodeType="clickEffect">
+                                  <p:stCondLst>
+                                    <p:cond delay="0"/>
+                                  </p:stCondLst>
+                                  <p:childTnLst>
+                                    <p:set>
+                                      <p:cBhvr>
+                                        <p:cTn id="18" dur="1" fill="hold">
                                           <p:stCondLst>
                                             <p:cond delay="0"/>
                                           </p:stCondLst>
@@ -9366,6 +9480,104 @@
                                           <p:spTgt spid="3">
                                             <p:txEl>
                                               <p:pRg st="6" end="6"/>
+                                            </p:txEl>
+                                          </p:spTgt>
+                                        </p:tgtEl>
+                                        <p:attrNameLst>
+                                          <p:attrName>style.visibility</p:attrName>
+                                        </p:attrNameLst>
+                                      </p:cBhvr>
+                                      <p:to>
+                                        <p:strVal val="visible"/>
+                                      </p:to>
+                                    </p:set>
+                                  </p:childTnLst>
+                                </p:cTn>
+                              </p:par>
+                            </p:childTnLst>
+                          </p:cTn>
+                        </p:par>
+                      </p:childTnLst>
+                    </p:cTn>
+                  </p:par>
+                  <p:par>
+                    <p:cTn id="19" fill="hold">
+                      <p:stCondLst>
+                        <p:cond delay="indefinite"/>
+                      </p:stCondLst>
+                      <p:childTnLst>
+                        <p:par>
+                          <p:cTn id="20" fill="hold">
+                            <p:stCondLst>
+                              <p:cond delay="0"/>
+                            </p:stCondLst>
+                            <p:childTnLst>
+                              <p:par>
+                                <p:cTn id="21" presetID="1" presetClass="entr" presetSubtype="0" fill="hold" grpId="0" nodeType="clickEffect">
+                                  <p:stCondLst>
+                                    <p:cond delay="0"/>
+                                  </p:stCondLst>
+                                  <p:childTnLst>
+                                    <p:set>
+                                      <p:cBhvr>
+                                        <p:cTn id="22" dur="1" fill="hold">
+                                          <p:stCondLst>
+                                            <p:cond delay="0"/>
+                                          </p:stCondLst>
+                                        </p:cTn>
+                                        <p:tgtEl>
+                                          <p:spTgt spid="3">
+                                            <p:txEl>
+                                              <p:pRg st="7" end="7"/>
+                                            </p:txEl>
+                                          </p:spTgt>
+                                        </p:tgtEl>
+                                        <p:attrNameLst>
+                                          <p:attrName>style.visibility</p:attrName>
+                                        </p:attrNameLst>
+                                      </p:cBhvr>
+                                      <p:to>
+                                        <p:strVal val="visible"/>
+                                      </p:to>
+                                    </p:set>
+                                  </p:childTnLst>
+                                </p:cTn>
+                              </p:par>
+                            </p:childTnLst>
+                          </p:cTn>
+                        </p:par>
+                      </p:childTnLst>
+                    </p:cTn>
+                  </p:par>
+                  <p:par>
+                    <p:cTn id="23" fill="hold">
+                      <p:stCondLst>
+                        <p:cond delay="indefinite"/>
+                      </p:stCondLst>
+                      <p:childTnLst>
+                        <p:par>
+                          <p:cTn id="24" fill="hold">
+                            <p:stCondLst>
+                              <p:cond delay="0"/>
+                            </p:stCondLst>
+                            <p:childTnLst>
+                              <p:par>
+                                <p:cTn id="25" presetID="1" presetClass="entr" presetSubtype="0" fill="hold" grpId="0" nodeType="clickEffect">
+                                  <p:stCondLst>
+                                    <p:cond delay="0"/>
+                                  </p:stCondLst>
+                                  <p:childTnLst>
+                                    <p:set>
+                                      <p:cBhvr>
+                                        <p:cTn id="26" dur="1" fill="hold">
+                                          <p:stCondLst>
+                                            <p:cond delay="0"/>
+                                          </p:stCondLst>
+                                        </p:cTn>
+                                        <p:tgtEl>
+                                          <p:spTgt spid="3">
+                                            <p:txEl>
+                                              <p:pRg st="8" end="8"/>
                                             </p:txEl>
                                           </p:spTgt>
                                         </p:tgtEl>
@@ -9408,7 +9620,7 @@
       </p:par>
     </p:tnLst>
     <p:bldLst>
-      <p:bldP spid="3" grpId="0" build="p"/>
+      <p:bldP spid="3" grpId="0" uiExpand="1" build="p"/>
     </p:bldLst>
   </p:timing>
 </p:sld>
@@ -9714,8 +9926,13 @@
           <a:p>
             <a:r>
               <a:rPr lang="en-US" dirty="0"/>
-              <a:t>Git for Teams (</a:t>
-            </a:r>
+              <a:t>Git for Teams </a:t>
+            </a:r>
+            <a:r>
+              <a:rPr lang="en-US"/>
+              <a:t>(O’Reilly Press &amp; www.gitforteams.com)</a:t>
+            </a:r>
+            <a:endParaRPr lang="en-US" dirty="0"/>
           </a:p>
           <a:p>
             <a:endParaRPr lang="en-US" dirty="0"/>
@@ -13160,6 +13377,9 @@
             <a:endParaRPr lang="en-US" dirty="0"/>
           </a:p>
           <a:p>
+            <a:endParaRPr lang="en-US" dirty="0"/>
+          </a:p>
+          <a:p>
             <a:r>
               <a:rPr lang="en-US" dirty="0"/>
               <a:t>Who is the source of authority?</a:t>
@@ -13178,7 +13398,7 @@
           <a:p>
             <a:r>
               <a:rPr lang="en-US" dirty="0"/>
-              <a:t>If working in a team, you must have good teamwork</a:t>
+              <a:t>If working in a team, you must have good communication and teamwork</a:t>
             </a:r>
           </a:p>
           <a:p>
@@ -13195,6 +13415,29 @@
             <a:r>
               <a:rPr lang="en-US" dirty="0"/>
               <a:t>This can be managed through some rules and workflows. </a:t>
+            </a:r>
+          </a:p>
+          <a:p>
+            <a:pPr lvl="1"/>
+            <a:r>
+              <a:rPr lang="en-US" dirty="0"/>
+              <a:t>Example workflows: </a:t>
+            </a:r>
+            <a:r>
+              <a:rPr lang="en-US" dirty="0" err="1"/>
+              <a:t>Gitflow</a:t>
+            </a:r>
+            <a:r>
+              <a:rPr lang="en-US" dirty="0"/>
+              <a:t> &amp; </a:t>
+            </a:r>
+            <a:r>
+              <a:rPr lang="en-US" dirty="0" err="1"/>
+              <a:t>Github</a:t>
+            </a:r>
+            <a:r>
+              <a:rPr lang="en-US" dirty="0"/>
+              <a:t> Flow</a:t>
             </a:r>
           </a:p>
           <a:p>
@@ -13260,7 +13503,7 @@
                                         <p:tgtEl>
                                           <p:spTgt spid="3">
                                             <p:txEl>
-                                              <p:pRg st="1" end="1"/>
+                                              <p:pRg st="2" end="2"/>
                                             </p:txEl>
                                           </p:spTgt>
                                         </p:tgtEl>
@@ -13309,7 +13552,7 @@
                                         <p:tgtEl>
                                           <p:spTgt spid="3">
                                             <p:txEl>
-                                              <p:pRg st="2" end="2"/>
+                                              <p:pRg st="3" end="3"/>
                                             </p:txEl>
                                           </p:spTgt>
                                         </p:tgtEl>
@@ -13358,7 +13601,7 @@
                                         <p:tgtEl>
                                           <p:spTgt spid="3">
                                             <p:txEl>
-                                              <p:pRg st="4" end="4"/>
+                                              <p:pRg st="5" end="5"/>
                                             </p:txEl>
                                           </p:spTgt>
                                         </p:tgtEl>
@@ -13407,7 +13650,7 @@
                                         <p:tgtEl>
                                           <p:spTgt spid="3">
                                             <p:txEl>
-                                              <p:pRg st="6" end="6"/>
+                                              <p:pRg st="7" end="7"/>
                                             </p:txEl>
                                           </p:spTgt>
                                         </p:tgtEl>
@@ -13456,7 +13699,56 @@
                                         <p:tgtEl>
                                           <p:spTgt spid="3">
                                             <p:txEl>
-                                              <p:pRg st="7" end="7"/>
+                                              <p:pRg st="8" end="8"/>
+                                            </p:txEl>
+                                          </p:spTgt>
+                                        </p:tgtEl>
+                                        <p:attrNameLst>
+                                          <p:attrName>style.visibility</p:attrName>
+                                        </p:attrNameLst>
+                                      </p:cBhvr>
+                                      <p:to>
+                                        <p:strVal val="visible"/>
+                                      </p:to>
+                                    </p:set>
+                                  </p:childTnLst>
+                                </p:cTn>
+                              </p:par>
+                            </p:childTnLst>
+                          </p:cTn>
+                        </p:par>
+                      </p:childTnLst>
+                    </p:cTn>
+                  </p:par>
+                  <p:par>
+                    <p:cTn id="23" fill="hold">
+                      <p:stCondLst>
+                        <p:cond delay="indefinite"/>
+                      </p:stCondLst>
+                      <p:childTnLst>
+                        <p:par>
+                          <p:cTn id="24" fill="hold">
+                            <p:stCondLst>
+                              <p:cond delay="0"/>
+                            </p:stCondLst>
+                            <p:childTnLst>
+                              <p:par>
+                                <p:cTn id="25" presetID="1" presetClass="entr" presetSubtype="0" fill="hold" grpId="0" nodeType="clickEffect">
+                                  <p:stCondLst>
+                                    <p:cond delay="0"/>
+                                  </p:stCondLst>
+                                  <p:childTnLst>
+                                    <p:set>
+                                      <p:cBhvr>
+                                        <p:cTn id="26" dur="1" fill="hold">
+                                          <p:stCondLst>
+                                            <p:cond delay="0"/>
+                                          </p:stCondLst>
+                                        </p:cTn>
+                                        <p:tgtEl>
+                                          <p:spTgt spid="3">
+                                            <p:txEl>
+                                              <p:pRg st="9" end="9"/>
                                             </p:txEl>
                                           </p:spTgt>
                                         </p:tgtEl>

</xml_diff>

<commit_message>
Cleared up language on branching slide
</commit_message>
<xml_diff>
--- a/Git and LV.pptx
+++ b/Git and LV.pptx
@@ -228,7 +228,7 @@
           <a:p>
             <a:fld id="{340551C4-E36D-4DF7-AAE7-E45DF88FF737}" type="datetimeFigureOut">
               <a:rPr lang="en-US" smtClean="0"/>
-              <a:t>10/29/2019</a:t>
+              <a:t>11/2/2021</a:t>
             </a:fld>
             <a:endParaRPr lang="en-US"/>
           </a:p>
@@ -558,39 +558,6 @@
           <a:bodyPr/>
           <a:lstStyle/>
           <a:p>
-            <a:r>
-              <a:rPr lang="en-US" dirty="0"/>
-              <a:t>Explain “Core feature set’ Wording better</a:t>
-            </a:r>
-          </a:p>
-          <a:p>
-            <a:r>
-              <a:rPr lang="en-US" dirty="0"/>
-              <a:t>Worst Case Audience</a:t>
-            </a:r>
-          </a:p>
-          <a:p>
-            <a:pPr lvl="1"/>
-            <a:r>
-              <a:rPr lang="en-US" dirty="0"/>
-              <a:t>Git experts!</a:t>
-            </a:r>
-          </a:p>
-          <a:p>
-            <a:pPr lvl="1"/>
-            <a:r>
-              <a:rPr lang="en-US" dirty="0"/>
-              <a:t>I apologize in advance for any gross simplifications and errors. </a:t>
-            </a:r>
-          </a:p>
-          <a:p>
-            <a:pPr lvl="1"/>
-            <a:r>
-              <a:rPr lang="en-US" dirty="0"/>
-              <a:t>Please try to avoid “but what about…”s.  I will be focusing on the core feature set and not any extra modules. </a:t>
-            </a:r>
-          </a:p>
-          <a:p>
             <a:endParaRPr lang="en-US" dirty="0"/>
           </a:p>
         </p:txBody>
@@ -612,7 +579,7 @@
           <a:p>
             <a:fld id="{E9E1DFC9-EE16-4136-8822-8361C2EB7D32}" type="slidenum">
               <a:rPr lang="en-US" smtClean="0"/>
-              <a:t>2</a:t>
+              <a:t>1</a:t>
             </a:fld>
             <a:endParaRPr lang="en-US"/>
           </a:p>
@@ -621,7 +588,7 @@
     </p:spTree>
     <p:extLst>
       <p:ext uri="{BB962C8B-B14F-4D97-AF65-F5344CB8AC3E}">
-        <p14:creationId xmlns:p14="http://schemas.microsoft.com/office/powerpoint/2010/main" val="3941402197"/>
+        <p14:creationId xmlns:p14="http://schemas.microsoft.com/office/powerpoint/2010/main" val="689956113"/>
       </p:ext>
     </p:extLst>
   </p:cSld>
@@ -675,75 +642,7 @@
           <a:bodyPr/>
           <a:lstStyle/>
           <a:p>
-            <a:r>
-              <a:rPr lang="en-US" dirty="0"/>
-              <a:t>Add Visual References (Atlassian Diagrams)</a:t>
-            </a:r>
-          </a:p>
-          <a:p>
             <a:endParaRPr lang="en-US" dirty="0"/>
-          </a:p>
-          <a:p>
-            <a:r>
-              <a:rPr lang="en-US" dirty="0"/>
-              <a:t>By </a:t>
-            </a:r>
-            <a:r>
-              <a:rPr lang="en-US" dirty="0" err="1"/>
-              <a:t>Revision_controlled_project_visualization.svg</a:t>
-            </a:r>
-            <a:r>
-              <a:rPr lang="en-US" dirty="0"/>
-              <a:t>: *</a:t>
-            </a:r>
-            <a:r>
-              <a:rPr lang="en-US" dirty="0" err="1"/>
-              <a:t>Subversion_project_visualization.svg</a:t>
-            </a:r>
-            <a:r>
-              <a:rPr lang="en-US" dirty="0"/>
-              <a:t>: Traced by </a:t>
-            </a:r>
-            <a:r>
-              <a:rPr lang="en-US" dirty="0" err="1"/>
-              <a:t>User:Stannered</a:t>
-            </a:r>
-            <a:r>
-              <a:rPr lang="en-US" dirty="0"/>
-              <a:t>, original by </a:t>
-            </a:r>
-            <a:r>
-              <a:rPr lang="en-US" dirty="0" err="1"/>
-              <a:t>en:User:Sami</a:t>
-            </a:r>
-            <a:r>
-              <a:rPr lang="en-US" dirty="0"/>
-              <a:t> </a:t>
-            </a:r>
-            <a:r>
-              <a:rPr lang="en-US" dirty="0" err="1"/>
-              <a:t>Keroladerivative</a:t>
-            </a:r>
-            <a:r>
-              <a:rPr lang="en-US" dirty="0"/>
-              <a:t> work: </a:t>
-            </a:r>
-            <a:r>
-              <a:rPr lang="en-US" dirty="0" err="1"/>
-              <a:t>Moxfyre</a:t>
-            </a:r>
-            <a:r>
-              <a:rPr lang="en-US" dirty="0"/>
-              <a:t> (talk)derivative work: Echion2 (talk) - </a:t>
-            </a:r>
-            <a:r>
-              <a:rPr lang="en-US" dirty="0" err="1"/>
-              <a:t>Revision_controlled_project_visualization.svg</a:t>
-            </a:r>
-            <a:r>
-              <a:rPr lang="en-US" dirty="0"/>
-              <a:t>, CC BY-SA 3.0, https://commons.wikimedia.org/w/index.php?curid=9562807</a:t>
-            </a:r>
           </a:p>
         </p:txBody>
       </p:sp>
@@ -764,7 +663,7 @@
           <a:p>
             <a:fld id="{E9E1DFC9-EE16-4136-8822-8361C2EB7D32}" type="slidenum">
               <a:rPr lang="en-US" smtClean="0"/>
-              <a:t>14</a:t>
+              <a:t>11</a:t>
             </a:fld>
             <a:endParaRPr lang="en-US"/>
           </a:p>
@@ -773,7 +672,7 @@
     </p:spTree>
     <p:extLst>
       <p:ext uri="{BB962C8B-B14F-4D97-AF65-F5344CB8AC3E}">
-        <p14:creationId xmlns:p14="http://schemas.microsoft.com/office/powerpoint/2010/main" val="2749384323"/>
+        <p14:creationId xmlns:p14="http://schemas.microsoft.com/office/powerpoint/2010/main" val="431731124"/>
       </p:ext>
     </p:extLst>
   </p:cSld>
@@ -916,6 +815,158 @@
           <a:p>
             <a:fld id="{E9E1DFC9-EE16-4136-8822-8361C2EB7D32}" type="slidenum">
               <a:rPr lang="en-US" smtClean="0"/>
+              <a:t>14</a:t>
+            </a:fld>
+            <a:endParaRPr lang="en-US"/>
+          </a:p>
+        </p:txBody>
+      </p:sp>
+    </p:spTree>
+    <p:extLst>
+      <p:ext uri="{BB962C8B-B14F-4D97-AF65-F5344CB8AC3E}">
+        <p14:creationId xmlns:p14="http://schemas.microsoft.com/office/powerpoint/2010/main" val="2749384323"/>
+      </p:ext>
+    </p:extLst>
+  </p:cSld>
+  <p:clrMapOvr>
+    <a:masterClrMapping/>
+  </p:clrMapOvr>
+</p:notes>
+</file>
+
+<file path=ppt/notesSlides/notesSlide12.xml><?xml version="1.0" encoding="utf-8"?>
+<p:notes xmlns:a="http://schemas.openxmlformats.org/drawingml/2006/main" xmlns:r="http://schemas.openxmlformats.org/officeDocument/2006/relationships" xmlns:p="http://schemas.openxmlformats.org/presentationml/2006/main">
+  <p:cSld>
+    <p:spTree>
+      <p:nvGrpSpPr>
+        <p:cNvPr id="1" name=""/>
+        <p:cNvGrpSpPr/>
+        <p:nvPr/>
+      </p:nvGrpSpPr>
+      <p:grpSpPr>
+        <a:xfrm>
+          <a:off x="0" y="0"/>
+          <a:ext cx="0" cy="0"/>
+          <a:chOff x="0" y="0"/>
+          <a:chExt cx="0" cy="0"/>
+        </a:xfrm>
+      </p:grpSpPr>
+      <p:sp>
+        <p:nvSpPr>
+          <p:cNvPr id="2" name="Slide Image Placeholder 1"/>
+          <p:cNvSpPr>
+            <a:spLocks noGrp="1" noRot="1" noChangeAspect="1"/>
+          </p:cNvSpPr>
+          <p:nvPr>
+            <p:ph type="sldImg"/>
+          </p:nvPr>
+        </p:nvSpPr>
+        <p:spPr/>
+      </p:sp>
+      <p:sp>
+        <p:nvSpPr>
+          <p:cNvPr id="3" name="Notes Placeholder 2"/>
+          <p:cNvSpPr>
+            <a:spLocks noGrp="1"/>
+          </p:cNvSpPr>
+          <p:nvPr>
+            <p:ph type="body" idx="1"/>
+          </p:nvPr>
+        </p:nvSpPr>
+        <p:spPr/>
+        <p:txBody>
+          <a:bodyPr/>
+          <a:lstStyle/>
+          <a:p>
+            <a:r>
+              <a:rPr lang="en-US" dirty="0"/>
+              <a:t>Add Visual References (Atlassian Diagrams)</a:t>
+            </a:r>
+          </a:p>
+          <a:p>
+            <a:endParaRPr lang="en-US" dirty="0"/>
+          </a:p>
+          <a:p>
+            <a:r>
+              <a:rPr lang="en-US" dirty="0"/>
+              <a:t>By </a:t>
+            </a:r>
+            <a:r>
+              <a:rPr lang="en-US" dirty="0" err="1"/>
+              <a:t>Revision_controlled_project_visualization.svg</a:t>
+            </a:r>
+            <a:r>
+              <a:rPr lang="en-US" dirty="0"/>
+              <a:t>: *</a:t>
+            </a:r>
+            <a:r>
+              <a:rPr lang="en-US" dirty="0" err="1"/>
+              <a:t>Subversion_project_visualization.svg</a:t>
+            </a:r>
+            <a:r>
+              <a:rPr lang="en-US" dirty="0"/>
+              <a:t>: Traced by </a:t>
+            </a:r>
+            <a:r>
+              <a:rPr lang="en-US" dirty="0" err="1"/>
+              <a:t>User:Stannered</a:t>
+            </a:r>
+            <a:r>
+              <a:rPr lang="en-US" dirty="0"/>
+              <a:t>, original by </a:t>
+            </a:r>
+            <a:r>
+              <a:rPr lang="en-US" dirty="0" err="1"/>
+              <a:t>en:User:Sami</a:t>
+            </a:r>
+            <a:r>
+              <a:rPr lang="en-US" dirty="0"/>
+              <a:t> </a:t>
+            </a:r>
+            <a:r>
+              <a:rPr lang="en-US" dirty="0" err="1"/>
+              <a:t>Keroladerivative</a:t>
+            </a:r>
+            <a:r>
+              <a:rPr lang="en-US" dirty="0"/>
+              <a:t> work: </a:t>
+            </a:r>
+            <a:r>
+              <a:rPr lang="en-US" dirty="0" err="1"/>
+              <a:t>Moxfyre</a:t>
+            </a:r>
+            <a:r>
+              <a:rPr lang="en-US" dirty="0"/>
+              <a:t> (talk)derivative work: Echion2 (talk) - </a:t>
+            </a:r>
+            <a:r>
+              <a:rPr lang="en-US" dirty="0" err="1"/>
+              <a:t>Revision_controlled_project_visualization.svg</a:t>
+            </a:r>
+            <a:r>
+              <a:rPr lang="en-US" dirty="0"/>
+              <a:t>, CC BY-SA 3.0, https://commons.wikimedia.org/w/index.php?curid=9562807</a:t>
+            </a:r>
+          </a:p>
+        </p:txBody>
+      </p:sp>
+      <p:sp>
+        <p:nvSpPr>
+          <p:cNvPr id="4" name="Slide Number Placeholder 3"/>
+          <p:cNvSpPr>
+            <a:spLocks noGrp="1"/>
+          </p:cNvSpPr>
+          <p:nvPr>
+            <p:ph type="sldNum" sz="quarter" idx="5"/>
+          </p:nvPr>
+        </p:nvSpPr>
+        <p:spPr/>
+        <p:txBody>
+          <a:bodyPr/>
+          <a:lstStyle/>
+          <a:p>
+            <a:fld id="{E9E1DFC9-EE16-4136-8822-8361C2EB7D32}" type="slidenum">
+              <a:rPr lang="en-US" smtClean="0"/>
               <a:t>15</a:t>
             </a:fld>
             <a:endParaRPr lang="en-US"/>
@@ -935,7 +986,7 @@
 </p:notes>
 </file>
 
-<file path=ppt/notesSlides/notesSlide12.xml><?xml version="1.0" encoding="utf-8"?>
+<file path=ppt/notesSlides/notesSlide13.xml><?xml version="1.0" encoding="utf-8"?>
 <p:notes xmlns:a="http://schemas.openxmlformats.org/drawingml/2006/main" xmlns:r="http://schemas.openxmlformats.org/officeDocument/2006/relationships" xmlns:p="http://schemas.openxmlformats.org/presentationml/2006/main">
   <p:cSld>
     <p:spTree>
@@ -1066,6 +1117,39 @@
           <a:bodyPr/>
           <a:lstStyle/>
           <a:p>
+            <a:r>
+              <a:rPr lang="en-US" dirty="0"/>
+              <a:t>Explain “Core feature set’ Wording better</a:t>
+            </a:r>
+          </a:p>
+          <a:p>
+            <a:r>
+              <a:rPr lang="en-US" dirty="0"/>
+              <a:t>Worst Case Audience</a:t>
+            </a:r>
+          </a:p>
+          <a:p>
+            <a:pPr lvl="1"/>
+            <a:r>
+              <a:rPr lang="en-US" dirty="0"/>
+              <a:t>Git experts!</a:t>
+            </a:r>
+          </a:p>
+          <a:p>
+            <a:pPr lvl="1"/>
+            <a:r>
+              <a:rPr lang="en-US" dirty="0"/>
+              <a:t>I apologize in advance for any gross simplifications and errors. </a:t>
+            </a:r>
+          </a:p>
+          <a:p>
+            <a:pPr lvl="1"/>
+            <a:r>
+              <a:rPr lang="en-US" dirty="0"/>
+              <a:t>Please try to avoid “but what about…”s.  I will be focusing on the core feature set and not any extra modules. </a:t>
+            </a:r>
+          </a:p>
+          <a:p>
             <a:endParaRPr lang="en-US" dirty="0"/>
           </a:p>
         </p:txBody>
@@ -1087,7 +1171,7 @@
           <a:p>
             <a:fld id="{E9E1DFC9-EE16-4136-8822-8361C2EB7D32}" type="slidenum">
               <a:rPr lang="en-US" smtClean="0"/>
-              <a:t>3</a:t>
+              <a:t>2</a:t>
             </a:fld>
             <a:endParaRPr lang="en-US"/>
           </a:p>
@@ -1096,7 +1180,7 @@
     </p:spTree>
     <p:extLst>
       <p:ext uri="{BB962C8B-B14F-4D97-AF65-F5344CB8AC3E}">
-        <p14:creationId xmlns:p14="http://schemas.microsoft.com/office/powerpoint/2010/main" val="2717331410"/>
+        <p14:creationId xmlns:p14="http://schemas.microsoft.com/office/powerpoint/2010/main" val="3941402197"/>
       </p:ext>
     </p:extLst>
   </p:cSld>
@@ -1171,7 +1255,7 @@
           <a:p>
             <a:fld id="{E9E1DFC9-EE16-4136-8822-8361C2EB7D32}" type="slidenum">
               <a:rPr lang="en-US" smtClean="0"/>
-              <a:t>4</a:t>
+              <a:t>3</a:t>
             </a:fld>
             <a:endParaRPr lang="en-US"/>
           </a:p>
@@ -1180,7 +1264,7 @@
     </p:spTree>
     <p:extLst>
       <p:ext uri="{BB962C8B-B14F-4D97-AF65-F5344CB8AC3E}">
-        <p14:creationId xmlns:p14="http://schemas.microsoft.com/office/powerpoint/2010/main" val="473062820"/>
+        <p14:creationId xmlns:p14="http://schemas.microsoft.com/office/powerpoint/2010/main" val="2717331410"/>
       </p:ext>
     </p:extLst>
   </p:cSld>
@@ -1234,45 +1318,6 @@
           <a:bodyPr/>
           <a:lstStyle/>
           <a:p>
-            <a:pPr marL="0" marR="0" lvl="0" indent="0" algn="l" defTabSz="914400" rtl="0" eaLnBrk="1" fontAlgn="auto" latinLnBrk="0" hangingPunct="1">
-              <a:lnSpc>
-                <a:spcPct val="100000"/>
-              </a:lnSpc>
-              <a:spcBef>
-                <a:spcPts val="0"/>
-              </a:spcBef>
-              <a:spcAft>
-                <a:spcPts val="0"/>
-              </a:spcAft>
-              <a:buClrTx/>
-              <a:buSzTx/>
-              <a:buFontTx/>
-              <a:buNone/>
-              <a:tabLst/>
-              <a:defRPr/>
-            </a:pPr>
-            <a:r>
-              <a:rPr lang="en-US" dirty="0"/>
-              <a:t>“I have this awesome software I developed that does everything I need, but it has this one tenacious bug.  I just spent the last </a:t>
-            </a:r>
-            <a:r>
-              <a:rPr lang="en-US" u="sng" dirty="0"/>
-              <a:t>3 weeks</a:t>
-            </a:r>
-            <a:r>
-              <a:rPr lang="en-US" dirty="0"/>
-              <a:t> finding this bug, and it turned out that it was a simple setting/register/</a:t>
-            </a:r>
-            <a:r>
-              <a:rPr lang="en-US" dirty="0" err="1"/>
-              <a:t>subVI</a:t>
-            </a:r>
-            <a:r>
-              <a:rPr lang="en-US" dirty="0"/>
-              <a:t>.  But now, I don’t remember all the things I changed in trying to find that one thing I needed to change.”</a:t>
-            </a:r>
-          </a:p>
-          <a:p>
             <a:endParaRPr lang="en-US" dirty="0"/>
           </a:p>
         </p:txBody>
@@ -1294,7 +1339,7 @@
           <a:p>
             <a:fld id="{E9E1DFC9-EE16-4136-8822-8361C2EB7D32}" type="slidenum">
               <a:rPr lang="en-US" smtClean="0"/>
-              <a:t>5</a:t>
+              <a:t>4</a:t>
             </a:fld>
             <a:endParaRPr lang="en-US"/>
           </a:p>
@@ -1303,7 +1348,7 @@
     </p:spTree>
     <p:extLst>
       <p:ext uri="{BB962C8B-B14F-4D97-AF65-F5344CB8AC3E}">
-        <p14:creationId xmlns:p14="http://schemas.microsoft.com/office/powerpoint/2010/main" val="3795168807"/>
+        <p14:creationId xmlns:p14="http://schemas.microsoft.com/office/powerpoint/2010/main" val="473062820"/>
       </p:ext>
     </p:extLst>
   </p:cSld>
@@ -1357,10 +1402,46 @@
           <a:bodyPr/>
           <a:lstStyle/>
           <a:p>
+            <a:pPr marL="0" marR="0" lvl="0" indent="0" algn="l" defTabSz="914400" rtl="0" eaLnBrk="1" fontAlgn="auto" latinLnBrk="0" hangingPunct="1">
+              <a:lnSpc>
+                <a:spcPct val="100000"/>
+              </a:lnSpc>
+              <a:spcBef>
+                <a:spcPts val="0"/>
+              </a:spcBef>
+              <a:spcAft>
+                <a:spcPts val="0"/>
+              </a:spcAft>
+              <a:buClrTx/>
+              <a:buSzTx/>
+              <a:buFontTx/>
+              <a:buNone/>
+              <a:tabLst/>
+              <a:defRPr/>
+            </a:pPr>
             <a:r>
               <a:rPr lang="en-US" dirty="0"/>
-              <a:t>Better Define Locked out.</a:t>
-            </a:r>
+              <a:t>“I have this awesome software I developed that does everything I need, but it has this one tenacious bug.  I just spent the last </a:t>
+            </a:r>
+            <a:r>
+              <a:rPr lang="en-US" u="sng" dirty="0"/>
+              <a:t>3 weeks</a:t>
+            </a:r>
+            <a:r>
+              <a:rPr lang="en-US" dirty="0"/>
+              <a:t> finding this bug, and it turned out that it was a simple setting/register/</a:t>
+            </a:r>
+            <a:r>
+              <a:rPr lang="en-US" dirty="0" err="1"/>
+              <a:t>subVI</a:t>
+            </a:r>
+            <a:r>
+              <a:rPr lang="en-US" dirty="0"/>
+              <a:t>.  But now, I don’t remember all the things I changed in trying to find that one thing I needed to change.”</a:t>
+            </a:r>
+          </a:p>
+          <a:p>
+            <a:endParaRPr lang="en-US" dirty="0"/>
           </a:p>
         </p:txBody>
       </p:sp>
@@ -1381,7 +1462,7 @@
           <a:p>
             <a:fld id="{E9E1DFC9-EE16-4136-8822-8361C2EB7D32}" type="slidenum">
               <a:rPr lang="en-US" smtClean="0"/>
-              <a:t>6</a:t>
+              <a:t>5</a:t>
             </a:fld>
             <a:endParaRPr lang="en-US"/>
           </a:p>
@@ -1390,7 +1471,7 @@
     </p:spTree>
     <p:extLst>
       <p:ext uri="{BB962C8B-B14F-4D97-AF65-F5344CB8AC3E}">
-        <p14:creationId xmlns:p14="http://schemas.microsoft.com/office/powerpoint/2010/main" val="420198931"/>
+        <p14:creationId xmlns:p14="http://schemas.microsoft.com/office/powerpoint/2010/main" val="3795168807"/>
       </p:ext>
     </p:extLst>
   </p:cSld>
@@ -1444,7 +1525,10 @@
           <a:bodyPr/>
           <a:lstStyle/>
           <a:p>
-            <a:endParaRPr lang="en-US" dirty="0"/>
+            <a:r>
+              <a:rPr lang="en-US" dirty="0"/>
+              <a:t>Better Define Locked out.</a:t>
+            </a:r>
           </a:p>
         </p:txBody>
       </p:sp>
@@ -1463,9 +1547,9 @@
           <a:bodyPr/>
           <a:lstStyle/>
           <a:p>
-            <a:fld id="{D831DA15-0810-404C-B38C-91CCA02F8F85}" type="slidenum">
+            <a:fld id="{E9E1DFC9-EE16-4136-8822-8361C2EB7D32}" type="slidenum">
               <a:rPr lang="en-US" smtClean="0"/>
-              <a:t>7</a:t>
+              <a:t>6</a:t>
             </a:fld>
             <a:endParaRPr lang="en-US"/>
           </a:p>
@@ -1474,7 +1558,7 @@
     </p:spTree>
     <p:extLst>
       <p:ext uri="{BB962C8B-B14F-4D97-AF65-F5344CB8AC3E}">
-        <p14:creationId xmlns:p14="http://schemas.microsoft.com/office/powerpoint/2010/main" val="2611573630"/>
+        <p14:creationId xmlns:p14="http://schemas.microsoft.com/office/powerpoint/2010/main" val="420198931"/>
       </p:ext>
     </p:extLst>
   </p:cSld>
@@ -1528,10 +1612,7 @@
           <a:bodyPr/>
           <a:lstStyle/>
           <a:p>
-            <a:r>
-              <a:rPr lang="en-US" dirty="0"/>
-              <a:t>Better define work</a:t>
-            </a:r>
+            <a:endParaRPr lang="en-US" dirty="0"/>
           </a:p>
         </p:txBody>
       </p:sp>
@@ -1550,9 +1631,9 @@
           <a:bodyPr/>
           <a:lstStyle/>
           <a:p>
-            <a:fld id="{E9E1DFC9-EE16-4136-8822-8361C2EB7D32}" type="slidenum">
+            <a:fld id="{D831DA15-0810-404C-B38C-91CCA02F8F85}" type="slidenum">
               <a:rPr lang="en-US" smtClean="0"/>
-              <a:t>8</a:t>
+              <a:t>7</a:t>
             </a:fld>
             <a:endParaRPr lang="en-US"/>
           </a:p>
@@ -1561,7 +1642,7 @@
     </p:spTree>
     <p:extLst>
       <p:ext uri="{BB962C8B-B14F-4D97-AF65-F5344CB8AC3E}">
-        <p14:creationId xmlns:p14="http://schemas.microsoft.com/office/powerpoint/2010/main" val="1214830215"/>
+        <p14:creationId xmlns:p14="http://schemas.microsoft.com/office/powerpoint/2010/main" val="2611573630"/>
       </p:ext>
     </p:extLst>
   </p:cSld>
@@ -1639,7 +1720,7 @@
           <a:p>
             <a:fld id="{E9E1DFC9-EE16-4136-8822-8361C2EB7D32}" type="slidenum">
               <a:rPr lang="en-US" smtClean="0"/>
-              <a:t>9</a:t>
+              <a:t>8</a:t>
             </a:fld>
             <a:endParaRPr lang="en-US"/>
           </a:p>
@@ -1648,7 +1729,7 @@
     </p:spTree>
     <p:extLst>
       <p:ext uri="{BB962C8B-B14F-4D97-AF65-F5344CB8AC3E}">
-        <p14:creationId xmlns:p14="http://schemas.microsoft.com/office/powerpoint/2010/main" val="2705225124"/>
+        <p14:creationId xmlns:p14="http://schemas.microsoft.com/office/powerpoint/2010/main" val="1214830215"/>
       </p:ext>
     </p:extLst>
   </p:cSld>
@@ -1702,7 +1783,10 @@
           <a:bodyPr/>
           <a:lstStyle/>
           <a:p>
-            <a:endParaRPr lang="en-US" dirty="0"/>
+            <a:r>
+              <a:rPr lang="en-US" dirty="0"/>
+              <a:t>Better define work</a:t>
+            </a:r>
           </a:p>
         </p:txBody>
       </p:sp>
@@ -1723,7 +1807,7 @@
           <a:p>
             <a:fld id="{E9E1DFC9-EE16-4136-8822-8361C2EB7D32}" type="slidenum">
               <a:rPr lang="en-US" smtClean="0"/>
-              <a:t>11</a:t>
+              <a:t>9</a:t>
             </a:fld>
             <a:endParaRPr lang="en-US"/>
           </a:p>
@@ -1732,7 +1816,7 @@
     </p:spTree>
     <p:extLst>
       <p:ext uri="{BB962C8B-B14F-4D97-AF65-F5344CB8AC3E}">
-        <p14:creationId xmlns:p14="http://schemas.microsoft.com/office/powerpoint/2010/main" val="431731124"/>
+        <p14:creationId xmlns:p14="http://schemas.microsoft.com/office/powerpoint/2010/main" val="2705225124"/>
       </p:ext>
     </p:extLst>
   </p:cSld>
@@ -2464,7 +2548,7 @@
           <a:p>
             <a:fld id="{38E594E3-4743-4683-81F7-698D2FA773A6}" type="datetimeFigureOut">
               <a:rPr lang="en-US" smtClean="0"/>
-              <a:t>10/29/2019</a:t>
+              <a:t>11/2/2021</a:t>
             </a:fld>
             <a:endParaRPr lang="en-US"/>
           </a:p>
@@ -2715,7 +2799,7 @@
           <a:p>
             <a:fld id="{38E594E3-4743-4683-81F7-698D2FA773A6}" type="datetimeFigureOut">
               <a:rPr lang="en-US" smtClean="0"/>
-              <a:t>10/29/2019</a:t>
+              <a:t>11/2/2021</a:t>
             </a:fld>
             <a:endParaRPr lang="en-US"/>
           </a:p>
@@ -3029,7 +3113,7 @@
           <a:p>
             <a:fld id="{38E594E3-4743-4683-81F7-698D2FA773A6}" type="datetimeFigureOut">
               <a:rPr lang="en-US" smtClean="0"/>
-              <a:t>10/29/2019</a:t>
+              <a:t>11/2/2021</a:t>
             </a:fld>
             <a:endParaRPr lang="en-US"/>
           </a:p>
@@ -3370,7 +3454,7 @@
           <a:p>
             <a:fld id="{38E594E3-4743-4683-81F7-698D2FA773A6}" type="datetimeFigureOut">
               <a:rPr lang="en-US" smtClean="0"/>
-              <a:t>10/29/2019</a:t>
+              <a:t>11/2/2021</a:t>
             </a:fld>
             <a:endParaRPr lang="en-US"/>
           </a:p>
@@ -3684,7 +3768,7 @@
           <a:p>
             <a:fld id="{38E594E3-4743-4683-81F7-698D2FA773A6}" type="datetimeFigureOut">
               <a:rPr lang="en-US" smtClean="0"/>
-              <a:t>10/29/2019</a:t>
+              <a:t>11/2/2021</a:t>
             </a:fld>
             <a:endParaRPr lang="en-US"/>
           </a:p>
@@ -4077,7 +4161,7 @@
           <a:p>
             <a:fld id="{38E594E3-4743-4683-81F7-698D2FA773A6}" type="datetimeFigureOut">
               <a:rPr lang="en-US" smtClean="0"/>
-              <a:t>10/29/2019</a:t>
+              <a:t>11/2/2021</a:t>
             </a:fld>
             <a:endParaRPr lang="en-US"/>
           </a:p>
@@ -4247,7 +4331,7 @@
           <a:p>
             <a:fld id="{38E594E3-4743-4683-81F7-698D2FA773A6}" type="datetimeFigureOut">
               <a:rPr lang="en-US" smtClean="0"/>
-              <a:t>10/29/2019</a:t>
+              <a:t>11/2/2021</a:t>
             </a:fld>
             <a:endParaRPr lang="en-US"/>
           </a:p>
@@ -4427,7 +4511,7 @@
           <a:p>
             <a:fld id="{38E594E3-4743-4683-81F7-698D2FA773A6}" type="datetimeFigureOut">
               <a:rPr lang="en-US" smtClean="0"/>
-              <a:t>10/29/2019</a:t>
+              <a:t>11/2/2021</a:t>
             </a:fld>
             <a:endParaRPr lang="en-US"/>
           </a:p>
@@ -4603,7 +4687,7 @@
           <a:p>
             <a:fld id="{38E594E3-4743-4683-81F7-698D2FA773A6}" type="datetimeFigureOut">
               <a:rPr lang="en-US" smtClean="0"/>
-              <a:t>10/29/2019</a:t>
+              <a:t>11/2/2021</a:t>
             </a:fld>
             <a:endParaRPr lang="en-US"/>
           </a:p>
@@ -4850,7 +4934,7 @@
           <a:p>
             <a:fld id="{38E594E3-4743-4683-81F7-698D2FA773A6}" type="datetimeFigureOut">
               <a:rPr lang="en-US" smtClean="0"/>
-              <a:t>10/29/2019</a:t>
+              <a:t>11/2/2021</a:t>
             </a:fld>
             <a:endParaRPr lang="en-US"/>
           </a:p>
@@ -5082,7 +5166,7 @@
           <a:p>
             <a:fld id="{38E594E3-4743-4683-81F7-698D2FA773A6}" type="datetimeFigureOut">
               <a:rPr lang="en-US" smtClean="0"/>
-              <a:t>10/29/2019</a:t>
+              <a:t>11/2/2021</a:t>
             </a:fld>
             <a:endParaRPr lang="en-US"/>
           </a:p>
@@ -5456,7 +5540,7 @@
           <a:p>
             <a:fld id="{38E594E3-4743-4683-81F7-698D2FA773A6}" type="datetimeFigureOut">
               <a:rPr lang="en-US" smtClean="0"/>
-              <a:t>10/29/2019</a:t>
+              <a:t>11/2/2021</a:t>
             </a:fld>
             <a:endParaRPr lang="en-US"/>
           </a:p>
@@ -5579,7 +5663,7 @@
           <a:p>
             <a:fld id="{38E594E3-4743-4683-81F7-698D2FA773A6}" type="datetimeFigureOut">
               <a:rPr lang="en-US" smtClean="0"/>
-              <a:t>10/29/2019</a:t>
+              <a:t>11/2/2021</a:t>
             </a:fld>
             <a:endParaRPr lang="en-US"/>
           </a:p>
@@ -5674,7 +5758,7 @@
           <a:p>
             <a:fld id="{38E594E3-4743-4683-81F7-698D2FA773A6}" type="datetimeFigureOut">
               <a:rPr lang="en-US" smtClean="0"/>
-              <a:t>10/29/2019</a:t>
+              <a:t>11/2/2021</a:t>
             </a:fld>
             <a:endParaRPr lang="en-US"/>
           </a:p>
@@ -5929,7 +6013,7 @@
           <a:p>
             <a:fld id="{38E594E3-4743-4683-81F7-698D2FA773A6}" type="datetimeFigureOut">
               <a:rPr lang="en-US" smtClean="0"/>
-              <a:t>10/29/2019</a:t>
+              <a:t>11/2/2021</a:t>
             </a:fld>
             <a:endParaRPr lang="en-US"/>
           </a:p>
@@ -6192,7 +6276,7 @@
           <a:p>
             <a:fld id="{38E594E3-4743-4683-81F7-698D2FA773A6}" type="datetimeFigureOut">
               <a:rPr lang="en-US" smtClean="0"/>
-              <a:t>10/29/2019</a:t>
+              <a:t>11/2/2021</a:t>
             </a:fld>
             <a:endParaRPr lang="en-US"/>
           </a:p>
@@ -6935,7 +7019,7 @@
           <a:p>
             <a:fld id="{38E594E3-4743-4683-81F7-698D2FA773A6}" type="datetimeFigureOut">
               <a:rPr lang="en-US" smtClean="0"/>
-              <a:t>10/29/2019</a:t>
+              <a:t>11/2/2021</a:t>
             </a:fld>
             <a:endParaRPr lang="en-US"/>
           </a:p>
@@ -7516,7 +7600,7 @@
           <a:p>
             <a:r>
               <a:rPr lang="en-US" dirty="0"/>
-              <a:t>Presented by Seth Kazarians, BSEE</a:t>
+              <a:t>Presented by Seth Kazarians, MSEE</a:t>
             </a:r>
           </a:p>
         </p:txBody>
@@ -9186,7 +9270,15 @@
           <a:p>
             <a:r>
               <a:rPr lang="en-US" dirty="0"/>
-              <a:t>A branch is a copy of the working set that can be modified independently of other branches.</a:t>
+              <a:t>A branch is </a:t>
+            </a:r>
+            <a:r>
+              <a:rPr lang="en-US"/>
+              <a:t>(effectively) a </a:t>
+            </a:r>
+            <a:r>
+              <a:rPr lang="en-US" dirty="0"/>
+              <a:t>copy of the working set that can be modified independently of other branches.</a:t>
             </a:r>
           </a:p>
           <a:p>
@@ -10720,6 +10812,9 @@
                     <p:cTn id="3" fill="hold">
                       <p:stCondLst>
                         <p:cond delay="indefinite"/>
+                        <p:cond evt="onBegin" delay="0">
+                          <p:tn val="2"/>
+                        </p:cond>
                       </p:stCondLst>
                       <p:childTnLst>
                         <p:par>
@@ -10729,7 +10824,7 @@
                             </p:stCondLst>
                             <p:childTnLst>
                               <p:par>
-                                <p:cTn id="5" presetID="1" presetClass="entr" presetSubtype="0" fill="hold" grpId="0" nodeType="clickEffect">
+                                <p:cTn id="5" presetID="1" presetClass="entr" presetSubtype="0" fill="hold" grpId="0" nodeType="withEffect">
                                   <p:stCondLst>
                                     <p:cond delay="0"/>
                                   </p:stCondLst>
@@ -11063,7 +11158,79 @@
           <a:p>
             <a:r>
               <a:rPr lang="en-US" dirty="0"/>
-              <a:t>Git for Teams (O’Reilly Press &amp; www.gitforteams.com)</a:t>
+              <a:t>Git for Teams (O’Reilly Press &amp; </a:t>
+            </a:r>
+            <a:r>
+              <a:rPr lang="en-US" dirty="0">
+                <a:hlinkClick r:id="rId4"/>
+              </a:rPr>
+              <a:t>www.gitforteams.com</a:t>
+            </a:r>
+            <a:r>
+              <a:rPr lang="en-US" dirty="0"/>
+              <a:t>)</a:t>
+            </a:r>
+          </a:p>
+          <a:p>
+            <a:r>
+              <a:rPr lang="en-US" dirty="0" err="1"/>
+              <a:t>GitFlow</a:t>
+            </a:r>
+            <a:r>
+              <a:rPr lang="en-US" dirty="0"/>
+              <a:t> (</a:t>
+            </a:r>
+            <a:r>
+              <a:rPr lang="en-US" dirty="0">
+                <a:hlinkClick r:id="rId5"/>
+              </a:rPr>
+              <a:t>https://datasift.github.io/gitflow/IntroducingGitFlow.html</a:t>
+            </a:r>
+            <a:r>
+              <a:rPr lang="en-US" dirty="0"/>
+              <a:t>)</a:t>
+            </a:r>
+          </a:p>
+          <a:p>
+            <a:r>
+              <a:rPr lang="en-US" dirty="0"/>
+              <a:t>GitHub Flow (</a:t>
+            </a:r>
+            <a:r>
+              <a:rPr lang="en-US" dirty="0">
+                <a:hlinkClick r:id="rId6"/>
+              </a:rPr>
+              <a:t>https://guides.github.com/introduction/flow/</a:t>
+            </a:r>
+            <a:r>
+              <a:rPr lang="en-US" dirty="0"/>
+              <a:t>)</a:t>
+            </a:r>
+          </a:p>
+          <a:p>
+            <a:r>
+              <a:rPr lang="en-US" dirty="0"/>
+              <a:t>Git Large File Storage (</a:t>
+            </a:r>
+            <a:r>
+              <a:rPr lang="en-US" dirty="0">
+                <a:hlinkClick r:id="rId7"/>
+              </a:rPr>
+              <a:t>Atlassian</a:t>
+            </a:r>
+            <a:r>
+              <a:rPr lang="en-US" dirty="0"/>
+              <a:t> &amp; </a:t>
+            </a:r>
+            <a:r>
+              <a:rPr lang="en-US" dirty="0">
+                <a:hlinkClick r:id="rId8"/>
+              </a:rPr>
+              <a:t>GitHub</a:t>
+            </a:r>
+            <a:r>
+              <a:rPr lang="en-US" dirty="0"/>
+              <a:t>)</a:t>
             </a:r>
           </a:p>
           <a:p>

</xml_diff>